<commit_message>
Updating website commands for lab 1 and presentation.
</commit_message>
<xml_diff>
--- a/resources/Advanced github topics.pptx
+++ b/resources/Advanced github topics.pptx
@@ -5,33 +5,30 @@
     <p:sldMasterId id="2147483669" r:id="rId4"/>
   </p:sldMasterIdLst>
   <p:notesMasterIdLst>
-    <p:notesMasterId r:id="rId26"/>
+    <p:notesMasterId r:id="rId23"/>
   </p:notesMasterIdLst>
   <p:handoutMasterIdLst>
-    <p:handoutMasterId r:id="rId27"/>
+    <p:handoutMasterId r:id="rId24"/>
   </p:handoutMasterIdLst>
   <p:sldIdLst>
     <p:sldId id="256" r:id="rId5"/>
     <p:sldId id="258" r:id="rId6"/>
     <p:sldId id="285" r:id="rId7"/>
-    <p:sldId id="261" r:id="rId8"/>
-    <p:sldId id="262" r:id="rId9"/>
-    <p:sldId id="264" r:id="rId10"/>
-    <p:sldId id="266" r:id="rId11"/>
-    <p:sldId id="267" r:id="rId12"/>
-    <p:sldId id="268" r:id="rId13"/>
-    <p:sldId id="271" r:id="rId14"/>
-    <p:sldId id="270" r:id="rId15"/>
-    <p:sldId id="272" r:id="rId16"/>
-    <p:sldId id="273" r:id="rId17"/>
-    <p:sldId id="274" r:id="rId18"/>
-    <p:sldId id="275" r:id="rId19"/>
-    <p:sldId id="276" r:id="rId20"/>
-    <p:sldId id="277" r:id="rId21"/>
-    <p:sldId id="278" r:id="rId22"/>
-    <p:sldId id="279" r:id="rId23"/>
-    <p:sldId id="286" r:id="rId24"/>
-    <p:sldId id="265" r:id="rId25"/>
+    <p:sldId id="286" r:id="rId8"/>
+    <p:sldId id="287" r:id="rId9"/>
+    <p:sldId id="288" r:id="rId10"/>
+    <p:sldId id="289" r:id="rId11"/>
+    <p:sldId id="290" r:id="rId12"/>
+    <p:sldId id="291" r:id="rId13"/>
+    <p:sldId id="292" r:id="rId14"/>
+    <p:sldId id="293" r:id="rId15"/>
+    <p:sldId id="294" r:id="rId16"/>
+    <p:sldId id="295" r:id="rId17"/>
+    <p:sldId id="296" r:id="rId18"/>
+    <p:sldId id="297" r:id="rId19"/>
+    <p:sldId id="298" r:id="rId20"/>
+    <p:sldId id="299" r:id="rId21"/>
+    <p:sldId id="265" r:id="rId22"/>
   </p:sldIdLst>
   <p:sldSz cx="12192000" cy="6858000"/>
   <p:notesSz cx="6858000" cy="9144000"/>
@@ -13135,7 +13132,7 @@
           <p:cNvPr id="2" name="Title 1">
             <a:extLst>
               <a:ext uri="{FF2B5EF4-FFF2-40B4-BE49-F238E27FC236}">
-                <a16:creationId xmlns:a16="http://schemas.microsoft.com/office/drawing/2014/main" id="{13FC7AF7-A763-46CF-A6AA-353C92C0D8D4}"/>
+                <a16:creationId xmlns:a16="http://schemas.microsoft.com/office/drawing/2014/main" id="{460E5E25-300A-4A4D-B1C2-63CB6E978153}"/>
               </a:ext>
             </a:extLst>
           </p:cNvPr>
@@ -13153,102 +13150,50 @@
           <a:p>
             <a:r>
               <a:rPr lang="en-US" dirty="0"/>
-              <a:t>Lab 1 – Part 2</a:t>
+              <a:t>Rebase golden Rule - Illustrated</a:t>
             </a:r>
           </a:p>
         </p:txBody>
       </p:sp>
-      <p:sp>
-        <p:nvSpPr>
-          <p:cNvPr id="3" name="Content Placeholder 2">
+      <p:pic>
+        <p:nvPicPr>
+          <p:cNvPr id="7" name="Content Placeholder 6">
             <a:extLst>
               <a:ext uri="{FF2B5EF4-FFF2-40B4-BE49-F238E27FC236}">
-                <a16:creationId xmlns:a16="http://schemas.microsoft.com/office/drawing/2014/main" id="{6D08EF2B-6A6E-4390-A8F1-CDC0E1412495}"/>
+                <a16:creationId xmlns:a16="http://schemas.microsoft.com/office/drawing/2014/main" id="{D02A06AD-E44F-4112-9E5C-28E4F55730ED}"/>
               </a:ext>
             </a:extLst>
           </p:cNvPr>
-          <p:cNvSpPr>
-            <a:spLocks noGrp="1"/>
-          </p:cNvSpPr>
+          <p:cNvPicPr>
+            <a:picLocks noGrp="1" noChangeAspect="1"/>
+          </p:cNvPicPr>
           <p:nvPr>
             <p:ph idx="1"/>
           </p:nvPr>
-        </p:nvSpPr>
-        <p:spPr/>
-        <p:txBody>
-          <a:bodyPr/>
-          <a:lstStyle/>
-          <a:p>
-            <a:r>
-              <a:rPr lang="en-US" dirty="0"/>
-              <a:t>Create a repository in </a:t>
-            </a:r>
-            <a:r>
-              <a:rPr lang="en-US" dirty="0" err="1"/>
-              <a:t>github</a:t>
-            </a:r>
-            <a:endParaRPr lang="en-US" dirty="0"/>
-          </a:p>
-          <a:p>
-            <a:pPr lvl="1"/>
-            <a:r>
-              <a:rPr lang="en-US" dirty="0"/>
-              <a:t>Repository will be initialized by </a:t>
-            </a:r>
-            <a:r>
-              <a:rPr lang="en-US" dirty="0" err="1"/>
-              <a:t>github</a:t>
-            </a:r>
-            <a:endParaRPr lang="en-US" dirty="0"/>
-          </a:p>
-          <a:p>
-            <a:pPr lvl="2"/>
-            <a:r>
-              <a:rPr lang="en-US" dirty="0"/>
-              <a:t>Clone repository</a:t>
-            </a:r>
-          </a:p>
-          <a:p>
-            <a:pPr lvl="2"/>
-            <a:r>
-              <a:rPr lang="en-US" dirty="0"/>
-              <a:t>Create branch</a:t>
-            </a:r>
-          </a:p>
-          <a:p>
-            <a:pPr lvl="2"/>
-            <a:r>
-              <a:rPr lang="en-US" dirty="0"/>
-              <a:t>Make change</a:t>
-            </a:r>
-          </a:p>
-          <a:p>
-            <a:pPr lvl="2"/>
-            <a:r>
-              <a:rPr lang="en-US" dirty="0"/>
-              <a:t>Commit change</a:t>
-            </a:r>
-          </a:p>
-          <a:p>
-            <a:pPr lvl="2"/>
-            <a:r>
-              <a:rPr lang="en-US" dirty="0"/>
-              <a:t>Push</a:t>
-            </a:r>
-          </a:p>
-          <a:p>
-            <a:pPr lvl="2"/>
-            <a:r>
-              <a:rPr lang="en-US" dirty="0"/>
-              <a:t>Merge branch</a:t>
-            </a:r>
-          </a:p>
-        </p:txBody>
-      </p:sp>
+        </p:nvPicPr>
+        <p:blipFill>
+          <a:blip r:embed="rId2">
+            <a:extLst>
+              <a:ext uri="{96DAC541-7B7A-43D3-8B79-37D633B846F1}">
+                <asvg:svgBlip xmlns:asvg="http://schemas.microsoft.com/office/drawing/2016/SVG/main" r:embed="rId3"/>
+              </a:ext>
+            </a:extLst>
+          </a:blip>
+          <a:stretch>
+            <a:fillRect/>
+          </a:stretch>
+        </p:blipFill>
+        <p:spPr>
+          <a:xfrm>
+            <a:off x="3441445" y="2249488"/>
+            <a:ext cx="5305935" cy="3541712"/>
+          </a:xfrm>
+        </p:spPr>
+      </p:pic>
     </p:spTree>
     <p:extLst>
       <p:ext uri="{BB962C8B-B14F-4D97-AF65-F5344CB8AC3E}">
-        <p14:creationId xmlns:p14="http://schemas.microsoft.com/office/powerpoint/2010/main" val="4049689424"/>
+        <p14:creationId xmlns:p14="http://schemas.microsoft.com/office/powerpoint/2010/main" val="3349206372"/>
       </p:ext>
     </p:extLst>
   </p:cSld>
@@ -13280,7 +13225,7 @@
           <p:cNvPr id="2" name="Title 1">
             <a:extLst>
               <a:ext uri="{FF2B5EF4-FFF2-40B4-BE49-F238E27FC236}">
-                <a16:creationId xmlns:a16="http://schemas.microsoft.com/office/drawing/2014/main" id="{30819BD5-DA31-4FB8-B85B-9FC5D4A46B14}"/>
+                <a16:creationId xmlns:a16="http://schemas.microsoft.com/office/drawing/2014/main" id="{460E5E25-300A-4A4D-B1C2-63CB6E978153}"/>
               </a:ext>
             </a:extLst>
           </p:cNvPr>
@@ -13298,22 +13243,17 @@
           <a:p>
             <a:r>
               <a:rPr lang="en-US" dirty="0"/>
-              <a:t>Branching strategies - </a:t>
-            </a:r>
-            <a:r>
-              <a:rPr lang="en-US" dirty="0" err="1"/>
-              <a:t>Gitflow</a:t>
-            </a:r>
-            <a:endParaRPr lang="en-US" dirty="0"/>
+              <a:t>Rebase golden Rule - Illustrated</a:t>
+            </a:r>
           </a:p>
         </p:txBody>
       </p:sp>
       <p:pic>
         <p:nvPicPr>
-          <p:cNvPr id="5" name="Content Placeholder 4">
+          <p:cNvPr id="7" name="Content Placeholder 6">
             <a:extLst>
               <a:ext uri="{FF2B5EF4-FFF2-40B4-BE49-F238E27FC236}">
-                <a16:creationId xmlns:a16="http://schemas.microsoft.com/office/drawing/2014/main" id="{B928A5DC-54F3-4342-9FB1-578C95FDA742}"/>
+                <a16:creationId xmlns:a16="http://schemas.microsoft.com/office/drawing/2014/main" id="{D02A06AD-E44F-4112-9E5C-28E4F55730ED}"/>
               </a:ext>
             </a:extLst>
           </p:cNvPr>
@@ -13338,15 +13278,15 @@
         </p:blipFill>
         <p:spPr>
           <a:xfrm>
-            <a:off x="1403544" y="2097087"/>
-            <a:ext cx="9435031" cy="3868363"/>
+            <a:off x="3441445" y="2249488"/>
+            <a:ext cx="5305935" cy="3541712"/>
           </a:xfrm>
         </p:spPr>
       </p:pic>
     </p:spTree>
     <p:extLst>
       <p:ext uri="{BB962C8B-B14F-4D97-AF65-F5344CB8AC3E}">
-        <p14:creationId xmlns:p14="http://schemas.microsoft.com/office/powerpoint/2010/main" val="2559640882"/>
+        <p14:creationId xmlns:p14="http://schemas.microsoft.com/office/powerpoint/2010/main" val="1022779862"/>
       </p:ext>
     </p:extLst>
   </p:cSld>
@@ -13378,7 +13318,7 @@
           <p:cNvPr id="2" name="Title 1">
             <a:extLst>
               <a:ext uri="{FF2B5EF4-FFF2-40B4-BE49-F238E27FC236}">
-                <a16:creationId xmlns:a16="http://schemas.microsoft.com/office/drawing/2014/main" id="{30819BD5-DA31-4FB8-B85B-9FC5D4A46B14}"/>
+                <a16:creationId xmlns:a16="http://schemas.microsoft.com/office/drawing/2014/main" id="{B778339D-9DD8-4064-9E1B-B79A7D595DE2}"/>
               </a:ext>
             </a:extLst>
           </p:cNvPr>
@@ -13396,58 +13336,111 @@
           <a:p>
             <a:r>
               <a:rPr lang="en-US" dirty="0"/>
-              <a:t>Branching strategies – </a:t>
-            </a:r>
-            <a:r>
-              <a:rPr lang="en-US" dirty="0" err="1"/>
-              <a:t>Gitflow</a:t>
-            </a:r>
-            <a:r>
-              <a:rPr lang="en-US" dirty="0"/>
-              <a:t> (Cont.)</a:t>
+              <a:t>Leadup to lab 1</a:t>
             </a:r>
           </a:p>
         </p:txBody>
       </p:sp>
-      <p:pic>
-        <p:nvPicPr>
-          <p:cNvPr id="11" name="Content Placeholder 10">
+      <p:sp>
+        <p:nvSpPr>
+          <p:cNvPr id="3" name="Content Placeholder 2">
             <a:extLst>
               <a:ext uri="{FF2B5EF4-FFF2-40B4-BE49-F238E27FC236}">
-                <a16:creationId xmlns:a16="http://schemas.microsoft.com/office/drawing/2014/main" id="{D704F0B6-6DFF-4631-B064-30A8D090672C}"/>
+                <a16:creationId xmlns:a16="http://schemas.microsoft.com/office/drawing/2014/main" id="{6B98D569-D6AD-4D2A-8345-F2929A73D6AF}"/>
               </a:ext>
             </a:extLst>
           </p:cNvPr>
-          <p:cNvPicPr>
-            <a:picLocks noGrp="1" noChangeAspect="1"/>
-          </p:cNvPicPr>
+          <p:cNvSpPr>
+            <a:spLocks noGrp="1"/>
+          </p:cNvSpPr>
           <p:nvPr>
             <p:ph idx="1"/>
           </p:nvPr>
-        </p:nvPicPr>
-        <p:blipFill>
-          <a:blip r:embed="rId2">
-            <a:extLst>
-              <a:ext uri="{96DAC541-7B7A-43D3-8B79-37D633B846F1}">
-                <asvg:svgBlip xmlns:asvg="http://schemas.microsoft.com/office/drawing/2016/SVG/main" r:embed="rId3"/>
-              </a:ext>
-            </a:extLst>
-          </a:blip>
-          <a:stretch>
-            <a:fillRect/>
-          </a:stretch>
-        </p:blipFill>
-        <p:spPr>
-          <a:xfrm>
-            <a:off x="2174299" y="1780354"/>
-            <a:ext cx="7840225" cy="4459128"/>
-          </a:xfrm>
-        </p:spPr>
-      </p:pic>
+        </p:nvSpPr>
+        <p:spPr/>
+        <p:txBody>
+          <a:bodyPr>
+            <a:normAutofit fontScale="85000" lnSpcReduction="20000"/>
+          </a:bodyPr>
+          <a:lstStyle/>
+          <a:p>
+            <a:r>
+              <a:rPr lang="en-US" dirty="0"/>
+              <a:t>Rebase not only helps keep a clean tree, it can reduce clutter</a:t>
+            </a:r>
+          </a:p>
+          <a:p>
+            <a:pPr lvl="1"/>
+            <a:r>
+              <a:rPr lang="en-US" dirty="0"/>
+              <a:t>Maintaining clean commit histories can be challenging</a:t>
+            </a:r>
+          </a:p>
+          <a:p>
+            <a:pPr lvl="1"/>
+            <a:r>
+              <a:rPr lang="en-US" dirty="0"/>
+              <a:t>Consolidating commit messages and removing unnecessary commits</a:t>
+            </a:r>
+          </a:p>
+          <a:p>
+            <a:pPr lvl="1"/>
+            <a:r>
+              <a:rPr lang="en-US" dirty="0"/>
+              <a:t>Alter history itself! (You can do some weird stuff with rebase!)</a:t>
+            </a:r>
+          </a:p>
+          <a:p>
+            <a:r>
+              <a:rPr lang="en-US" dirty="0"/>
+              <a:t>Important rebase terms:</a:t>
+            </a:r>
+          </a:p>
+          <a:p>
+            <a:pPr lvl="1"/>
+            <a:r>
+              <a:rPr lang="en-US" dirty="0"/>
+              <a:t>Pick</a:t>
+            </a:r>
+          </a:p>
+          <a:p>
+            <a:pPr lvl="1"/>
+            <a:r>
+              <a:rPr lang="en-US" dirty="0"/>
+              <a:t>Squash</a:t>
+            </a:r>
+          </a:p>
+          <a:p>
+            <a:pPr lvl="1"/>
+            <a:r>
+              <a:rPr lang="en-US" dirty="0"/>
+              <a:t>Edit</a:t>
+            </a:r>
+          </a:p>
+          <a:p>
+            <a:pPr lvl="1"/>
+            <a:r>
+              <a:rPr lang="en-US" dirty="0"/>
+              <a:t>Reword</a:t>
+            </a:r>
+          </a:p>
+          <a:p>
+            <a:pPr lvl="1"/>
+            <a:r>
+              <a:rPr lang="en-US" dirty="0"/>
+              <a:t>Drop</a:t>
+            </a:r>
+          </a:p>
+          <a:p>
+            <a:pPr lvl="1"/>
+            <a:endParaRPr lang="en-US" dirty="0"/>
+          </a:p>
+        </p:txBody>
+      </p:sp>
     </p:spTree>
     <p:extLst>
       <p:ext uri="{BB962C8B-B14F-4D97-AF65-F5344CB8AC3E}">
-        <p14:creationId xmlns:p14="http://schemas.microsoft.com/office/powerpoint/2010/main" val="3925328895"/>
+        <p14:creationId xmlns:p14="http://schemas.microsoft.com/office/powerpoint/2010/main" val="2070696651"/>
       </p:ext>
     </p:extLst>
   </p:cSld>
@@ -13479,7 +13472,7 @@
           <p:cNvPr id="2" name="Title 1">
             <a:extLst>
               <a:ext uri="{FF2B5EF4-FFF2-40B4-BE49-F238E27FC236}">
-                <a16:creationId xmlns:a16="http://schemas.microsoft.com/office/drawing/2014/main" id="{30819BD5-DA31-4FB8-B85B-9FC5D4A46B14}"/>
+                <a16:creationId xmlns:a16="http://schemas.microsoft.com/office/drawing/2014/main" id="{B778339D-9DD8-4064-9E1B-B79A7D595DE2}"/>
               </a:ext>
             </a:extLst>
           </p:cNvPr>
@@ -13497,495 +13490,7 @@
           <a:p>
             <a:r>
               <a:rPr lang="en-US" dirty="0"/>
-              <a:t>Branching strategies – </a:t>
-            </a:r>
-            <a:r>
-              <a:rPr lang="en-US" dirty="0" err="1"/>
-              <a:t>Gitflow</a:t>
-            </a:r>
-            <a:r>
-              <a:rPr lang="en-US" dirty="0"/>
-              <a:t> (Cont.)</a:t>
-            </a:r>
-          </a:p>
-        </p:txBody>
-      </p:sp>
-      <p:pic>
-        <p:nvPicPr>
-          <p:cNvPr id="9" name="Content Placeholder 8">
-            <a:extLst>
-              <a:ext uri="{FF2B5EF4-FFF2-40B4-BE49-F238E27FC236}">
-                <a16:creationId xmlns:a16="http://schemas.microsoft.com/office/drawing/2014/main" id="{D2595462-70B1-42AE-97F1-85438471583F}"/>
-              </a:ext>
-            </a:extLst>
-          </p:cNvPr>
-          <p:cNvPicPr>
-            <a:picLocks noGrp="1" noChangeAspect="1"/>
-          </p:cNvPicPr>
-          <p:nvPr>
-            <p:ph idx="1"/>
-          </p:nvPr>
-        </p:nvPicPr>
-        <p:blipFill>
-          <a:blip r:embed="rId2">
-            <a:extLst>
-              <a:ext uri="{96DAC541-7B7A-43D3-8B79-37D633B846F1}">
-                <asvg:svgBlip xmlns:asvg="http://schemas.microsoft.com/office/drawing/2016/SVG/main" r:embed="rId3"/>
-              </a:ext>
-            </a:extLst>
-          </a:blip>
-          <a:stretch>
-            <a:fillRect/>
-          </a:stretch>
-        </p:blipFill>
-        <p:spPr>
-          <a:xfrm>
-            <a:off x="2314152" y="1753299"/>
-            <a:ext cx="7560520" cy="4857634"/>
-          </a:xfrm>
-        </p:spPr>
-      </p:pic>
-    </p:spTree>
-    <p:extLst>
-      <p:ext uri="{BB962C8B-B14F-4D97-AF65-F5344CB8AC3E}">
-        <p14:creationId xmlns:p14="http://schemas.microsoft.com/office/powerpoint/2010/main" val="2638837885"/>
-      </p:ext>
-    </p:extLst>
-  </p:cSld>
-  <p:clrMapOvr>
-    <a:masterClrMapping/>
-  </p:clrMapOvr>
-</p:sld>
-</file>
-
-<file path=ppt/slides/slide14.xml><?xml version="1.0" encoding="utf-8"?>
-<p:sld xmlns:a="http://schemas.openxmlformats.org/drawingml/2006/main" xmlns:r="http://schemas.openxmlformats.org/officeDocument/2006/relationships" xmlns:p="http://schemas.openxmlformats.org/presentationml/2006/main">
-  <p:cSld>
-    <p:spTree>
-      <p:nvGrpSpPr>
-        <p:cNvPr id="1" name=""/>
-        <p:cNvGrpSpPr/>
-        <p:nvPr/>
-      </p:nvGrpSpPr>
-      <p:grpSpPr>
-        <a:xfrm>
-          <a:off x="0" y="0"/>
-          <a:ext cx="0" cy="0"/>
-          <a:chOff x="0" y="0"/>
-          <a:chExt cx="0" cy="0"/>
-        </a:xfrm>
-      </p:grpSpPr>
-      <p:sp>
-        <p:nvSpPr>
-          <p:cNvPr id="2" name="Title 1">
-            <a:extLst>
-              <a:ext uri="{FF2B5EF4-FFF2-40B4-BE49-F238E27FC236}">
-                <a16:creationId xmlns:a16="http://schemas.microsoft.com/office/drawing/2014/main" id="{30819BD5-DA31-4FB8-B85B-9FC5D4A46B14}"/>
-              </a:ext>
-            </a:extLst>
-          </p:cNvPr>
-          <p:cNvSpPr>
-            <a:spLocks noGrp="1"/>
-          </p:cNvSpPr>
-          <p:nvPr>
-            <p:ph type="title"/>
-          </p:nvPr>
-        </p:nvSpPr>
-        <p:spPr/>
-        <p:txBody>
-          <a:bodyPr/>
-          <a:lstStyle/>
-          <a:p>
-            <a:r>
-              <a:rPr lang="en-US" dirty="0"/>
-              <a:t>Branching strategies – </a:t>
-            </a:r>
-            <a:r>
-              <a:rPr lang="en-US" dirty="0" err="1"/>
-              <a:t>Gitflow</a:t>
-            </a:r>
-            <a:r>
-              <a:rPr lang="en-US" dirty="0"/>
-              <a:t> (Cont.)</a:t>
-            </a:r>
-          </a:p>
-        </p:txBody>
-      </p:sp>
-      <p:pic>
-        <p:nvPicPr>
-          <p:cNvPr id="9" name="Content Placeholder 8">
-            <a:extLst>
-              <a:ext uri="{FF2B5EF4-FFF2-40B4-BE49-F238E27FC236}">
-                <a16:creationId xmlns:a16="http://schemas.microsoft.com/office/drawing/2014/main" id="{14AD2C50-D590-4F3F-9475-980F846DF02E}"/>
-              </a:ext>
-            </a:extLst>
-          </p:cNvPr>
-          <p:cNvPicPr>
-            <a:picLocks noGrp="1" noChangeAspect="1"/>
-          </p:cNvPicPr>
-          <p:nvPr>
-            <p:ph idx="1"/>
-          </p:nvPr>
-        </p:nvPicPr>
-        <p:blipFill>
-          <a:blip r:embed="rId2">
-            <a:extLst>
-              <a:ext uri="{96DAC541-7B7A-43D3-8B79-37D633B846F1}">
-                <asvg:svgBlip xmlns:asvg="http://schemas.microsoft.com/office/drawing/2016/SVG/main" r:embed="rId3"/>
-              </a:ext>
-            </a:extLst>
-          </a:blip>
-          <a:stretch>
-            <a:fillRect/>
-          </a:stretch>
-        </p:blipFill>
-        <p:spPr>
-          <a:xfrm>
-            <a:off x="2774841" y="1802716"/>
-            <a:ext cx="6642318" cy="4765864"/>
-          </a:xfrm>
-        </p:spPr>
-      </p:pic>
-    </p:spTree>
-    <p:extLst>
-      <p:ext uri="{BB962C8B-B14F-4D97-AF65-F5344CB8AC3E}">
-        <p14:creationId xmlns:p14="http://schemas.microsoft.com/office/powerpoint/2010/main" val="3664828835"/>
-      </p:ext>
-    </p:extLst>
-  </p:cSld>
-  <p:clrMapOvr>
-    <a:masterClrMapping/>
-  </p:clrMapOvr>
-</p:sld>
-</file>
-
-<file path=ppt/slides/slide15.xml><?xml version="1.0" encoding="utf-8"?>
-<p:sld xmlns:a="http://schemas.openxmlformats.org/drawingml/2006/main" xmlns:r="http://schemas.openxmlformats.org/officeDocument/2006/relationships" xmlns:p="http://schemas.openxmlformats.org/presentationml/2006/main">
-  <p:cSld>
-    <p:spTree>
-      <p:nvGrpSpPr>
-        <p:cNvPr id="1" name=""/>
-        <p:cNvGrpSpPr/>
-        <p:nvPr/>
-      </p:nvGrpSpPr>
-      <p:grpSpPr>
-        <a:xfrm>
-          <a:off x="0" y="0"/>
-          <a:ext cx="0" cy="0"/>
-          <a:chOff x="0" y="0"/>
-          <a:chExt cx="0" cy="0"/>
-        </a:xfrm>
-      </p:grpSpPr>
-      <p:sp>
-        <p:nvSpPr>
-          <p:cNvPr id="2" name="Title 1">
-            <a:extLst>
-              <a:ext uri="{FF2B5EF4-FFF2-40B4-BE49-F238E27FC236}">
-                <a16:creationId xmlns:a16="http://schemas.microsoft.com/office/drawing/2014/main" id="{6DD14019-48D1-41B6-A0B1-4EF1A8F1E48D}"/>
-              </a:ext>
-            </a:extLst>
-          </p:cNvPr>
-          <p:cNvSpPr>
-            <a:spLocks noGrp="1"/>
-          </p:cNvSpPr>
-          <p:nvPr>
-            <p:ph type="title"/>
-          </p:nvPr>
-        </p:nvSpPr>
-        <p:spPr>
-          <a:xfrm>
-            <a:off x="1141413" y="618518"/>
-            <a:ext cx="9905998" cy="1478570"/>
-          </a:xfrm>
-        </p:spPr>
-        <p:txBody>
-          <a:bodyPr/>
-          <a:lstStyle/>
-          <a:p>
-            <a:r>
-              <a:rPr lang="en-US" dirty="0"/>
-              <a:t>Conflict is inevitable</a:t>
-            </a:r>
-          </a:p>
-        </p:txBody>
-      </p:sp>
-      <p:sp>
-        <p:nvSpPr>
-          <p:cNvPr id="3" name="Content Placeholder 2">
-            <a:extLst>
-              <a:ext uri="{FF2B5EF4-FFF2-40B4-BE49-F238E27FC236}">
-                <a16:creationId xmlns:a16="http://schemas.microsoft.com/office/drawing/2014/main" id="{B1235650-9466-40DF-93FC-28282045BDE8}"/>
-              </a:ext>
-            </a:extLst>
-          </p:cNvPr>
-          <p:cNvSpPr>
-            <a:spLocks noGrp="1"/>
-          </p:cNvSpPr>
-          <p:nvPr>
-            <p:ph idx="1"/>
-          </p:nvPr>
-        </p:nvSpPr>
-        <p:spPr>
-          <a:xfrm>
-            <a:off x="1141412" y="2249487"/>
-            <a:ext cx="9905999" cy="3541714"/>
-          </a:xfrm>
-        </p:spPr>
-        <p:txBody>
-          <a:bodyPr/>
-          <a:lstStyle/>
-          <a:p>
-            <a:r>
-              <a:rPr lang="en-US" dirty="0"/>
-              <a:t>Unless you are working on a project by yourself, it will likely be almost impossible to avoid merge conflicts</a:t>
-            </a:r>
-          </a:p>
-          <a:p>
-            <a:pPr lvl="1"/>
-            <a:r>
-              <a:rPr lang="en-US" dirty="0"/>
-              <a:t>Managing conflicts can be challenging</a:t>
-            </a:r>
-          </a:p>
-          <a:p>
-            <a:pPr lvl="1"/>
-            <a:r>
-              <a:rPr lang="en-US" dirty="0"/>
-              <a:t>Different strategies exist, but our next lab will be the most likely resolution strategy</a:t>
-            </a:r>
-          </a:p>
-          <a:p>
-            <a:r>
-              <a:rPr lang="en-US" dirty="0"/>
-              <a:t>Rebasing is another strategy we’ll discuss post-lab</a:t>
-            </a:r>
-          </a:p>
-        </p:txBody>
-      </p:sp>
-    </p:spTree>
-    <p:extLst>
-      <p:ext uri="{BB962C8B-B14F-4D97-AF65-F5344CB8AC3E}">
-        <p14:creationId xmlns:p14="http://schemas.microsoft.com/office/powerpoint/2010/main" val="555395727"/>
-      </p:ext>
-    </p:extLst>
-  </p:cSld>
-  <p:clrMapOvr>
-    <a:masterClrMapping/>
-  </p:clrMapOvr>
-</p:sld>
-</file>
-
-<file path=ppt/slides/slide16.xml><?xml version="1.0" encoding="utf-8"?>
-<p:sld xmlns:a="http://schemas.openxmlformats.org/drawingml/2006/main" xmlns:r="http://schemas.openxmlformats.org/officeDocument/2006/relationships" xmlns:p="http://schemas.openxmlformats.org/presentationml/2006/main">
-  <p:cSld>
-    <p:spTree>
-      <p:nvGrpSpPr>
-        <p:cNvPr id="1" name=""/>
-        <p:cNvGrpSpPr/>
-        <p:nvPr/>
-      </p:nvGrpSpPr>
-      <p:grpSpPr>
-        <a:xfrm>
-          <a:off x="0" y="0"/>
-          <a:ext cx="0" cy="0"/>
-          <a:chOff x="0" y="0"/>
-          <a:chExt cx="0" cy="0"/>
-        </a:xfrm>
-      </p:grpSpPr>
-      <p:sp>
-        <p:nvSpPr>
-          <p:cNvPr id="2" name="Title 1">
-            <a:extLst>
-              <a:ext uri="{FF2B5EF4-FFF2-40B4-BE49-F238E27FC236}">
-                <a16:creationId xmlns:a16="http://schemas.microsoft.com/office/drawing/2014/main" id="{4FFD6851-F1AF-41A1-A40D-745BE3ACD56E}"/>
-              </a:ext>
-            </a:extLst>
-          </p:cNvPr>
-          <p:cNvSpPr>
-            <a:spLocks noGrp="1"/>
-          </p:cNvSpPr>
-          <p:nvPr>
-            <p:ph type="title"/>
-          </p:nvPr>
-        </p:nvSpPr>
-        <p:spPr/>
-        <p:txBody>
-          <a:bodyPr/>
-          <a:lstStyle/>
-          <a:p>
-            <a:r>
-              <a:rPr lang="en-US" dirty="0"/>
-              <a:t>Lab 2</a:t>
-            </a:r>
-          </a:p>
-        </p:txBody>
-      </p:sp>
-      <p:sp>
-        <p:nvSpPr>
-          <p:cNvPr id="3" name="Content Placeholder 2">
-            <a:extLst>
-              <a:ext uri="{FF2B5EF4-FFF2-40B4-BE49-F238E27FC236}">
-                <a16:creationId xmlns:a16="http://schemas.microsoft.com/office/drawing/2014/main" id="{324C217D-DAE3-4D56-85C2-ADEF32B55302}"/>
-              </a:ext>
-            </a:extLst>
-          </p:cNvPr>
-          <p:cNvSpPr>
-            <a:spLocks noGrp="1"/>
-          </p:cNvSpPr>
-          <p:nvPr>
-            <p:ph idx="1"/>
-          </p:nvPr>
-        </p:nvSpPr>
-        <p:spPr>
-          <a:xfrm>
-            <a:off x="1141412" y="2249487"/>
-            <a:ext cx="9905999" cy="3989996"/>
-          </a:xfrm>
-        </p:spPr>
-        <p:txBody>
-          <a:bodyPr>
-            <a:normAutofit fontScale="85000" lnSpcReduction="20000"/>
-          </a:bodyPr>
-          <a:lstStyle/>
-          <a:p>
-            <a:r>
-              <a:rPr lang="en-US" dirty="0"/>
-              <a:t>For this lab, we’ll use GitHub Desktop</a:t>
-            </a:r>
-          </a:p>
-          <a:p>
-            <a:pPr lvl="1"/>
-            <a:r>
-              <a:rPr lang="en-US" dirty="0"/>
-              <a:t>Use the repository we created as our starting point</a:t>
-            </a:r>
-          </a:p>
-          <a:p>
-            <a:pPr lvl="1"/>
-            <a:r>
-              <a:rPr lang="en-US" dirty="0"/>
-              <a:t>Create a new branch, the name is unimportant</a:t>
-            </a:r>
-          </a:p>
-          <a:p>
-            <a:pPr lvl="1"/>
-            <a:r>
-              <a:rPr lang="en-US" dirty="0"/>
-              <a:t>Switch back to master (GitHub Desktop switches to the newly created branch by default)</a:t>
-            </a:r>
-          </a:p>
-          <a:p>
-            <a:pPr lvl="1"/>
-            <a:r>
-              <a:rPr lang="en-US" dirty="0"/>
-              <a:t>Update the README.md file</a:t>
-            </a:r>
-          </a:p>
-          <a:p>
-            <a:pPr lvl="1"/>
-            <a:r>
-              <a:rPr lang="en-US" dirty="0"/>
-              <a:t>Commit changes</a:t>
-            </a:r>
-          </a:p>
-          <a:p>
-            <a:pPr lvl="1"/>
-            <a:r>
-              <a:rPr lang="en-US" dirty="0"/>
-              <a:t>Switch to your new branch</a:t>
-            </a:r>
-          </a:p>
-          <a:p>
-            <a:pPr lvl="1"/>
-            <a:r>
-              <a:rPr lang="en-US" dirty="0"/>
-              <a:t>Update the README.md file on the same line</a:t>
-            </a:r>
-          </a:p>
-          <a:p>
-            <a:pPr lvl="1"/>
-            <a:r>
-              <a:rPr lang="en-US" dirty="0"/>
-              <a:t>Commit changes</a:t>
-            </a:r>
-          </a:p>
-          <a:p>
-            <a:pPr lvl="1"/>
-            <a:r>
-              <a:rPr lang="en-US" dirty="0"/>
-              <a:t>Switch to master branch</a:t>
-            </a:r>
-          </a:p>
-          <a:p>
-            <a:pPr lvl="1"/>
-            <a:r>
-              <a:rPr lang="en-US" dirty="0"/>
-              <a:t>Attempt to merge your new branch into master</a:t>
-            </a:r>
-          </a:p>
-          <a:p>
-            <a:pPr lvl="1"/>
-            <a:r>
-              <a:rPr lang="en-US" dirty="0"/>
-              <a:t>Resolve conflict</a:t>
-            </a:r>
-          </a:p>
-        </p:txBody>
-      </p:sp>
-    </p:spTree>
-    <p:extLst>
-      <p:ext uri="{BB962C8B-B14F-4D97-AF65-F5344CB8AC3E}">
-        <p14:creationId xmlns:p14="http://schemas.microsoft.com/office/powerpoint/2010/main" val="1429735983"/>
-      </p:ext>
-    </p:extLst>
-  </p:cSld>
-  <p:clrMapOvr>
-    <a:masterClrMapping/>
-  </p:clrMapOvr>
-</p:sld>
-</file>
-
-<file path=ppt/slides/slide17.xml><?xml version="1.0" encoding="utf-8"?>
-<p:sld xmlns:a="http://schemas.openxmlformats.org/drawingml/2006/main" xmlns:r="http://schemas.openxmlformats.org/officeDocument/2006/relationships" xmlns:p="http://schemas.openxmlformats.org/presentationml/2006/main">
-  <p:cSld>
-    <p:spTree>
-      <p:nvGrpSpPr>
-        <p:cNvPr id="1" name=""/>
-        <p:cNvGrpSpPr/>
-        <p:nvPr/>
-      </p:nvGrpSpPr>
-      <p:grpSpPr>
-        <a:xfrm>
-          <a:off x="0" y="0"/>
-          <a:ext cx="0" cy="0"/>
-          <a:chOff x="0" y="0"/>
-          <a:chExt cx="0" cy="0"/>
-        </a:xfrm>
-      </p:grpSpPr>
-      <p:sp>
-        <p:nvSpPr>
-          <p:cNvPr id="2" name="Title 1">
-            <a:extLst>
-              <a:ext uri="{FF2B5EF4-FFF2-40B4-BE49-F238E27FC236}">
-                <a16:creationId xmlns:a16="http://schemas.microsoft.com/office/drawing/2014/main" id="{4D1E3FC3-B062-491B-A8A4-DA3269C9306E}"/>
-              </a:ext>
-            </a:extLst>
-          </p:cNvPr>
-          <p:cNvSpPr>
-            <a:spLocks noGrp="1"/>
-          </p:cNvSpPr>
-          <p:nvPr>
-            <p:ph type="title"/>
-          </p:nvPr>
-        </p:nvSpPr>
-        <p:spPr/>
-        <p:txBody>
-          <a:bodyPr/>
-          <a:lstStyle/>
-          <a:p>
-            <a:r>
-              <a:rPr lang="en-US" dirty="0"/>
-              <a:t>Rebase – Tread carefully</a:t>
+              <a:t>Lab 1 – Interactively rebasing</a:t>
             </a:r>
           </a:p>
         </p:txBody>
@@ -13995,7 +13500,7 @@
           <p:cNvPr id="5" name="Content Placeholder 4">
             <a:extLst>
               <a:ext uri="{FF2B5EF4-FFF2-40B4-BE49-F238E27FC236}">
-                <a16:creationId xmlns:a16="http://schemas.microsoft.com/office/drawing/2014/main" id="{83847413-08C2-4A59-87B1-6CCE207798ED}"/>
+                <a16:creationId xmlns:a16="http://schemas.microsoft.com/office/drawing/2014/main" id="{203F82D0-49C5-4317-9751-818DC1662131}"/>
               </a:ext>
             </a:extLst>
           </p:cNvPr>
@@ -14028,7 +13533,512 @@
     </p:spTree>
     <p:extLst>
       <p:ext uri="{BB962C8B-B14F-4D97-AF65-F5344CB8AC3E}">
-        <p14:creationId xmlns:p14="http://schemas.microsoft.com/office/powerpoint/2010/main" val="4237218953"/>
+        <p14:creationId xmlns:p14="http://schemas.microsoft.com/office/powerpoint/2010/main" val="2033759713"/>
+      </p:ext>
+    </p:extLst>
+  </p:cSld>
+  <p:clrMapOvr>
+    <a:masterClrMapping/>
+  </p:clrMapOvr>
+</p:sld>
+</file>
+
+<file path=ppt/slides/slide14.xml><?xml version="1.0" encoding="utf-8"?>
+<p:sld xmlns:a="http://schemas.openxmlformats.org/drawingml/2006/main" xmlns:r="http://schemas.openxmlformats.org/officeDocument/2006/relationships" xmlns:p="http://schemas.openxmlformats.org/presentationml/2006/main">
+  <p:cSld>
+    <p:spTree>
+      <p:nvGrpSpPr>
+        <p:cNvPr id="1" name=""/>
+        <p:cNvGrpSpPr/>
+        <p:nvPr/>
+      </p:nvGrpSpPr>
+      <p:grpSpPr>
+        <a:xfrm>
+          <a:off x="0" y="0"/>
+          <a:ext cx="0" cy="0"/>
+          <a:chOff x="0" y="0"/>
+          <a:chExt cx="0" cy="0"/>
+        </a:xfrm>
+      </p:grpSpPr>
+      <p:sp>
+        <p:nvSpPr>
+          <p:cNvPr id="2" name="Title 1">
+            <a:extLst>
+              <a:ext uri="{FF2B5EF4-FFF2-40B4-BE49-F238E27FC236}">
+                <a16:creationId xmlns:a16="http://schemas.microsoft.com/office/drawing/2014/main" id="{B778339D-9DD8-4064-9E1B-B79A7D595DE2}"/>
+              </a:ext>
+            </a:extLst>
+          </p:cNvPr>
+          <p:cNvSpPr>
+            <a:spLocks noGrp="1"/>
+          </p:cNvSpPr>
+          <p:nvPr>
+            <p:ph type="title"/>
+          </p:nvPr>
+        </p:nvSpPr>
+        <p:spPr/>
+        <p:txBody>
+          <a:bodyPr/>
+          <a:lstStyle/>
+          <a:p>
+            <a:r>
+              <a:rPr lang="en-US" dirty="0"/>
+              <a:t>Lab 1 – Interactively rebasing</a:t>
+            </a:r>
+          </a:p>
+        </p:txBody>
+      </p:sp>
+      <p:pic>
+        <p:nvPicPr>
+          <p:cNvPr id="7" name="Content Placeholder 6">
+            <a:extLst>
+              <a:ext uri="{FF2B5EF4-FFF2-40B4-BE49-F238E27FC236}">
+                <a16:creationId xmlns:a16="http://schemas.microsoft.com/office/drawing/2014/main" id="{CE0FD989-86EC-492A-B5F7-6D37E3C1FFE9}"/>
+              </a:ext>
+            </a:extLst>
+          </p:cNvPr>
+          <p:cNvPicPr>
+            <a:picLocks noGrp="1" noChangeAspect="1"/>
+          </p:cNvPicPr>
+          <p:nvPr>
+            <p:ph idx="1"/>
+          </p:nvPr>
+        </p:nvPicPr>
+        <p:blipFill>
+          <a:blip r:embed="rId2">
+            <a:extLst>
+              <a:ext uri="{96DAC541-7B7A-43D3-8B79-37D633B846F1}">
+                <asvg:svgBlip xmlns:asvg="http://schemas.microsoft.com/office/drawing/2016/SVG/main" r:embed="rId3"/>
+              </a:ext>
+            </a:extLst>
+          </a:blip>
+          <a:stretch>
+            <a:fillRect/>
+          </a:stretch>
+        </p:blipFill>
+        <p:spPr>
+          <a:xfrm>
+            <a:off x="3768165" y="2249488"/>
+            <a:ext cx="4652495" cy="3541712"/>
+          </a:xfrm>
+        </p:spPr>
+      </p:pic>
+    </p:spTree>
+    <p:extLst>
+      <p:ext uri="{BB962C8B-B14F-4D97-AF65-F5344CB8AC3E}">
+        <p14:creationId xmlns:p14="http://schemas.microsoft.com/office/powerpoint/2010/main" val="3775200752"/>
+      </p:ext>
+    </p:extLst>
+  </p:cSld>
+  <p:clrMapOvr>
+    <a:masterClrMapping/>
+  </p:clrMapOvr>
+</p:sld>
+</file>
+
+<file path=ppt/slides/slide15.xml><?xml version="1.0" encoding="utf-8"?>
+<p:sld xmlns:a="http://schemas.openxmlformats.org/drawingml/2006/main" xmlns:r="http://schemas.openxmlformats.org/officeDocument/2006/relationships" xmlns:p="http://schemas.openxmlformats.org/presentationml/2006/main">
+  <p:cSld>
+    <p:spTree>
+      <p:nvGrpSpPr>
+        <p:cNvPr id="1" name=""/>
+        <p:cNvGrpSpPr/>
+        <p:nvPr/>
+      </p:nvGrpSpPr>
+      <p:grpSpPr>
+        <a:xfrm>
+          <a:off x="0" y="0"/>
+          <a:ext cx="0" cy="0"/>
+          <a:chOff x="0" y="0"/>
+          <a:chExt cx="0" cy="0"/>
+        </a:xfrm>
+      </p:grpSpPr>
+      <p:sp>
+        <p:nvSpPr>
+          <p:cNvPr id="2" name="Title 1">
+            <a:extLst>
+              <a:ext uri="{FF2B5EF4-FFF2-40B4-BE49-F238E27FC236}">
+                <a16:creationId xmlns:a16="http://schemas.microsoft.com/office/drawing/2014/main" id="{B778339D-9DD8-4064-9E1B-B79A7D595DE2}"/>
+              </a:ext>
+            </a:extLst>
+          </p:cNvPr>
+          <p:cNvSpPr>
+            <a:spLocks noGrp="1"/>
+          </p:cNvSpPr>
+          <p:nvPr>
+            <p:ph type="title"/>
+          </p:nvPr>
+        </p:nvSpPr>
+        <p:spPr/>
+        <p:txBody>
+          <a:bodyPr/>
+          <a:lstStyle/>
+          <a:p>
+            <a:r>
+              <a:rPr lang="en-US" dirty="0"/>
+              <a:t>Lab 1 – Interactively rebasing</a:t>
+            </a:r>
+          </a:p>
+        </p:txBody>
+      </p:sp>
+      <p:sp>
+        <p:nvSpPr>
+          <p:cNvPr id="4" name="Content Placeholder 3">
+            <a:extLst>
+              <a:ext uri="{FF2B5EF4-FFF2-40B4-BE49-F238E27FC236}">
+                <a16:creationId xmlns:a16="http://schemas.microsoft.com/office/drawing/2014/main" id="{44C1B0C6-BB4E-4D5F-9A1F-04E1F8C0E36F}"/>
+              </a:ext>
+            </a:extLst>
+          </p:cNvPr>
+          <p:cNvSpPr>
+            <a:spLocks noGrp="1"/>
+          </p:cNvSpPr>
+          <p:nvPr>
+            <p:ph idx="1"/>
+          </p:nvPr>
+        </p:nvSpPr>
+        <p:spPr/>
+        <p:txBody>
+          <a:bodyPr>
+            <a:normAutofit lnSpcReduction="10000"/>
+          </a:bodyPr>
+          <a:lstStyle/>
+          <a:p>
+            <a:r>
+              <a:rPr lang="en-US" dirty="0"/>
+              <a:t>Create a new branch, called lab_1, and change to that branch</a:t>
+            </a:r>
+          </a:p>
+          <a:p>
+            <a:pPr lvl="1"/>
+            <a:r>
+              <a:rPr lang="en-US" dirty="0"/>
+              <a:t>git branch lab_1</a:t>
+            </a:r>
+          </a:p>
+          <a:p>
+            <a:pPr lvl="1"/>
+            <a:r>
+              <a:rPr lang="en-US" dirty="0"/>
+              <a:t>git checkout lab_1</a:t>
+            </a:r>
+          </a:p>
+          <a:p>
+            <a:r>
+              <a:rPr lang="en-US" dirty="0"/>
+              <a:t>Make a minor change, for our example we’re creating a temp file and updating it, and then commit that change with the commit message “commit 1”</a:t>
+            </a:r>
+          </a:p>
+          <a:p>
+            <a:pPr lvl="1"/>
+            <a:r>
+              <a:rPr lang="en-US" dirty="0"/>
+              <a:t>echo “change 1” &gt;&gt; tmp.txt</a:t>
+            </a:r>
+          </a:p>
+          <a:p>
+            <a:pPr lvl="1"/>
+            <a:r>
+              <a:rPr lang="en-US" dirty="0"/>
+              <a:t>git add tmp.txt</a:t>
+            </a:r>
+          </a:p>
+          <a:p>
+            <a:pPr lvl="1"/>
+            <a:r>
+              <a:rPr lang="en-US" dirty="0"/>
+              <a:t>git commit –m “commit 1”</a:t>
+            </a:r>
+          </a:p>
+        </p:txBody>
+      </p:sp>
+    </p:spTree>
+    <p:extLst>
+      <p:ext uri="{BB962C8B-B14F-4D97-AF65-F5344CB8AC3E}">
+        <p14:creationId xmlns:p14="http://schemas.microsoft.com/office/powerpoint/2010/main" val="3831016955"/>
+      </p:ext>
+    </p:extLst>
+  </p:cSld>
+  <p:clrMapOvr>
+    <a:masterClrMapping/>
+  </p:clrMapOvr>
+</p:sld>
+</file>
+
+<file path=ppt/slides/slide16.xml><?xml version="1.0" encoding="utf-8"?>
+<p:sld xmlns:a="http://schemas.openxmlformats.org/drawingml/2006/main" xmlns:r="http://schemas.openxmlformats.org/officeDocument/2006/relationships" xmlns:p="http://schemas.openxmlformats.org/presentationml/2006/main">
+  <p:cSld>
+    <p:spTree>
+      <p:nvGrpSpPr>
+        <p:cNvPr id="1" name=""/>
+        <p:cNvGrpSpPr/>
+        <p:nvPr/>
+      </p:nvGrpSpPr>
+      <p:grpSpPr>
+        <a:xfrm>
+          <a:off x="0" y="0"/>
+          <a:ext cx="0" cy="0"/>
+          <a:chOff x="0" y="0"/>
+          <a:chExt cx="0" cy="0"/>
+        </a:xfrm>
+      </p:grpSpPr>
+      <p:sp>
+        <p:nvSpPr>
+          <p:cNvPr id="2" name="Title 1">
+            <a:extLst>
+              <a:ext uri="{FF2B5EF4-FFF2-40B4-BE49-F238E27FC236}">
+                <a16:creationId xmlns:a16="http://schemas.microsoft.com/office/drawing/2014/main" id="{B778339D-9DD8-4064-9E1B-B79A7D595DE2}"/>
+              </a:ext>
+            </a:extLst>
+          </p:cNvPr>
+          <p:cNvSpPr>
+            <a:spLocks noGrp="1"/>
+          </p:cNvSpPr>
+          <p:nvPr>
+            <p:ph type="title"/>
+          </p:nvPr>
+        </p:nvSpPr>
+        <p:spPr/>
+        <p:txBody>
+          <a:bodyPr/>
+          <a:lstStyle/>
+          <a:p>
+            <a:r>
+              <a:rPr lang="en-US" dirty="0"/>
+              <a:t>Lab 1 – Interactively rebasing (Cont.)</a:t>
+            </a:r>
+          </a:p>
+        </p:txBody>
+      </p:sp>
+      <p:sp>
+        <p:nvSpPr>
+          <p:cNvPr id="4" name="Content Placeholder 3">
+            <a:extLst>
+              <a:ext uri="{FF2B5EF4-FFF2-40B4-BE49-F238E27FC236}">
+                <a16:creationId xmlns:a16="http://schemas.microsoft.com/office/drawing/2014/main" id="{44C1B0C6-BB4E-4D5F-9A1F-04E1F8C0E36F}"/>
+              </a:ext>
+            </a:extLst>
+          </p:cNvPr>
+          <p:cNvSpPr>
+            <a:spLocks noGrp="1"/>
+          </p:cNvSpPr>
+          <p:nvPr>
+            <p:ph idx="1"/>
+          </p:nvPr>
+        </p:nvSpPr>
+        <p:spPr/>
+        <p:txBody>
+          <a:bodyPr>
+            <a:normAutofit fontScale="85000" lnSpcReduction="20000"/>
+          </a:bodyPr>
+          <a:lstStyle/>
+          <a:p>
+            <a:r>
+              <a:rPr lang="en-US" dirty="0"/>
+              <a:t>Do the same steps we did before, twice more, but incrementing the commit message by one each time (“commit 2”, “commit 3”)</a:t>
+            </a:r>
+          </a:p>
+          <a:p>
+            <a:pPr lvl="1"/>
+            <a:r>
+              <a:rPr lang="en-US" dirty="0"/>
+              <a:t>echo “</a:t>
+            </a:r>
+            <a:r>
+              <a:rPr lang="en-US" dirty="0" err="1"/>
+              <a:t>tmp</a:t>
+            </a:r>
+            <a:r>
+              <a:rPr lang="en-US" dirty="0"/>
+              <a:t>” &gt;&gt; tmp.txt</a:t>
+            </a:r>
+          </a:p>
+          <a:p>
+            <a:pPr lvl="1"/>
+            <a:r>
+              <a:rPr lang="en-US" dirty="0"/>
+              <a:t>git add tmp.txt</a:t>
+            </a:r>
+          </a:p>
+          <a:p>
+            <a:pPr lvl="1"/>
+            <a:r>
+              <a:rPr lang="en-US" dirty="0"/>
+              <a:t>git commit –m “commit #”</a:t>
+            </a:r>
+          </a:p>
+          <a:p>
+            <a:r>
+              <a:rPr lang="en-US" dirty="0"/>
+              <a:t>Once finished, confirm that all commits and changes are in place and no files are pending commit (this prevents a rebase from occurring)</a:t>
+            </a:r>
+          </a:p>
+          <a:p>
+            <a:pPr lvl="1"/>
+            <a:r>
+              <a:rPr lang="en-US" dirty="0"/>
+              <a:t>cat tmp.txt</a:t>
+            </a:r>
+          </a:p>
+          <a:p>
+            <a:pPr lvl="1"/>
+            <a:r>
+              <a:rPr lang="en-US" dirty="0"/>
+              <a:t>git status</a:t>
+            </a:r>
+          </a:p>
+          <a:p>
+            <a:pPr lvl="1"/>
+            <a:r>
+              <a:rPr lang="en-US" dirty="0"/>
+              <a:t>git log</a:t>
+            </a:r>
+          </a:p>
+        </p:txBody>
+      </p:sp>
+    </p:spTree>
+    <p:extLst>
+      <p:ext uri="{BB962C8B-B14F-4D97-AF65-F5344CB8AC3E}">
+        <p14:creationId xmlns:p14="http://schemas.microsoft.com/office/powerpoint/2010/main" val="3059681544"/>
+      </p:ext>
+    </p:extLst>
+  </p:cSld>
+  <p:clrMapOvr>
+    <a:masterClrMapping/>
+  </p:clrMapOvr>
+</p:sld>
+</file>
+
+<file path=ppt/slides/slide17.xml><?xml version="1.0" encoding="utf-8"?>
+<p:sld xmlns:a="http://schemas.openxmlformats.org/drawingml/2006/main" xmlns:r="http://schemas.openxmlformats.org/officeDocument/2006/relationships" xmlns:p="http://schemas.openxmlformats.org/presentationml/2006/main">
+  <p:cSld>
+    <p:spTree>
+      <p:nvGrpSpPr>
+        <p:cNvPr id="1" name=""/>
+        <p:cNvGrpSpPr/>
+        <p:nvPr/>
+      </p:nvGrpSpPr>
+      <p:grpSpPr>
+        <a:xfrm>
+          <a:off x="0" y="0"/>
+          <a:ext cx="0" cy="0"/>
+          <a:chOff x="0" y="0"/>
+          <a:chExt cx="0" cy="0"/>
+        </a:xfrm>
+      </p:grpSpPr>
+      <p:sp>
+        <p:nvSpPr>
+          <p:cNvPr id="2" name="Title 1">
+            <a:extLst>
+              <a:ext uri="{FF2B5EF4-FFF2-40B4-BE49-F238E27FC236}">
+                <a16:creationId xmlns:a16="http://schemas.microsoft.com/office/drawing/2014/main" id="{B778339D-9DD8-4064-9E1B-B79A7D595DE2}"/>
+              </a:ext>
+            </a:extLst>
+          </p:cNvPr>
+          <p:cNvSpPr>
+            <a:spLocks noGrp="1"/>
+          </p:cNvSpPr>
+          <p:nvPr>
+            <p:ph type="title"/>
+          </p:nvPr>
+        </p:nvSpPr>
+        <p:spPr/>
+        <p:txBody>
+          <a:bodyPr/>
+          <a:lstStyle/>
+          <a:p>
+            <a:r>
+              <a:rPr lang="en-US" dirty="0"/>
+              <a:t>Lab 1 – Interactively rebasing (Cont.)</a:t>
+            </a:r>
+          </a:p>
+        </p:txBody>
+      </p:sp>
+      <p:sp>
+        <p:nvSpPr>
+          <p:cNvPr id="4" name="Content Placeholder 3">
+            <a:extLst>
+              <a:ext uri="{FF2B5EF4-FFF2-40B4-BE49-F238E27FC236}">
+                <a16:creationId xmlns:a16="http://schemas.microsoft.com/office/drawing/2014/main" id="{44C1B0C6-BB4E-4D5F-9A1F-04E1F8C0E36F}"/>
+              </a:ext>
+            </a:extLst>
+          </p:cNvPr>
+          <p:cNvSpPr>
+            <a:spLocks noGrp="1"/>
+          </p:cNvSpPr>
+          <p:nvPr>
+            <p:ph idx="1"/>
+          </p:nvPr>
+        </p:nvSpPr>
+        <p:spPr/>
+        <p:txBody>
+          <a:bodyPr>
+            <a:normAutofit/>
+          </a:bodyPr>
+          <a:lstStyle/>
+          <a:p>
+            <a:r>
+              <a:rPr lang="en-US" dirty="0"/>
+              <a:t>We’re now ready to interactively rebase and clean up our commit history</a:t>
+            </a:r>
+          </a:p>
+          <a:p>
+            <a:pPr lvl="1"/>
+            <a:r>
+              <a:rPr lang="en-US" dirty="0"/>
+              <a:t>git rebase –</a:t>
+            </a:r>
+            <a:r>
+              <a:rPr lang="en-US" dirty="0" err="1"/>
+              <a:t>i</a:t>
+            </a:r>
+            <a:r>
+              <a:rPr lang="en-US" dirty="0"/>
+              <a:t> HEAD~3</a:t>
+            </a:r>
+          </a:p>
+          <a:p>
+            <a:pPr lvl="1"/>
+            <a:r>
+              <a:rPr lang="en-US" dirty="0"/>
+              <a:t>Squash commits 2 and 3 in the editor</a:t>
+            </a:r>
+          </a:p>
+          <a:p>
+            <a:pPr lvl="1"/>
+            <a:r>
+              <a:rPr lang="en-US" dirty="0"/>
+              <a:t>Clean up the final commit message to now say “commit 1 with changes 1, 2, and 3”</a:t>
+            </a:r>
+          </a:p>
+          <a:p>
+            <a:pPr lvl="1"/>
+            <a:r>
+              <a:rPr lang="en-US" dirty="0"/>
+              <a:t>git log</a:t>
+            </a:r>
+          </a:p>
+          <a:p>
+            <a:r>
+              <a:rPr lang="en-US" dirty="0"/>
+              <a:t>We now have a cleaner </a:t>
+            </a:r>
+            <a:r>
+              <a:rPr lang="en-US"/>
+              <a:t>git history</a:t>
+            </a:r>
+            <a:endParaRPr lang="en-US" dirty="0"/>
+          </a:p>
+          <a:p>
+            <a:pPr lvl="1"/>
+            <a:endParaRPr lang="en-US" dirty="0"/>
+          </a:p>
+        </p:txBody>
+      </p:sp>
+    </p:spTree>
+    <p:extLst>
+      <p:ext uri="{BB962C8B-B14F-4D97-AF65-F5344CB8AC3E}">
+        <p14:creationId xmlns:p14="http://schemas.microsoft.com/office/powerpoint/2010/main" val="3748549130"/>
       </p:ext>
     </p:extLst>
   </p:cSld>
@@ -14060,7 +14070,7 @@
           <p:cNvPr id="2" name="Title 1">
             <a:extLst>
               <a:ext uri="{FF2B5EF4-FFF2-40B4-BE49-F238E27FC236}">
-                <a16:creationId xmlns:a16="http://schemas.microsoft.com/office/drawing/2014/main" id="{4D1E3FC3-B062-491B-A8A4-DA3269C9306E}"/>
+                <a16:creationId xmlns:a16="http://schemas.microsoft.com/office/drawing/2014/main" id="{C7AB3235-CCE8-46E6-BDE8-EF71E09B00DA}"/>
               </a:ext>
             </a:extLst>
           </p:cNvPr>
@@ -14078,82 +14088,17 @@
           <a:p>
             <a:r>
               <a:rPr lang="en-US" dirty="0"/>
-              <a:t>Rebase – Tread carefully (Cont.)</a:t>
+              <a:t>Presentation End – open lab and questions</a:t>
             </a:r>
           </a:p>
         </p:txBody>
       </p:sp>
-      <p:pic>
-        <p:nvPicPr>
-          <p:cNvPr id="7" name="Content Placeholder 6">
+      <p:sp>
+        <p:nvSpPr>
+          <p:cNvPr id="3" name="Content Placeholder 2">
             <a:extLst>
               <a:ext uri="{FF2B5EF4-FFF2-40B4-BE49-F238E27FC236}">
-                <a16:creationId xmlns:a16="http://schemas.microsoft.com/office/drawing/2014/main" id="{42B15C38-064C-448F-B886-3B193A81EF06}"/>
-              </a:ext>
-            </a:extLst>
-          </p:cNvPr>
-          <p:cNvPicPr>
-            <a:picLocks noGrp="1" noChangeAspect="1"/>
-          </p:cNvPicPr>
-          <p:nvPr>
-            <p:ph idx="1"/>
-          </p:nvPr>
-        </p:nvPicPr>
-        <p:blipFill>
-          <a:blip r:embed="rId2">
-            <a:extLst>
-              <a:ext uri="{96DAC541-7B7A-43D3-8B79-37D633B846F1}">
-                <asvg:svgBlip xmlns:asvg="http://schemas.microsoft.com/office/drawing/2016/SVG/main" r:embed="rId3"/>
-              </a:ext>
-            </a:extLst>
-          </a:blip>
-          <a:stretch>
-            <a:fillRect/>
-          </a:stretch>
-        </p:blipFill>
-        <p:spPr>
-          <a:xfrm>
-            <a:off x="3451344" y="2249488"/>
-            <a:ext cx="5286137" cy="3541712"/>
-          </a:xfrm>
-        </p:spPr>
-      </p:pic>
-    </p:spTree>
-    <p:extLst>
-      <p:ext uri="{BB962C8B-B14F-4D97-AF65-F5344CB8AC3E}">
-        <p14:creationId xmlns:p14="http://schemas.microsoft.com/office/powerpoint/2010/main" val="1078994264"/>
-      </p:ext>
-    </p:extLst>
-  </p:cSld>
-  <p:clrMapOvr>
-    <a:masterClrMapping/>
-  </p:clrMapOvr>
-</p:sld>
-</file>
-
-<file path=ppt/slides/slide19.xml><?xml version="1.0" encoding="utf-8"?>
-<p:sld xmlns:a="http://schemas.openxmlformats.org/drawingml/2006/main" xmlns:r="http://schemas.openxmlformats.org/officeDocument/2006/relationships" xmlns:p="http://schemas.openxmlformats.org/presentationml/2006/main">
-  <p:cSld>
-    <p:spTree>
-      <p:nvGrpSpPr>
-        <p:cNvPr id="1" name=""/>
-        <p:cNvGrpSpPr/>
-        <p:nvPr/>
-      </p:nvGrpSpPr>
-      <p:grpSpPr>
-        <a:xfrm>
-          <a:off x="0" y="0"/>
-          <a:ext cx="0" cy="0"/>
-          <a:chOff x="0" y="0"/>
-          <a:chExt cx="0" cy="0"/>
-        </a:xfrm>
-      </p:grpSpPr>
-      <p:sp>
-        <p:nvSpPr>
-          <p:cNvPr id="2" name="Title 1">
-            <a:extLst>
-              <a:ext uri="{FF2B5EF4-FFF2-40B4-BE49-F238E27FC236}">
-                <a16:creationId xmlns:a16="http://schemas.microsoft.com/office/drawing/2014/main" id="{4D1E3FC3-B062-491B-A8A4-DA3269C9306E}"/>
+                <a16:creationId xmlns:a16="http://schemas.microsoft.com/office/drawing/2014/main" id="{3A9669AB-E7B2-4895-9E7F-B06438F6702B}"/>
               </a:ext>
             </a:extLst>
           </p:cNvPr>
@@ -14161,7 +14106,7 @@
             <a:spLocks noGrp="1"/>
           </p:cNvSpPr>
           <p:nvPr>
-            <p:ph type="title"/>
+            <p:ph idx="1"/>
           </p:nvPr>
         </p:nvSpPr>
         <p:spPr/>
@@ -14171,50 +14116,46 @@
           <a:p>
             <a:r>
               <a:rPr lang="en-US" dirty="0"/>
-              <a:t>Rebase – Tread carefully (Cont.)</a:t>
-            </a:r>
+              <a:t>Can’t think of a question or need to leave before I can answer?</a:t>
+            </a:r>
+          </a:p>
+          <a:p>
+            <a:pPr lvl="1"/>
+            <a:r>
+              <a:rPr lang="en-US" dirty="0"/>
+              <a:t>No worries! Send me an email – </a:t>
+            </a:r>
+            <a:r>
+              <a:rPr lang="en-US" dirty="0">
+                <a:solidFill>
+                  <a:schemeClr val="tx1">
+                    <a:lumMod val="95000"/>
+                  </a:schemeClr>
+                </a:solidFill>
+                <a:hlinkClick r:id="rId2">
+                  <a:extLst>
+                    <a:ext uri="{A12FA001-AC4F-418D-AE19-62706E023703}">
+                      <ahyp:hlinkClr xmlns:ahyp="http://schemas.microsoft.com/office/drawing/2018/hyperlinkcolor" val="tx"/>
+                    </a:ext>
+                  </a:extLst>
+                </a:hlinkClick>
+              </a:rPr>
+              <a:t>zach@zach-martin.com</a:t>
+            </a:r>
+            <a:endParaRPr lang="en-US" dirty="0">
+              <a:solidFill>
+                <a:schemeClr val="tx1">
+                  <a:lumMod val="95000"/>
+                </a:schemeClr>
+              </a:solidFill>
+            </a:endParaRPr>
           </a:p>
         </p:txBody>
       </p:sp>
-      <p:pic>
-        <p:nvPicPr>
-          <p:cNvPr id="5" name="Content Placeholder 4">
-            <a:extLst>
-              <a:ext uri="{FF2B5EF4-FFF2-40B4-BE49-F238E27FC236}">
-                <a16:creationId xmlns:a16="http://schemas.microsoft.com/office/drawing/2014/main" id="{1126805B-9410-4816-80DE-B9371B2B9B8C}"/>
-              </a:ext>
-            </a:extLst>
-          </p:cNvPr>
-          <p:cNvPicPr>
-            <a:picLocks noGrp="1" noChangeAspect="1"/>
-          </p:cNvPicPr>
-          <p:nvPr>
-            <p:ph idx="1"/>
-          </p:nvPr>
-        </p:nvPicPr>
-        <p:blipFill>
-          <a:blip r:embed="rId2">
-            <a:extLst>
-              <a:ext uri="{96DAC541-7B7A-43D3-8B79-37D633B846F1}">
-                <asvg:svgBlip xmlns:asvg="http://schemas.microsoft.com/office/drawing/2016/SVG/main" r:embed="rId3"/>
-              </a:ext>
-            </a:extLst>
-          </a:blip>
-          <a:stretch>
-            <a:fillRect/>
-          </a:stretch>
-        </p:blipFill>
-        <p:spPr>
-          <a:xfrm>
-            <a:off x="3494991" y="2249488"/>
-            <a:ext cx="5198843" cy="3541712"/>
-          </a:xfrm>
-        </p:spPr>
-      </p:pic>
     </p:spTree>
     <p:extLst>
       <p:ext uri="{BB962C8B-B14F-4D97-AF65-F5344CB8AC3E}">
-        <p14:creationId xmlns:p14="http://schemas.microsoft.com/office/powerpoint/2010/main" val="3275597828"/>
+        <p14:creationId xmlns:p14="http://schemas.microsoft.com/office/powerpoint/2010/main" val="3460011935"/>
       </p:ext>
     </p:extLst>
   </p:cSld>
@@ -14442,291 +14383,6 @@
 </p:sld>
 </file>
 
-<file path=ppt/slides/slide20.xml><?xml version="1.0" encoding="utf-8"?>
-<p:sld xmlns:a="http://schemas.openxmlformats.org/drawingml/2006/main" xmlns:r="http://schemas.openxmlformats.org/officeDocument/2006/relationships" xmlns:p="http://schemas.openxmlformats.org/presentationml/2006/main">
-  <p:cSld>
-    <p:spTree>
-      <p:nvGrpSpPr>
-        <p:cNvPr id="1" name=""/>
-        <p:cNvGrpSpPr/>
-        <p:nvPr/>
-      </p:nvGrpSpPr>
-      <p:grpSpPr>
-        <a:xfrm>
-          <a:off x="0" y="0"/>
-          <a:ext cx="0" cy="0"/>
-          <a:chOff x="0" y="0"/>
-          <a:chExt cx="0" cy="0"/>
-        </a:xfrm>
-      </p:grpSpPr>
-      <p:sp>
-        <p:nvSpPr>
-          <p:cNvPr id="2" name="Title 1">
-            <a:extLst>
-              <a:ext uri="{FF2B5EF4-FFF2-40B4-BE49-F238E27FC236}">
-                <a16:creationId xmlns:a16="http://schemas.microsoft.com/office/drawing/2014/main" id="{A234A7D7-D1AF-41D1-B1CF-9696405119D7}"/>
-              </a:ext>
-            </a:extLst>
-          </p:cNvPr>
-          <p:cNvSpPr>
-            <a:spLocks noGrp="1"/>
-          </p:cNvSpPr>
-          <p:nvPr>
-            <p:ph type="title"/>
-          </p:nvPr>
-        </p:nvSpPr>
-        <p:spPr/>
-        <p:txBody>
-          <a:bodyPr/>
-          <a:lstStyle/>
-          <a:p>
-            <a:r>
-              <a:rPr lang="en-US" dirty="0" err="1"/>
-              <a:t>Github</a:t>
-            </a:r>
-            <a:r>
-              <a:rPr lang="en-US" dirty="0"/>
-              <a:t> features and next steps</a:t>
-            </a:r>
-          </a:p>
-        </p:txBody>
-      </p:sp>
-      <p:sp>
-        <p:nvSpPr>
-          <p:cNvPr id="3" name="Content Placeholder 2">
-            <a:extLst>
-              <a:ext uri="{FF2B5EF4-FFF2-40B4-BE49-F238E27FC236}">
-                <a16:creationId xmlns:a16="http://schemas.microsoft.com/office/drawing/2014/main" id="{1C3B3AAE-A676-4F92-A6C6-DD0ABEBE3E8B}"/>
-              </a:ext>
-            </a:extLst>
-          </p:cNvPr>
-          <p:cNvSpPr>
-            <a:spLocks noGrp="1"/>
-          </p:cNvSpPr>
-          <p:nvPr>
-            <p:ph idx="1"/>
-          </p:nvPr>
-        </p:nvSpPr>
-        <p:spPr>
-          <a:xfrm>
-            <a:off x="1141412" y="2097088"/>
-            <a:ext cx="9905999" cy="4268760"/>
-          </a:xfrm>
-        </p:spPr>
-        <p:txBody>
-          <a:bodyPr>
-            <a:normAutofit/>
-          </a:bodyPr>
-          <a:lstStyle/>
-          <a:p>
-            <a:r>
-              <a:rPr lang="en-US" dirty="0"/>
-              <a:t>Commit History</a:t>
-            </a:r>
-          </a:p>
-          <a:p>
-            <a:r>
-              <a:rPr lang="en-US" dirty="0"/>
-              <a:t>Pull Requests</a:t>
-            </a:r>
-          </a:p>
-          <a:p>
-            <a:r>
-              <a:rPr lang="en-US" dirty="0"/>
-              <a:t>Settings</a:t>
-            </a:r>
-          </a:p>
-          <a:p>
-            <a:pPr lvl="1"/>
-            <a:r>
-              <a:rPr lang="en-US" dirty="0"/>
-              <a:t>Features</a:t>
-            </a:r>
-          </a:p>
-          <a:p>
-            <a:pPr lvl="1"/>
-            <a:r>
-              <a:rPr lang="en-US" dirty="0"/>
-              <a:t>Access</a:t>
-            </a:r>
-          </a:p>
-          <a:p>
-            <a:pPr lvl="1"/>
-            <a:r>
-              <a:rPr lang="en-US" dirty="0"/>
-              <a:t>Branch Protection</a:t>
-            </a:r>
-          </a:p>
-          <a:p>
-            <a:pPr lvl="1"/>
-            <a:r>
-              <a:rPr lang="en-US" dirty="0"/>
-              <a:t>Notifications</a:t>
-            </a:r>
-          </a:p>
-          <a:p>
-            <a:r>
-              <a:rPr lang="en-US" dirty="0"/>
-              <a:t>Additional Resources Found at - </a:t>
-            </a:r>
-            <a:r>
-              <a:rPr lang="en-US" dirty="0">
-                <a:hlinkClick r:id="rId2">
-                  <a:extLst>
-                    <a:ext uri="{A12FA001-AC4F-418D-AE19-62706E023703}">
-                      <ahyp:hlinkClr xmlns:ahyp="http://schemas.microsoft.com/office/drawing/2018/hyperlinkcolor" val="tx"/>
-                    </a:ext>
-                  </a:extLst>
-                </a:hlinkClick>
-              </a:rPr>
-              <a:t>http://github.zach-martin.com/resources.html</a:t>
-            </a:r>
-            <a:endParaRPr lang="en-US" dirty="0"/>
-          </a:p>
-        </p:txBody>
-      </p:sp>
-    </p:spTree>
-    <p:extLst>
-      <p:ext uri="{BB962C8B-B14F-4D97-AF65-F5344CB8AC3E}">
-        <p14:creationId xmlns:p14="http://schemas.microsoft.com/office/powerpoint/2010/main" val="635754875"/>
-      </p:ext>
-    </p:extLst>
-  </p:cSld>
-  <p:clrMapOvr>
-    <a:masterClrMapping/>
-  </p:clrMapOvr>
-</p:sld>
-</file>
-
-<file path=ppt/slides/slide21.xml><?xml version="1.0" encoding="utf-8"?>
-<p:sld xmlns:a="http://schemas.openxmlformats.org/drawingml/2006/main" xmlns:r="http://schemas.openxmlformats.org/officeDocument/2006/relationships" xmlns:p="http://schemas.openxmlformats.org/presentationml/2006/main">
-  <p:cSld>
-    <p:spTree>
-      <p:nvGrpSpPr>
-        <p:cNvPr id="1" name=""/>
-        <p:cNvGrpSpPr/>
-        <p:nvPr/>
-      </p:nvGrpSpPr>
-      <p:grpSpPr>
-        <a:xfrm>
-          <a:off x="0" y="0"/>
-          <a:ext cx="0" cy="0"/>
-          <a:chOff x="0" y="0"/>
-          <a:chExt cx="0" cy="0"/>
-        </a:xfrm>
-      </p:grpSpPr>
-      <p:sp>
-        <p:nvSpPr>
-          <p:cNvPr id="2" name="Title 1">
-            <a:extLst>
-              <a:ext uri="{FF2B5EF4-FFF2-40B4-BE49-F238E27FC236}">
-                <a16:creationId xmlns:a16="http://schemas.microsoft.com/office/drawing/2014/main" id="{C7AB3235-CCE8-46E6-BDE8-EF71E09B00DA}"/>
-              </a:ext>
-            </a:extLst>
-          </p:cNvPr>
-          <p:cNvSpPr>
-            <a:spLocks noGrp="1"/>
-          </p:cNvSpPr>
-          <p:nvPr>
-            <p:ph type="title"/>
-          </p:nvPr>
-        </p:nvSpPr>
-        <p:spPr/>
-        <p:txBody>
-          <a:bodyPr/>
-          <a:lstStyle/>
-          <a:p>
-            <a:r>
-              <a:rPr lang="en-US" dirty="0"/>
-              <a:t>Presentation End – open lab and questions</a:t>
-            </a:r>
-          </a:p>
-        </p:txBody>
-      </p:sp>
-      <p:sp>
-        <p:nvSpPr>
-          <p:cNvPr id="3" name="Content Placeholder 2">
-            <a:extLst>
-              <a:ext uri="{FF2B5EF4-FFF2-40B4-BE49-F238E27FC236}">
-                <a16:creationId xmlns:a16="http://schemas.microsoft.com/office/drawing/2014/main" id="{3A9669AB-E7B2-4895-9E7F-B06438F6702B}"/>
-              </a:ext>
-            </a:extLst>
-          </p:cNvPr>
-          <p:cNvSpPr>
-            <a:spLocks noGrp="1"/>
-          </p:cNvSpPr>
-          <p:nvPr>
-            <p:ph idx="1"/>
-          </p:nvPr>
-        </p:nvSpPr>
-        <p:spPr/>
-        <p:txBody>
-          <a:bodyPr/>
-          <a:lstStyle/>
-          <a:p>
-            <a:r>
-              <a:rPr lang="en-US" dirty="0"/>
-              <a:t>Can’t think of a question or need to leave before I can answer?</a:t>
-            </a:r>
-          </a:p>
-          <a:p>
-            <a:pPr lvl="1"/>
-            <a:r>
-              <a:rPr lang="en-US" dirty="0"/>
-              <a:t>No worries! Send me an email – </a:t>
-            </a:r>
-            <a:r>
-              <a:rPr lang="en-US" dirty="0">
-                <a:solidFill>
-                  <a:schemeClr val="tx1">
-                    <a:lumMod val="95000"/>
-                  </a:schemeClr>
-                </a:solidFill>
-                <a:hlinkClick r:id="rId2">
-                  <a:extLst>
-                    <a:ext uri="{A12FA001-AC4F-418D-AE19-62706E023703}">
-                      <ahyp:hlinkClr xmlns:ahyp="http://schemas.microsoft.com/office/drawing/2018/hyperlinkcolor" val="tx"/>
-                    </a:ext>
-                  </a:extLst>
-                </a:hlinkClick>
-              </a:rPr>
-              <a:t>zach@zach-martin.com</a:t>
-            </a:r>
-            <a:endParaRPr lang="en-US" dirty="0">
-              <a:solidFill>
-                <a:schemeClr val="tx1">
-                  <a:lumMod val="95000"/>
-                </a:schemeClr>
-              </a:solidFill>
-            </a:endParaRPr>
-          </a:p>
-          <a:p>
-            <a:r>
-              <a:rPr lang="en-US" dirty="0">
-                <a:solidFill>
-                  <a:schemeClr val="tx1">
-                    <a:lumMod val="95000"/>
-                  </a:schemeClr>
-                </a:solidFill>
-              </a:rPr>
-              <a:t>Hope to see most of you in the GitHub Advanced Class!</a:t>
-            </a:r>
-          </a:p>
-        </p:txBody>
-      </p:sp>
-    </p:spTree>
-    <p:extLst>
-      <p:ext uri="{BB962C8B-B14F-4D97-AF65-F5344CB8AC3E}">
-        <p14:creationId xmlns:p14="http://schemas.microsoft.com/office/powerpoint/2010/main" val="3460011935"/>
-      </p:ext>
-    </p:extLst>
-  </p:cSld>
-  <p:clrMapOvr>
-    <a:masterClrMapping/>
-  </p:clrMapOvr>
-</p:sld>
-</file>
-
 <file path=ppt/slides/slide3.xml><?xml version="1.0" encoding="utf-8"?>
 <p:sld xmlns:a="http://schemas.openxmlformats.org/drawingml/2006/main" xmlns:r="http://schemas.openxmlformats.org/officeDocument/2006/relationships" xmlns:p="http://schemas.openxmlformats.org/presentationml/2006/main">
   <p:cSld>
@@ -14852,13 +14508,8 @@
             <a:pPr lvl="1"/>
             <a:r>
               <a:rPr lang="en-US" dirty="0"/>
-              <a:t>Issue Tracking </a:t>
-            </a:r>
-            <a:r>
-              <a:rPr lang="en-US"/>
-              <a:t>and Projects</a:t>
-            </a:r>
-            <a:endParaRPr lang="en-US" dirty="0"/>
+              <a:t>Issue Tracking and Projects</a:t>
+            </a:r>
           </a:p>
           <a:p>
             <a:pPr lvl="1"/>
@@ -14901,7 +14552,7 @@
           <p:cNvPr id="2" name="Title 1">
             <a:extLst>
               <a:ext uri="{FF2B5EF4-FFF2-40B4-BE49-F238E27FC236}">
-                <a16:creationId xmlns:a16="http://schemas.microsoft.com/office/drawing/2014/main" id="{34DB6CE4-2B13-4715-B5B2-615A55922CA1}"/>
+                <a16:creationId xmlns:a16="http://schemas.microsoft.com/office/drawing/2014/main" id="{4D486711-6C98-4AF3-BEB5-160B9E93D8E1}"/>
               </a:ext>
             </a:extLst>
           </p:cNvPr>
@@ -14914,22 +14565,12 @@
         </p:nvSpPr>
         <p:spPr/>
         <p:txBody>
-          <a:bodyPr>
-            <a:normAutofit/>
-          </a:bodyPr>
+          <a:bodyPr/>
           <a:lstStyle/>
           <a:p>
             <a:r>
-              <a:rPr lang="en-US" sz="4400" dirty="0" err="1">
-                <a:latin typeface="Rockwell" panose="02060603020205020403" pitchFamily="18" charset="0"/>
-              </a:rPr>
-              <a:t>GIThub</a:t>
-            </a:r>
-            <a:r>
-              <a:rPr lang="en-US" sz="4400" dirty="0">
-                <a:latin typeface="Rockwell" panose="02060603020205020403" pitchFamily="18" charset="0"/>
-              </a:rPr>
-              <a:t> uses git (surprise!)</a:t>
+              <a:rPr lang="en-US" dirty="0"/>
+              <a:t>Rebasing vs. Merging</a:t>
             </a:r>
           </a:p>
         </p:txBody>
@@ -14939,7 +14580,7 @@
           <p:cNvPr id="3" name="Content Placeholder 2">
             <a:extLst>
               <a:ext uri="{FF2B5EF4-FFF2-40B4-BE49-F238E27FC236}">
-                <a16:creationId xmlns:a16="http://schemas.microsoft.com/office/drawing/2014/main" id="{143F5361-68C0-4BF5-80C8-F1E7BF92B2DB}"/>
+                <a16:creationId xmlns:a16="http://schemas.microsoft.com/office/drawing/2014/main" id="{8E4CFEF3-0D67-4521-92E7-AEFC18406867}"/>
               </a:ext>
             </a:extLst>
           </p:cNvPr>
@@ -14952,90 +14593,46 @@
         </p:nvSpPr>
         <p:spPr/>
         <p:txBody>
-          <a:bodyPr>
-            <a:normAutofit/>
-          </a:bodyPr>
+          <a:bodyPr/>
           <a:lstStyle/>
           <a:p>
+            <a:r>
+              <a:rPr lang="en-US" dirty="0"/>
+              <a:t>Merging</a:t>
+            </a:r>
+          </a:p>
+          <a:p>
             <a:pPr lvl="1"/>
             <a:r>
-              <a:rPr lang="en-US" sz="2400" dirty="0">
-                <a:latin typeface="Tahoma" panose="020B0604030504040204" pitchFamily="34" charset="0"/>
-                <a:ea typeface="Tahoma" panose="020B0604030504040204" pitchFamily="34" charset="0"/>
-                <a:cs typeface="Tahoma" panose="020B0604030504040204" pitchFamily="34" charset="0"/>
-              </a:rPr>
-              <a:t>What is git?</a:t>
-            </a:r>
-          </a:p>
-          <a:p>
-            <a:pPr lvl="2"/>
-            <a:r>
-              <a:rPr lang="en-US" sz="2200" dirty="0">
-                <a:latin typeface="Tahoma" panose="020B0604030504040204" pitchFamily="34" charset="0"/>
-                <a:ea typeface="Tahoma" panose="020B0604030504040204" pitchFamily="34" charset="0"/>
-                <a:cs typeface="Tahoma" panose="020B0604030504040204" pitchFamily="34" charset="0"/>
-              </a:rPr>
-              <a:t>Git is a VCS (Version Control System)</a:t>
-            </a:r>
-            <a:endParaRPr lang="en-US" sz="2400" dirty="0">
-              <a:latin typeface="Tahoma" panose="020B0604030504040204" pitchFamily="34" charset="0"/>
-              <a:ea typeface="Tahoma" panose="020B0604030504040204" pitchFamily="34" charset="0"/>
-              <a:cs typeface="Tahoma" panose="020B0604030504040204" pitchFamily="34" charset="0"/>
-            </a:endParaRPr>
+              <a:rPr lang="en-US" dirty="0"/>
+              <a:t>Explicitly define what stays and what goes</a:t>
+            </a:r>
           </a:p>
           <a:p>
             <a:pPr lvl="1"/>
             <a:r>
-              <a:rPr lang="en-US" sz="2400" dirty="0">
-                <a:latin typeface="Tahoma" panose="020B0604030504040204" pitchFamily="34" charset="0"/>
-                <a:ea typeface="Tahoma" panose="020B0604030504040204" pitchFamily="34" charset="0"/>
-                <a:cs typeface="Tahoma" panose="020B0604030504040204" pitchFamily="34" charset="0"/>
-              </a:rPr>
-              <a:t>Examples of other VCS</a:t>
-            </a:r>
-          </a:p>
-          <a:p>
-            <a:pPr lvl="2"/>
-            <a:r>
-              <a:rPr lang="en-US" sz="2200" dirty="0">
-                <a:latin typeface="Tahoma" panose="020B0604030504040204" pitchFamily="34" charset="0"/>
-                <a:ea typeface="Tahoma" panose="020B0604030504040204" pitchFamily="34" charset="0"/>
-                <a:cs typeface="Tahoma" panose="020B0604030504040204" pitchFamily="34" charset="0"/>
-              </a:rPr>
-              <a:t>Subversion</a:t>
-            </a:r>
-          </a:p>
-          <a:p>
-            <a:pPr lvl="2"/>
-            <a:r>
-              <a:rPr lang="en-US" sz="2200" dirty="0">
-                <a:latin typeface="Tahoma" panose="020B0604030504040204" pitchFamily="34" charset="0"/>
-                <a:ea typeface="Tahoma" panose="020B0604030504040204" pitchFamily="34" charset="0"/>
-                <a:cs typeface="Tahoma" panose="020B0604030504040204" pitchFamily="34" charset="0"/>
-              </a:rPr>
-              <a:t>CVS</a:t>
-            </a:r>
-          </a:p>
-          <a:p>
-            <a:pPr lvl="2"/>
-            <a:r>
-              <a:rPr lang="en-US" sz="2200" dirty="0">
-                <a:latin typeface="Tahoma" panose="020B0604030504040204" pitchFamily="34" charset="0"/>
-                <a:ea typeface="Tahoma" panose="020B0604030504040204" pitchFamily="34" charset="0"/>
-                <a:cs typeface="Tahoma" panose="020B0604030504040204" pitchFamily="34" charset="0"/>
-              </a:rPr>
-              <a:t>Mercurial</a:t>
-            </a:r>
-          </a:p>
-          <a:p>
-            <a:pPr lvl="2"/>
-            <a:r>
-              <a:rPr lang="en-US" sz="2200" dirty="0">
-                <a:latin typeface="Tahoma" panose="020B0604030504040204" pitchFamily="34" charset="0"/>
-                <a:ea typeface="Tahoma" panose="020B0604030504040204" pitchFamily="34" charset="0"/>
-                <a:cs typeface="Tahoma" panose="020B0604030504040204" pitchFamily="34" charset="0"/>
-              </a:rPr>
-              <a:t>Monotone</a:t>
+              <a:rPr lang="en-US" dirty="0"/>
+              <a:t>A new commit with these specifications is created</a:t>
+            </a:r>
+          </a:p>
+          <a:p>
+            <a:r>
+              <a:rPr lang="en-US" dirty="0"/>
+              <a:t>Rebasing</a:t>
+            </a:r>
+          </a:p>
+          <a:p>
+            <a:pPr lvl="1"/>
+            <a:r>
+              <a:rPr lang="en-US" dirty="0"/>
+              <a:t>“Replay” one branch at the end of another</a:t>
+            </a:r>
+          </a:p>
+          <a:p>
+            <a:pPr lvl="1"/>
+            <a:r>
+              <a:rPr lang="en-US" dirty="0"/>
+              <a:t>Cleaner tree with no additional commit</a:t>
             </a:r>
           </a:p>
         </p:txBody>
@@ -15043,7 +14640,7 @@
     </p:spTree>
     <p:extLst>
       <p:ext uri="{BB962C8B-B14F-4D97-AF65-F5344CB8AC3E}">
-        <p14:creationId xmlns:p14="http://schemas.microsoft.com/office/powerpoint/2010/main" val="1348318116"/>
+        <p14:creationId xmlns:p14="http://schemas.microsoft.com/office/powerpoint/2010/main" val="3826316260"/>
       </p:ext>
     </p:extLst>
   </p:cSld>
@@ -15075,7 +14672,7 @@
           <p:cNvPr id="2" name="Title 1">
             <a:extLst>
               <a:ext uri="{FF2B5EF4-FFF2-40B4-BE49-F238E27FC236}">
-                <a16:creationId xmlns:a16="http://schemas.microsoft.com/office/drawing/2014/main" id="{34DB6CE4-2B13-4715-B5B2-615A55922CA1}"/>
+                <a16:creationId xmlns:a16="http://schemas.microsoft.com/office/drawing/2014/main" id="{460E5E25-300A-4A4D-B1C2-63CB6E978153}"/>
               </a:ext>
             </a:extLst>
           </p:cNvPr>
@@ -15088,112 +14685,55 @@
         </p:nvSpPr>
         <p:spPr/>
         <p:txBody>
-          <a:bodyPr>
-            <a:normAutofit/>
-          </a:bodyPr>
+          <a:bodyPr/>
           <a:lstStyle/>
           <a:p>
             <a:r>
-              <a:rPr lang="en-US" sz="4400" dirty="0">
-                <a:latin typeface="Rockwell" panose="02060603020205020403" pitchFamily="18" charset="0"/>
-              </a:rPr>
-              <a:t>Version Control System</a:t>
+              <a:rPr lang="en-US" dirty="0"/>
+              <a:t>Rebase workflow</a:t>
             </a:r>
           </a:p>
         </p:txBody>
       </p:sp>
-      <p:sp>
-        <p:nvSpPr>
-          <p:cNvPr id="3" name="Content Placeholder 2">
+      <p:pic>
+        <p:nvPicPr>
+          <p:cNvPr id="9" name="Content Placeholder 8">
             <a:extLst>
               <a:ext uri="{FF2B5EF4-FFF2-40B4-BE49-F238E27FC236}">
-                <a16:creationId xmlns:a16="http://schemas.microsoft.com/office/drawing/2014/main" id="{143F5361-68C0-4BF5-80C8-F1E7BF92B2DB}"/>
+                <a16:creationId xmlns:a16="http://schemas.microsoft.com/office/drawing/2014/main" id="{A0648F48-9120-4A8F-A261-F6CCE1ED9AC4}"/>
               </a:ext>
             </a:extLst>
           </p:cNvPr>
-          <p:cNvSpPr>
-            <a:spLocks noGrp="1"/>
-          </p:cNvSpPr>
+          <p:cNvPicPr>
+            <a:picLocks noGrp="1" noChangeAspect="1"/>
+          </p:cNvPicPr>
           <p:nvPr>
             <p:ph idx="1"/>
           </p:nvPr>
-        </p:nvSpPr>
-        <p:spPr/>
-        <p:txBody>
-          <a:bodyPr>
-            <a:normAutofit/>
-          </a:bodyPr>
-          <a:lstStyle/>
-          <a:p>
-            <a:r>
-              <a:rPr lang="en-US" sz="2800" dirty="0">
-                <a:latin typeface="Tahoma" panose="020B0604030504040204" pitchFamily="34" charset="0"/>
-                <a:ea typeface="Tahoma" panose="020B0604030504040204" pitchFamily="34" charset="0"/>
-                <a:cs typeface="Tahoma" panose="020B0604030504040204" pitchFamily="34" charset="0"/>
-              </a:rPr>
-              <a:t>Any VCS should have at minimum the following:</a:t>
-            </a:r>
-          </a:p>
-          <a:p>
-            <a:pPr lvl="1"/>
-            <a:r>
-              <a:rPr lang="en-US" sz="2400" dirty="0">
-                <a:latin typeface="Tahoma" panose="020B0604030504040204" pitchFamily="34" charset="0"/>
-                <a:ea typeface="Tahoma" panose="020B0604030504040204" pitchFamily="34" charset="0"/>
-                <a:cs typeface="Tahoma" panose="020B0604030504040204" pitchFamily="34" charset="0"/>
-              </a:rPr>
-              <a:t>Complete history of changes for all files</a:t>
-            </a:r>
-          </a:p>
-          <a:p>
-            <a:pPr lvl="1"/>
-            <a:r>
-              <a:rPr lang="en-US" sz="2400" dirty="0">
-                <a:latin typeface="Tahoma" panose="020B0604030504040204" pitchFamily="34" charset="0"/>
-                <a:ea typeface="Tahoma" panose="020B0604030504040204" pitchFamily="34" charset="0"/>
-                <a:cs typeface="Tahoma" panose="020B0604030504040204" pitchFamily="34" charset="0"/>
-              </a:rPr>
-              <a:t>Branching and merging by authorized users</a:t>
-            </a:r>
-          </a:p>
-          <a:p>
-            <a:pPr lvl="1"/>
-            <a:r>
-              <a:rPr lang="en-US" sz="2400" dirty="0">
-                <a:latin typeface="Tahoma" panose="020B0604030504040204" pitchFamily="34" charset="0"/>
-                <a:ea typeface="Tahoma" panose="020B0604030504040204" pitchFamily="34" charset="0"/>
-                <a:cs typeface="Tahoma" panose="020B0604030504040204" pitchFamily="34" charset="0"/>
-              </a:rPr>
-              <a:t>Traceability</a:t>
-            </a:r>
-          </a:p>
-          <a:p>
-            <a:r>
-              <a:rPr lang="en-US" sz="2800" dirty="0">
-                <a:latin typeface="Tahoma" panose="020B0604030504040204" pitchFamily="34" charset="0"/>
-                <a:ea typeface="Tahoma" panose="020B0604030504040204" pitchFamily="34" charset="0"/>
-                <a:cs typeface="Tahoma" panose="020B0604030504040204" pitchFamily="34" charset="0"/>
-              </a:rPr>
-              <a:t>Does Software Development Require VCS?</a:t>
-            </a:r>
-          </a:p>
-          <a:p>
-            <a:pPr lvl="1"/>
-            <a:r>
-              <a:rPr lang="en-US" sz="2400" dirty="0">
-                <a:latin typeface="Tahoma" panose="020B0604030504040204" pitchFamily="34" charset="0"/>
-                <a:ea typeface="Tahoma" panose="020B0604030504040204" pitchFamily="34" charset="0"/>
-                <a:cs typeface="Tahoma" panose="020B0604030504040204" pitchFamily="34" charset="0"/>
-              </a:rPr>
-              <a:t>Strictly speaking – no (but you’ll regret it!)</a:t>
-            </a:r>
-          </a:p>
-        </p:txBody>
-      </p:sp>
+        </p:nvPicPr>
+        <p:blipFill>
+          <a:blip r:embed="rId2">
+            <a:extLst>
+              <a:ext uri="{96DAC541-7B7A-43D3-8B79-37D633B846F1}">
+                <asvg:svgBlip xmlns:asvg="http://schemas.microsoft.com/office/drawing/2016/SVG/main" r:embed="rId3"/>
+              </a:ext>
+            </a:extLst>
+          </a:blip>
+          <a:stretch>
+            <a:fillRect/>
+          </a:stretch>
+        </p:blipFill>
+        <p:spPr>
+          <a:xfrm>
+            <a:off x="3001215" y="2249488"/>
+            <a:ext cx="6186396" cy="3541712"/>
+          </a:xfrm>
+        </p:spPr>
+      </p:pic>
     </p:spTree>
     <p:extLst>
       <p:ext uri="{BB962C8B-B14F-4D97-AF65-F5344CB8AC3E}">
-        <p14:creationId xmlns:p14="http://schemas.microsoft.com/office/powerpoint/2010/main" val="2919556985"/>
+        <p14:creationId xmlns:p14="http://schemas.microsoft.com/office/powerpoint/2010/main" val="1804423006"/>
       </p:ext>
     </p:extLst>
   </p:cSld>
@@ -15225,7 +14765,7 @@
           <p:cNvPr id="2" name="Title 1">
             <a:extLst>
               <a:ext uri="{FF2B5EF4-FFF2-40B4-BE49-F238E27FC236}">
-                <a16:creationId xmlns:a16="http://schemas.microsoft.com/office/drawing/2014/main" id="{911C6286-638B-4091-B6CB-BD14BB8DDAF7}"/>
+                <a16:creationId xmlns:a16="http://schemas.microsoft.com/office/drawing/2014/main" id="{460E5E25-300A-4A4D-B1C2-63CB6E978153}"/>
               </a:ext>
             </a:extLst>
           </p:cNvPr>
@@ -15243,67 +14783,50 @@
           <a:p>
             <a:r>
               <a:rPr lang="en-US" dirty="0"/>
-              <a:t>OK, So why git?</a:t>
+              <a:t>Rebase workflow (Cont.)</a:t>
             </a:r>
           </a:p>
         </p:txBody>
       </p:sp>
-      <p:sp>
-        <p:nvSpPr>
-          <p:cNvPr id="9" name="Content Placeholder 8">
+      <p:pic>
+        <p:nvPicPr>
+          <p:cNvPr id="6" name="Content Placeholder 5">
             <a:extLst>
               <a:ext uri="{FF2B5EF4-FFF2-40B4-BE49-F238E27FC236}">
-                <a16:creationId xmlns:a16="http://schemas.microsoft.com/office/drawing/2014/main" id="{1CF86407-6C8D-440B-9442-2234CED8E577}"/>
+                <a16:creationId xmlns:a16="http://schemas.microsoft.com/office/drawing/2014/main" id="{7446AF04-D9E3-4AA5-BEEC-75A030DF9F74}"/>
               </a:ext>
             </a:extLst>
           </p:cNvPr>
-          <p:cNvSpPr>
-            <a:spLocks noGrp="1"/>
-          </p:cNvSpPr>
+          <p:cNvPicPr>
+            <a:picLocks noGrp="1" noChangeAspect="1"/>
+          </p:cNvPicPr>
           <p:nvPr>
             <p:ph idx="1"/>
           </p:nvPr>
-        </p:nvSpPr>
-        <p:spPr/>
-        <p:txBody>
-          <a:bodyPr/>
-          <a:lstStyle/>
-          <a:p>
-            <a:r>
-              <a:rPr lang="en-US" dirty="0"/>
-              <a:t>Works offline</a:t>
-            </a:r>
-          </a:p>
-          <a:p>
-            <a:r>
-              <a:rPr lang="en-US" dirty="0"/>
-              <a:t>Branching is easy</a:t>
-            </a:r>
-          </a:p>
-          <a:p>
-            <a:r>
-              <a:rPr lang="en-US" dirty="0"/>
-              <a:t>Merging is easy</a:t>
-            </a:r>
-          </a:p>
-          <a:p>
-            <a:r>
-              <a:rPr lang="en-US" dirty="0"/>
-              <a:t>Full history is kept in each repository copy</a:t>
-            </a:r>
-          </a:p>
-          <a:p>
-            <a:r>
-              <a:rPr lang="en-US" dirty="0"/>
-              <a:t>It’s fast… really fast!</a:t>
-            </a:r>
-          </a:p>
-        </p:txBody>
-      </p:sp>
+        </p:nvPicPr>
+        <p:blipFill>
+          <a:blip r:embed="rId2">
+            <a:extLst>
+              <a:ext uri="{96DAC541-7B7A-43D3-8B79-37D633B846F1}">
+                <asvg:svgBlip xmlns:asvg="http://schemas.microsoft.com/office/drawing/2016/SVG/main" r:embed="rId3"/>
+              </a:ext>
+            </a:extLst>
+          </a:blip>
+          <a:stretch>
+            <a:fillRect/>
+          </a:stretch>
+        </p:blipFill>
+        <p:spPr>
+          <a:xfrm>
+            <a:off x="3451344" y="2249488"/>
+            <a:ext cx="5286137" cy="3541712"/>
+          </a:xfrm>
+        </p:spPr>
+      </p:pic>
     </p:spTree>
     <p:extLst>
       <p:ext uri="{BB962C8B-B14F-4D97-AF65-F5344CB8AC3E}">
-        <p14:creationId xmlns:p14="http://schemas.microsoft.com/office/powerpoint/2010/main" val="3381794860"/>
+        <p14:creationId xmlns:p14="http://schemas.microsoft.com/office/powerpoint/2010/main" val="2415559359"/>
       </p:ext>
     </p:extLst>
   </p:cSld>
@@ -15335,7 +14858,7 @@
           <p:cNvPr id="2" name="Title 1">
             <a:extLst>
               <a:ext uri="{FF2B5EF4-FFF2-40B4-BE49-F238E27FC236}">
-                <a16:creationId xmlns:a16="http://schemas.microsoft.com/office/drawing/2014/main" id="{911C6286-638B-4091-B6CB-BD14BB8DDAF7}"/>
+                <a16:creationId xmlns:a16="http://schemas.microsoft.com/office/drawing/2014/main" id="{460E5E25-300A-4A4D-B1C2-63CB6E978153}"/>
               </a:ext>
             </a:extLst>
           </p:cNvPr>
@@ -15353,7 +14876,7 @@
           <a:p>
             <a:r>
               <a:rPr lang="en-US" dirty="0"/>
-              <a:t>OK, So why git? (Continued)</a:t>
+              <a:t>Rebase workflow (Cont.)</a:t>
             </a:r>
           </a:p>
         </p:txBody>
@@ -15363,7 +14886,7 @@
           <p:cNvPr id="7" name="Content Placeholder 6">
             <a:extLst>
               <a:ext uri="{FF2B5EF4-FFF2-40B4-BE49-F238E27FC236}">
-                <a16:creationId xmlns:a16="http://schemas.microsoft.com/office/drawing/2014/main" id="{E331BA7B-E49E-43E8-BCAA-638C2C2DFDF3}"/>
+                <a16:creationId xmlns:a16="http://schemas.microsoft.com/office/drawing/2014/main" id="{B51158DF-473D-4D96-B075-D2D8845482C2}"/>
               </a:ext>
             </a:extLst>
           </p:cNvPr>
@@ -15375,25 +14898,28 @@
           </p:nvPr>
         </p:nvPicPr>
         <p:blipFill>
-          <a:blip r:embed="rId2"/>
+          <a:blip r:embed="rId2">
+            <a:extLst>
+              <a:ext uri="{96DAC541-7B7A-43D3-8B79-37D633B846F1}">
+                <asvg:svgBlip xmlns:asvg="http://schemas.microsoft.com/office/drawing/2016/SVG/main" r:embed="rId3"/>
+              </a:ext>
+            </a:extLst>
+          </a:blip>
           <a:stretch>
             <a:fillRect/>
           </a:stretch>
         </p:blipFill>
         <p:spPr>
           <a:xfrm>
-            <a:off x="1450327" y="2267499"/>
-            <a:ext cx="9288171" cy="3505689"/>
+            <a:off x="3494991" y="2249488"/>
+            <a:ext cx="5198843" cy="3541712"/>
           </a:xfrm>
-          <a:prstGeom prst="rect">
-            <a:avLst/>
-          </a:prstGeom>
         </p:spPr>
       </p:pic>
     </p:spTree>
     <p:extLst>
       <p:ext uri="{BB962C8B-B14F-4D97-AF65-F5344CB8AC3E}">
-        <p14:creationId xmlns:p14="http://schemas.microsoft.com/office/powerpoint/2010/main" val="3864249410"/>
+        <p14:creationId xmlns:p14="http://schemas.microsoft.com/office/powerpoint/2010/main" val="404804294"/>
       </p:ext>
     </p:extLst>
   </p:cSld>
@@ -15425,7 +14951,7 @@
           <p:cNvPr id="2" name="Title 1">
             <a:extLst>
               <a:ext uri="{FF2B5EF4-FFF2-40B4-BE49-F238E27FC236}">
-                <a16:creationId xmlns:a16="http://schemas.microsoft.com/office/drawing/2014/main" id="{E65278C7-EB92-473C-81C1-40DF1B6C3424}"/>
+                <a16:creationId xmlns:a16="http://schemas.microsoft.com/office/drawing/2014/main" id="{460E5E25-300A-4A4D-B1C2-63CB6E978153}"/>
               </a:ext>
             </a:extLst>
           </p:cNvPr>
@@ -15443,324 +14969,50 @@
           <a:p>
             <a:r>
               <a:rPr lang="en-US" dirty="0"/>
-              <a:t>Important terms</a:t>
+              <a:t>Rebase workflow (Cont.)</a:t>
             </a:r>
           </a:p>
         </p:txBody>
       </p:sp>
-      <p:sp>
-        <p:nvSpPr>
-          <p:cNvPr id="3" name="Content Placeholder 2">
+      <p:pic>
+        <p:nvPicPr>
+          <p:cNvPr id="6" name="Content Placeholder 5">
             <a:extLst>
               <a:ext uri="{FF2B5EF4-FFF2-40B4-BE49-F238E27FC236}">
-                <a16:creationId xmlns:a16="http://schemas.microsoft.com/office/drawing/2014/main" id="{534A0C44-F76B-478D-A870-8CC91863C81B}"/>
+                <a16:creationId xmlns:a16="http://schemas.microsoft.com/office/drawing/2014/main" id="{7A1A7D49-3A09-494D-9214-D9E300234EEA}"/>
               </a:ext>
             </a:extLst>
           </p:cNvPr>
-          <p:cNvSpPr>
-            <a:spLocks noGrp="1"/>
-          </p:cNvSpPr>
+          <p:cNvPicPr>
+            <a:picLocks noGrp="1" noChangeAspect="1"/>
+          </p:cNvPicPr>
           <p:nvPr>
             <p:ph idx="1"/>
           </p:nvPr>
-        </p:nvSpPr>
+        </p:nvPicPr>
+        <p:blipFill>
+          <a:blip r:embed="rId2">
+            <a:extLst>
+              <a:ext uri="{96DAC541-7B7A-43D3-8B79-37D633B846F1}">
+                <asvg:svgBlip xmlns:asvg="http://schemas.microsoft.com/office/drawing/2016/SVG/main" r:embed="rId3"/>
+              </a:ext>
+            </a:extLst>
+          </a:blip>
+          <a:stretch>
+            <a:fillRect/>
+          </a:stretch>
+        </p:blipFill>
         <p:spPr>
           <a:xfrm>
-            <a:off x="1141413" y="2249487"/>
-            <a:ext cx="4378544" cy="3541714"/>
+            <a:off x="3490213" y="2249488"/>
+            <a:ext cx="5208400" cy="3541712"/>
           </a:xfrm>
         </p:spPr>
-        <p:txBody>
-          <a:bodyPr>
-            <a:normAutofit/>
-          </a:bodyPr>
-          <a:lstStyle/>
-          <a:p>
-            <a:r>
-              <a:rPr lang="en-US" dirty="0"/>
-              <a:t>Repository</a:t>
-            </a:r>
-          </a:p>
-          <a:p>
-            <a:r>
-              <a:rPr lang="en-US" dirty="0"/>
-              <a:t>Clone</a:t>
-            </a:r>
-          </a:p>
-          <a:p>
-            <a:r>
-              <a:rPr lang="en-US" dirty="0"/>
-              <a:t>Branch</a:t>
-            </a:r>
-          </a:p>
-          <a:p>
-            <a:r>
-              <a:rPr lang="en-US" dirty="0"/>
-              <a:t>Status</a:t>
-            </a:r>
-          </a:p>
-          <a:p>
-            <a:r>
-              <a:rPr lang="en-US" dirty="0"/>
-              <a:t>Add/Stage</a:t>
-            </a:r>
-          </a:p>
-          <a:p>
-            <a:r>
-              <a:rPr lang="en-US" dirty="0"/>
-              <a:t>Commit</a:t>
-            </a:r>
-          </a:p>
-          <a:p>
-            <a:pPr marL="0" indent="0">
-              <a:buNone/>
-            </a:pPr>
-            <a:endParaRPr lang="en-US" dirty="0"/>
-          </a:p>
-        </p:txBody>
-      </p:sp>
-      <p:sp>
-        <p:nvSpPr>
-          <p:cNvPr id="4" name="Content Placeholder 2">
-            <a:extLst>
-              <a:ext uri="{FF2B5EF4-FFF2-40B4-BE49-F238E27FC236}">
-                <a16:creationId xmlns:a16="http://schemas.microsoft.com/office/drawing/2014/main" id="{9F6692E9-E8F2-4A49-8D7D-C8F90999C66C}"/>
-              </a:ext>
-            </a:extLst>
-          </p:cNvPr>
-          <p:cNvSpPr txBox="1">
-            <a:spLocks/>
-          </p:cNvSpPr>
-          <p:nvPr/>
-        </p:nvSpPr>
-        <p:spPr>
-          <a:xfrm>
-            <a:off x="6094412" y="2249487"/>
-            <a:ext cx="4378544" cy="3541714"/>
-          </a:xfrm>
-          <a:prstGeom prst="rect">
-            <a:avLst/>
-          </a:prstGeom>
-        </p:spPr>
-        <p:txBody>
-          <a:bodyPr vert="horz" lIns="91440" tIns="45720" rIns="91440" bIns="45720" rtlCol="0">
-            <a:normAutofit/>
-          </a:bodyPr>
-          <a:lstStyle>
-            <a:lvl1pPr marL="228600" indent="-228600" algn="l" defTabSz="914400" rtl="0" eaLnBrk="1" latinLnBrk="0" hangingPunct="1">
-              <a:lnSpc>
-                <a:spcPct val="120000"/>
-              </a:lnSpc>
-              <a:spcBef>
-                <a:spcPts val="1000"/>
-              </a:spcBef>
-              <a:buSzPct val="125000"/>
-              <a:buFont typeface="Arial" panose="020B0604020202020204" pitchFamily="34" charset="0"/>
-              <a:buChar char="•"/>
-              <a:defRPr sz="2400" kern="1200">
-                <a:solidFill>
-                  <a:schemeClr val="tx1"/>
-                </a:solidFill>
-                <a:latin typeface="+mn-lt"/>
-                <a:ea typeface="+mn-ea"/>
-                <a:cs typeface="+mn-cs"/>
-              </a:defRPr>
-            </a:lvl1pPr>
-            <a:lvl2pPr marL="685800" indent="-228600" algn="l" defTabSz="914400" rtl="0" eaLnBrk="1" latinLnBrk="0" hangingPunct="1">
-              <a:lnSpc>
-                <a:spcPct val="120000"/>
-              </a:lnSpc>
-              <a:spcBef>
-                <a:spcPts val="500"/>
-              </a:spcBef>
-              <a:buSzPct val="125000"/>
-              <a:buFont typeface="Arial" panose="020B0604020202020204" pitchFamily="34" charset="0"/>
-              <a:buChar char="•"/>
-              <a:defRPr sz="2000" kern="1200">
-                <a:solidFill>
-                  <a:schemeClr val="tx1"/>
-                </a:solidFill>
-                <a:latin typeface="+mn-lt"/>
-                <a:ea typeface="+mn-ea"/>
-                <a:cs typeface="+mn-cs"/>
-              </a:defRPr>
-            </a:lvl2pPr>
-            <a:lvl3pPr marL="1143000" indent="-228600" algn="l" defTabSz="914400" rtl="0" eaLnBrk="1" latinLnBrk="0" hangingPunct="1">
-              <a:lnSpc>
-                <a:spcPct val="120000"/>
-              </a:lnSpc>
-              <a:spcBef>
-                <a:spcPts val="500"/>
-              </a:spcBef>
-              <a:buSzPct val="125000"/>
-              <a:buFont typeface="Arial" panose="020B0604020202020204" pitchFamily="34" charset="0"/>
-              <a:buChar char="•"/>
-              <a:defRPr sz="1800" kern="1200">
-                <a:solidFill>
-                  <a:schemeClr val="tx1"/>
-                </a:solidFill>
-                <a:latin typeface="+mn-lt"/>
-                <a:ea typeface="+mn-ea"/>
-                <a:cs typeface="+mn-cs"/>
-              </a:defRPr>
-            </a:lvl3pPr>
-            <a:lvl4pPr marL="1600200" indent="-228600" algn="l" defTabSz="914400" rtl="0" eaLnBrk="1" latinLnBrk="0" hangingPunct="1">
-              <a:lnSpc>
-                <a:spcPct val="120000"/>
-              </a:lnSpc>
-              <a:spcBef>
-                <a:spcPts val="500"/>
-              </a:spcBef>
-              <a:buSzPct val="125000"/>
-              <a:buFont typeface="Arial" panose="020B0604020202020204" pitchFamily="34" charset="0"/>
-              <a:buChar char="•"/>
-              <a:defRPr sz="1600" kern="1200">
-                <a:solidFill>
-                  <a:schemeClr val="tx1"/>
-                </a:solidFill>
-                <a:latin typeface="+mn-lt"/>
-                <a:ea typeface="+mn-ea"/>
-                <a:cs typeface="+mn-cs"/>
-              </a:defRPr>
-            </a:lvl4pPr>
-            <a:lvl5pPr marL="2057400" indent="-228600" algn="l" defTabSz="914400" rtl="0" eaLnBrk="1" latinLnBrk="0" hangingPunct="1">
-              <a:lnSpc>
-                <a:spcPct val="120000"/>
-              </a:lnSpc>
-              <a:spcBef>
-                <a:spcPts val="500"/>
-              </a:spcBef>
-              <a:buSzPct val="125000"/>
-              <a:buFont typeface="Arial" panose="020B0604020202020204" pitchFamily="34" charset="0"/>
-              <a:buChar char="•"/>
-              <a:defRPr sz="1600" kern="1200">
-                <a:solidFill>
-                  <a:schemeClr val="tx1"/>
-                </a:solidFill>
-                <a:latin typeface="+mn-lt"/>
-                <a:ea typeface="+mn-ea"/>
-                <a:cs typeface="+mn-cs"/>
-              </a:defRPr>
-            </a:lvl5pPr>
-            <a:lvl6pPr marL="2514600" indent="-228600" algn="l" defTabSz="914400" rtl="0" eaLnBrk="1" latinLnBrk="0" hangingPunct="1">
-              <a:lnSpc>
-                <a:spcPct val="120000"/>
-              </a:lnSpc>
-              <a:spcBef>
-                <a:spcPts val="500"/>
-              </a:spcBef>
-              <a:buSzPct val="125000"/>
-              <a:buFont typeface="Arial" panose="020B0604020202020204" pitchFamily="34" charset="0"/>
-              <a:buChar char="•"/>
-              <a:defRPr sz="1400" kern="1200">
-                <a:solidFill>
-                  <a:schemeClr val="tx1"/>
-                </a:solidFill>
-                <a:latin typeface="+mn-lt"/>
-                <a:ea typeface="+mn-ea"/>
-                <a:cs typeface="+mn-cs"/>
-              </a:defRPr>
-            </a:lvl6pPr>
-            <a:lvl7pPr marL="2971800" indent="-228600" algn="l" defTabSz="914400" rtl="0" eaLnBrk="1" latinLnBrk="0" hangingPunct="1">
-              <a:lnSpc>
-                <a:spcPct val="120000"/>
-              </a:lnSpc>
-              <a:spcBef>
-                <a:spcPts val="500"/>
-              </a:spcBef>
-              <a:buSzPct val="125000"/>
-              <a:buFont typeface="Arial" panose="020B0604020202020204" pitchFamily="34" charset="0"/>
-              <a:buChar char="•"/>
-              <a:defRPr sz="1400" kern="1200">
-                <a:solidFill>
-                  <a:schemeClr val="tx1"/>
-                </a:solidFill>
-                <a:latin typeface="+mn-lt"/>
-                <a:ea typeface="+mn-ea"/>
-                <a:cs typeface="+mn-cs"/>
-              </a:defRPr>
-            </a:lvl7pPr>
-            <a:lvl8pPr marL="3429000" indent="-228600" algn="l" defTabSz="914400" rtl="0" eaLnBrk="1" latinLnBrk="0" hangingPunct="1">
-              <a:lnSpc>
-                <a:spcPct val="120000"/>
-              </a:lnSpc>
-              <a:spcBef>
-                <a:spcPts val="500"/>
-              </a:spcBef>
-              <a:buSzPct val="125000"/>
-              <a:buFont typeface="Arial" panose="020B0604020202020204" pitchFamily="34" charset="0"/>
-              <a:buChar char="•"/>
-              <a:defRPr sz="1400" kern="1200">
-                <a:solidFill>
-                  <a:schemeClr val="tx1"/>
-                </a:solidFill>
-                <a:latin typeface="+mn-lt"/>
-                <a:ea typeface="+mn-ea"/>
-                <a:cs typeface="+mn-cs"/>
-              </a:defRPr>
-            </a:lvl8pPr>
-            <a:lvl9pPr marL="3886200" indent="-228600" algn="l" defTabSz="914400" rtl="0" eaLnBrk="1" latinLnBrk="0" hangingPunct="1">
-              <a:lnSpc>
-                <a:spcPct val="120000"/>
-              </a:lnSpc>
-              <a:spcBef>
-                <a:spcPts val="500"/>
-              </a:spcBef>
-              <a:buSzPct val="125000"/>
-              <a:buFont typeface="Arial" panose="020B0604020202020204" pitchFamily="34" charset="0"/>
-              <a:buChar char="•"/>
-              <a:defRPr sz="1400" kern="1200">
-                <a:solidFill>
-                  <a:schemeClr val="tx1"/>
-                </a:solidFill>
-                <a:latin typeface="+mn-lt"/>
-                <a:ea typeface="+mn-ea"/>
-                <a:cs typeface="+mn-cs"/>
-              </a:defRPr>
-            </a:lvl9pPr>
-          </a:lstStyle>
-          <a:p>
-            <a:r>
-              <a:rPr lang="en-US" dirty="0"/>
-              <a:t>Merge</a:t>
-            </a:r>
-          </a:p>
-          <a:p>
-            <a:r>
-              <a:rPr lang="en-US" dirty="0"/>
-              <a:t>Push</a:t>
-            </a:r>
-          </a:p>
-          <a:p>
-            <a:r>
-              <a:rPr lang="en-US" dirty="0"/>
-              <a:t>Pull</a:t>
-            </a:r>
-          </a:p>
-          <a:p>
-            <a:r>
-              <a:rPr lang="en-US" dirty="0"/>
-              <a:t>Fetch</a:t>
-            </a:r>
-          </a:p>
-          <a:p>
-            <a:r>
-              <a:rPr lang="en-US" dirty="0"/>
-              <a:t>Rebase</a:t>
-            </a:r>
-          </a:p>
-          <a:p>
-            <a:r>
-              <a:rPr lang="en-US" dirty="0"/>
-              <a:t>Fork</a:t>
-            </a:r>
-          </a:p>
-        </p:txBody>
-      </p:sp>
+      </p:pic>
     </p:spTree>
     <p:extLst>
       <p:ext uri="{BB962C8B-B14F-4D97-AF65-F5344CB8AC3E}">
-        <p14:creationId xmlns:p14="http://schemas.microsoft.com/office/powerpoint/2010/main" val="253780100"/>
+        <p14:creationId xmlns:p14="http://schemas.microsoft.com/office/powerpoint/2010/main" val="3970215657"/>
       </p:ext>
     </p:extLst>
   </p:cSld>
@@ -15792,7 +15044,7 @@
           <p:cNvPr id="2" name="Title 1">
             <a:extLst>
               <a:ext uri="{FF2B5EF4-FFF2-40B4-BE49-F238E27FC236}">
-                <a16:creationId xmlns:a16="http://schemas.microsoft.com/office/drawing/2014/main" id="{13FC7AF7-A763-46CF-A6AA-353C92C0D8D4}"/>
+                <a16:creationId xmlns:a16="http://schemas.microsoft.com/office/drawing/2014/main" id="{460E5E25-300A-4A4D-B1C2-63CB6E978153}"/>
               </a:ext>
             </a:extLst>
           </p:cNvPr>
@@ -15810,17 +15062,17 @@
           <a:p>
             <a:r>
               <a:rPr lang="en-US" dirty="0"/>
-              <a:t>Lab 1 – part 1</a:t>
+              <a:t>Rebase golden Rule</a:t>
             </a:r>
           </a:p>
         </p:txBody>
       </p:sp>
       <p:sp>
         <p:nvSpPr>
-          <p:cNvPr id="3" name="Content Placeholder 2">
+          <p:cNvPr id="9" name="Content Placeholder 8">
             <a:extLst>
               <a:ext uri="{FF2B5EF4-FFF2-40B4-BE49-F238E27FC236}">
-                <a16:creationId xmlns:a16="http://schemas.microsoft.com/office/drawing/2014/main" id="{6D08EF2B-6A6E-4390-A8F1-CDC0E1412495}"/>
+                <a16:creationId xmlns:a16="http://schemas.microsoft.com/office/drawing/2014/main" id="{7B5AF4F8-6FA9-4858-A0E3-DE4C8ADBA48F}"/>
               </a:ext>
             </a:extLst>
           </p:cNvPr>
@@ -15833,100 +15085,44 @@
         </p:nvSpPr>
         <p:spPr/>
         <p:txBody>
-          <a:bodyPr>
-            <a:normAutofit fontScale="85000" lnSpcReduction="20000"/>
-          </a:bodyPr>
+          <a:bodyPr/>
           <a:lstStyle/>
           <a:p>
             <a:r>
               <a:rPr lang="en-US" dirty="0"/>
-              <a:t>Install Visual Studio Code</a:t>
-            </a:r>
-          </a:p>
-          <a:p>
+              <a:t>When rebasing, keep the golden rule in mind:</a:t>
+            </a:r>
+          </a:p>
+          <a:p>
+            <a:pPr lvl="1"/>
+            <a:r>
+              <a:rPr lang="en-US" b="1" dirty="0"/>
+              <a:t>NEVER</a:t>
+            </a:r>
             <a:r>
               <a:rPr lang="en-US" dirty="0"/>
-              <a:t>Install git-</a:t>
-            </a:r>
-            <a:r>
-              <a:rPr lang="en-US" dirty="0" err="1"/>
-              <a:t>scm</a:t>
-            </a:r>
-            <a:endParaRPr lang="en-US" dirty="0"/>
+              <a:t> rebase a public branch over your branch</a:t>
+            </a:r>
           </a:p>
           <a:p>
             <a:r>
               <a:rPr lang="en-US" dirty="0"/>
-              <a:t>Open git-bash (MacOS users should use terminal instead)</a:t>
-            </a:r>
-          </a:p>
-          <a:p>
+              <a:t>Rebasing gives you an opportunity to realign your history with team changes</a:t>
+            </a:r>
+          </a:p>
+          <a:p>
+            <a:pPr lvl="1"/>
             <a:r>
               <a:rPr lang="en-US" dirty="0"/>
-              <a:t>Let git know who you are</a:t>
-            </a:r>
-          </a:p>
-          <a:p>
-            <a:pPr lvl="1"/>
-            <a:r>
-              <a:rPr lang="en-US" dirty="0"/>
-              <a:t>git config --global </a:t>
-            </a:r>
-            <a:r>
-              <a:rPr lang="en-US" dirty="0" err="1"/>
-              <a:t>user.email</a:t>
-            </a:r>
-            <a:r>
-              <a:rPr lang="en-US" dirty="0"/>
-              <a:t> "MyEmail@Email.com"</a:t>
-            </a:r>
-          </a:p>
-          <a:p>
-            <a:pPr lvl="1"/>
-            <a:r>
-              <a:rPr lang="en-US" dirty="0"/>
-              <a:t>git config --global user.name "My Name“</a:t>
-            </a:r>
-          </a:p>
-          <a:p>
-            <a:pPr lvl="1"/>
-            <a:r>
-              <a:rPr lang="en-US" dirty="0"/>
-              <a:t>git config --l</a:t>
-            </a:r>
-          </a:p>
-          <a:p>
-            <a:pPr lvl="2"/>
-            <a:r>
-              <a:rPr lang="en-US" dirty="0"/>
-              <a:t>Alternatively, you can use the following commands to explicitly pull this information</a:t>
-            </a:r>
-          </a:p>
-          <a:p>
-            <a:pPr lvl="2"/>
-            <a:r>
-              <a:rPr lang="en-US" dirty="0"/>
-              <a:t>git config --get user.name</a:t>
-            </a:r>
-          </a:p>
-          <a:p>
-            <a:pPr lvl="2"/>
-            <a:r>
-              <a:rPr lang="en-US" dirty="0"/>
-              <a:t>git config --get </a:t>
-            </a:r>
-            <a:r>
-              <a:rPr lang="en-US" dirty="0" err="1"/>
-              <a:t>user.email</a:t>
-            </a:r>
-            <a:endParaRPr lang="en-US" dirty="0"/>
+              <a:t>Don’t make others have to realign around your own changes</a:t>
+            </a:r>
           </a:p>
         </p:txBody>
       </p:sp>
     </p:spTree>
     <p:extLst>
       <p:ext uri="{BB962C8B-B14F-4D97-AF65-F5344CB8AC3E}">
-        <p14:creationId xmlns:p14="http://schemas.microsoft.com/office/powerpoint/2010/main" val="1868797460"/>
+        <p14:creationId xmlns:p14="http://schemas.microsoft.com/office/powerpoint/2010/main" val="467940543"/>
       </p:ext>
     </p:extLst>
   </p:cSld>

</xml_diff>

<commit_message>
Adding slides for Lab 2 and beyond.
</commit_message>
<xml_diff>
--- a/resources/Advanced github topics.pptx
+++ b/resources/Advanced github topics.pptx
@@ -5,10 +5,10 @@
     <p:sldMasterId id="2147483669" r:id="rId4"/>
   </p:sldMasterIdLst>
   <p:notesMasterIdLst>
-    <p:notesMasterId r:id="rId23"/>
+    <p:notesMasterId r:id="rId34"/>
   </p:notesMasterIdLst>
   <p:handoutMasterIdLst>
-    <p:handoutMasterId r:id="rId24"/>
+    <p:handoutMasterId r:id="rId35"/>
   </p:handoutMasterIdLst>
   <p:sldIdLst>
     <p:sldId id="256" r:id="rId5"/>
@@ -28,7 +28,18 @@
     <p:sldId id="297" r:id="rId19"/>
     <p:sldId id="298" r:id="rId20"/>
     <p:sldId id="299" r:id="rId21"/>
-    <p:sldId id="265" r:id="rId22"/>
+    <p:sldId id="300" r:id="rId22"/>
+    <p:sldId id="301" r:id="rId23"/>
+    <p:sldId id="302" r:id="rId24"/>
+    <p:sldId id="303" r:id="rId25"/>
+    <p:sldId id="304" r:id="rId26"/>
+    <p:sldId id="305" r:id="rId27"/>
+    <p:sldId id="306" r:id="rId28"/>
+    <p:sldId id="307" r:id="rId29"/>
+    <p:sldId id="308" r:id="rId30"/>
+    <p:sldId id="309" r:id="rId31"/>
+    <p:sldId id="310" r:id="rId32"/>
+    <p:sldId id="265" r:id="rId33"/>
   </p:sldIdLst>
   <p:sldSz cx="12192000" cy="6858000"/>
   <p:notesSz cx="6858000" cy="9144000"/>
@@ -733,7 +744,7 @@
           <a:noFill/>
           <a:extLst>
             <a:ext uri="{909E8E84-426E-40dd-AFC4-6F175D3DCCD1}">
-              <a14:hiddenFill xmlns="" xmlns:a14="http://schemas.microsoft.com/office/drawing/2010/main">
+              <a14:hiddenFill xmlns:a14="http://schemas.microsoft.com/office/drawing/2010/main" xmlns="">
                 <a:solidFill>
                   <a:srgbClr val="FFFFFF"/>
                 </a:solidFill>
@@ -792,7 +803,7 @@
             </a:ln>
             <a:extLst>
               <a:ext uri="{91240B29-F687-4f45-9708-019B960494DF}">
-                <a14:hiddenLine xmlns="" xmlns:a14="http://schemas.microsoft.com/office/drawing/2010/main" w="9525">
+                <a14:hiddenLine xmlns:a14="http://schemas.microsoft.com/office/drawing/2010/main" xmlns="" w="9525">
                   <a:solidFill>
                     <a:srgbClr val="000000"/>
                   </a:solidFill>
@@ -882,7 +893,7 @@
             </a:ln>
             <a:extLst>
               <a:ext uri="{91240B29-F687-4f45-9708-019B960494DF}">
-                <a14:hiddenLine xmlns="" xmlns:a14="http://schemas.microsoft.com/office/drawing/2010/main" w="9525">
+                <a14:hiddenLine xmlns:a14="http://schemas.microsoft.com/office/drawing/2010/main" xmlns="" w="9525">
                   <a:solidFill>
                     <a:srgbClr val="000000"/>
                   </a:solidFill>
@@ -972,7 +983,7 @@
             </a:ln>
             <a:extLst>
               <a:ext uri="{91240B29-F687-4f45-9708-019B960494DF}">
-                <a14:hiddenLine xmlns="" xmlns:a14="http://schemas.microsoft.com/office/drawing/2010/main" w="9525">
+                <a14:hiddenLine xmlns:a14="http://schemas.microsoft.com/office/drawing/2010/main" xmlns="" w="9525">
                   <a:solidFill>
                     <a:srgbClr val="000000"/>
                   </a:solidFill>
@@ -1006,7 +1017,7 @@
             </a:ln>
             <a:extLst>
               <a:ext uri="{91240B29-F687-4f45-9708-019B960494DF}">
-                <a14:hiddenLine xmlns="" xmlns:a14="http://schemas.microsoft.com/office/drawing/2010/main" w="9525">
+                <a14:hiddenLine xmlns:a14="http://schemas.microsoft.com/office/drawing/2010/main" xmlns="" w="9525">
                   <a:solidFill>
                     <a:srgbClr val="000000"/>
                   </a:solidFill>
@@ -1096,7 +1107,7 @@
             </a:ln>
             <a:extLst>
               <a:ext uri="{91240B29-F687-4f45-9708-019B960494DF}">
-                <a14:hiddenLine xmlns="" xmlns:a14="http://schemas.microsoft.com/office/drawing/2010/main" w="9525">
+                <a14:hiddenLine xmlns:a14="http://schemas.microsoft.com/office/drawing/2010/main" xmlns="" w="9525">
                   <a:solidFill>
                     <a:srgbClr val="000000"/>
                   </a:solidFill>
@@ -1158,7 +1169,7 @@
             </a:ln>
             <a:extLst>
               <a:ext uri="{91240B29-F687-4f45-9708-019B960494DF}">
-                <a14:hiddenLine xmlns="" xmlns:a14="http://schemas.microsoft.com/office/drawing/2010/main" w="9525">
+                <a14:hiddenLine xmlns:a14="http://schemas.microsoft.com/office/drawing/2010/main" xmlns="" w="9525">
                   <a:solidFill>
                     <a:srgbClr val="000000"/>
                   </a:solidFill>
@@ -1220,7 +1231,7 @@
             </a:ln>
             <a:extLst>
               <a:ext uri="{91240B29-F687-4f45-9708-019B960494DF}">
-                <a14:hiddenLine xmlns="" xmlns:a14="http://schemas.microsoft.com/office/drawing/2010/main" w="9525">
+                <a14:hiddenLine xmlns:a14="http://schemas.microsoft.com/office/drawing/2010/main" xmlns="" w="9525">
                   <a:solidFill>
                     <a:srgbClr val="000000"/>
                   </a:solidFill>
@@ -1310,7 +1321,7 @@
             </a:ln>
             <a:extLst>
               <a:ext uri="{91240B29-F687-4f45-9708-019B960494DF}">
-                <a14:hiddenLine xmlns="" xmlns:a14="http://schemas.microsoft.com/office/drawing/2010/main" w="9525">
+                <a14:hiddenLine xmlns:a14="http://schemas.microsoft.com/office/drawing/2010/main" xmlns="" w="9525">
                   <a:solidFill>
                     <a:srgbClr val="000000"/>
                   </a:solidFill>
@@ -1372,7 +1383,7 @@
             </a:ln>
             <a:extLst>
               <a:ext uri="{91240B29-F687-4f45-9708-019B960494DF}">
-                <a14:hiddenLine xmlns="" xmlns:a14="http://schemas.microsoft.com/office/drawing/2010/main" w="9525">
+                <a14:hiddenLine xmlns:a14="http://schemas.microsoft.com/office/drawing/2010/main" xmlns="" w="9525">
                   <a:solidFill>
                     <a:srgbClr val="000000"/>
                   </a:solidFill>
@@ -1434,7 +1445,7 @@
             </a:ln>
             <a:extLst>
               <a:ext uri="{91240B29-F687-4f45-9708-019B960494DF}">
-                <a14:hiddenLine xmlns="" xmlns:a14="http://schemas.microsoft.com/office/drawing/2010/main" w="9525">
+                <a14:hiddenLine xmlns:a14="http://schemas.microsoft.com/office/drawing/2010/main" xmlns="" w="9525">
                   <a:solidFill>
                     <a:srgbClr val="000000"/>
                   </a:solidFill>
@@ -1524,7 +1535,7 @@
             </a:ln>
             <a:extLst>
               <a:ext uri="{91240B29-F687-4f45-9708-019B960494DF}">
-                <a14:hiddenLine xmlns="" xmlns:a14="http://schemas.microsoft.com/office/drawing/2010/main" w="9525">
+                <a14:hiddenLine xmlns:a14="http://schemas.microsoft.com/office/drawing/2010/main" xmlns="" w="9525">
                   <a:solidFill>
                     <a:srgbClr val="000000"/>
                   </a:solidFill>
@@ -1614,7 +1625,7 @@
             </a:ln>
             <a:extLst>
               <a:ext uri="{91240B29-F687-4f45-9708-019B960494DF}">
-                <a14:hiddenLine xmlns="" xmlns:a14="http://schemas.microsoft.com/office/drawing/2010/main" w="9525">
+                <a14:hiddenLine xmlns:a14="http://schemas.microsoft.com/office/drawing/2010/main" xmlns="" w="9525">
                   <a:solidFill>
                     <a:srgbClr val="000000"/>
                   </a:solidFill>
@@ -1676,7 +1687,7 @@
             </a:ln>
             <a:extLst>
               <a:ext uri="{91240B29-F687-4f45-9708-019B960494DF}">
-                <a14:hiddenLine xmlns="" xmlns:a14="http://schemas.microsoft.com/office/drawing/2010/main" w="9525">
+                <a14:hiddenLine xmlns:a14="http://schemas.microsoft.com/office/drawing/2010/main" xmlns="" w="9525">
                   <a:solidFill>
                     <a:srgbClr val="000000"/>
                   </a:solidFill>
@@ -1786,7 +1797,7 @@
             </a:ln>
             <a:extLst>
               <a:ext uri="{91240B29-F687-4f45-9708-019B960494DF}">
-                <a14:hiddenLine xmlns="" xmlns:a14="http://schemas.microsoft.com/office/drawing/2010/main" w="9525">
+                <a14:hiddenLine xmlns:a14="http://schemas.microsoft.com/office/drawing/2010/main" xmlns="" w="9525">
                   <a:solidFill>
                     <a:srgbClr val="000000"/>
                   </a:solidFill>
@@ -1848,7 +1859,7 @@
             </a:ln>
             <a:extLst>
               <a:ext uri="{91240B29-F687-4f45-9708-019B960494DF}">
-                <a14:hiddenLine xmlns="" xmlns:a14="http://schemas.microsoft.com/office/drawing/2010/main" w="9525">
+                <a14:hiddenLine xmlns:a14="http://schemas.microsoft.com/office/drawing/2010/main" xmlns="" w="9525">
                   <a:solidFill>
                     <a:srgbClr val="000000"/>
                   </a:solidFill>
@@ -1938,7 +1949,7 @@
             </a:ln>
             <a:extLst>
               <a:ext uri="{91240B29-F687-4f45-9708-019B960494DF}">
-                <a14:hiddenLine xmlns="" xmlns:a14="http://schemas.microsoft.com/office/drawing/2010/main" w="9525">
+                <a14:hiddenLine xmlns:a14="http://schemas.microsoft.com/office/drawing/2010/main" xmlns="" w="9525">
                   <a:solidFill>
                     <a:srgbClr val="000000"/>
                   </a:solidFill>
@@ -2028,7 +2039,7 @@
             </a:ln>
             <a:extLst>
               <a:ext uri="{91240B29-F687-4f45-9708-019B960494DF}">
-                <a14:hiddenLine xmlns="" xmlns:a14="http://schemas.microsoft.com/office/drawing/2010/main" w="9525">
+                <a14:hiddenLine xmlns:a14="http://schemas.microsoft.com/office/drawing/2010/main" xmlns="" w="9525">
                   <a:solidFill>
                     <a:srgbClr val="000000"/>
                   </a:solidFill>
@@ -2090,7 +2101,7 @@
             </a:ln>
             <a:extLst>
               <a:ext uri="{91240B29-F687-4f45-9708-019B960494DF}">
-                <a14:hiddenLine xmlns="" xmlns:a14="http://schemas.microsoft.com/office/drawing/2010/main" w="9525">
+                <a14:hiddenLine xmlns:a14="http://schemas.microsoft.com/office/drawing/2010/main" xmlns="" w="9525">
                   <a:solidFill>
                     <a:srgbClr val="000000"/>
                   </a:solidFill>
@@ -2180,7 +2191,7 @@
             </a:ln>
             <a:extLst>
               <a:ext uri="{91240B29-F687-4f45-9708-019B960494DF}">
-                <a14:hiddenLine xmlns="" xmlns:a14="http://schemas.microsoft.com/office/drawing/2010/main" w="9525">
+                <a14:hiddenLine xmlns:a14="http://schemas.microsoft.com/office/drawing/2010/main" xmlns="" w="9525">
                   <a:solidFill>
                     <a:srgbClr val="000000"/>
                   </a:solidFill>
@@ -2270,7 +2281,7 @@
             </a:ln>
             <a:extLst>
               <a:ext uri="{91240B29-F687-4f45-9708-019B960494DF}">
-                <a14:hiddenLine xmlns="" xmlns:a14="http://schemas.microsoft.com/office/drawing/2010/main" w="9525">
+                <a14:hiddenLine xmlns:a14="http://schemas.microsoft.com/office/drawing/2010/main" xmlns="" w="9525">
                   <a:solidFill>
                     <a:srgbClr val="000000"/>
                   </a:solidFill>
@@ -2326,7 +2337,7 @@
             </a:ln>
             <a:extLst>
               <a:ext uri="{91240B29-F687-4f45-9708-019B960494DF}">
-                <a14:hiddenLine xmlns="" xmlns:a14="http://schemas.microsoft.com/office/drawing/2010/main" w="9525">
+                <a14:hiddenLine xmlns:a14="http://schemas.microsoft.com/office/drawing/2010/main" xmlns="" w="9525">
                   <a:solidFill>
                     <a:srgbClr val="000000"/>
                   </a:solidFill>
@@ -2416,7 +2427,7 @@
             </a:ln>
             <a:extLst>
               <a:ext uri="{91240B29-F687-4f45-9708-019B960494DF}">
-                <a14:hiddenLine xmlns="" xmlns:a14="http://schemas.microsoft.com/office/drawing/2010/main" w="9525">
+                <a14:hiddenLine xmlns:a14="http://schemas.microsoft.com/office/drawing/2010/main" xmlns="" w="9525">
                   <a:solidFill>
                     <a:srgbClr val="000000"/>
                   </a:solidFill>
@@ -2472,7 +2483,7 @@
             </a:ln>
             <a:extLst>
               <a:ext uri="{91240B29-F687-4f45-9708-019B960494DF}">
-                <a14:hiddenLine xmlns="" xmlns:a14="http://schemas.microsoft.com/office/drawing/2010/main" w="9525">
+                <a14:hiddenLine xmlns:a14="http://schemas.microsoft.com/office/drawing/2010/main" xmlns="" w="9525">
                   <a:solidFill>
                     <a:srgbClr val="000000"/>
                   </a:solidFill>
@@ -2562,7 +2573,7 @@
             </a:ln>
             <a:extLst>
               <a:ext uri="{91240B29-F687-4f45-9708-019B960494DF}">
-                <a14:hiddenLine xmlns="" xmlns:a14="http://schemas.microsoft.com/office/drawing/2010/main" w="9525">
+                <a14:hiddenLine xmlns:a14="http://schemas.microsoft.com/office/drawing/2010/main" xmlns="" w="9525">
                   <a:solidFill>
                     <a:srgbClr val="000000"/>
                   </a:solidFill>
@@ -2630,7 +2641,7 @@
             </a:ln>
             <a:extLst>
               <a:ext uri="{91240B29-F687-4f45-9708-019B960494DF}">
-                <a14:hiddenLine xmlns="" xmlns:a14="http://schemas.microsoft.com/office/drawing/2010/main" w="9525">
+                <a14:hiddenLine xmlns:a14="http://schemas.microsoft.com/office/drawing/2010/main" xmlns="" w="9525">
                   <a:solidFill>
                     <a:srgbClr val="000000"/>
                   </a:solidFill>
@@ -2720,7 +2731,7 @@
             </a:ln>
             <a:extLst>
               <a:ext uri="{91240B29-F687-4f45-9708-019B960494DF}">
-                <a14:hiddenLine xmlns="" xmlns:a14="http://schemas.microsoft.com/office/drawing/2010/main" w="9525">
+                <a14:hiddenLine xmlns:a14="http://schemas.microsoft.com/office/drawing/2010/main" xmlns="" w="9525">
                   <a:solidFill>
                     <a:srgbClr val="000000"/>
                   </a:solidFill>
@@ -2788,7 +2799,7 @@
             </a:ln>
             <a:extLst>
               <a:ext uri="{91240B29-F687-4f45-9708-019B960494DF}">
-                <a14:hiddenLine xmlns="" xmlns:a14="http://schemas.microsoft.com/office/drawing/2010/main" w="9525">
+                <a14:hiddenLine xmlns:a14="http://schemas.microsoft.com/office/drawing/2010/main" xmlns="" w="9525">
                   <a:solidFill>
                     <a:srgbClr val="000000"/>
                   </a:solidFill>
@@ -2878,7 +2889,7 @@
             </a:ln>
             <a:extLst>
               <a:ext uri="{91240B29-F687-4f45-9708-019B960494DF}">
-                <a14:hiddenLine xmlns="" xmlns:a14="http://schemas.microsoft.com/office/drawing/2010/main" w="9525">
+                <a14:hiddenLine xmlns:a14="http://schemas.microsoft.com/office/drawing/2010/main" xmlns="" w="9525">
                   <a:solidFill>
                     <a:srgbClr val="000000"/>
                   </a:solidFill>
@@ -2912,7 +2923,7 @@
             </a:ln>
             <a:extLst>
               <a:ext uri="{91240B29-F687-4f45-9708-019B960494DF}">
-                <a14:hiddenLine xmlns="" xmlns:a14="http://schemas.microsoft.com/office/drawing/2010/main" w="9525">
+                <a14:hiddenLine xmlns:a14="http://schemas.microsoft.com/office/drawing/2010/main" xmlns="" w="9525">
                   <a:solidFill>
                     <a:srgbClr val="000000"/>
                   </a:solidFill>
@@ -3002,7 +3013,7 @@
             </a:ln>
             <a:extLst>
               <a:ext uri="{91240B29-F687-4f45-9708-019B960494DF}">
-                <a14:hiddenLine xmlns="" xmlns:a14="http://schemas.microsoft.com/office/drawing/2010/main" w="9525">
+                <a14:hiddenLine xmlns:a14="http://schemas.microsoft.com/office/drawing/2010/main" xmlns="" w="9525">
                   <a:solidFill>
                     <a:srgbClr val="000000"/>
                   </a:solidFill>
@@ -3064,7 +3075,7 @@
             </a:ln>
             <a:extLst>
               <a:ext uri="{91240B29-F687-4f45-9708-019B960494DF}">
-                <a14:hiddenLine xmlns="" xmlns:a14="http://schemas.microsoft.com/office/drawing/2010/main" w="9525">
+                <a14:hiddenLine xmlns:a14="http://schemas.microsoft.com/office/drawing/2010/main" xmlns="" w="9525">
                   <a:solidFill>
                     <a:srgbClr val="000000"/>
                   </a:solidFill>
@@ -3126,7 +3137,7 @@
             </a:ln>
             <a:extLst>
               <a:ext uri="{91240B29-F687-4f45-9708-019B960494DF}">
-                <a14:hiddenLine xmlns="" xmlns:a14="http://schemas.microsoft.com/office/drawing/2010/main" w="9525">
+                <a14:hiddenLine xmlns:a14="http://schemas.microsoft.com/office/drawing/2010/main" xmlns="" w="9525">
                   <a:solidFill>
                     <a:srgbClr val="000000"/>
                   </a:solidFill>
@@ -3216,7 +3227,7 @@
             </a:ln>
             <a:extLst>
               <a:ext uri="{91240B29-F687-4f45-9708-019B960494DF}">
-                <a14:hiddenLine xmlns="" xmlns:a14="http://schemas.microsoft.com/office/drawing/2010/main" w="9525">
+                <a14:hiddenLine xmlns:a14="http://schemas.microsoft.com/office/drawing/2010/main" xmlns="" w="9525">
                   <a:solidFill>
                     <a:srgbClr val="000000"/>
                   </a:solidFill>
@@ -3284,7 +3295,7 @@
             </a:ln>
             <a:extLst>
               <a:ext uri="{91240B29-F687-4f45-9708-019B960494DF}">
-                <a14:hiddenLine xmlns="" xmlns:a14="http://schemas.microsoft.com/office/drawing/2010/main" w="9525">
+                <a14:hiddenLine xmlns:a14="http://schemas.microsoft.com/office/drawing/2010/main" xmlns="" w="9525">
                   <a:solidFill>
                     <a:srgbClr val="000000"/>
                   </a:solidFill>
@@ -3346,7 +3357,7 @@
             </a:ln>
             <a:extLst>
               <a:ext uri="{91240B29-F687-4f45-9708-019B960494DF}">
-                <a14:hiddenLine xmlns="" xmlns:a14="http://schemas.microsoft.com/office/drawing/2010/main" w="9525">
+                <a14:hiddenLine xmlns:a14="http://schemas.microsoft.com/office/drawing/2010/main" xmlns="" w="9525">
                   <a:solidFill>
                     <a:srgbClr val="000000"/>
                   </a:solidFill>
@@ -3436,7 +3447,7 @@
             </a:ln>
             <a:extLst>
               <a:ext uri="{91240B29-F687-4f45-9708-019B960494DF}">
-                <a14:hiddenLine xmlns="" xmlns:a14="http://schemas.microsoft.com/office/drawing/2010/main" w="9525">
+                <a14:hiddenLine xmlns:a14="http://schemas.microsoft.com/office/drawing/2010/main" xmlns="" w="9525">
                   <a:solidFill>
                     <a:srgbClr val="000000"/>
                   </a:solidFill>
@@ -3498,7 +3509,7 @@
             </a:ln>
             <a:extLst>
               <a:ext uri="{91240B29-F687-4f45-9708-019B960494DF}">
-                <a14:hiddenLine xmlns="" xmlns:a14="http://schemas.microsoft.com/office/drawing/2010/main" w="9525">
+                <a14:hiddenLine xmlns:a14="http://schemas.microsoft.com/office/drawing/2010/main" xmlns="" w="9525">
                   <a:solidFill>
                     <a:srgbClr val="000000"/>
                   </a:solidFill>
@@ -3588,7 +3599,7 @@
             </a:ln>
             <a:extLst>
               <a:ext uri="{91240B29-F687-4f45-9708-019B960494DF}">
-                <a14:hiddenLine xmlns="" xmlns:a14="http://schemas.microsoft.com/office/drawing/2010/main" w="9525">
+                <a14:hiddenLine xmlns:a14="http://schemas.microsoft.com/office/drawing/2010/main" xmlns="" w="9525">
                   <a:solidFill>
                     <a:srgbClr val="000000"/>
                   </a:solidFill>
@@ -3650,7 +3661,7 @@
             </a:ln>
             <a:extLst>
               <a:ext uri="{91240B29-F687-4f45-9708-019B960494DF}">
-                <a14:hiddenLine xmlns="" xmlns:a14="http://schemas.microsoft.com/office/drawing/2010/main" w="9525">
+                <a14:hiddenLine xmlns:a14="http://schemas.microsoft.com/office/drawing/2010/main" xmlns="" w="9525">
                   <a:solidFill>
                     <a:srgbClr val="000000"/>
                   </a:solidFill>
@@ -3740,7 +3751,7 @@
             </a:ln>
             <a:extLst>
               <a:ext uri="{91240B29-F687-4f45-9708-019B960494DF}">
-                <a14:hiddenLine xmlns="" xmlns:a14="http://schemas.microsoft.com/office/drawing/2010/main" w="9525">
+                <a14:hiddenLine xmlns:a14="http://schemas.microsoft.com/office/drawing/2010/main" xmlns="" w="9525">
                   <a:solidFill>
                     <a:srgbClr val="000000"/>
                   </a:solidFill>
@@ -3774,7 +3785,7 @@
             </a:ln>
             <a:extLst>
               <a:ext uri="{91240B29-F687-4f45-9708-019B960494DF}">
-                <a14:hiddenLine xmlns="" xmlns:a14="http://schemas.microsoft.com/office/drawing/2010/main" w="9525">
+                <a14:hiddenLine xmlns:a14="http://schemas.microsoft.com/office/drawing/2010/main" xmlns="" w="9525">
                   <a:solidFill>
                     <a:srgbClr val="000000"/>
                   </a:solidFill>
@@ -3839,7 +3850,7 @@
             </a:ln>
             <a:extLst>
               <a:ext uri="{91240B29-F687-4f45-9708-019B960494DF}">
-                <a14:hiddenLine xmlns="" xmlns:a14="http://schemas.microsoft.com/office/drawing/2010/main" w="9525">
+                <a14:hiddenLine xmlns:a14="http://schemas.microsoft.com/office/drawing/2010/main" xmlns="" w="9525">
                   <a:solidFill>
                     <a:srgbClr val="000000"/>
                   </a:solidFill>
@@ -3929,7 +3940,7 @@
             </a:ln>
             <a:extLst>
               <a:ext uri="{91240B29-F687-4f45-9708-019B960494DF}">
-                <a14:hiddenLine xmlns="" xmlns:a14="http://schemas.microsoft.com/office/drawing/2010/main" w="9525">
+                <a14:hiddenLine xmlns:a14="http://schemas.microsoft.com/office/drawing/2010/main" xmlns="" w="9525">
                   <a:solidFill>
                     <a:srgbClr val="000000"/>
                   </a:solidFill>
@@ -3991,7 +4002,7 @@
             </a:ln>
             <a:extLst>
               <a:ext uri="{91240B29-F687-4f45-9708-019B960494DF}">
-                <a14:hiddenLine xmlns="" xmlns:a14="http://schemas.microsoft.com/office/drawing/2010/main" w="9525">
+                <a14:hiddenLine xmlns:a14="http://schemas.microsoft.com/office/drawing/2010/main" xmlns="" w="9525">
                   <a:solidFill>
                     <a:srgbClr val="000000"/>
                   </a:solidFill>
@@ -4081,7 +4092,7 @@
             </a:ln>
             <a:extLst>
               <a:ext uri="{91240B29-F687-4f45-9708-019B960494DF}">
-                <a14:hiddenLine xmlns="" xmlns:a14="http://schemas.microsoft.com/office/drawing/2010/main" w="9525">
+                <a14:hiddenLine xmlns:a14="http://schemas.microsoft.com/office/drawing/2010/main" xmlns="" w="9525">
                   <a:solidFill>
                     <a:srgbClr val="000000"/>
                   </a:solidFill>
@@ -4171,7 +4182,7 @@
             </a:ln>
             <a:extLst>
               <a:ext uri="{91240B29-F687-4f45-9708-019B960494DF}">
-                <a14:hiddenLine xmlns="" xmlns:a14="http://schemas.microsoft.com/office/drawing/2010/main" w="9525">
+                <a14:hiddenLine xmlns:a14="http://schemas.microsoft.com/office/drawing/2010/main" xmlns="" w="9525">
                   <a:solidFill>
                     <a:srgbClr val="000000"/>
                   </a:solidFill>
@@ -4236,7 +4247,7 @@
             </a:ln>
             <a:extLst>
               <a:ext uri="{91240B29-F687-4f45-9708-019B960494DF}">
-                <a14:hiddenLine xmlns="" xmlns:a14="http://schemas.microsoft.com/office/drawing/2010/main" w="9525">
+                <a14:hiddenLine xmlns:a14="http://schemas.microsoft.com/office/drawing/2010/main" xmlns="" w="9525">
                   <a:solidFill>
                     <a:srgbClr val="000000"/>
                   </a:solidFill>
@@ -4298,7 +4309,7 @@
             </a:ln>
             <a:extLst>
               <a:ext uri="{91240B29-F687-4f45-9708-019B960494DF}">
-                <a14:hiddenLine xmlns="" xmlns:a14="http://schemas.microsoft.com/office/drawing/2010/main" w="9525">
+                <a14:hiddenLine xmlns:a14="http://schemas.microsoft.com/office/drawing/2010/main" xmlns="" w="9525">
                   <a:solidFill>
                     <a:srgbClr val="000000"/>
                   </a:solidFill>
@@ -4388,7 +4399,7 @@
             </a:ln>
             <a:extLst>
               <a:ext uri="{91240B29-F687-4f45-9708-019B960494DF}">
-                <a14:hiddenLine xmlns="" xmlns:a14="http://schemas.microsoft.com/office/drawing/2010/main" w="9525">
+                <a14:hiddenLine xmlns:a14="http://schemas.microsoft.com/office/drawing/2010/main" xmlns="" w="9525">
                   <a:solidFill>
                     <a:srgbClr val="000000"/>
                   </a:solidFill>
@@ -4478,7 +4489,7 @@
             </a:ln>
             <a:extLst>
               <a:ext uri="{91240B29-F687-4f45-9708-019B960494DF}">
-                <a14:hiddenLine xmlns="" xmlns:a14="http://schemas.microsoft.com/office/drawing/2010/main" w="9525">
+                <a14:hiddenLine xmlns:a14="http://schemas.microsoft.com/office/drawing/2010/main" xmlns="" w="9525">
                   <a:solidFill>
                     <a:srgbClr val="000000"/>
                   </a:solidFill>
@@ -4540,7 +4551,7 @@
             </a:ln>
             <a:extLst>
               <a:ext uri="{91240B29-F687-4f45-9708-019B960494DF}">
-                <a14:hiddenLine xmlns="" xmlns:a14="http://schemas.microsoft.com/office/drawing/2010/main" w="9525">
+                <a14:hiddenLine xmlns:a14="http://schemas.microsoft.com/office/drawing/2010/main" xmlns="" w="9525">
                   <a:solidFill>
                     <a:srgbClr val="000000"/>
                   </a:solidFill>
@@ -4660,7 +4671,7 @@
             </a:ln>
             <a:extLst>
               <a:ext uri="{91240B29-F687-4f45-9708-019B960494DF}">
-                <a14:hiddenLine xmlns="" xmlns:a14="http://schemas.microsoft.com/office/drawing/2010/main" w="9525">
+                <a14:hiddenLine xmlns:a14="http://schemas.microsoft.com/office/drawing/2010/main" xmlns="" w="9525">
                   <a:solidFill>
                     <a:srgbClr val="000000"/>
                   </a:solidFill>
@@ -4728,7 +4739,7 @@
             </a:ln>
             <a:extLst>
               <a:ext uri="{91240B29-F687-4f45-9708-019B960494DF}">
-                <a14:hiddenLine xmlns="" xmlns:a14="http://schemas.microsoft.com/office/drawing/2010/main" w="9525">
+                <a14:hiddenLine xmlns:a14="http://schemas.microsoft.com/office/drawing/2010/main" xmlns="" w="9525">
                   <a:solidFill>
                     <a:srgbClr val="000000"/>
                   </a:solidFill>
@@ -4818,7 +4829,7 @@
             </a:ln>
             <a:extLst>
               <a:ext uri="{91240B29-F687-4f45-9708-019B960494DF}">
-                <a14:hiddenLine xmlns="" xmlns:a14="http://schemas.microsoft.com/office/drawing/2010/main" w="9525">
+                <a14:hiddenLine xmlns:a14="http://schemas.microsoft.com/office/drawing/2010/main" xmlns="" w="9525">
                   <a:solidFill>
                     <a:srgbClr val="000000"/>
                   </a:solidFill>
@@ -9632,7 +9643,7 @@
           <a:noFill/>
           <a:extLst>
             <a:ext uri="{909E8E84-426E-40dd-AFC4-6F175D3DCCD1}">
-              <a14:hiddenFill xmlns="" xmlns:a14="http://schemas.microsoft.com/office/drawing/2010/main">
+              <a14:hiddenFill xmlns:a14="http://schemas.microsoft.com/office/drawing/2010/main" xmlns="">
                 <a:solidFill>
                   <a:srgbClr val="FFFFFF"/>
                 </a:solidFill>
@@ -9706,7 +9717,7 @@
               </a:ln>
               <a:extLst>
                 <a:ext uri="{91240B29-F687-4f45-9708-019B960494DF}">
-                  <a14:hiddenLine xmlns="" xmlns:a14="http://schemas.microsoft.com/office/drawing/2010/main" w="9525">
+                  <a14:hiddenLine xmlns:a14="http://schemas.microsoft.com/office/drawing/2010/main" xmlns="" w="9525">
                     <a:solidFill>
                       <a:srgbClr val="000000"/>
                     </a:solidFill>
@@ -9796,7 +9807,7 @@
               </a:ln>
               <a:extLst>
                 <a:ext uri="{91240B29-F687-4f45-9708-019B960494DF}">
-                  <a14:hiddenLine xmlns="" xmlns:a14="http://schemas.microsoft.com/office/drawing/2010/main" w="9525">
+                  <a14:hiddenLine xmlns:a14="http://schemas.microsoft.com/office/drawing/2010/main" xmlns="" w="9525">
                     <a:solidFill>
                       <a:srgbClr val="000000"/>
                     </a:solidFill>
@@ -9886,7 +9897,7 @@
               </a:ln>
               <a:extLst>
                 <a:ext uri="{91240B29-F687-4f45-9708-019B960494DF}">
-                  <a14:hiddenLine xmlns="" xmlns:a14="http://schemas.microsoft.com/office/drawing/2010/main" w="9525">
+                  <a14:hiddenLine xmlns:a14="http://schemas.microsoft.com/office/drawing/2010/main" xmlns="" w="9525">
                     <a:solidFill>
                       <a:srgbClr val="000000"/>
                     </a:solidFill>
@@ -9948,7 +9959,7 @@
               </a:ln>
               <a:extLst>
                 <a:ext uri="{91240B29-F687-4f45-9708-019B960494DF}">
-                  <a14:hiddenLine xmlns="" xmlns:a14="http://schemas.microsoft.com/office/drawing/2010/main" w="9525">
+                  <a14:hiddenLine xmlns:a14="http://schemas.microsoft.com/office/drawing/2010/main" xmlns="" w="9525">
                     <a:solidFill>
                       <a:srgbClr val="000000"/>
                     </a:solidFill>
@@ -10038,7 +10049,7 @@
               </a:ln>
               <a:extLst>
                 <a:ext uri="{91240B29-F687-4f45-9708-019B960494DF}">
-                  <a14:hiddenLine xmlns="" xmlns:a14="http://schemas.microsoft.com/office/drawing/2010/main" w="9525">
+                  <a14:hiddenLine xmlns:a14="http://schemas.microsoft.com/office/drawing/2010/main" xmlns="" w="9525">
                     <a:solidFill>
                       <a:srgbClr val="000000"/>
                     </a:solidFill>
@@ -10100,7 +10111,7 @@
               </a:ln>
               <a:extLst>
                 <a:ext uri="{91240B29-F687-4f45-9708-019B960494DF}">
-                  <a14:hiddenLine xmlns="" xmlns:a14="http://schemas.microsoft.com/office/drawing/2010/main" w="9525">
+                  <a14:hiddenLine xmlns:a14="http://schemas.microsoft.com/office/drawing/2010/main" xmlns="" w="9525">
                     <a:solidFill>
                       <a:srgbClr val="000000"/>
                     </a:solidFill>
@@ -10162,7 +10173,7 @@
               </a:ln>
               <a:extLst>
                 <a:ext uri="{91240B29-F687-4f45-9708-019B960494DF}">
-                  <a14:hiddenLine xmlns="" xmlns:a14="http://schemas.microsoft.com/office/drawing/2010/main" w="9525">
+                  <a14:hiddenLine xmlns:a14="http://schemas.microsoft.com/office/drawing/2010/main" xmlns="" w="9525">
                     <a:solidFill>
                       <a:srgbClr val="000000"/>
                     </a:solidFill>
@@ -10252,7 +10263,7 @@
               </a:ln>
               <a:extLst>
                 <a:ext uri="{91240B29-F687-4f45-9708-019B960494DF}">
-                  <a14:hiddenLine xmlns="" xmlns:a14="http://schemas.microsoft.com/office/drawing/2010/main" w="9525">
+                  <a14:hiddenLine xmlns:a14="http://schemas.microsoft.com/office/drawing/2010/main" xmlns="" w="9525">
                     <a:solidFill>
                       <a:srgbClr val="000000"/>
                     </a:solidFill>
@@ -10342,7 +10353,7 @@
               </a:ln>
               <a:extLst>
                 <a:ext uri="{91240B29-F687-4f45-9708-019B960494DF}">
-                  <a14:hiddenLine xmlns="" xmlns:a14="http://schemas.microsoft.com/office/drawing/2010/main" w="9525">
+                  <a14:hiddenLine xmlns:a14="http://schemas.microsoft.com/office/drawing/2010/main" xmlns="" w="9525">
                     <a:solidFill>
                       <a:srgbClr val="000000"/>
                     </a:solidFill>
@@ -10404,7 +10415,7 @@
               </a:ln>
               <a:extLst>
                 <a:ext uri="{91240B29-F687-4f45-9708-019B960494DF}">
-                  <a14:hiddenLine xmlns="" xmlns:a14="http://schemas.microsoft.com/office/drawing/2010/main" w="9525">
+                  <a14:hiddenLine xmlns:a14="http://schemas.microsoft.com/office/drawing/2010/main" xmlns="" w="9525">
                     <a:solidFill>
                       <a:srgbClr val="000000"/>
                     </a:solidFill>
@@ -10514,7 +10525,7 @@
               </a:ln>
               <a:extLst>
                 <a:ext uri="{91240B29-F687-4f45-9708-019B960494DF}">
-                  <a14:hiddenLine xmlns="" xmlns:a14="http://schemas.microsoft.com/office/drawing/2010/main" w="9525">
+                  <a14:hiddenLine xmlns:a14="http://schemas.microsoft.com/office/drawing/2010/main" xmlns="" w="9525">
                     <a:solidFill>
                       <a:srgbClr val="000000"/>
                     </a:solidFill>
@@ -10598,7 +10609,7 @@
               </a:ln>
               <a:extLst>
                 <a:ext uri="{91240B29-F687-4f45-9708-019B960494DF}">
-                  <a14:hiddenLine xmlns="" xmlns:a14="http://schemas.microsoft.com/office/drawing/2010/main" w="9525">
+                  <a14:hiddenLine xmlns:a14="http://schemas.microsoft.com/office/drawing/2010/main" xmlns="" w="9525">
                     <a:solidFill>
                       <a:srgbClr val="000000"/>
                     </a:solidFill>
@@ -10660,7 +10671,7 @@
               </a:ln>
               <a:extLst>
                 <a:ext uri="{91240B29-F687-4f45-9708-019B960494DF}">
-                  <a14:hiddenLine xmlns="" xmlns:a14="http://schemas.microsoft.com/office/drawing/2010/main" w="9525">
+                  <a14:hiddenLine xmlns:a14="http://schemas.microsoft.com/office/drawing/2010/main" xmlns="" w="9525">
                     <a:solidFill>
                       <a:srgbClr val="000000"/>
                     </a:solidFill>
@@ -10722,7 +10733,7 @@
               </a:ln>
               <a:extLst>
                 <a:ext uri="{91240B29-F687-4f45-9708-019B960494DF}">
-                  <a14:hiddenLine xmlns="" xmlns:a14="http://schemas.microsoft.com/office/drawing/2010/main" w="9525">
+                  <a14:hiddenLine xmlns:a14="http://schemas.microsoft.com/office/drawing/2010/main" xmlns="" w="9525">
                     <a:solidFill>
                       <a:srgbClr val="000000"/>
                     </a:solidFill>
@@ -10812,7 +10823,7 @@
               </a:ln>
               <a:extLst>
                 <a:ext uri="{91240B29-F687-4f45-9708-019B960494DF}">
-                  <a14:hiddenLine xmlns="" xmlns:a14="http://schemas.microsoft.com/office/drawing/2010/main" w="9525">
+                  <a14:hiddenLine xmlns:a14="http://schemas.microsoft.com/office/drawing/2010/main" xmlns="" w="9525">
                     <a:solidFill>
                       <a:srgbClr val="000000"/>
                     </a:solidFill>
@@ -10846,7 +10857,7 @@
               </a:ln>
               <a:extLst>
                 <a:ext uri="{91240B29-F687-4f45-9708-019B960494DF}">
-                  <a14:hiddenLine xmlns="" xmlns:a14="http://schemas.microsoft.com/office/drawing/2010/main" w="9525">
+                  <a14:hiddenLine xmlns:a14="http://schemas.microsoft.com/office/drawing/2010/main" xmlns="" w="9525">
                     <a:solidFill>
                       <a:srgbClr val="000000"/>
                     </a:solidFill>
@@ -10911,7 +10922,7 @@
               </a:ln>
               <a:extLst>
                 <a:ext uri="{91240B29-F687-4f45-9708-019B960494DF}">
-                  <a14:hiddenLine xmlns="" xmlns:a14="http://schemas.microsoft.com/office/drawing/2010/main" w="9525">
+                  <a14:hiddenLine xmlns:a14="http://schemas.microsoft.com/office/drawing/2010/main" xmlns="" w="9525">
                     <a:solidFill>
                       <a:srgbClr val="000000"/>
                     </a:solidFill>
@@ -11001,7 +11012,7 @@
               </a:ln>
               <a:extLst>
                 <a:ext uri="{91240B29-F687-4f45-9708-019B960494DF}">
-                  <a14:hiddenLine xmlns="" xmlns:a14="http://schemas.microsoft.com/office/drawing/2010/main" w="9525">
+                  <a14:hiddenLine xmlns:a14="http://schemas.microsoft.com/office/drawing/2010/main" xmlns="" w="9525">
                     <a:solidFill>
                       <a:srgbClr val="000000"/>
                     </a:solidFill>
@@ -11063,7 +11074,7 @@
               </a:ln>
               <a:extLst>
                 <a:ext uri="{91240B29-F687-4f45-9708-019B960494DF}">
-                  <a14:hiddenLine xmlns="" xmlns:a14="http://schemas.microsoft.com/office/drawing/2010/main" w="9525">
+                  <a14:hiddenLine xmlns:a14="http://schemas.microsoft.com/office/drawing/2010/main" xmlns="" w="9525">
                     <a:solidFill>
                       <a:srgbClr val="000000"/>
                     </a:solidFill>
@@ -11153,7 +11164,7 @@
               </a:ln>
               <a:extLst>
                 <a:ext uri="{91240B29-F687-4f45-9708-019B960494DF}">
-                  <a14:hiddenLine xmlns="" xmlns:a14="http://schemas.microsoft.com/office/drawing/2010/main" w="9525">
+                  <a14:hiddenLine xmlns:a14="http://schemas.microsoft.com/office/drawing/2010/main" xmlns="" w="9525">
                     <a:solidFill>
                       <a:srgbClr val="000000"/>
                     </a:solidFill>
@@ -11218,7 +11229,7 @@
               </a:ln>
               <a:extLst>
                 <a:ext uri="{91240B29-F687-4f45-9708-019B960494DF}">
-                  <a14:hiddenLine xmlns="" xmlns:a14="http://schemas.microsoft.com/office/drawing/2010/main" w="9525">
+                  <a14:hiddenLine xmlns:a14="http://schemas.microsoft.com/office/drawing/2010/main" xmlns="" w="9525">
                     <a:solidFill>
                       <a:srgbClr val="000000"/>
                     </a:solidFill>
@@ -11280,7 +11291,7 @@
               </a:ln>
               <a:extLst>
                 <a:ext uri="{91240B29-F687-4f45-9708-019B960494DF}">
-                  <a14:hiddenLine xmlns="" xmlns:a14="http://schemas.microsoft.com/office/drawing/2010/main" w="9525">
+                  <a14:hiddenLine xmlns:a14="http://schemas.microsoft.com/office/drawing/2010/main" xmlns="" w="9525">
                     <a:solidFill>
                       <a:srgbClr val="000000"/>
                     </a:solidFill>
@@ -11370,7 +11381,7 @@
               </a:ln>
               <a:extLst>
                 <a:ext uri="{91240B29-F687-4f45-9708-019B960494DF}">
-                  <a14:hiddenLine xmlns="" xmlns:a14="http://schemas.microsoft.com/office/drawing/2010/main" w="9525">
+                  <a14:hiddenLine xmlns:a14="http://schemas.microsoft.com/office/drawing/2010/main" xmlns="" w="9525">
                     <a:solidFill>
                       <a:srgbClr val="000000"/>
                     </a:solidFill>
@@ -11460,7 +11471,7 @@
               </a:ln>
               <a:extLst>
                 <a:ext uri="{91240B29-F687-4f45-9708-019B960494DF}">
-                  <a14:hiddenLine xmlns="" xmlns:a14="http://schemas.microsoft.com/office/drawing/2010/main" w="9525">
+                  <a14:hiddenLine xmlns:a14="http://schemas.microsoft.com/office/drawing/2010/main" xmlns="" w="9525">
                     <a:solidFill>
                       <a:srgbClr val="000000"/>
                     </a:solidFill>
@@ -11525,7 +11536,7 @@
               </a:ln>
               <a:extLst>
                 <a:ext uri="{91240B29-F687-4f45-9708-019B960494DF}">
-                  <a14:hiddenLine xmlns="" xmlns:a14="http://schemas.microsoft.com/office/drawing/2010/main" w="9525">
+                  <a14:hiddenLine xmlns:a14="http://schemas.microsoft.com/office/drawing/2010/main" xmlns="" w="9525">
                     <a:solidFill>
                       <a:srgbClr val="000000"/>
                     </a:solidFill>
@@ -11645,7 +11656,7 @@
               </a:ln>
               <a:extLst>
                 <a:ext uri="{91240B29-F687-4f45-9708-019B960494DF}">
-                  <a14:hiddenLine xmlns="" xmlns:a14="http://schemas.microsoft.com/office/drawing/2010/main" w="9525">
+                  <a14:hiddenLine xmlns:a14="http://schemas.microsoft.com/office/drawing/2010/main" xmlns="" w="9525">
                     <a:solidFill>
                       <a:srgbClr val="000000"/>
                     </a:solidFill>
@@ -11726,7 +11737,7 @@
               </a:ln>
               <a:extLst>
                 <a:ext uri="{91240B29-F687-4f45-9708-019B960494DF}">
-                  <a14:hiddenLine xmlns="" xmlns:a14="http://schemas.microsoft.com/office/drawing/2010/main" w="9525">
+                  <a14:hiddenLine xmlns:a14="http://schemas.microsoft.com/office/drawing/2010/main" xmlns="" w="9525">
                     <a:solidFill>
                       <a:srgbClr val="000000"/>
                     </a:solidFill>
@@ -11841,7 +11852,7 @@
               </a:ln>
               <a:extLst>
                 <a:ext uri="{91240B29-F687-4f45-9708-019B960494DF}">
-                  <a14:hiddenLine xmlns="" xmlns:a14="http://schemas.microsoft.com/office/drawing/2010/main" w="9525">
+                  <a14:hiddenLine xmlns:a14="http://schemas.microsoft.com/office/drawing/2010/main" xmlns="" w="9525">
                     <a:solidFill>
                       <a:srgbClr val="000000"/>
                     </a:solidFill>
@@ -11931,7 +11942,7 @@
               </a:ln>
               <a:extLst>
                 <a:ext uri="{91240B29-F687-4f45-9708-019B960494DF}">
-                  <a14:hiddenLine xmlns="" xmlns:a14="http://schemas.microsoft.com/office/drawing/2010/main" w="9525">
+                  <a14:hiddenLine xmlns:a14="http://schemas.microsoft.com/office/drawing/2010/main" xmlns="" w="9525">
                     <a:solidFill>
                       <a:srgbClr val="000000"/>
                     </a:solidFill>
@@ -11996,7 +12007,7 @@
               </a:ln>
               <a:extLst>
                 <a:ext uri="{91240B29-F687-4f45-9708-019B960494DF}">
-                  <a14:hiddenLine xmlns="" xmlns:a14="http://schemas.microsoft.com/office/drawing/2010/main" w="9525">
+                  <a14:hiddenLine xmlns:a14="http://schemas.microsoft.com/office/drawing/2010/main" xmlns="" w="9525">
                     <a:solidFill>
                       <a:srgbClr val="000000"/>
                     </a:solidFill>
@@ -12086,7 +12097,7 @@
               </a:ln>
               <a:extLst>
                 <a:ext uri="{91240B29-F687-4f45-9708-019B960494DF}">
-                  <a14:hiddenLine xmlns="" xmlns:a14="http://schemas.microsoft.com/office/drawing/2010/main" w="9525">
+                  <a14:hiddenLine xmlns:a14="http://schemas.microsoft.com/office/drawing/2010/main" xmlns="" w="9525">
                     <a:solidFill>
                       <a:srgbClr val="000000"/>
                     </a:solidFill>
@@ -12154,7 +12165,7 @@
               </a:ln>
               <a:extLst>
                 <a:ext uri="{91240B29-F687-4f45-9708-019B960494DF}">
-                  <a14:hiddenLine xmlns="" xmlns:a14="http://schemas.microsoft.com/office/drawing/2010/main" w="9525">
+                  <a14:hiddenLine xmlns:a14="http://schemas.microsoft.com/office/drawing/2010/main" xmlns="" w="9525">
                     <a:solidFill>
                       <a:srgbClr val="000000"/>
                     </a:solidFill>
@@ -12244,7 +12255,7 @@
               </a:ln>
               <a:extLst>
                 <a:ext uri="{91240B29-F687-4f45-9708-019B960494DF}">
-                  <a14:hiddenLine xmlns="" xmlns:a14="http://schemas.microsoft.com/office/drawing/2010/main" w="9525">
+                  <a14:hiddenLine xmlns:a14="http://schemas.microsoft.com/office/drawing/2010/main" xmlns="" w="9525">
                     <a:solidFill>
                       <a:srgbClr val="000000"/>
                     </a:solidFill>
@@ -12312,7 +12323,7 @@
               </a:ln>
               <a:extLst>
                 <a:ext uri="{91240B29-F687-4f45-9708-019B960494DF}">
-                  <a14:hiddenLine xmlns="" xmlns:a14="http://schemas.microsoft.com/office/drawing/2010/main" w="9525">
+                  <a14:hiddenLine xmlns:a14="http://schemas.microsoft.com/office/drawing/2010/main" xmlns="" w="9525">
                     <a:solidFill>
                       <a:srgbClr val="000000"/>
                     </a:solidFill>
@@ -12402,7 +12413,7 @@
               </a:ln>
               <a:extLst>
                 <a:ext uri="{91240B29-F687-4f45-9708-019B960494DF}">
-                  <a14:hiddenLine xmlns="" xmlns:a14="http://schemas.microsoft.com/office/drawing/2010/main" w="9525">
+                  <a14:hiddenLine xmlns:a14="http://schemas.microsoft.com/office/drawing/2010/main" xmlns="" w="9525">
                     <a:solidFill>
                       <a:srgbClr val="000000"/>
                     </a:solidFill>
@@ -12436,7 +12447,7 @@
               </a:ln>
               <a:extLst>
                 <a:ext uri="{91240B29-F687-4f45-9708-019B960494DF}">
-                  <a14:hiddenLine xmlns="" xmlns:a14="http://schemas.microsoft.com/office/drawing/2010/main" w="9525">
+                  <a14:hiddenLine xmlns:a14="http://schemas.microsoft.com/office/drawing/2010/main" xmlns="" w="9525">
                     <a:solidFill>
                       <a:srgbClr val="000000"/>
                     </a:solidFill>
@@ -14070,7 +14081,7 @@
           <p:cNvPr id="2" name="Title 1">
             <a:extLst>
               <a:ext uri="{FF2B5EF4-FFF2-40B4-BE49-F238E27FC236}">
-                <a16:creationId xmlns:a16="http://schemas.microsoft.com/office/drawing/2014/main" id="{C7AB3235-CCE8-46E6-BDE8-EF71E09B00DA}"/>
+                <a16:creationId xmlns:a16="http://schemas.microsoft.com/office/drawing/2014/main" id="{AFEBA3CF-34A3-4670-84E6-3C2BD41D1880}"/>
               </a:ext>
             </a:extLst>
           </p:cNvPr>
@@ -14088,7 +14099,7 @@
           <a:p>
             <a:r>
               <a:rPr lang="en-US" dirty="0"/>
-              <a:t>Presentation End – open lab and questions</a:t>
+              <a:t>Tags</a:t>
             </a:r>
           </a:p>
         </p:txBody>
@@ -14098,7 +14109,7 @@
           <p:cNvPr id="3" name="Content Placeholder 2">
             <a:extLst>
               <a:ext uri="{FF2B5EF4-FFF2-40B4-BE49-F238E27FC236}">
-                <a16:creationId xmlns:a16="http://schemas.microsoft.com/office/drawing/2014/main" id="{3A9669AB-E7B2-4895-9E7F-B06438F6702B}"/>
+                <a16:creationId xmlns:a16="http://schemas.microsoft.com/office/drawing/2014/main" id="{7C091F4E-8775-4439-AF13-33C4DAD6ECF3}"/>
               </a:ext>
             </a:extLst>
           </p:cNvPr>
@@ -14116,46 +14127,206 @@
           <a:p>
             <a:r>
               <a:rPr lang="en-US" dirty="0"/>
-              <a:t>Can’t think of a question or need to leave before I can answer?</a:t>
+              <a:t>Tags are used to indicate a significant milestone in the branch history</a:t>
             </a:r>
           </a:p>
           <a:p>
             <a:pPr lvl="1"/>
             <a:r>
               <a:rPr lang="en-US" dirty="0"/>
-              <a:t>No worries! Send me an email – </a:t>
-            </a:r>
-            <a:r>
-              <a:rPr lang="en-US" dirty="0">
-                <a:solidFill>
-                  <a:schemeClr val="tx1">
-                    <a:lumMod val="95000"/>
-                  </a:schemeClr>
-                </a:solidFill>
-                <a:hlinkClick r:id="rId2">
-                  <a:extLst>
-                    <a:ext uri="{A12FA001-AC4F-418D-AE19-62706E023703}">
-                      <ahyp:hlinkClr xmlns:ahyp="http://schemas.microsoft.com/office/drawing/2018/hyperlinkcolor" val="tx"/>
-                    </a:ext>
-                  </a:extLst>
-                </a:hlinkClick>
-              </a:rPr>
-              <a:t>zach@zach-martin.com</a:t>
-            </a:r>
-            <a:endParaRPr lang="en-US" dirty="0">
-              <a:solidFill>
-                <a:schemeClr val="tx1">
-                  <a:lumMod val="95000"/>
-                </a:schemeClr>
-              </a:solidFill>
-            </a:endParaRPr>
+              <a:t>These are usually indicative of a version release</a:t>
+            </a:r>
+          </a:p>
+          <a:p>
+            <a:pPr lvl="1"/>
+            <a:r>
+              <a:rPr lang="en-US" dirty="0"/>
+              <a:t>Unlike branches, after a tag is created it has no further history</a:t>
+            </a:r>
+          </a:p>
+          <a:p>
+            <a:pPr lvl="1"/>
+            <a:r>
+              <a:rPr lang="en-US" dirty="0"/>
+              <a:t>Tags provide a static reference a specific point your git tree history</a:t>
+            </a:r>
+          </a:p>
+          <a:p>
+            <a:r>
+              <a:rPr lang="en-US" dirty="0"/>
+              <a:t>Usage</a:t>
+            </a:r>
+          </a:p>
+          <a:p>
+            <a:pPr lvl="1"/>
+            <a:r>
+              <a:rPr lang="en-US" dirty="0"/>
+              <a:t>git tag &lt;</a:t>
+            </a:r>
+            <a:r>
+              <a:rPr lang="en-US" dirty="0" err="1"/>
+              <a:t>tagname</a:t>
+            </a:r>
+            <a:r>
+              <a:rPr lang="en-US" dirty="0"/>
+              <a:t>&gt; - Creates a tag of &lt;</a:t>
+            </a:r>
+            <a:r>
+              <a:rPr lang="en-US" dirty="0" err="1"/>
+              <a:t>tagname</a:t>
+            </a:r>
+            <a:r>
+              <a:rPr lang="en-US" dirty="0"/>
+              <a:t>&gt;</a:t>
+            </a:r>
+          </a:p>
+          <a:p>
+            <a:pPr lvl="1"/>
+            <a:r>
+              <a:rPr lang="en-US" dirty="0"/>
+              <a:t>git tag – Lists all tags in the branch history</a:t>
+            </a:r>
           </a:p>
         </p:txBody>
       </p:sp>
     </p:spTree>
     <p:extLst>
       <p:ext uri="{BB962C8B-B14F-4D97-AF65-F5344CB8AC3E}">
-        <p14:creationId xmlns:p14="http://schemas.microsoft.com/office/powerpoint/2010/main" val="3460011935"/>
+        <p14:creationId xmlns:p14="http://schemas.microsoft.com/office/powerpoint/2010/main" val="3241581009"/>
+      </p:ext>
+    </p:extLst>
+  </p:cSld>
+  <p:clrMapOvr>
+    <a:masterClrMapping/>
+  </p:clrMapOvr>
+</p:sld>
+</file>
+
+<file path=ppt/slides/slide19.xml><?xml version="1.0" encoding="utf-8"?>
+<p:sld xmlns:a="http://schemas.openxmlformats.org/drawingml/2006/main" xmlns:r="http://schemas.openxmlformats.org/officeDocument/2006/relationships" xmlns:p="http://schemas.openxmlformats.org/presentationml/2006/main">
+  <p:cSld>
+    <p:spTree>
+      <p:nvGrpSpPr>
+        <p:cNvPr id="1" name=""/>
+        <p:cNvGrpSpPr/>
+        <p:nvPr/>
+      </p:nvGrpSpPr>
+      <p:grpSpPr>
+        <a:xfrm>
+          <a:off x="0" y="0"/>
+          <a:ext cx="0" cy="0"/>
+          <a:chOff x="0" y="0"/>
+          <a:chExt cx="0" cy="0"/>
+        </a:xfrm>
+      </p:grpSpPr>
+      <p:sp>
+        <p:nvSpPr>
+          <p:cNvPr id="2" name="Title 1">
+            <a:extLst>
+              <a:ext uri="{FF2B5EF4-FFF2-40B4-BE49-F238E27FC236}">
+                <a16:creationId xmlns:a16="http://schemas.microsoft.com/office/drawing/2014/main" id="{9567AAA9-572C-40F8-B61C-976244117C46}"/>
+              </a:ext>
+            </a:extLst>
+          </p:cNvPr>
+          <p:cNvSpPr>
+            <a:spLocks noGrp="1"/>
+          </p:cNvSpPr>
+          <p:nvPr>
+            <p:ph type="title"/>
+          </p:nvPr>
+        </p:nvSpPr>
+        <p:spPr/>
+        <p:txBody>
+          <a:bodyPr/>
+          <a:lstStyle/>
+          <a:p>
+            <a:r>
+              <a:rPr lang="en-US" dirty="0"/>
+              <a:t>Advanced </a:t>
+            </a:r>
+            <a:r>
+              <a:rPr lang="en-US" dirty="0" err="1"/>
+              <a:t>Github</a:t>
+            </a:r>
+            <a:r>
+              <a:rPr lang="en-US" dirty="0"/>
+              <a:t> Features</a:t>
+            </a:r>
+          </a:p>
+        </p:txBody>
+      </p:sp>
+      <p:sp>
+        <p:nvSpPr>
+          <p:cNvPr id="3" name="Content Placeholder 2">
+            <a:extLst>
+              <a:ext uri="{FF2B5EF4-FFF2-40B4-BE49-F238E27FC236}">
+                <a16:creationId xmlns:a16="http://schemas.microsoft.com/office/drawing/2014/main" id="{8FE9A726-545E-4DFA-B6C1-C177C8A98F34}"/>
+              </a:ext>
+            </a:extLst>
+          </p:cNvPr>
+          <p:cNvSpPr>
+            <a:spLocks noGrp="1"/>
+          </p:cNvSpPr>
+          <p:nvPr>
+            <p:ph idx="1"/>
+          </p:nvPr>
+        </p:nvSpPr>
+        <p:spPr/>
+        <p:txBody>
+          <a:bodyPr/>
+          <a:lstStyle/>
+          <a:p>
+            <a:r>
+              <a:rPr lang="en-US" dirty="0"/>
+              <a:t>Enough with non-</a:t>
+            </a:r>
+            <a:r>
+              <a:rPr lang="en-US" dirty="0" err="1"/>
+              <a:t>github</a:t>
+            </a:r>
+            <a:r>
+              <a:rPr lang="en-US" dirty="0"/>
+              <a:t> stuff, we git it! (Get it?)</a:t>
+            </a:r>
+          </a:p>
+          <a:p>
+            <a:pPr lvl="1"/>
+            <a:r>
+              <a:rPr lang="en-US" dirty="0"/>
+              <a:t>Actions and Workflows to build a CI/CD Pipeline</a:t>
+            </a:r>
+          </a:p>
+          <a:p>
+            <a:pPr lvl="1"/>
+            <a:r>
+              <a:rPr lang="en-US" dirty="0"/>
+              <a:t>Secrets and how to use them</a:t>
+            </a:r>
+          </a:p>
+          <a:p>
+            <a:pPr lvl="1"/>
+            <a:r>
+              <a:rPr lang="en-US" dirty="0"/>
+              <a:t>Pull Request Management</a:t>
+            </a:r>
+          </a:p>
+          <a:p>
+            <a:pPr lvl="1"/>
+            <a:r>
+              <a:rPr lang="en-US" dirty="0"/>
+              <a:t>Issue Tracking and Projects</a:t>
+            </a:r>
+          </a:p>
+          <a:p>
+            <a:pPr lvl="1"/>
+            <a:endParaRPr lang="en-US" dirty="0"/>
+          </a:p>
+        </p:txBody>
+      </p:sp>
+    </p:spTree>
+    <p:extLst>
+      <p:ext uri="{BB962C8B-B14F-4D97-AF65-F5344CB8AC3E}">
+        <p14:creationId xmlns:p14="http://schemas.microsoft.com/office/powerpoint/2010/main" val="2879512403"/>
       </p:ext>
     </p:extLst>
   </p:cSld>
@@ -14374,6 +14545,1306 @@
     <p:extLst>
       <p:ext uri="{BB962C8B-B14F-4D97-AF65-F5344CB8AC3E}">
         <p14:creationId xmlns:p14="http://schemas.microsoft.com/office/powerpoint/2010/main" val="2172179498"/>
+      </p:ext>
+    </p:extLst>
+  </p:cSld>
+  <p:clrMapOvr>
+    <a:masterClrMapping/>
+  </p:clrMapOvr>
+</p:sld>
+</file>
+
+<file path=ppt/slides/slide20.xml><?xml version="1.0" encoding="utf-8"?>
+<p:sld xmlns:a="http://schemas.openxmlformats.org/drawingml/2006/main" xmlns:r="http://schemas.openxmlformats.org/officeDocument/2006/relationships" xmlns:p="http://schemas.openxmlformats.org/presentationml/2006/main">
+  <p:cSld>
+    <p:spTree>
+      <p:nvGrpSpPr>
+        <p:cNvPr id="1" name=""/>
+        <p:cNvGrpSpPr/>
+        <p:nvPr/>
+      </p:nvGrpSpPr>
+      <p:grpSpPr>
+        <a:xfrm>
+          <a:off x="0" y="0"/>
+          <a:ext cx="0" cy="0"/>
+          <a:chOff x="0" y="0"/>
+          <a:chExt cx="0" cy="0"/>
+        </a:xfrm>
+      </p:grpSpPr>
+      <p:sp>
+        <p:nvSpPr>
+          <p:cNvPr id="2" name="Title 1">
+            <a:extLst>
+              <a:ext uri="{FF2B5EF4-FFF2-40B4-BE49-F238E27FC236}">
+                <a16:creationId xmlns:a16="http://schemas.microsoft.com/office/drawing/2014/main" id="{B2A7DB65-2734-4ADA-ADC9-73E420BCBF7B}"/>
+              </a:ext>
+            </a:extLst>
+          </p:cNvPr>
+          <p:cNvSpPr>
+            <a:spLocks noGrp="1"/>
+          </p:cNvSpPr>
+          <p:nvPr>
+            <p:ph type="title"/>
+          </p:nvPr>
+        </p:nvSpPr>
+        <p:spPr/>
+        <p:txBody>
+          <a:bodyPr/>
+          <a:lstStyle/>
+          <a:p>
+            <a:r>
+              <a:rPr lang="en-US" dirty="0"/>
+              <a:t>Secrets and Workflows</a:t>
+            </a:r>
+          </a:p>
+        </p:txBody>
+      </p:sp>
+      <p:sp>
+        <p:nvSpPr>
+          <p:cNvPr id="3" name="Content Placeholder 2">
+            <a:extLst>
+              <a:ext uri="{FF2B5EF4-FFF2-40B4-BE49-F238E27FC236}">
+                <a16:creationId xmlns:a16="http://schemas.microsoft.com/office/drawing/2014/main" id="{982C56AF-899F-4FD6-A398-653EC93AEA2A}"/>
+              </a:ext>
+            </a:extLst>
+          </p:cNvPr>
+          <p:cNvSpPr>
+            <a:spLocks noGrp="1"/>
+          </p:cNvSpPr>
+          <p:nvPr>
+            <p:ph idx="1"/>
+          </p:nvPr>
+        </p:nvSpPr>
+        <p:spPr/>
+        <p:txBody>
+          <a:bodyPr>
+            <a:normAutofit fontScale="92500" lnSpcReduction="20000"/>
+          </a:bodyPr>
+          <a:lstStyle/>
+          <a:p>
+            <a:r>
+              <a:rPr lang="en-US" dirty="0"/>
+              <a:t>Secrets are important pieces of information that you want to remain hidden</a:t>
+            </a:r>
+          </a:p>
+          <a:p>
+            <a:pPr lvl="1"/>
+            <a:r>
+              <a:rPr lang="en-US" dirty="0"/>
+              <a:t>This is likely to be username and passwords for services that your workflow may use</a:t>
+            </a:r>
+          </a:p>
+          <a:p>
+            <a:pPr lvl="1"/>
+            <a:r>
+              <a:rPr lang="en-US" dirty="0"/>
+              <a:t>Secrets are essentially hidden environment variables</a:t>
+            </a:r>
+          </a:p>
+          <a:p>
+            <a:r>
+              <a:rPr lang="en-US" dirty="0"/>
+              <a:t>Workflows can be whatever you need them to be</a:t>
+            </a:r>
+          </a:p>
+          <a:p>
+            <a:pPr lvl="1"/>
+            <a:r>
+              <a:rPr lang="en-US" dirty="0"/>
+              <a:t>This could be a CI/CD (Continuous Integration / Continuous Deployment) Pipeline</a:t>
+            </a:r>
+          </a:p>
+          <a:p>
+            <a:pPr lvl="1"/>
+            <a:r>
+              <a:rPr lang="en-US" dirty="0"/>
+              <a:t>Automatically tag specific branches as they come in</a:t>
+            </a:r>
+          </a:p>
+          <a:p>
+            <a:pPr lvl="1"/>
+            <a:r>
+              <a:rPr lang="en-US" dirty="0"/>
+              <a:t>Immediately raise new issues when found</a:t>
+            </a:r>
+          </a:p>
+          <a:p>
+            <a:pPr lvl="1"/>
+            <a:r>
+              <a:rPr lang="en-US" dirty="0"/>
+              <a:t>FTP files to a specific destination upon merge</a:t>
+            </a:r>
+          </a:p>
+          <a:p>
+            <a:pPr lvl="1"/>
+            <a:r>
+              <a:rPr lang="en-US" dirty="0"/>
+              <a:t>Countless other scenarios…</a:t>
+            </a:r>
+          </a:p>
+        </p:txBody>
+      </p:sp>
+    </p:spTree>
+    <p:extLst>
+      <p:ext uri="{BB962C8B-B14F-4D97-AF65-F5344CB8AC3E}">
+        <p14:creationId xmlns:p14="http://schemas.microsoft.com/office/powerpoint/2010/main" val="2339013658"/>
+      </p:ext>
+    </p:extLst>
+  </p:cSld>
+  <p:clrMapOvr>
+    <a:masterClrMapping/>
+  </p:clrMapOvr>
+</p:sld>
+</file>
+
+<file path=ppt/slides/slide21.xml><?xml version="1.0" encoding="utf-8"?>
+<p:sld xmlns:a="http://schemas.openxmlformats.org/drawingml/2006/main" xmlns:r="http://schemas.openxmlformats.org/officeDocument/2006/relationships" xmlns:p="http://schemas.openxmlformats.org/presentationml/2006/main">
+  <p:cSld>
+    <p:spTree>
+      <p:nvGrpSpPr>
+        <p:cNvPr id="1" name=""/>
+        <p:cNvGrpSpPr/>
+        <p:nvPr/>
+      </p:nvGrpSpPr>
+      <p:grpSpPr>
+        <a:xfrm>
+          <a:off x="0" y="0"/>
+          <a:ext cx="0" cy="0"/>
+          <a:chOff x="0" y="0"/>
+          <a:chExt cx="0" cy="0"/>
+        </a:xfrm>
+      </p:grpSpPr>
+      <p:sp>
+        <p:nvSpPr>
+          <p:cNvPr id="2" name="Title 1">
+            <a:extLst>
+              <a:ext uri="{FF2B5EF4-FFF2-40B4-BE49-F238E27FC236}">
+                <a16:creationId xmlns:a16="http://schemas.microsoft.com/office/drawing/2014/main" id="{6B8CBCE7-19D5-47BD-BBA8-267CA594559F}"/>
+              </a:ext>
+            </a:extLst>
+          </p:cNvPr>
+          <p:cNvSpPr>
+            <a:spLocks noGrp="1"/>
+          </p:cNvSpPr>
+          <p:nvPr>
+            <p:ph type="title"/>
+          </p:nvPr>
+        </p:nvSpPr>
+        <p:spPr/>
+        <p:txBody>
+          <a:bodyPr/>
+          <a:lstStyle/>
+          <a:p>
+            <a:r>
+              <a:rPr lang="en-US" dirty="0"/>
+              <a:t>Lab 2 – Let’s make a secret</a:t>
+            </a:r>
+          </a:p>
+        </p:txBody>
+      </p:sp>
+      <p:sp>
+        <p:nvSpPr>
+          <p:cNvPr id="3" name="Content Placeholder 2">
+            <a:extLst>
+              <a:ext uri="{FF2B5EF4-FFF2-40B4-BE49-F238E27FC236}">
+                <a16:creationId xmlns:a16="http://schemas.microsoft.com/office/drawing/2014/main" id="{2461CDFF-AFCF-41F0-8E56-F9207F305A5B}"/>
+              </a:ext>
+            </a:extLst>
+          </p:cNvPr>
+          <p:cNvSpPr>
+            <a:spLocks noGrp="1"/>
+          </p:cNvSpPr>
+          <p:nvPr>
+            <p:ph idx="1"/>
+          </p:nvPr>
+        </p:nvSpPr>
+        <p:spPr/>
+        <p:txBody>
+          <a:bodyPr>
+            <a:normAutofit lnSpcReduction="10000"/>
+          </a:bodyPr>
+          <a:lstStyle/>
+          <a:p>
+            <a:r>
+              <a:rPr lang="en-US" dirty="0"/>
+              <a:t>Setting up Secrets for your Repository if easy!</a:t>
+            </a:r>
+          </a:p>
+          <a:p>
+            <a:pPr lvl="1"/>
+            <a:r>
+              <a:rPr lang="en-US" dirty="0"/>
+              <a:t>Select Settings from the top ribbon on your repository homepage</a:t>
+            </a:r>
+          </a:p>
+          <a:p>
+            <a:pPr lvl="1"/>
+            <a:r>
+              <a:rPr lang="en-US" dirty="0"/>
+              <a:t>Select Secrets from the left navigation panel</a:t>
+            </a:r>
+          </a:p>
+          <a:p>
+            <a:pPr lvl="1"/>
+            <a:r>
+              <a:rPr lang="en-US" dirty="0"/>
+              <a:t>Click “Add a new secret” to start adding your secret</a:t>
+            </a:r>
+          </a:p>
+          <a:p>
+            <a:pPr lvl="2"/>
+            <a:r>
+              <a:rPr lang="en-US" dirty="0"/>
+              <a:t>Our secret Name is “LAB_SECRET” – This is the variable name used</a:t>
+            </a:r>
+          </a:p>
+          <a:p>
+            <a:pPr lvl="2"/>
+            <a:r>
+              <a:rPr lang="en-US" dirty="0"/>
+              <a:t>Our secret Value is “This will be our secret!” (Alternatively, you can input whatever you’d like here, up to 64KB in size)</a:t>
+            </a:r>
+          </a:p>
+          <a:p>
+            <a:pPr lvl="2"/>
+            <a:r>
+              <a:rPr lang="en-US" dirty="0"/>
+              <a:t>Click Add secret to finalize adding the secret</a:t>
+            </a:r>
+          </a:p>
+          <a:p>
+            <a:pPr lvl="2"/>
+            <a:r>
+              <a:rPr lang="en-US" dirty="0"/>
+              <a:t>Note: Any repo can have a maximum of 100 Secrets associated with it</a:t>
+            </a:r>
+          </a:p>
+        </p:txBody>
+      </p:sp>
+    </p:spTree>
+    <p:extLst>
+      <p:ext uri="{BB962C8B-B14F-4D97-AF65-F5344CB8AC3E}">
+        <p14:creationId xmlns:p14="http://schemas.microsoft.com/office/powerpoint/2010/main" val="1269780835"/>
+      </p:ext>
+    </p:extLst>
+  </p:cSld>
+  <p:clrMapOvr>
+    <a:masterClrMapping/>
+  </p:clrMapOvr>
+</p:sld>
+</file>
+
+<file path=ppt/slides/slide22.xml><?xml version="1.0" encoding="utf-8"?>
+<p:sld xmlns:a="http://schemas.openxmlformats.org/drawingml/2006/main" xmlns:r="http://schemas.openxmlformats.org/officeDocument/2006/relationships" xmlns:p="http://schemas.openxmlformats.org/presentationml/2006/main">
+  <p:cSld>
+    <p:spTree>
+      <p:nvGrpSpPr>
+        <p:cNvPr id="1" name=""/>
+        <p:cNvGrpSpPr/>
+        <p:nvPr/>
+      </p:nvGrpSpPr>
+      <p:grpSpPr>
+        <a:xfrm>
+          <a:off x="0" y="0"/>
+          <a:ext cx="0" cy="0"/>
+          <a:chOff x="0" y="0"/>
+          <a:chExt cx="0" cy="0"/>
+        </a:xfrm>
+      </p:grpSpPr>
+      <p:sp>
+        <p:nvSpPr>
+          <p:cNvPr id="2" name="Title 1">
+            <a:extLst>
+              <a:ext uri="{FF2B5EF4-FFF2-40B4-BE49-F238E27FC236}">
+                <a16:creationId xmlns:a16="http://schemas.microsoft.com/office/drawing/2014/main" id="{9F8D29C7-8A51-44CB-B76F-70FFA3C275E3}"/>
+              </a:ext>
+            </a:extLst>
+          </p:cNvPr>
+          <p:cNvSpPr>
+            <a:spLocks noGrp="1"/>
+          </p:cNvSpPr>
+          <p:nvPr>
+            <p:ph type="title"/>
+          </p:nvPr>
+        </p:nvSpPr>
+        <p:spPr/>
+        <p:txBody>
+          <a:bodyPr/>
+          <a:lstStyle/>
+          <a:p>
+            <a:r>
+              <a:rPr lang="en-US" dirty="0"/>
+              <a:t>LAB 2 – Our workflow and secret</a:t>
+            </a:r>
+          </a:p>
+        </p:txBody>
+      </p:sp>
+      <p:sp>
+        <p:nvSpPr>
+          <p:cNvPr id="3" name="Content Placeholder 2">
+            <a:extLst>
+              <a:ext uri="{FF2B5EF4-FFF2-40B4-BE49-F238E27FC236}">
+                <a16:creationId xmlns:a16="http://schemas.microsoft.com/office/drawing/2014/main" id="{67BCB097-17C9-4894-9918-206E335879B6}"/>
+              </a:ext>
+            </a:extLst>
+          </p:cNvPr>
+          <p:cNvSpPr>
+            <a:spLocks noGrp="1"/>
+          </p:cNvSpPr>
+          <p:nvPr>
+            <p:ph idx="1"/>
+          </p:nvPr>
+        </p:nvSpPr>
+        <p:spPr/>
+        <p:txBody>
+          <a:bodyPr/>
+          <a:lstStyle/>
+          <a:p>
+            <a:r>
+              <a:rPr lang="en-US" dirty="0"/>
+              <a:t>Now that we have a secret, let’s make a workflow to use it</a:t>
+            </a:r>
+          </a:p>
+          <a:p>
+            <a:r>
+              <a:rPr lang="en-US" dirty="0"/>
+              <a:t>Select Actions from the ribbon at the top of your repository homepage</a:t>
+            </a:r>
+          </a:p>
+          <a:p>
+            <a:r>
+              <a:rPr lang="en-US" dirty="0"/>
+              <a:t>Here you’ll see a number of workflows that are pre-built, but we’re going to make our own</a:t>
+            </a:r>
+          </a:p>
+          <a:p>
+            <a:pPr lvl="1"/>
+            <a:r>
+              <a:rPr lang="en-US" dirty="0"/>
+              <a:t>Select “Skip this: Set up a workflow yourself” in the top right of the page</a:t>
+            </a:r>
+          </a:p>
+          <a:p>
+            <a:pPr lvl="1"/>
+            <a:r>
+              <a:rPr lang="en-US" dirty="0"/>
+              <a:t>Let’s pause to discuss YML files</a:t>
+            </a:r>
+          </a:p>
+        </p:txBody>
+      </p:sp>
+    </p:spTree>
+    <p:extLst>
+      <p:ext uri="{BB962C8B-B14F-4D97-AF65-F5344CB8AC3E}">
+        <p14:creationId xmlns:p14="http://schemas.microsoft.com/office/powerpoint/2010/main" val="3472812206"/>
+      </p:ext>
+    </p:extLst>
+  </p:cSld>
+  <p:clrMapOvr>
+    <a:masterClrMapping/>
+  </p:clrMapOvr>
+</p:sld>
+</file>
+
+<file path=ppt/slides/slide23.xml><?xml version="1.0" encoding="utf-8"?>
+<p:sld xmlns:a="http://schemas.openxmlformats.org/drawingml/2006/main" xmlns:r="http://schemas.openxmlformats.org/officeDocument/2006/relationships" xmlns:p="http://schemas.openxmlformats.org/presentationml/2006/main">
+  <p:cSld>
+    <p:spTree>
+      <p:nvGrpSpPr>
+        <p:cNvPr id="1" name=""/>
+        <p:cNvGrpSpPr/>
+        <p:nvPr/>
+      </p:nvGrpSpPr>
+      <p:grpSpPr>
+        <a:xfrm>
+          <a:off x="0" y="0"/>
+          <a:ext cx="0" cy="0"/>
+          <a:chOff x="0" y="0"/>
+          <a:chExt cx="0" cy="0"/>
+        </a:xfrm>
+      </p:grpSpPr>
+      <p:sp>
+        <p:nvSpPr>
+          <p:cNvPr id="2" name="Title 1">
+            <a:extLst>
+              <a:ext uri="{FF2B5EF4-FFF2-40B4-BE49-F238E27FC236}">
+                <a16:creationId xmlns:a16="http://schemas.microsoft.com/office/drawing/2014/main" id="{B5F0D990-AA06-490C-B918-101E69C4F751}"/>
+              </a:ext>
+            </a:extLst>
+          </p:cNvPr>
+          <p:cNvSpPr>
+            <a:spLocks noGrp="1"/>
+          </p:cNvSpPr>
+          <p:nvPr>
+            <p:ph type="title"/>
+          </p:nvPr>
+        </p:nvSpPr>
+        <p:spPr/>
+        <p:txBody>
+          <a:bodyPr/>
+          <a:lstStyle/>
+          <a:p>
+            <a:r>
+              <a:rPr lang="en-US" dirty="0"/>
+              <a:t>Lab 2 – The intermission</a:t>
+            </a:r>
+          </a:p>
+        </p:txBody>
+      </p:sp>
+      <p:sp>
+        <p:nvSpPr>
+          <p:cNvPr id="3" name="Content Placeholder 2">
+            <a:extLst>
+              <a:ext uri="{FF2B5EF4-FFF2-40B4-BE49-F238E27FC236}">
+                <a16:creationId xmlns:a16="http://schemas.microsoft.com/office/drawing/2014/main" id="{51C8985B-9A11-4026-BBF4-FBC9EFBB044D}"/>
+              </a:ext>
+            </a:extLst>
+          </p:cNvPr>
+          <p:cNvSpPr>
+            <a:spLocks noGrp="1"/>
+          </p:cNvSpPr>
+          <p:nvPr>
+            <p:ph idx="1"/>
+          </p:nvPr>
+        </p:nvSpPr>
+        <p:spPr/>
+        <p:txBody>
+          <a:bodyPr>
+            <a:normAutofit fontScale="92500" lnSpcReduction="20000"/>
+          </a:bodyPr>
+          <a:lstStyle/>
+          <a:p>
+            <a:r>
+              <a:rPr lang="en-US" dirty="0"/>
+              <a:t>YML or YAML is a recursive acronym for “YAML </a:t>
+            </a:r>
+            <a:r>
+              <a:rPr lang="en-US" dirty="0" err="1"/>
+              <a:t>Ain’t</a:t>
+            </a:r>
+            <a:r>
+              <a:rPr lang="en-US" dirty="0"/>
+              <a:t> Markup Language”</a:t>
+            </a:r>
+          </a:p>
+          <a:p>
+            <a:r>
+              <a:rPr lang="en-US" dirty="0"/>
+              <a:t>Similar to JSON, but uses white space to denote structure</a:t>
+            </a:r>
+          </a:p>
+          <a:p>
+            <a:r>
+              <a:rPr lang="en-US" dirty="0"/>
+              <a:t>It’s minimal syntax footprint has helped it gain popularity</a:t>
+            </a:r>
+          </a:p>
+          <a:p>
+            <a:r>
+              <a:rPr lang="en-US" dirty="0"/>
+              <a:t>Key-Value pairs are denoted by colons ‘:’</a:t>
+            </a:r>
+          </a:p>
+          <a:p>
+            <a:r>
+              <a:rPr lang="en-US" dirty="0"/>
+              <a:t>Key advantages over other data-serialization languages</a:t>
+            </a:r>
+          </a:p>
+          <a:p>
+            <a:pPr lvl="1"/>
+            <a:r>
+              <a:rPr lang="en-US" dirty="0"/>
+              <a:t>Multiple documents in a stream can be denoted through ---</a:t>
+            </a:r>
+          </a:p>
+          <a:p>
+            <a:pPr lvl="1"/>
+            <a:r>
+              <a:rPr lang="en-US" dirty="0"/>
+              <a:t>Data typing through implicit and explicit denotation</a:t>
+            </a:r>
+          </a:p>
+          <a:p>
+            <a:pPr lvl="1"/>
+            <a:r>
+              <a:rPr lang="en-US" dirty="0"/>
+              <a:t>References for repeated nodes allows for brevity</a:t>
+            </a:r>
+          </a:p>
+          <a:p>
+            <a:endParaRPr lang="en-US" dirty="0"/>
+          </a:p>
+        </p:txBody>
+      </p:sp>
+    </p:spTree>
+    <p:extLst>
+      <p:ext uri="{BB962C8B-B14F-4D97-AF65-F5344CB8AC3E}">
+        <p14:creationId xmlns:p14="http://schemas.microsoft.com/office/powerpoint/2010/main" val="827438630"/>
+      </p:ext>
+    </p:extLst>
+  </p:cSld>
+  <p:clrMapOvr>
+    <a:masterClrMapping/>
+  </p:clrMapOvr>
+</p:sld>
+</file>
+
+<file path=ppt/slides/slide24.xml><?xml version="1.0" encoding="utf-8"?>
+<p:sld xmlns:a="http://schemas.openxmlformats.org/drawingml/2006/main" xmlns:r="http://schemas.openxmlformats.org/officeDocument/2006/relationships" xmlns:p="http://schemas.openxmlformats.org/presentationml/2006/main">
+  <p:cSld>
+    <p:spTree>
+      <p:nvGrpSpPr>
+        <p:cNvPr id="1" name=""/>
+        <p:cNvGrpSpPr/>
+        <p:nvPr/>
+      </p:nvGrpSpPr>
+      <p:grpSpPr>
+        <a:xfrm>
+          <a:off x="0" y="0"/>
+          <a:ext cx="0" cy="0"/>
+          <a:chOff x="0" y="0"/>
+          <a:chExt cx="0" cy="0"/>
+        </a:xfrm>
+      </p:grpSpPr>
+      <p:sp>
+        <p:nvSpPr>
+          <p:cNvPr id="2" name="Title 1">
+            <a:extLst>
+              <a:ext uri="{FF2B5EF4-FFF2-40B4-BE49-F238E27FC236}">
+                <a16:creationId xmlns:a16="http://schemas.microsoft.com/office/drawing/2014/main" id="{56EC12EE-0E66-4C46-B1FB-728D5711AF84}"/>
+              </a:ext>
+            </a:extLst>
+          </p:cNvPr>
+          <p:cNvSpPr>
+            <a:spLocks noGrp="1"/>
+          </p:cNvSpPr>
+          <p:nvPr>
+            <p:ph type="title"/>
+          </p:nvPr>
+        </p:nvSpPr>
+        <p:spPr/>
+        <p:txBody>
+          <a:bodyPr/>
+          <a:lstStyle/>
+          <a:p>
+            <a:r>
+              <a:rPr lang="en-US" dirty="0"/>
+              <a:t>Lab 2 – Workflow completion</a:t>
+            </a:r>
+          </a:p>
+        </p:txBody>
+      </p:sp>
+      <p:sp>
+        <p:nvSpPr>
+          <p:cNvPr id="3" name="Content Placeholder 2">
+            <a:extLst>
+              <a:ext uri="{FF2B5EF4-FFF2-40B4-BE49-F238E27FC236}">
+                <a16:creationId xmlns:a16="http://schemas.microsoft.com/office/drawing/2014/main" id="{A7B9062D-6FED-4CA3-A9A4-9CA67ECF83D5}"/>
+              </a:ext>
+            </a:extLst>
+          </p:cNvPr>
+          <p:cNvSpPr>
+            <a:spLocks noGrp="1"/>
+          </p:cNvSpPr>
+          <p:nvPr>
+            <p:ph idx="1"/>
+          </p:nvPr>
+        </p:nvSpPr>
+        <p:spPr/>
+        <p:txBody>
+          <a:bodyPr>
+            <a:normAutofit fontScale="92500" lnSpcReduction="20000"/>
+          </a:bodyPr>
+          <a:lstStyle/>
+          <a:p>
+            <a:r>
+              <a:rPr lang="en-US" dirty="0"/>
+              <a:t>Change the file name to lab2.yml</a:t>
+            </a:r>
+          </a:p>
+          <a:p>
+            <a:r>
+              <a:rPr lang="en-US" dirty="0"/>
+              <a:t>Change the name of the workflow to Lab 2 Workflow</a:t>
+            </a:r>
+          </a:p>
+          <a:p>
+            <a:r>
+              <a:rPr lang="en-US" dirty="0"/>
+              <a:t>Remove all lines after line 13</a:t>
+            </a:r>
+          </a:p>
+          <a:p>
+            <a:r>
+              <a:rPr lang="en-US" dirty="0"/>
+              <a:t>Update line 13 to reflect the following:</a:t>
+            </a:r>
+          </a:p>
+          <a:p>
+            <a:pPr lvl="1"/>
+            <a:r>
+              <a:rPr lang="en-US" dirty="0"/>
+              <a:t>run: echo Our secret is ${{ </a:t>
+            </a:r>
+            <a:r>
+              <a:rPr lang="en-US" dirty="0" err="1"/>
+              <a:t>secrets.LAB_SECRET</a:t>
+            </a:r>
+            <a:r>
+              <a:rPr lang="en-US" dirty="0"/>
+              <a:t> }}</a:t>
+            </a:r>
+          </a:p>
+          <a:p>
+            <a:r>
+              <a:rPr lang="en-US" dirty="0"/>
+              <a:t>Alternatively, copy the contents of my example file from the link provided on the website for Lab 2</a:t>
+            </a:r>
+          </a:p>
+          <a:p>
+            <a:r>
+              <a:rPr lang="en-US" dirty="0"/>
+              <a:t>Commit the file to your repo using the commit button at the top right</a:t>
+            </a:r>
+          </a:p>
+        </p:txBody>
+      </p:sp>
+    </p:spTree>
+    <p:extLst>
+      <p:ext uri="{BB962C8B-B14F-4D97-AF65-F5344CB8AC3E}">
+        <p14:creationId xmlns:p14="http://schemas.microsoft.com/office/powerpoint/2010/main" val="4280234771"/>
+      </p:ext>
+    </p:extLst>
+  </p:cSld>
+  <p:clrMapOvr>
+    <a:masterClrMapping/>
+  </p:clrMapOvr>
+</p:sld>
+</file>
+
+<file path=ppt/slides/slide25.xml><?xml version="1.0" encoding="utf-8"?>
+<p:sld xmlns:a="http://schemas.openxmlformats.org/drawingml/2006/main" xmlns:r="http://schemas.openxmlformats.org/officeDocument/2006/relationships" xmlns:p="http://schemas.openxmlformats.org/presentationml/2006/main">
+  <p:cSld>
+    <p:spTree>
+      <p:nvGrpSpPr>
+        <p:cNvPr id="1" name=""/>
+        <p:cNvGrpSpPr/>
+        <p:nvPr/>
+      </p:nvGrpSpPr>
+      <p:grpSpPr>
+        <a:xfrm>
+          <a:off x="0" y="0"/>
+          <a:ext cx="0" cy="0"/>
+          <a:chOff x="0" y="0"/>
+          <a:chExt cx="0" cy="0"/>
+        </a:xfrm>
+      </p:grpSpPr>
+      <p:sp>
+        <p:nvSpPr>
+          <p:cNvPr id="2" name="Title 1">
+            <a:extLst>
+              <a:ext uri="{FF2B5EF4-FFF2-40B4-BE49-F238E27FC236}">
+                <a16:creationId xmlns:a16="http://schemas.microsoft.com/office/drawing/2014/main" id="{56EC12EE-0E66-4C46-B1FB-728D5711AF84}"/>
+              </a:ext>
+            </a:extLst>
+          </p:cNvPr>
+          <p:cNvSpPr>
+            <a:spLocks noGrp="1"/>
+          </p:cNvSpPr>
+          <p:nvPr>
+            <p:ph type="title"/>
+          </p:nvPr>
+        </p:nvSpPr>
+        <p:spPr/>
+        <p:txBody>
+          <a:bodyPr/>
+          <a:lstStyle/>
+          <a:p>
+            <a:r>
+              <a:rPr lang="en-US" dirty="0"/>
+              <a:t>Lab 2 – Workflow completion</a:t>
+            </a:r>
+          </a:p>
+        </p:txBody>
+      </p:sp>
+      <p:sp>
+        <p:nvSpPr>
+          <p:cNvPr id="3" name="Content Placeholder 2">
+            <a:extLst>
+              <a:ext uri="{FF2B5EF4-FFF2-40B4-BE49-F238E27FC236}">
+                <a16:creationId xmlns:a16="http://schemas.microsoft.com/office/drawing/2014/main" id="{A7B9062D-6FED-4CA3-A9A4-9CA67ECF83D5}"/>
+              </a:ext>
+            </a:extLst>
+          </p:cNvPr>
+          <p:cNvSpPr>
+            <a:spLocks noGrp="1"/>
+          </p:cNvSpPr>
+          <p:nvPr>
+            <p:ph idx="1"/>
+          </p:nvPr>
+        </p:nvSpPr>
+        <p:spPr/>
+        <p:txBody>
+          <a:bodyPr>
+            <a:normAutofit/>
+          </a:bodyPr>
+          <a:lstStyle/>
+          <a:p>
+            <a:r>
+              <a:rPr lang="en-US" dirty="0"/>
+              <a:t>Watch your new workflow in action!</a:t>
+            </a:r>
+          </a:p>
+          <a:p>
+            <a:pPr lvl="1"/>
+            <a:r>
+              <a:rPr lang="en-US" dirty="0"/>
+              <a:t>Click on Actions on the top ribbon</a:t>
+            </a:r>
+          </a:p>
+          <a:p>
+            <a:pPr lvl="1"/>
+            <a:r>
+              <a:rPr lang="en-US" dirty="0"/>
+              <a:t>Select Lab 2 Workflow from the left nav panel</a:t>
+            </a:r>
+          </a:p>
+          <a:p>
+            <a:pPr lvl="1"/>
+            <a:r>
+              <a:rPr lang="en-US" dirty="0"/>
+              <a:t>Click on the latest build of your Lab 2 Workflow</a:t>
+            </a:r>
+          </a:p>
+          <a:p>
+            <a:pPr lvl="1"/>
+            <a:r>
+              <a:rPr lang="en-US" dirty="0"/>
+              <a:t>Click on the “build” link to the left to review the logs of the build process</a:t>
+            </a:r>
+          </a:p>
+          <a:p>
+            <a:pPr lvl="1"/>
+            <a:r>
+              <a:rPr lang="en-US" dirty="0"/>
+              <a:t>Expand the collapsed item “Run a one-line script” so we can see our secret!</a:t>
+            </a:r>
+          </a:p>
+          <a:p>
+            <a:pPr lvl="2"/>
+            <a:r>
+              <a:rPr lang="en-US" dirty="0"/>
+              <a:t>What happened?</a:t>
+            </a:r>
+          </a:p>
+        </p:txBody>
+      </p:sp>
+    </p:spTree>
+    <p:extLst>
+      <p:ext uri="{BB962C8B-B14F-4D97-AF65-F5344CB8AC3E}">
+        <p14:creationId xmlns:p14="http://schemas.microsoft.com/office/powerpoint/2010/main" val="1173621339"/>
+      </p:ext>
+    </p:extLst>
+  </p:cSld>
+  <p:clrMapOvr>
+    <a:masterClrMapping/>
+  </p:clrMapOvr>
+</p:sld>
+</file>
+
+<file path=ppt/slides/slide26.xml><?xml version="1.0" encoding="utf-8"?>
+<p:sld xmlns:a="http://schemas.openxmlformats.org/drawingml/2006/main" xmlns:r="http://schemas.openxmlformats.org/officeDocument/2006/relationships" xmlns:p="http://schemas.openxmlformats.org/presentationml/2006/main">
+  <p:cSld>
+    <p:spTree>
+      <p:nvGrpSpPr>
+        <p:cNvPr id="1" name=""/>
+        <p:cNvGrpSpPr/>
+        <p:nvPr/>
+      </p:nvGrpSpPr>
+      <p:grpSpPr>
+        <a:xfrm>
+          <a:off x="0" y="0"/>
+          <a:ext cx="0" cy="0"/>
+          <a:chOff x="0" y="0"/>
+          <a:chExt cx="0" cy="0"/>
+        </a:xfrm>
+      </p:grpSpPr>
+      <p:sp>
+        <p:nvSpPr>
+          <p:cNvPr id="2" name="Title 1">
+            <a:extLst>
+              <a:ext uri="{FF2B5EF4-FFF2-40B4-BE49-F238E27FC236}">
+                <a16:creationId xmlns:a16="http://schemas.microsoft.com/office/drawing/2014/main" id="{67E1F745-C343-4000-BA61-A4216D992177}"/>
+              </a:ext>
+            </a:extLst>
+          </p:cNvPr>
+          <p:cNvSpPr>
+            <a:spLocks noGrp="1"/>
+          </p:cNvSpPr>
+          <p:nvPr>
+            <p:ph type="title"/>
+          </p:nvPr>
+        </p:nvSpPr>
+        <p:spPr/>
+        <p:txBody>
+          <a:bodyPr/>
+          <a:lstStyle/>
+          <a:p>
+            <a:r>
+              <a:rPr lang="en-US" dirty="0"/>
+              <a:t>Pull Requests</a:t>
+            </a:r>
+          </a:p>
+        </p:txBody>
+      </p:sp>
+      <p:sp>
+        <p:nvSpPr>
+          <p:cNvPr id="3" name="Content Placeholder 2">
+            <a:extLst>
+              <a:ext uri="{FF2B5EF4-FFF2-40B4-BE49-F238E27FC236}">
+                <a16:creationId xmlns:a16="http://schemas.microsoft.com/office/drawing/2014/main" id="{4A71ABC2-B0DA-4589-9CF9-EACAE9E9E93D}"/>
+              </a:ext>
+            </a:extLst>
+          </p:cNvPr>
+          <p:cNvSpPr>
+            <a:spLocks noGrp="1"/>
+          </p:cNvSpPr>
+          <p:nvPr>
+            <p:ph idx="1"/>
+          </p:nvPr>
+        </p:nvSpPr>
+        <p:spPr/>
+        <p:txBody>
+          <a:bodyPr>
+            <a:normAutofit fontScale="85000" lnSpcReduction="10000"/>
+          </a:bodyPr>
+          <a:lstStyle/>
+          <a:p>
+            <a:r>
+              <a:rPr lang="en-US" dirty="0"/>
+              <a:t>Pull requests (or PRs) represent a formal workflow to introduce code from one branch to another</a:t>
+            </a:r>
+          </a:p>
+          <a:p>
+            <a:r>
+              <a:rPr lang="en-US" dirty="0"/>
+              <a:t>There is typically a review process for pull requests</a:t>
+            </a:r>
+          </a:p>
+          <a:p>
+            <a:r>
+              <a:rPr lang="en-US" dirty="0"/>
+              <a:t>PRs provide a history for your repository beyond branches and commits</a:t>
+            </a:r>
+          </a:p>
+          <a:p>
+            <a:r>
+              <a:rPr lang="en-US" dirty="0"/>
+              <a:t>PRs can have rules to, including but not limited to, do the following:</a:t>
+            </a:r>
+          </a:p>
+          <a:p>
+            <a:pPr lvl="1"/>
+            <a:r>
+              <a:rPr lang="en-US" dirty="0"/>
+              <a:t>Make sure all code passes tests before it can be merged</a:t>
+            </a:r>
+          </a:p>
+          <a:p>
+            <a:pPr lvl="1"/>
+            <a:r>
+              <a:rPr lang="en-US" dirty="0"/>
+              <a:t>Meets the minimum number of approvers</a:t>
+            </a:r>
+          </a:p>
+          <a:p>
+            <a:pPr lvl="1"/>
+            <a:r>
+              <a:rPr lang="en-US" dirty="0"/>
+              <a:t>Expires if too much time has passed</a:t>
+            </a:r>
+          </a:p>
+          <a:p>
+            <a:pPr lvl="1"/>
+            <a:r>
+              <a:rPr lang="en-US" dirty="0"/>
+              <a:t>Clear previous approvals if the contributor pushes additional changes to the branch to be merged</a:t>
+            </a:r>
+          </a:p>
+        </p:txBody>
+      </p:sp>
+    </p:spTree>
+    <p:extLst>
+      <p:ext uri="{BB962C8B-B14F-4D97-AF65-F5344CB8AC3E}">
+        <p14:creationId xmlns:p14="http://schemas.microsoft.com/office/powerpoint/2010/main" val="2477599779"/>
+      </p:ext>
+    </p:extLst>
+  </p:cSld>
+  <p:clrMapOvr>
+    <a:masterClrMapping/>
+  </p:clrMapOvr>
+</p:sld>
+</file>
+
+<file path=ppt/slides/slide27.xml><?xml version="1.0" encoding="utf-8"?>
+<p:sld xmlns:a="http://schemas.openxmlformats.org/drawingml/2006/main" xmlns:r="http://schemas.openxmlformats.org/officeDocument/2006/relationships" xmlns:p="http://schemas.openxmlformats.org/presentationml/2006/main">
+  <p:cSld>
+    <p:spTree>
+      <p:nvGrpSpPr>
+        <p:cNvPr id="1" name=""/>
+        <p:cNvGrpSpPr/>
+        <p:nvPr/>
+      </p:nvGrpSpPr>
+      <p:grpSpPr>
+        <a:xfrm>
+          <a:off x="0" y="0"/>
+          <a:ext cx="0" cy="0"/>
+          <a:chOff x="0" y="0"/>
+          <a:chExt cx="0" cy="0"/>
+        </a:xfrm>
+      </p:grpSpPr>
+      <p:sp>
+        <p:nvSpPr>
+          <p:cNvPr id="2" name="Title 1">
+            <a:extLst>
+              <a:ext uri="{FF2B5EF4-FFF2-40B4-BE49-F238E27FC236}">
+                <a16:creationId xmlns:a16="http://schemas.microsoft.com/office/drawing/2014/main" id="{7826371A-3D4E-49A3-A87C-545BDF3F92E5}"/>
+              </a:ext>
+            </a:extLst>
+          </p:cNvPr>
+          <p:cNvSpPr>
+            <a:spLocks noGrp="1"/>
+          </p:cNvSpPr>
+          <p:nvPr>
+            <p:ph type="title"/>
+          </p:nvPr>
+        </p:nvSpPr>
+        <p:spPr/>
+        <p:txBody>
+          <a:bodyPr/>
+          <a:lstStyle/>
+          <a:p>
+            <a:r>
+              <a:rPr lang="en-US" dirty="0"/>
+              <a:t>Issue tracking and projects</a:t>
+            </a:r>
+          </a:p>
+        </p:txBody>
+      </p:sp>
+      <p:sp>
+        <p:nvSpPr>
+          <p:cNvPr id="3" name="Content Placeholder 2">
+            <a:extLst>
+              <a:ext uri="{FF2B5EF4-FFF2-40B4-BE49-F238E27FC236}">
+                <a16:creationId xmlns:a16="http://schemas.microsoft.com/office/drawing/2014/main" id="{9BB3DF2A-9194-46FA-BE6A-7E2920736BBB}"/>
+              </a:ext>
+            </a:extLst>
+          </p:cNvPr>
+          <p:cNvSpPr>
+            <a:spLocks noGrp="1"/>
+          </p:cNvSpPr>
+          <p:nvPr>
+            <p:ph idx="1"/>
+          </p:nvPr>
+        </p:nvSpPr>
+        <p:spPr/>
+        <p:txBody>
+          <a:bodyPr>
+            <a:normAutofit/>
+          </a:bodyPr>
+          <a:lstStyle/>
+          <a:p>
+            <a:r>
+              <a:rPr lang="en-US" dirty="0"/>
+              <a:t>Projects helps consolidate the work specific to a certain effort</a:t>
+            </a:r>
+          </a:p>
+          <a:p>
+            <a:pPr lvl="1"/>
+            <a:r>
+              <a:rPr lang="en-US" dirty="0"/>
+              <a:t>A project need not be limited to a single repository</a:t>
+            </a:r>
+          </a:p>
+          <a:p>
+            <a:pPr lvl="1"/>
+            <a:r>
+              <a:rPr lang="en-US" dirty="0"/>
+              <a:t>Most larger projects will have numerous repositories attached</a:t>
+            </a:r>
+          </a:p>
+          <a:p>
+            <a:pPr lvl="1"/>
+            <a:r>
+              <a:rPr lang="en-US" dirty="0"/>
+              <a:t>Kanban boards are a common work management tool to quickly visualize and progress items in need of completing</a:t>
+            </a:r>
+          </a:p>
+          <a:p>
+            <a:pPr lvl="1"/>
+            <a:r>
+              <a:rPr lang="en-US" dirty="0"/>
+              <a:t>Issues can be triaged directly from your project screen to be sorted on the </a:t>
+            </a:r>
+            <a:r>
+              <a:rPr lang="en-US" dirty="0" err="1"/>
+              <a:t>kanban</a:t>
+            </a:r>
+            <a:endParaRPr lang="en-US" dirty="0"/>
+          </a:p>
+        </p:txBody>
+      </p:sp>
+    </p:spTree>
+    <p:extLst>
+      <p:ext uri="{BB962C8B-B14F-4D97-AF65-F5344CB8AC3E}">
+        <p14:creationId xmlns:p14="http://schemas.microsoft.com/office/powerpoint/2010/main" val="1765616708"/>
+      </p:ext>
+    </p:extLst>
+  </p:cSld>
+  <p:clrMapOvr>
+    <a:masterClrMapping/>
+  </p:clrMapOvr>
+</p:sld>
+</file>
+
+<file path=ppt/slides/slide28.xml><?xml version="1.0" encoding="utf-8"?>
+<p:sld xmlns:a="http://schemas.openxmlformats.org/drawingml/2006/main" xmlns:r="http://schemas.openxmlformats.org/officeDocument/2006/relationships" xmlns:p="http://schemas.openxmlformats.org/presentationml/2006/main">
+  <p:cSld>
+    <p:spTree>
+      <p:nvGrpSpPr>
+        <p:cNvPr id="1" name=""/>
+        <p:cNvGrpSpPr/>
+        <p:nvPr/>
+      </p:nvGrpSpPr>
+      <p:grpSpPr>
+        <a:xfrm>
+          <a:off x="0" y="0"/>
+          <a:ext cx="0" cy="0"/>
+          <a:chOff x="0" y="0"/>
+          <a:chExt cx="0" cy="0"/>
+        </a:xfrm>
+      </p:grpSpPr>
+      <p:sp>
+        <p:nvSpPr>
+          <p:cNvPr id="2" name="Title 1">
+            <a:extLst>
+              <a:ext uri="{FF2B5EF4-FFF2-40B4-BE49-F238E27FC236}">
+                <a16:creationId xmlns:a16="http://schemas.microsoft.com/office/drawing/2014/main" id="{7826371A-3D4E-49A3-A87C-545BDF3F92E5}"/>
+              </a:ext>
+            </a:extLst>
+          </p:cNvPr>
+          <p:cNvSpPr>
+            <a:spLocks noGrp="1"/>
+          </p:cNvSpPr>
+          <p:nvPr>
+            <p:ph type="title"/>
+          </p:nvPr>
+        </p:nvSpPr>
+        <p:spPr/>
+        <p:txBody>
+          <a:bodyPr/>
+          <a:lstStyle/>
+          <a:p>
+            <a:r>
+              <a:rPr lang="en-US" dirty="0"/>
+              <a:t>Issue tracking and projects (Cont.)</a:t>
+            </a:r>
+          </a:p>
+        </p:txBody>
+      </p:sp>
+      <p:sp>
+        <p:nvSpPr>
+          <p:cNvPr id="3" name="Content Placeholder 2">
+            <a:extLst>
+              <a:ext uri="{FF2B5EF4-FFF2-40B4-BE49-F238E27FC236}">
+                <a16:creationId xmlns:a16="http://schemas.microsoft.com/office/drawing/2014/main" id="{9BB3DF2A-9194-46FA-BE6A-7E2920736BBB}"/>
+              </a:ext>
+            </a:extLst>
+          </p:cNvPr>
+          <p:cNvSpPr>
+            <a:spLocks noGrp="1"/>
+          </p:cNvSpPr>
+          <p:nvPr>
+            <p:ph idx="1"/>
+          </p:nvPr>
+        </p:nvSpPr>
+        <p:spPr/>
+        <p:txBody>
+          <a:bodyPr>
+            <a:normAutofit fontScale="92500" lnSpcReduction="10000"/>
+          </a:bodyPr>
+          <a:lstStyle/>
+          <a:p>
+            <a:r>
+              <a:rPr lang="en-US" dirty="0"/>
+              <a:t>Issue tracking acts as a funnel for all work coming into your project</a:t>
+            </a:r>
+          </a:p>
+          <a:p>
+            <a:pPr lvl="1"/>
+            <a:r>
+              <a:rPr lang="en-US" dirty="0"/>
+              <a:t>This doesn’t have to be explicitly issues in the sense of bugs or problems</a:t>
+            </a:r>
+          </a:p>
+          <a:p>
+            <a:pPr lvl="1"/>
+            <a:r>
+              <a:rPr lang="en-US" dirty="0"/>
+              <a:t>Enhancements or new features are classified as “issues”</a:t>
+            </a:r>
+          </a:p>
+          <a:p>
+            <a:pPr lvl="1"/>
+            <a:r>
+              <a:rPr lang="en-US" dirty="0"/>
+              <a:t>Requests for additional documentation are issues as well</a:t>
+            </a:r>
+          </a:p>
+          <a:p>
+            <a:r>
+              <a:rPr lang="en-US" dirty="0"/>
+              <a:t>As new issues are tracked, labels can help sort out the work</a:t>
+            </a:r>
+          </a:p>
+          <a:p>
+            <a:pPr lvl="1"/>
+            <a:r>
+              <a:rPr lang="en-US" dirty="0"/>
+              <a:t>Items tagged with “good first issue” are terrific for newcomers to your project (or a great target if you want to start helping on someone else’s project)</a:t>
+            </a:r>
+          </a:p>
+          <a:p>
+            <a:pPr lvl="1"/>
+            <a:r>
+              <a:rPr lang="en-US" dirty="0"/>
+              <a:t>“Help wanted” can indicate that the issue has exceeded the capacity of the current assignee, so they’re looking for more hands to solve the problem</a:t>
+            </a:r>
+          </a:p>
+        </p:txBody>
+      </p:sp>
+    </p:spTree>
+    <p:extLst>
+      <p:ext uri="{BB962C8B-B14F-4D97-AF65-F5344CB8AC3E}">
+        <p14:creationId xmlns:p14="http://schemas.microsoft.com/office/powerpoint/2010/main" val="211437080"/>
+      </p:ext>
+    </p:extLst>
+  </p:cSld>
+  <p:clrMapOvr>
+    <a:masterClrMapping/>
+  </p:clrMapOvr>
+</p:sld>
+</file>
+
+<file path=ppt/slides/slide29.xml><?xml version="1.0" encoding="utf-8"?>
+<p:sld xmlns:a="http://schemas.openxmlformats.org/drawingml/2006/main" xmlns:r="http://schemas.openxmlformats.org/officeDocument/2006/relationships" xmlns:p="http://schemas.openxmlformats.org/presentationml/2006/main">
+  <p:cSld>
+    <p:spTree>
+      <p:nvGrpSpPr>
+        <p:cNvPr id="1" name=""/>
+        <p:cNvGrpSpPr/>
+        <p:nvPr/>
+      </p:nvGrpSpPr>
+      <p:grpSpPr>
+        <a:xfrm>
+          <a:off x="0" y="0"/>
+          <a:ext cx="0" cy="0"/>
+          <a:chOff x="0" y="0"/>
+          <a:chExt cx="0" cy="0"/>
+        </a:xfrm>
+      </p:grpSpPr>
+      <p:sp>
+        <p:nvSpPr>
+          <p:cNvPr id="2" name="Title 1">
+            <a:extLst>
+              <a:ext uri="{FF2B5EF4-FFF2-40B4-BE49-F238E27FC236}">
+                <a16:creationId xmlns:a16="http://schemas.microsoft.com/office/drawing/2014/main" id="{C7AB3235-CCE8-46E6-BDE8-EF71E09B00DA}"/>
+              </a:ext>
+            </a:extLst>
+          </p:cNvPr>
+          <p:cNvSpPr>
+            <a:spLocks noGrp="1"/>
+          </p:cNvSpPr>
+          <p:nvPr>
+            <p:ph type="title"/>
+          </p:nvPr>
+        </p:nvSpPr>
+        <p:spPr/>
+        <p:txBody>
+          <a:bodyPr/>
+          <a:lstStyle/>
+          <a:p>
+            <a:r>
+              <a:rPr lang="en-US" dirty="0"/>
+              <a:t>Presentation End – open lab and questions</a:t>
+            </a:r>
+          </a:p>
+        </p:txBody>
+      </p:sp>
+      <p:sp>
+        <p:nvSpPr>
+          <p:cNvPr id="3" name="Content Placeholder 2">
+            <a:extLst>
+              <a:ext uri="{FF2B5EF4-FFF2-40B4-BE49-F238E27FC236}">
+                <a16:creationId xmlns:a16="http://schemas.microsoft.com/office/drawing/2014/main" id="{3A9669AB-E7B2-4895-9E7F-B06438F6702B}"/>
+              </a:ext>
+            </a:extLst>
+          </p:cNvPr>
+          <p:cNvSpPr>
+            <a:spLocks noGrp="1"/>
+          </p:cNvSpPr>
+          <p:nvPr>
+            <p:ph idx="1"/>
+          </p:nvPr>
+        </p:nvSpPr>
+        <p:spPr/>
+        <p:txBody>
+          <a:bodyPr/>
+          <a:lstStyle/>
+          <a:p>
+            <a:r>
+              <a:rPr lang="en-US" dirty="0"/>
+              <a:t>Can’t think of a question or need to leave before I can answer?</a:t>
+            </a:r>
+          </a:p>
+          <a:p>
+            <a:pPr lvl="1"/>
+            <a:r>
+              <a:rPr lang="en-US" dirty="0"/>
+              <a:t>No worries! Send me an email – </a:t>
+            </a:r>
+            <a:r>
+              <a:rPr lang="en-US" dirty="0">
+                <a:solidFill>
+                  <a:schemeClr val="tx1">
+                    <a:lumMod val="95000"/>
+                  </a:schemeClr>
+                </a:solidFill>
+                <a:hlinkClick r:id="rId2">
+                  <a:extLst>
+                    <a:ext uri="{A12FA001-AC4F-418D-AE19-62706E023703}">
+                      <ahyp:hlinkClr xmlns:ahyp="http://schemas.microsoft.com/office/drawing/2018/hyperlinkcolor" val="tx"/>
+                    </a:ext>
+                  </a:extLst>
+                </a:hlinkClick>
+              </a:rPr>
+              <a:t>zach@zach-martin.com</a:t>
+            </a:r>
+            <a:endParaRPr lang="en-US" dirty="0">
+              <a:solidFill>
+                <a:schemeClr val="tx1">
+                  <a:lumMod val="95000"/>
+                </a:schemeClr>
+              </a:solidFill>
+            </a:endParaRPr>
+          </a:p>
+        </p:txBody>
+      </p:sp>
+    </p:spTree>
+    <p:extLst>
+      <p:ext uri="{BB962C8B-B14F-4D97-AF65-F5344CB8AC3E}">
+        <p14:creationId xmlns:p14="http://schemas.microsoft.com/office/powerpoint/2010/main" val="3460011935"/>
       </p:ext>
     </p:extLst>
   </p:cSld>
@@ -15974,6 +17445,23 @@
 </file>
 
 <file path=customXml/item1.xml><?xml version="1.0" encoding="utf-8"?>
+<?mso-contentType ?>
+<FormTemplates xmlns="http://schemas.microsoft.com/sharepoint/v3/contenttype/forms">
+  <Display>DocumentLibraryForm</Display>
+  <Edit>DocumentLibraryForm</Edit>
+  <New>DocumentLibraryForm</New>
+</FormTemplates>
+</file>
+
+<file path=customXml/item2.xml><?xml version="1.0" encoding="utf-8"?>
+<p:properties xmlns:p="http://schemas.microsoft.com/office/2006/metadata/properties" xmlns:xsi="http://www.w3.org/2001/XMLSchema-instance" xmlns:pc="http://schemas.microsoft.com/office/infopath/2007/PartnerControls">
+  <documentManagement>
+    <MediaServiceKeyPoints xmlns="71af3243-3dd4-4a8d-8c0d-dd76da1f02a5" xsi:nil="true"/>
+  </documentManagement>
+</p:properties>
+</file>
+
+<file path=customXml/item3.xml><?xml version="1.0" encoding="utf-8"?>
 <ct:contentTypeSchema xmlns:ct="http://schemas.microsoft.com/office/2006/metadata/contentType" xmlns:ma="http://schemas.microsoft.com/office/2006/metadata/properties/metaAttributes" ct:_="" ma:_="" ma:contentTypeName="Document" ma:contentTypeID="0x01010079F111ED35F8CC479449609E8A0923A6" ma:contentTypeVersion="11" ma:contentTypeDescription="Create a new document." ma:contentTypeScope="" ma:versionID="96291512c1ee715ab617f4c07df79fc1">
   <xsd:schema xmlns:xsd="http://www.w3.org/2001/XMLSchema" xmlns:xs="http://www.w3.org/2001/XMLSchema" xmlns:p="http://schemas.microsoft.com/office/2006/metadata/properties" xmlns:ns2="71af3243-3dd4-4a8d-8c0d-dd76da1f02a5" xmlns:ns3="16c05727-aa75-4e4a-9b5f-8a80a1165891" targetNamespace="http://schemas.microsoft.com/office/2006/metadata/properties" ma:root="true" ma:fieldsID="8256c27c40ca5c40ce1cf6c44f0205df" ns2:_="" ns3:_="">
     <xsd:import namespace="71af3243-3dd4-4a8d-8c0d-dd76da1f02a5"/>
@@ -16184,24 +17672,25 @@
 </ct:contentTypeSchema>
 </file>
 
-<file path=customXml/item2.xml><?xml version="1.0" encoding="utf-8"?>
-<p:properties xmlns:p="http://schemas.microsoft.com/office/2006/metadata/properties" xmlns:xsi="http://www.w3.org/2001/XMLSchema-instance" xmlns:pc="http://schemas.microsoft.com/office/infopath/2007/PartnerControls">
-  <documentManagement>
-    <MediaServiceKeyPoints xmlns="71af3243-3dd4-4a8d-8c0d-dd76da1f02a5" xsi:nil="true"/>
-  </documentManagement>
-</p:properties>
+<file path=customXml/itemProps1.xml><?xml version="1.0" encoding="utf-8"?>
+<ds:datastoreItem xmlns:ds="http://schemas.openxmlformats.org/officeDocument/2006/customXml" ds:itemID="{B579702B-25C7-40D7-9E29-7686B11A9660}">
+  <ds:schemaRefs>
+    <ds:schemaRef ds:uri="http://schemas.microsoft.com/sharepoint/v3/contenttype/forms"/>
+  </ds:schemaRefs>
+</ds:datastoreItem>
 </file>
 
-<file path=customXml/item3.xml><?xml version="1.0" encoding="utf-8"?>
-<?mso-contentType ?>
-<FormTemplates xmlns="http://schemas.microsoft.com/sharepoint/v3/contenttype/forms">
-  <Display>DocumentLibraryForm</Display>
-  <Edit>DocumentLibraryForm</Edit>
-  <New>DocumentLibraryForm</New>
-</FormTemplates>
+<file path=customXml/itemProps2.xml><?xml version="1.0" encoding="utf-8"?>
+<ds:datastoreItem xmlns:ds="http://schemas.openxmlformats.org/officeDocument/2006/customXml" ds:itemID="{E7866CFD-F94E-4AE5-ACEA-86FEC0F48A10}">
+  <ds:schemaRefs>
+    <ds:schemaRef ds:uri="http://schemas.microsoft.com/office/2006/metadata/properties"/>
+    <ds:schemaRef ds:uri="http://schemas.microsoft.com/office/infopath/2007/PartnerControls"/>
+    <ds:schemaRef ds:uri="71af3243-3dd4-4a8d-8c0d-dd76da1f02a5"/>
+  </ds:schemaRefs>
+</ds:datastoreItem>
 </file>
 
-<file path=customXml/itemProps1.xml><?xml version="1.0" encoding="utf-8"?>
+<file path=customXml/itemProps3.xml><?xml version="1.0" encoding="utf-8"?>
 <ds:datastoreItem xmlns:ds="http://schemas.openxmlformats.org/officeDocument/2006/customXml" ds:itemID="{A7C0B241-13E5-418D-8920-D23491E2D2C0}">
   <ds:schemaRefs>
     <ds:schemaRef ds:uri="http://schemas.microsoft.com/office/2006/metadata/contentType"/>
@@ -16218,22 +17707,4 @@
     <ds:schemaRef ds:uri="http://schemas.microsoft.com/internal/obd"/>
   </ds:schemaRefs>
 </ds:datastoreItem>
-</file>
-
-<file path=customXml/itemProps2.xml><?xml version="1.0" encoding="utf-8"?>
-<ds:datastoreItem xmlns:ds="http://schemas.openxmlformats.org/officeDocument/2006/customXml" ds:itemID="{E7866CFD-F94E-4AE5-ACEA-86FEC0F48A10}">
-  <ds:schemaRefs>
-    <ds:schemaRef ds:uri="http://schemas.microsoft.com/office/2006/metadata/properties"/>
-    <ds:schemaRef ds:uri="http://schemas.microsoft.com/office/infopath/2007/PartnerControls"/>
-    <ds:schemaRef ds:uri="71af3243-3dd4-4a8d-8c0d-dd76da1f02a5"/>
-  </ds:schemaRefs>
-</ds:datastoreItem>
-</file>
-
-<file path=customXml/itemProps3.xml><?xml version="1.0" encoding="utf-8"?>
-<ds:datastoreItem xmlns:ds="http://schemas.openxmlformats.org/officeDocument/2006/customXml" ds:itemID="{B579702B-25C7-40D7-9E29-7686B11A9660}">
-  <ds:schemaRefs>
-    <ds:schemaRef ds:uri="http://schemas.microsoft.com/sharepoint/v3/contenttype/forms"/>
-  </ds:schemaRefs>
-</ds:datastoreItem>
 </file>
</xml_diff>

<commit_message>
Updating Powerpoint for 2/14 class.
</commit_message>
<xml_diff>
--- a/resources/Advanced github topics.pptx
+++ b/resources/Advanced github topics.pptx
@@ -5,47 +5,52 @@
     <p:sldMasterId id="2147483669" r:id="rId4"/>
   </p:sldMasterIdLst>
   <p:notesMasterIdLst>
-    <p:notesMasterId r:id="rId40"/>
+    <p:notesMasterId r:id="rId45"/>
   </p:notesMasterIdLst>
   <p:handoutMasterIdLst>
-    <p:handoutMasterId r:id="rId41"/>
+    <p:handoutMasterId r:id="rId46"/>
   </p:handoutMasterIdLst>
   <p:sldIdLst>
     <p:sldId id="256" r:id="rId5"/>
-    <p:sldId id="258" r:id="rId6"/>
+    <p:sldId id="312" r:id="rId6"/>
     <p:sldId id="285" r:id="rId7"/>
-    <p:sldId id="286" r:id="rId8"/>
-    <p:sldId id="287" r:id="rId9"/>
-    <p:sldId id="288" r:id="rId10"/>
-    <p:sldId id="289" r:id="rId11"/>
-    <p:sldId id="290" r:id="rId12"/>
-    <p:sldId id="291" r:id="rId13"/>
-    <p:sldId id="293" r:id="rId14"/>
-    <p:sldId id="294" r:id="rId15"/>
-    <p:sldId id="295" r:id="rId16"/>
-    <p:sldId id="296" r:id="rId17"/>
-    <p:sldId id="297" r:id="rId18"/>
-    <p:sldId id="298" r:id="rId19"/>
-    <p:sldId id="299" r:id="rId20"/>
-    <p:sldId id="300" r:id="rId21"/>
-    <p:sldId id="301" r:id="rId22"/>
-    <p:sldId id="302" r:id="rId23"/>
-    <p:sldId id="303" r:id="rId24"/>
-    <p:sldId id="304" r:id="rId25"/>
-    <p:sldId id="305" r:id="rId26"/>
-    <p:sldId id="306" r:id="rId27"/>
-    <p:sldId id="307" r:id="rId28"/>
-    <p:sldId id="257" r:id="rId29"/>
-    <p:sldId id="311" r:id="rId30"/>
-    <p:sldId id="259" r:id="rId31"/>
-    <p:sldId id="260" r:id="rId32"/>
-    <p:sldId id="261" r:id="rId33"/>
-    <p:sldId id="262" r:id="rId34"/>
-    <p:sldId id="263" r:id="rId35"/>
-    <p:sldId id="308" r:id="rId36"/>
-    <p:sldId id="309" r:id="rId37"/>
-    <p:sldId id="310" r:id="rId38"/>
-    <p:sldId id="265" r:id="rId39"/>
+    <p:sldId id="270" r:id="rId8"/>
+    <p:sldId id="272" r:id="rId9"/>
+    <p:sldId id="273" r:id="rId10"/>
+    <p:sldId id="274" r:id="rId11"/>
+    <p:sldId id="286" r:id="rId12"/>
+    <p:sldId id="287" r:id="rId13"/>
+    <p:sldId id="288" r:id="rId14"/>
+    <p:sldId id="289" r:id="rId15"/>
+    <p:sldId id="290" r:id="rId16"/>
+    <p:sldId id="291" r:id="rId17"/>
+    <p:sldId id="293" r:id="rId18"/>
+    <p:sldId id="294" r:id="rId19"/>
+    <p:sldId id="295" r:id="rId20"/>
+    <p:sldId id="296" r:id="rId21"/>
+    <p:sldId id="297" r:id="rId22"/>
+    <p:sldId id="298" r:id="rId23"/>
+    <p:sldId id="299" r:id="rId24"/>
+    <p:sldId id="300" r:id="rId25"/>
+    <p:sldId id="301" r:id="rId26"/>
+    <p:sldId id="302" r:id="rId27"/>
+    <p:sldId id="303" r:id="rId28"/>
+    <p:sldId id="304" r:id="rId29"/>
+    <p:sldId id="305" r:id="rId30"/>
+    <p:sldId id="306" r:id="rId31"/>
+    <p:sldId id="307" r:id="rId32"/>
+    <p:sldId id="257" r:id="rId33"/>
+    <p:sldId id="311" r:id="rId34"/>
+    <p:sldId id="259" r:id="rId35"/>
+    <p:sldId id="260" r:id="rId36"/>
+    <p:sldId id="261" r:id="rId37"/>
+    <p:sldId id="262" r:id="rId38"/>
+    <p:sldId id="263" r:id="rId39"/>
+    <p:sldId id="308" r:id="rId40"/>
+    <p:sldId id="309" r:id="rId41"/>
+    <p:sldId id="310" r:id="rId42"/>
+    <p:sldId id="313" r:id="rId43"/>
+    <p:sldId id="265" r:id="rId44"/>
   </p:sldIdLst>
   <p:sldSz cx="12192000" cy="6858000"/>
   <p:notesSz cx="6858000" cy="9144000"/>
@@ -249,7 +254,7 @@
           <a:p>
             <a:fld id="{2B85766F-5EC0-4797-B4D1-777FCB005B11}" type="datetimeFigureOut">
               <a:rPr lang="en-US" smtClean="0"/>
-              <a:t>2/22/2020</a:t>
+              <a:t>2/14/2021</a:t>
             </a:fld>
             <a:endParaRPr lang="en-US" dirty="0"/>
           </a:p>
@@ -426,7 +431,7 @@
           <a:p>
             <a:fld id="{B2B4B5EC-152C-4627-80C0-63B10D5574EF}" type="datetimeFigureOut">
               <a:rPr lang="en-US" smtClean="0"/>
-              <a:t>2/22/2020</a:t>
+              <a:t>2/14/2021</a:t>
             </a:fld>
             <a:endParaRPr lang="en-US" dirty="0"/>
           </a:p>
@@ -4975,7 +4980,7 @@
           <a:p>
             <a:fld id="{48A87A34-81AB-432B-8DAE-1953F412C126}" type="datetimeFigureOut">
               <a:rPr lang="en-US" smtClean="0"/>
-              <a:t>2/22/2020</a:t>
+              <a:t>2/14/2021</a:t>
             </a:fld>
             <a:endParaRPr lang="en-US" dirty="0"/>
           </a:p>
@@ -5242,7 +5247,7 @@
           <a:p>
             <a:fld id="{48A87A34-81AB-432B-8DAE-1953F412C126}" type="datetimeFigureOut">
               <a:rPr lang="en-US" smtClean="0"/>
-              <a:t>2/22/2020</a:t>
+              <a:t>2/14/2021</a:t>
             </a:fld>
             <a:endParaRPr lang="en-US" dirty="0"/>
           </a:p>
@@ -5438,7 +5443,7 @@
           <a:p>
             <a:fld id="{48A87A34-81AB-432B-8DAE-1953F412C126}" type="datetimeFigureOut">
               <a:rPr lang="en-US" smtClean="0"/>
-              <a:t>2/22/2020</a:t>
+              <a:t>2/14/2021</a:t>
             </a:fld>
             <a:endParaRPr lang="en-US" dirty="0"/>
           </a:p>
@@ -5701,7 +5706,7 @@
           <a:p>
             <a:fld id="{48A87A34-81AB-432B-8DAE-1953F412C126}" type="datetimeFigureOut">
               <a:rPr lang="en-US" smtClean="0"/>
-              <a:t>2/22/2020</a:t>
+              <a:t>2/14/2021</a:t>
             </a:fld>
             <a:endParaRPr lang="en-US" dirty="0"/>
           </a:p>
@@ -6135,7 +6140,7 @@
           <a:p>
             <a:fld id="{48A87A34-81AB-432B-8DAE-1953F412C126}" type="datetimeFigureOut">
               <a:rPr lang="en-US" smtClean="0"/>
-              <a:t>2/22/2020</a:t>
+              <a:t>2/14/2021</a:t>
             </a:fld>
             <a:endParaRPr lang="en-US" dirty="0"/>
           </a:p>
@@ -6681,7 +6686,7 @@
           <a:p>
             <a:fld id="{48A87A34-81AB-432B-8DAE-1953F412C126}" type="datetimeFigureOut">
               <a:rPr lang="en-US" smtClean="0"/>
-              <a:t>2/22/2020</a:t>
+              <a:t>2/14/2021</a:t>
             </a:fld>
             <a:endParaRPr lang="en-US" dirty="0"/>
           </a:p>
@@ -7401,7 +7406,7 @@
           <a:p>
             <a:fld id="{48A87A34-81AB-432B-8DAE-1953F412C126}" type="datetimeFigureOut">
               <a:rPr lang="en-US" smtClean="0"/>
-              <a:t>2/22/2020</a:t>
+              <a:t>2/14/2021</a:t>
             </a:fld>
             <a:endParaRPr lang="en-US" dirty="0"/>
           </a:p>
@@ -7571,7 +7576,7 @@
           <a:p>
             <a:fld id="{48A87A34-81AB-432B-8DAE-1953F412C126}" type="datetimeFigureOut">
               <a:rPr lang="en-US" smtClean="0"/>
-              <a:t>2/22/2020</a:t>
+              <a:t>2/14/2021</a:t>
             </a:fld>
             <a:endParaRPr lang="en-US" dirty="0"/>
           </a:p>
@@ -7751,7 +7756,7 @@
           <a:p>
             <a:fld id="{48A87A34-81AB-432B-8DAE-1953F412C126}" type="datetimeFigureOut">
               <a:rPr lang="en-US" smtClean="0"/>
-              <a:t>2/22/2020</a:t>
+              <a:t>2/14/2021</a:t>
             </a:fld>
             <a:endParaRPr lang="en-US" dirty="0"/>
           </a:p>
@@ -7921,7 +7926,7 @@
           <a:p>
             <a:fld id="{48A87A34-81AB-432B-8DAE-1953F412C126}" type="datetimeFigureOut">
               <a:rPr lang="en-US" smtClean="0"/>
-              <a:t>2/22/2020</a:t>
+              <a:t>2/14/2021</a:t>
             </a:fld>
             <a:endParaRPr lang="en-US" dirty="0"/>
           </a:p>
@@ -8171,7 +8176,7 @@
           <a:p>
             <a:fld id="{48A87A34-81AB-432B-8DAE-1953F412C126}" type="datetimeFigureOut">
               <a:rPr lang="en-US" smtClean="0"/>
-              <a:t>2/22/2020</a:t>
+              <a:t>2/14/2021</a:t>
             </a:fld>
             <a:endParaRPr lang="en-US" dirty="0"/>
           </a:p>
@@ -8403,7 +8408,7 @@
           <a:p>
             <a:fld id="{48A87A34-81AB-432B-8DAE-1953F412C126}" type="datetimeFigureOut">
               <a:rPr lang="en-US" smtClean="0"/>
-              <a:t>2/22/2020</a:t>
+              <a:t>2/14/2021</a:t>
             </a:fld>
             <a:endParaRPr lang="en-US" dirty="0"/>
           </a:p>
@@ -8784,7 +8789,7 @@
           <a:p>
             <a:fld id="{48A87A34-81AB-432B-8DAE-1953F412C126}" type="datetimeFigureOut">
               <a:rPr lang="en-US" smtClean="0"/>
-              <a:t>2/22/2020</a:t>
+              <a:t>2/14/2021</a:t>
             </a:fld>
             <a:endParaRPr lang="en-US" dirty="0"/>
           </a:p>
@@ -8902,7 +8907,7 @@
           <a:p>
             <a:fld id="{48A87A34-81AB-432B-8DAE-1953F412C126}" type="datetimeFigureOut">
               <a:rPr lang="en-US" smtClean="0"/>
-              <a:t>2/22/2020</a:t>
+              <a:t>2/14/2021</a:t>
             </a:fld>
             <a:endParaRPr lang="en-US" dirty="0"/>
           </a:p>
@@ -8997,7 +9002,7 @@
           <a:p>
             <a:fld id="{48A87A34-81AB-432B-8DAE-1953F412C126}" type="datetimeFigureOut">
               <a:rPr lang="en-US" smtClean="0"/>
-              <a:t>2/22/2020</a:t>
+              <a:t>2/14/2021</a:t>
             </a:fld>
             <a:endParaRPr lang="en-US" dirty="0"/>
           </a:p>
@@ -9246,7 +9251,7 @@
           <a:p>
             <a:fld id="{48A87A34-81AB-432B-8DAE-1953F412C126}" type="datetimeFigureOut">
               <a:rPr lang="en-US" smtClean="0"/>
-              <a:t>2/22/2020</a:t>
+              <a:t>2/14/2021</a:t>
             </a:fld>
             <a:endParaRPr lang="en-US" dirty="0"/>
           </a:p>
@@ -9526,7 +9531,7 @@
           <a:p>
             <a:fld id="{48A87A34-81AB-432B-8DAE-1953F412C126}" type="datetimeFigureOut">
               <a:rPr lang="en-US" smtClean="0"/>
-              <a:t>2/22/2020</a:t>
+              <a:t>2/14/2021</a:t>
             </a:fld>
             <a:endParaRPr lang="en-US" dirty="0"/>
           </a:p>
@@ -12594,7 +12599,7 @@
             <a:fld id="{48A87A34-81AB-432B-8DAE-1953F412C126}" type="datetimeFigureOut">
               <a:rPr lang="en-US" smtClean="0"/>
               <a:pPr/>
-              <a:t>2/22/2020</a:t>
+              <a:t>2/14/2021</a:t>
             </a:fld>
             <a:endParaRPr lang="en-US" dirty="0"/>
           </a:p>
@@ -13085,20 +13090,12 @@
           <a:p>
             <a:pPr algn="ctr"/>
             <a:r>
-              <a:rPr lang="en-US" sz="2400" dirty="0" err="1">
-                <a:latin typeface="Tahoma" panose="020B0604030504040204" pitchFamily="34" charset="0"/>
-                <a:ea typeface="Tahoma" panose="020B0604030504040204" pitchFamily="34" charset="0"/>
-                <a:cs typeface="Tahoma" panose="020B0604030504040204" pitchFamily="34" charset="0"/>
-              </a:rPr>
-              <a:t>InstructorS</a:t>
-            </a:r>
-            <a:r>
               <a:rPr lang="en-US" sz="2400" dirty="0">
                 <a:latin typeface="Tahoma" panose="020B0604030504040204" pitchFamily="34" charset="0"/>
                 <a:ea typeface="Tahoma" panose="020B0604030504040204" pitchFamily="34" charset="0"/>
                 <a:cs typeface="Tahoma" panose="020B0604030504040204" pitchFamily="34" charset="0"/>
               </a:rPr>
-              <a:t> – </a:t>
+              <a:t>Instructor – </a:t>
             </a:r>
           </a:p>
           <a:p>
@@ -13109,7 +13106,7 @@
                 <a:ea typeface="Tahoma" panose="020B0604030504040204" pitchFamily="34" charset="0"/>
                 <a:cs typeface="Tahoma" panose="020B0604030504040204" pitchFamily="34" charset="0"/>
               </a:rPr>
-              <a:t>Zach martin &amp; Chris Daniels</a:t>
+              <a:t>Zach martin</a:t>
             </a:r>
           </a:p>
         </p:txBody>
@@ -13167,17 +13164,17 @@
           <a:p>
             <a:r>
               <a:rPr lang="en-US" dirty="0"/>
-              <a:t>Rebase golden Rule - Illustrated</a:t>
+              <a:t>Rebase workflow (Cont.)</a:t>
             </a:r>
           </a:p>
         </p:txBody>
       </p:sp>
       <p:pic>
         <p:nvPicPr>
-          <p:cNvPr id="7" name="Content Placeholder 6">
+          <p:cNvPr id="6" name="Content Placeholder 5">
             <a:extLst>
               <a:ext uri="{FF2B5EF4-FFF2-40B4-BE49-F238E27FC236}">
-                <a16:creationId xmlns:a16="http://schemas.microsoft.com/office/drawing/2014/main" id="{D02A06AD-E44F-4112-9E5C-28E4F55730ED}"/>
+                <a16:creationId xmlns:a16="http://schemas.microsoft.com/office/drawing/2014/main" id="{7446AF04-D9E3-4AA5-BEEC-75A030DF9F74}"/>
               </a:ext>
             </a:extLst>
           </p:cNvPr>
@@ -13202,15 +13199,15 @@
         </p:blipFill>
         <p:spPr>
           <a:xfrm>
-            <a:off x="3441445" y="2249488"/>
-            <a:ext cx="5305935" cy="3541712"/>
+            <a:off x="3451344" y="2249488"/>
+            <a:ext cx="5286137" cy="3541712"/>
           </a:xfrm>
         </p:spPr>
       </p:pic>
     </p:spTree>
     <p:extLst>
       <p:ext uri="{BB962C8B-B14F-4D97-AF65-F5344CB8AC3E}">
-        <p14:creationId xmlns:p14="http://schemas.microsoft.com/office/powerpoint/2010/main" val="1022779862"/>
+        <p14:creationId xmlns:p14="http://schemas.microsoft.com/office/powerpoint/2010/main" val="2415559359"/>
       </p:ext>
     </p:extLst>
   </p:cSld>
@@ -13242,7 +13239,7 @@
           <p:cNvPr id="2" name="Title 1">
             <a:extLst>
               <a:ext uri="{FF2B5EF4-FFF2-40B4-BE49-F238E27FC236}">
-                <a16:creationId xmlns:a16="http://schemas.microsoft.com/office/drawing/2014/main" id="{B778339D-9DD8-4064-9E1B-B79A7D595DE2}"/>
+                <a16:creationId xmlns:a16="http://schemas.microsoft.com/office/drawing/2014/main" id="{460E5E25-300A-4A4D-B1C2-63CB6E978153}"/>
               </a:ext>
             </a:extLst>
           </p:cNvPr>
@@ -13260,111 +13257,50 @@
           <a:p>
             <a:r>
               <a:rPr lang="en-US" dirty="0"/>
-              <a:t>Leadup to lab 1</a:t>
+              <a:t>Rebase workflow (Cont.)</a:t>
             </a:r>
           </a:p>
         </p:txBody>
       </p:sp>
-      <p:sp>
-        <p:nvSpPr>
-          <p:cNvPr id="3" name="Content Placeholder 2">
+      <p:pic>
+        <p:nvPicPr>
+          <p:cNvPr id="7" name="Content Placeholder 6">
             <a:extLst>
               <a:ext uri="{FF2B5EF4-FFF2-40B4-BE49-F238E27FC236}">
-                <a16:creationId xmlns:a16="http://schemas.microsoft.com/office/drawing/2014/main" id="{6B98D569-D6AD-4D2A-8345-F2929A73D6AF}"/>
+                <a16:creationId xmlns:a16="http://schemas.microsoft.com/office/drawing/2014/main" id="{B51158DF-473D-4D96-B075-D2D8845482C2}"/>
               </a:ext>
             </a:extLst>
           </p:cNvPr>
-          <p:cNvSpPr>
-            <a:spLocks noGrp="1"/>
-          </p:cNvSpPr>
+          <p:cNvPicPr>
+            <a:picLocks noGrp="1" noChangeAspect="1"/>
+          </p:cNvPicPr>
           <p:nvPr>
             <p:ph idx="1"/>
           </p:nvPr>
-        </p:nvSpPr>
-        <p:spPr/>
-        <p:txBody>
-          <a:bodyPr>
-            <a:normAutofit fontScale="85000" lnSpcReduction="20000"/>
-          </a:bodyPr>
-          <a:lstStyle/>
-          <a:p>
-            <a:r>
-              <a:rPr lang="en-US" dirty="0"/>
-              <a:t>Rebase not only helps keep a clean tree, it can reduce clutter</a:t>
-            </a:r>
-          </a:p>
-          <a:p>
-            <a:pPr lvl="1"/>
-            <a:r>
-              <a:rPr lang="en-US" dirty="0"/>
-              <a:t>Maintaining clean commit histories can be challenging</a:t>
-            </a:r>
-          </a:p>
-          <a:p>
-            <a:pPr lvl="1"/>
-            <a:r>
-              <a:rPr lang="en-US" dirty="0"/>
-              <a:t>Consolidating commit messages and removing unnecessary commits</a:t>
-            </a:r>
-          </a:p>
-          <a:p>
-            <a:pPr lvl="1"/>
-            <a:r>
-              <a:rPr lang="en-US" dirty="0"/>
-              <a:t>Alter history itself! (You can do some weird stuff with rebase!)</a:t>
-            </a:r>
-          </a:p>
-          <a:p>
-            <a:r>
-              <a:rPr lang="en-US" dirty="0"/>
-              <a:t>Important rebase terms:</a:t>
-            </a:r>
-          </a:p>
-          <a:p>
-            <a:pPr lvl="1"/>
-            <a:r>
-              <a:rPr lang="en-US" dirty="0"/>
-              <a:t>Pick</a:t>
-            </a:r>
-          </a:p>
-          <a:p>
-            <a:pPr lvl="1"/>
-            <a:r>
-              <a:rPr lang="en-US" dirty="0"/>
-              <a:t>Squash</a:t>
-            </a:r>
-          </a:p>
-          <a:p>
-            <a:pPr lvl="1"/>
-            <a:r>
-              <a:rPr lang="en-US" dirty="0"/>
-              <a:t>Edit</a:t>
-            </a:r>
-          </a:p>
-          <a:p>
-            <a:pPr lvl="1"/>
-            <a:r>
-              <a:rPr lang="en-US" dirty="0"/>
-              <a:t>Reword</a:t>
-            </a:r>
-          </a:p>
-          <a:p>
-            <a:pPr lvl="1"/>
-            <a:r>
-              <a:rPr lang="en-US" dirty="0"/>
-              <a:t>Drop</a:t>
-            </a:r>
-          </a:p>
-          <a:p>
-            <a:pPr lvl="1"/>
-            <a:endParaRPr lang="en-US" dirty="0"/>
-          </a:p>
-        </p:txBody>
-      </p:sp>
+        </p:nvPicPr>
+        <p:blipFill>
+          <a:blip r:embed="rId2">
+            <a:extLst>
+              <a:ext uri="{96DAC541-7B7A-43D3-8B79-37D633B846F1}">
+                <asvg:svgBlip xmlns:asvg="http://schemas.microsoft.com/office/drawing/2016/SVG/main" r:embed="rId3"/>
+              </a:ext>
+            </a:extLst>
+          </a:blip>
+          <a:stretch>
+            <a:fillRect/>
+          </a:stretch>
+        </p:blipFill>
+        <p:spPr>
+          <a:xfrm>
+            <a:off x="3494991" y="2249488"/>
+            <a:ext cx="5198843" cy="3541712"/>
+          </a:xfrm>
+        </p:spPr>
+      </p:pic>
     </p:spTree>
     <p:extLst>
       <p:ext uri="{BB962C8B-B14F-4D97-AF65-F5344CB8AC3E}">
-        <p14:creationId xmlns:p14="http://schemas.microsoft.com/office/powerpoint/2010/main" val="2070696651"/>
+        <p14:creationId xmlns:p14="http://schemas.microsoft.com/office/powerpoint/2010/main" val="404804294"/>
       </p:ext>
     </p:extLst>
   </p:cSld>
@@ -13396,7 +13332,7 @@
           <p:cNvPr id="2" name="Title 1">
             <a:extLst>
               <a:ext uri="{FF2B5EF4-FFF2-40B4-BE49-F238E27FC236}">
-                <a16:creationId xmlns:a16="http://schemas.microsoft.com/office/drawing/2014/main" id="{B778339D-9DD8-4064-9E1B-B79A7D595DE2}"/>
+                <a16:creationId xmlns:a16="http://schemas.microsoft.com/office/drawing/2014/main" id="{460E5E25-300A-4A4D-B1C2-63CB6E978153}"/>
               </a:ext>
             </a:extLst>
           </p:cNvPr>
@@ -13414,17 +13350,17 @@
           <a:p>
             <a:r>
               <a:rPr lang="en-US" dirty="0"/>
-              <a:t>Lab 1 – Interactively rebasing</a:t>
+              <a:t>Rebase workflow (Cont.)</a:t>
             </a:r>
           </a:p>
         </p:txBody>
       </p:sp>
       <p:pic>
         <p:nvPicPr>
-          <p:cNvPr id="5" name="Content Placeholder 4">
+          <p:cNvPr id="6" name="Content Placeholder 5">
             <a:extLst>
               <a:ext uri="{FF2B5EF4-FFF2-40B4-BE49-F238E27FC236}">
-                <a16:creationId xmlns:a16="http://schemas.microsoft.com/office/drawing/2014/main" id="{203F82D0-49C5-4317-9751-818DC1662131}"/>
+                <a16:creationId xmlns:a16="http://schemas.microsoft.com/office/drawing/2014/main" id="{7A1A7D49-3A09-494D-9214-D9E300234EEA}"/>
               </a:ext>
             </a:extLst>
           </p:cNvPr>
@@ -13449,15 +13385,15 @@
         </p:blipFill>
         <p:spPr>
           <a:xfrm>
-            <a:off x="3001215" y="2249488"/>
-            <a:ext cx="6186396" cy="3541712"/>
+            <a:off x="3490213" y="2249488"/>
+            <a:ext cx="5208400" cy="3541712"/>
           </a:xfrm>
         </p:spPr>
       </p:pic>
     </p:spTree>
     <p:extLst>
       <p:ext uri="{BB962C8B-B14F-4D97-AF65-F5344CB8AC3E}">
-        <p14:creationId xmlns:p14="http://schemas.microsoft.com/office/powerpoint/2010/main" val="2033759713"/>
+        <p14:creationId xmlns:p14="http://schemas.microsoft.com/office/powerpoint/2010/main" val="3970215657"/>
       </p:ext>
     </p:extLst>
   </p:cSld>
@@ -13489,7 +13425,7 @@
           <p:cNvPr id="2" name="Title 1">
             <a:extLst>
               <a:ext uri="{FF2B5EF4-FFF2-40B4-BE49-F238E27FC236}">
-                <a16:creationId xmlns:a16="http://schemas.microsoft.com/office/drawing/2014/main" id="{B778339D-9DD8-4064-9E1B-B79A7D595DE2}"/>
+                <a16:creationId xmlns:a16="http://schemas.microsoft.com/office/drawing/2014/main" id="{460E5E25-300A-4A4D-B1C2-63CB6E978153}"/>
               </a:ext>
             </a:extLst>
           </p:cNvPr>
@@ -13507,50 +13443,67 @@
           <a:p>
             <a:r>
               <a:rPr lang="en-US" dirty="0"/>
-              <a:t>Lab 1 – Interactively rebasing</a:t>
+              <a:t>Rebase golden Rule</a:t>
             </a:r>
           </a:p>
         </p:txBody>
       </p:sp>
-      <p:pic>
-        <p:nvPicPr>
-          <p:cNvPr id="7" name="Content Placeholder 6">
+      <p:sp>
+        <p:nvSpPr>
+          <p:cNvPr id="9" name="Content Placeholder 8">
             <a:extLst>
               <a:ext uri="{FF2B5EF4-FFF2-40B4-BE49-F238E27FC236}">
-                <a16:creationId xmlns:a16="http://schemas.microsoft.com/office/drawing/2014/main" id="{CE0FD989-86EC-492A-B5F7-6D37E3C1FFE9}"/>
+                <a16:creationId xmlns:a16="http://schemas.microsoft.com/office/drawing/2014/main" id="{7B5AF4F8-6FA9-4858-A0E3-DE4C8ADBA48F}"/>
               </a:ext>
             </a:extLst>
           </p:cNvPr>
-          <p:cNvPicPr>
-            <a:picLocks noGrp="1" noChangeAspect="1"/>
-          </p:cNvPicPr>
+          <p:cNvSpPr>
+            <a:spLocks noGrp="1"/>
+          </p:cNvSpPr>
           <p:nvPr>
             <p:ph idx="1"/>
           </p:nvPr>
-        </p:nvPicPr>
-        <p:blipFill>
-          <a:blip r:embed="rId2">
-            <a:extLst>
-              <a:ext uri="{96DAC541-7B7A-43D3-8B79-37D633B846F1}">
-                <asvg:svgBlip xmlns:asvg="http://schemas.microsoft.com/office/drawing/2016/SVG/main" r:embed="rId3"/>
-              </a:ext>
-            </a:extLst>
-          </a:blip>
-          <a:stretch>
-            <a:fillRect/>
-          </a:stretch>
-        </p:blipFill>
-        <p:spPr>
-          <a:xfrm>
-            <a:off x="3768165" y="2249488"/>
-            <a:ext cx="4652495" cy="3541712"/>
-          </a:xfrm>
-        </p:spPr>
-      </p:pic>
+        </p:nvSpPr>
+        <p:spPr/>
+        <p:txBody>
+          <a:bodyPr/>
+          <a:lstStyle/>
+          <a:p>
+            <a:r>
+              <a:rPr lang="en-US" dirty="0"/>
+              <a:t>When rebasing, keep the golden rule in mind:</a:t>
+            </a:r>
+          </a:p>
+          <a:p>
+            <a:pPr lvl="1"/>
+            <a:r>
+              <a:rPr lang="en-US" b="1" dirty="0"/>
+              <a:t>NEVER</a:t>
+            </a:r>
+            <a:r>
+              <a:rPr lang="en-US" dirty="0"/>
+              <a:t> rebase a public branch over your branch</a:t>
+            </a:r>
+          </a:p>
+          <a:p>
+            <a:r>
+              <a:rPr lang="en-US" dirty="0"/>
+              <a:t>Rebasing gives you an opportunity to realign your history with team changes</a:t>
+            </a:r>
+          </a:p>
+          <a:p>
+            <a:pPr lvl="1"/>
+            <a:r>
+              <a:rPr lang="en-US" dirty="0"/>
+              <a:t>Don’t make others have to realign around your own changes</a:t>
+            </a:r>
+          </a:p>
+        </p:txBody>
+      </p:sp>
     </p:spTree>
     <p:extLst>
       <p:ext uri="{BB962C8B-B14F-4D97-AF65-F5344CB8AC3E}">
-        <p14:creationId xmlns:p14="http://schemas.microsoft.com/office/powerpoint/2010/main" val="3775200752"/>
+        <p14:creationId xmlns:p14="http://schemas.microsoft.com/office/powerpoint/2010/main" val="467940543"/>
       </p:ext>
     </p:extLst>
   </p:cSld>
@@ -13582,7 +13535,7 @@
           <p:cNvPr id="2" name="Title 1">
             <a:extLst>
               <a:ext uri="{FF2B5EF4-FFF2-40B4-BE49-F238E27FC236}">
-                <a16:creationId xmlns:a16="http://schemas.microsoft.com/office/drawing/2014/main" id="{B778339D-9DD8-4064-9E1B-B79A7D595DE2}"/>
+                <a16:creationId xmlns:a16="http://schemas.microsoft.com/office/drawing/2014/main" id="{460E5E25-300A-4A4D-B1C2-63CB6E978153}"/>
               </a:ext>
             </a:extLst>
           </p:cNvPr>
@@ -13600,86 +13553,50 @@
           <a:p>
             <a:r>
               <a:rPr lang="en-US" dirty="0"/>
-              <a:t>Lab 1 – Interactively rebasing</a:t>
+              <a:t>Rebase golden Rule - Illustrated</a:t>
             </a:r>
           </a:p>
         </p:txBody>
       </p:sp>
-      <p:sp>
-        <p:nvSpPr>
-          <p:cNvPr id="4" name="Content Placeholder 3">
+      <p:pic>
+        <p:nvPicPr>
+          <p:cNvPr id="7" name="Content Placeholder 6">
             <a:extLst>
               <a:ext uri="{FF2B5EF4-FFF2-40B4-BE49-F238E27FC236}">
-                <a16:creationId xmlns:a16="http://schemas.microsoft.com/office/drawing/2014/main" id="{44C1B0C6-BB4E-4D5F-9A1F-04E1F8C0E36F}"/>
+                <a16:creationId xmlns:a16="http://schemas.microsoft.com/office/drawing/2014/main" id="{D02A06AD-E44F-4112-9E5C-28E4F55730ED}"/>
               </a:ext>
             </a:extLst>
           </p:cNvPr>
-          <p:cNvSpPr>
-            <a:spLocks noGrp="1"/>
-          </p:cNvSpPr>
+          <p:cNvPicPr>
+            <a:picLocks noGrp="1" noChangeAspect="1"/>
+          </p:cNvPicPr>
           <p:nvPr>
             <p:ph idx="1"/>
           </p:nvPr>
-        </p:nvSpPr>
-        <p:spPr/>
-        <p:txBody>
-          <a:bodyPr>
-            <a:normAutofit lnSpcReduction="10000"/>
-          </a:bodyPr>
-          <a:lstStyle/>
-          <a:p>
-            <a:r>
-              <a:rPr lang="en-US" dirty="0"/>
-              <a:t>Create a new branch, called lab_1, and change to that branch</a:t>
-            </a:r>
-          </a:p>
-          <a:p>
-            <a:pPr lvl="1"/>
-            <a:r>
-              <a:rPr lang="en-US" dirty="0"/>
-              <a:t>git branch lab_1</a:t>
-            </a:r>
-          </a:p>
-          <a:p>
-            <a:pPr lvl="1"/>
-            <a:r>
-              <a:rPr lang="en-US" dirty="0"/>
-              <a:t>git checkout lab_1</a:t>
-            </a:r>
-          </a:p>
-          <a:p>
-            <a:r>
-              <a:rPr lang="en-US" dirty="0"/>
-              <a:t>Make a minor change, for our example we’re creating a temp file and updating it, and then commit that change with the commit message “commit 1”</a:t>
-            </a:r>
-          </a:p>
-          <a:p>
-            <a:pPr lvl="1"/>
-            <a:r>
-              <a:rPr lang="en-US" dirty="0"/>
-              <a:t>echo “change 1” &gt;&gt; tmp.txt</a:t>
-            </a:r>
-          </a:p>
-          <a:p>
-            <a:pPr lvl="1"/>
-            <a:r>
-              <a:rPr lang="en-US" dirty="0"/>
-              <a:t>git add tmp.txt</a:t>
-            </a:r>
-          </a:p>
-          <a:p>
-            <a:pPr lvl="1"/>
-            <a:r>
-              <a:rPr lang="en-US" dirty="0"/>
-              <a:t>git commit –m “commit 1”</a:t>
-            </a:r>
-          </a:p>
-        </p:txBody>
-      </p:sp>
+        </p:nvPicPr>
+        <p:blipFill>
+          <a:blip r:embed="rId2">
+            <a:extLst>
+              <a:ext uri="{96DAC541-7B7A-43D3-8B79-37D633B846F1}">
+                <asvg:svgBlip xmlns:asvg="http://schemas.microsoft.com/office/drawing/2016/SVG/main" r:embed="rId3"/>
+              </a:ext>
+            </a:extLst>
+          </a:blip>
+          <a:stretch>
+            <a:fillRect/>
+          </a:stretch>
+        </p:blipFill>
+        <p:spPr>
+          <a:xfrm>
+            <a:off x="2689921" y="2150803"/>
+            <a:ext cx="5305935" cy="3541712"/>
+          </a:xfrm>
+        </p:spPr>
+      </p:pic>
     </p:spTree>
     <p:extLst>
       <p:ext uri="{BB962C8B-B14F-4D97-AF65-F5344CB8AC3E}">
-        <p14:creationId xmlns:p14="http://schemas.microsoft.com/office/powerpoint/2010/main" val="3831016955"/>
+        <p14:creationId xmlns:p14="http://schemas.microsoft.com/office/powerpoint/2010/main" val="1022779862"/>
       </p:ext>
     </p:extLst>
   </p:cSld>
@@ -13729,17 +13646,17 @@
           <a:p>
             <a:r>
               <a:rPr lang="en-US" dirty="0"/>
-              <a:t>Lab 1 – Interactively rebasing (Cont.)</a:t>
+              <a:t>Leadup to lab 1</a:t>
             </a:r>
           </a:p>
         </p:txBody>
       </p:sp>
       <p:sp>
         <p:nvSpPr>
-          <p:cNvPr id="4" name="Content Placeholder 3">
+          <p:cNvPr id="3" name="Content Placeholder 2">
             <a:extLst>
               <a:ext uri="{FF2B5EF4-FFF2-40B4-BE49-F238E27FC236}">
-                <a16:creationId xmlns:a16="http://schemas.microsoft.com/office/drawing/2014/main" id="{44C1B0C6-BB4E-4D5F-9A1F-04E1F8C0E36F}"/>
+                <a16:creationId xmlns:a16="http://schemas.microsoft.com/office/drawing/2014/main" id="{6B98D569-D6AD-4D2A-8345-F2929A73D6AF}"/>
               </a:ext>
             </a:extLst>
           </p:cNvPr>
@@ -13759,71 +13676,81 @@
           <a:p>
             <a:r>
               <a:rPr lang="en-US" dirty="0"/>
-              <a:t>Do the same steps we did before, twice more, but incrementing the commit message by one each time (“commit 2”, “commit 3”)</a:t>
+              <a:t>Rebase not only helps keep a clean tree, it can reduce clutter</a:t>
             </a:r>
           </a:p>
           <a:p>
             <a:pPr lvl="1"/>
             <a:r>
               <a:rPr lang="en-US" dirty="0"/>
-              <a:t>echo “</a:t>
-            </a:r>
-            <a:r>
-              <a:rPr lang="en-US" dirty="0" err="1"/>
-              <a:t>tmp</a:t>
-            </a:r>
-            <a:r>
-              <a:rPr lang="en-US" dirty="0"/>
-              <a:t>” &gt;&gt; tmp.txt</a:t>
+              <a:t>Maintaining clean commit histories can be challenging</a:t>
             </a:r>
           </a:p>
           <a:p>
             <a:pPr lvl="1"/>
             <a:r>
               <a:rPr lang="en-US" dirty="0"/>
-              <a:t>git add tmp.txt</a:t>
+              <a:t>Consolidating commit messages and removing unnecessary commits</a:t>
             </a:r>
           </a:p>
           <a:p>
             <a:pPr lvl="1"/>
             <a:r>
               <a:rPr lang="en-US" dirty="0"/>
-              <a:t>git commit –m “commit #”</a:t>
-            </a:r>
-          </a:p>
-          <a:p>
-            <a:r>
-              <a:rPr lang="en-US" dirty="0"/>
-              <a:t>Once finished, confirm that all commits and changes are in place and no files are pending commit (this prevents a rebase from occurring)</a:t>
+              <a:t>Alter history itself! (You can do some weird stuff with rebase!)</a:t>
+            </a:r>
+          </a:p>
+          <a:p>
+            <a:r>
+              <a:rPr lang="en-US" dirty="0"/>
+              <a:t>Important rebase terms:</a:t>
             </a:r>
           </a:p>
           <a:p>
             <a:pPr lvl="1"/>
             <a:r>
               <a:rPr lang="en-US" dirty="0"/>
-              <a:t>cat tmp.txt</a:t>
+              <a:t>Pick</a:t>
             </a:r>
           </a:p>
           <a:p>
             <a:pPr lvl="1"/>
             <a:r>
               <a:rPr lang="en-US" dirty="0"/>
-              <a:t>git status</a:t>
+              <a:t>Squash</a:t>
             </a:r>
           </a:p>
           <a:p>
             <a:pPr lvl="1"/>
             <a:r>
               <a:rPr lang="en-US" dirty="0"/>
-              <a:t>git log</a:t>
-            </a:r>
+              <a:t>Edit</a:t>
+            </a:r>
+          </a:p>
+          <a:p>
+            <a:pPr lvl="1"/>
+            <a:r>
+              <a:rPr lang="en-US" dirty="0"/>
+              <a:t>Reword</a:t>
+            </a:r>
+          </a:p>
+          <a:p>
+            <a:pPr lvl="1"/>
+            <a:r>
+              <a:rPr lang="en-US" dirty="0"/>
+              <a:t>Drop</a:t>
+            </a:r>
+          </a:p>
+          <a:p>
+            <a:pPr lvl="1"/>
+            <a:endParaRPr lang="en-US" dirty="0"/>
           </a:p>
         </p:txBody>
       </p:sp>
     </p:spTree>
     <p:extLst>
       <p:ext uri="{BB962C8B-B14F-4D97-AF65-F5344CB8AC3E}">
-        <p14:creationId xmlns:p14="http://schemas.microsoft.com/office/powerpoint/2010/main" val="3059681544"/>
+        <p14:creationId xmlns:p14="http://schemas.microsoft.com/office/powerpoint/2010/main" val="2070696651"/>
       </p:ext>
     </p:extLst>
   </p:cSld>
@@ -13873,96 +13800,50 @@
           <a:p>
             <a:r>
               <a:rPr lang="en-US" dirty="0"/>
-              <a:t>Lab 1 – Interactively rebasing (Cont.)</a:t>
+              <a:t>Lab 1 – Interactively rebasing</a:t>
             </a:r>
           </a:p>
         </p:txBody>
       </p:sp>
-      <p:sp>
-        <p:nvSpPr>
-          <p:cNvPr id="4" name="Content Placeholder 3">
+      <p:pic>
+        <p:nvPicPr>
+          <p:cNvPr id="5" name="Content Placeholder 4">
             <a:extLst>
               <a:ext uri="{FF2B5EF4-FFF2-40B4-BE49-F238E27FC236}">
-                <a16:creationId xmlns:a16="http://schemas.microsoft.com/office/drawing/2014/main" id="{44C1B0C6-BB4E-4D5F-9A1F-04E1F8C0E36F}"/>
+                <a16:creationId xmlns:a16="http://schemas.microsoft.com/office/drawing/2014/main" id="{203F82D0-49C5-4317-9751-818DC1662131}"/>
               </a:ext>
             </a:extLst>
           </p:cNvPr>
-          <p:cNvSpPr>
-            <a:spLocks noGrp="1"/>
-          </p:cNvSpPr>
+          <p:cNvPicPr>
+            <a:picLocks noGrp="1" noChangeAspect="1"/>
+          </p:cNvPicPr>
           <p:nvPr>
             <p:ph idx="1"/>
           </p:nvPr>
-        </p:nvSpPr>
-        <p:spPr/>
-        <p:txBody>
-          <a:bodyPr>
-            <a:normAutofit/>
-          </a:bodyPr>
-          <a:lstStyle/>
-          <a:p>
-            <a:r>
-              <a:rPr lang="en-US" dirty="0"/>
-              <a:t>We’re now ready to interactively rebase and clean up our commit history</a:t>
-            </a:r>
-          </a:p>
-          <a:p>
-            <a:pPr lvl="1"/>
-            <a:r>
-              <a:rPr lang="en-US" dirty="0"/>
-              <a:t>git rebase –</a:t>
-            </a:r>
-            <a:r>
-              <a:rPr lang="en-US" dirty="0" err="1"/>
-              <a:t>i</a:t>
-            </a:r>
-            <a:r>
-              <a:rPr lang="en-US" dirty="0"/>
-              <a:t> HEAD~3</a:t>
-            </a:r>
-          </a:p>
-          <a:p>
-            <a:pPr lvl="1"/>
-            <a:r>
-              <a:rPr lang="en-US" dirty="0"/>
-              <a:t>Squash commits 2 and 3 in the editor</a:t>
-            </a:r>
-          </a:p>
-          <a:p>
-            <a:pPr lvl="1"/>
-            <a:r>
-              <a:rPr lang="en-US" dirty="0"/>
-              <a:t>Clean up the final commit message to now say “commit 1 with changes 1, 2, and 3”</a:t>
-            </a:r>
-          </a:p>
-          <a:p>
-            <a:pPr lvl="1"/>
-            <a:r>
-              <a:rPr lang="en-US" dirty="0"/>
-              <a:t>git log</a:t>
-            </a:r>
-          </a:p>
-          <a:p>
-            <a:r>
-              <a:rPr lang="en-US" dirty="0"/>
-              <a:t>We now have a cleaner </a:t>
-            </a:r>
-            <a:r>
-              <a:rPr lang="en-US"/>
-              <a:t>git history</a:t>
-            </a:r>
-            <a:endParaRPr lang="en-US" dirty="0"/>
-          </a:p>
-          <a:p>
-            <a:pPr lvl="1"/>
-            <a:endParaRPr lang="en-US" dirty="0"/>
-          </a:p>
-        </p:txBody>
-      </p:sp>
+        </p:nvPicPr>
+        <p:blipFill>
+          <a:blip r:embed="rId2">
+            <a:extLst>
+              <a:ext uri="{96DAC541-7B7A-43D3-8B79-37D633B846F1}">
+                <asvg:svgBlip xmlns:asvg="http://schemas.microsoft.com/office/drawing/2016/SVG/main" r:embed="rId3"/>
+              </a:ext>
+            </a:extLst>
+          </a:blip>
+          <a:stretch>
+            <a:fillRect/>
+          </a:stretch>
+        </p:blipFill>
+        <p:spPr>
+          <a:xfrm>
+            <a:off x="3001215" y="2249488"/>
+            <a:ext cx="6186396" cy="3541712"/>
+          </a:xfrm>
+        </p:spPr>
+      </p:pic>
     </p:spTree>
     <p:extLst>
       <p:ext uri="{BB962C8B-B14F-4D97-AF65-F5344CB8AC3E}">
-        <p14:creationId xmlns:p14="http://schemas.microsoft.com/office/powerpoint/2010/main" val="3748549130"/>
+        <p14:creationId xmlns:p14="http://schemas.microsoft.com/office/powerpoint/2010/main" val="2033759713"/>
       </p:ext>
     </p:extLst>
   </p:cSld>
@@ -13994,7 +13875,7 @@
           <p:cNvPr id="2" name="Title 1">
             <a:extLst>
               <a:ext uri="{FF2B5EF4-FFF2-40B4-BE49-F238E27FC236}">
-                <a16:creationId xmlns:a16="http://schemas.microsoft.com/office/drawing/2014/main" id="{AFEBA3CF-34A3-4670-84E6-3C2BD41D1880}"/>
+                <a16:creationId xmlns:a16="http://schemas.microsoft.com/office/drawing/2014/main" id="{B778339D-9DD8-4064-9E1B-B79A7D595DE2}"/>
               </a:ext>
             </a:extLst>
           </p:cNvPr>
@@ -14012,100 +13893,50 @@
           <a:p>
             <a:r>
               <a:rPr lang="en-US" dirty="0"/>
-              <a:t>Tags</a:t>
+              <a:t>Lab 1 – Interactively rebasing</a:t>
             </a:r>
           </a:p>
         </p:txBody>
       </p:sp>
-      <p:sp>
-        <p:nvSpPr>
-          <p:cNvPr id="3" name="Content Placeholder 2">
+      <p:pic>
+        <p:nvPicPr>
+          <p:cNvPr id="7" name="Content Placeholder 6">
             <a:extLst>
               <a:ext uri="{FF2B5EF4-FFF2-40B4-BE49-F238E27FC236}">
-                <a16:creationId xmlns:a16="http://schemas.microsoft.com/office/drawing/2014/main" id="{7C091F4E-8775-4439-AF13-33C4DAD6ECF3}"/>
+                <a16:creationId xmlns:a16="http://schemas.microsoft.com/office/drawing/2014/main" id="{CE0FD989-86EC-492A-B5F7-6D37E3C1FFE9}"/>
               </a:ext>
             </a:extLst>
           </p:cNvPr>
-          <p:cNvSpPr>
-            <a:spLocks noGrp="1"/>
-          </p:cNvSpPr>
+          <p:cNvPicPr>
+            <a:picLocks noGrp="1" noChangeAspect="1"/>
+          </p:cNvPicPr>
           <p:nvPr>
             <p:ph idx="1"/>
           </p:nvPr>
-        </p:nvSpPr>
-        <p:spPr/>
-        <p:txBody>
-          <a:bodyPr/>
-          <a:lstStyle/>
-          <a:p>
-            <a:r>
-              <a:rPr lang="en-US" dirty="0"/>
-              <a:t>Tags are used to indicate a significant milestone in the branch history</a:t>
-            </a:r>
-          </a:p>
-          <a:p>
-            <a:pPr lvl="1"/>
-            <a:r>
-              <a:rPr lang="en-US" dirty="0"/>
-              <a:t>These are usually indicative of a version release</a:t>
-            </a:r>
-          </a:p>
-          <a:p>
-            <a:pPr lvl="1"/>
-            <a:r>
-              <a:rPr lang="en-US" dirty="0"/>
-              <a:t>Unlike branches, after a tag is created it has no further history</a:t>
-            </a:r>
-          </a:p>
-          <a:p>
-            <a:pPr lvl="1"/>
-            <a:r>
-              <a:rPr lang="en-US" dirty="0"/>
-              <a:t>Tags provide a static reference a specific point your git tree history</a:t>
-            </a:r>
-          </a:p>
-          <a:p>
-            <a:r>
-              <a:rPr lang="en-US" dirty="0"/>
-              <a:t>Usage</a:t>
-            </a:r>
-          </a:p>
-          <a:p>
-            <a:pPr lvl="1"/>
-            <a:r>
-              <a:rPr lang="en-US" dirty="0"/>
-              <a:t>git tag &lt;</a:t>
-            </a:r>
-            <a:r>
-              <a:rPr lang="en-US" dirty="0" err="1"/>
-              <a:t>tagname</a:t>
-            </a:r>
-            <a:r>
-              <a:rPr lang="en-US" dirty="0"/>
-              <a:t>&gt; - Creates a tag of &lt;</a:t>
-            </a:r>
-            <a:r>
-              <a:rPr lang="en-US" dirty="0" err="1"/>
-              <a:t>tagname</a:t>
-            </a:r>
-            <a:r>
-              <a:rPr lang="en-US" dirty="0"/>
-              <a:t>&gt;</a:t>
-            </a:r>
-          </a:p>
-          <a:p>
-            <a:pPr lvl="1"/>
-            <a:r>
-              <a:rPr lang="en-US" dirty="0"/>
-              <a:t>git tag – Lists all tags in the branch history</a:t>
-            </a:r>
-          </a:p>
-        </p:txBody>
-      </p:sp>
+        </p:nvPicPr>
+        <p:blipFill>
+          <a:blip r:embed="rId2">
+            <a:extLst>
+              <a:ext uri="{96DAC541-7B7A-43D3-8B79-37D633B846F1}">
+                <asvg:svgBlip xmlns:asvg="http://schemas.microsoft.com/office/drawing/2016/SVG/main" r:embed="rId3"/>
+              </a:ext>
+            </a:extLst>
+          </a:blip>
+          <a:stretch>
+            <a:fillRect/>
+          </a:stretch>
+        </p:blipFill>
+        <p:spPr>
+          <a:xfrm>
+            <a:off x="3768165" y="2249488"/>
+            <a:ext cx="4652495" cy="3541712"/>
+          </a:xfrm>
+        </p:spPr>
+      </p:pic>
     </p:spTree>
     <p:extLst>
       <p:ext uri="{BB962C8B-B14F-4D97-AF65-F5344CB8AC3E}">
-        <p14:creationId xmlns:p14="http://schemas.microsoft.com/office/powerpoint/2010/main" val="3241581009"/>
+        <p14:creationId xmlns:p14="http://schemas.microsoft.com/office/powerpoint/2010/main" val="3775200752"/>
       </p:ext>
     </p:extLst>
   </p:cSld>
@@ -14137,7 +13968,7 @@
           <p:cNvPr id="2" name="Title 1">
             <a:extLst>
               <a:ext uri="{FF2B5EF4-FFF2-40B4-BE49-F238E27FC236}">
-                <a16:creationId xmlns:a16="http://schemas.microsoft.com/office/drawing/2014/main" id="{9567AAA9-572C-40F8-B61C-976244117C46}"/>
+                <a16:creationId xmlns:a16="http://schemas.microsoft.com/office/drawing/2014/main" id="{B778339D-9DD8-4064-9E1B-B79A7D595DE2}"/>
               </a:ext>
             </a:extLst>
           </p:cNvPr>
@@ -14155,25 +13986,17 @@
           <a:p>
             <a:r>
               <a:rPr lang="en-US" dirty="0"/>
-              <a:t>Advanced </a:t>
-            </a:r>
-            <a:r>
-              <a:rPr lang="en-US" dirty="0" err="1"/>
-              <a:t>Github</a:t>
-            </a:r>
-            <a:r>
-              <a:rPr lang="en-US" dirty="0"/>
-              <a:t> Features</a:t>
+              <a:t>Lab 1 – Interactively rebasing</a:t>
             </a:r>
           </a:p>
         </p:txBody>
       </p:sp>
       <p:sp>
         <p:nvSpPr>
-          <p:cNvPr id="3" name="Content Placeholder 2">
+          <p:cNvPr id="4" name="Content Placeholder 3">
             <a:extLst>
               <a:ext uri="{FF2B5EF4-FFF2-40B4-BE49-F238E27FC236}">
-                <a16:creationId xmlns:a16="http://schemas.microsoft.com/office/drawing/2014/main" id="{8FE9A726-545E-4DFA-B6C1-C177C8A98F34}"/>
+                <a16:creationId xmlns:a16="http://schemas.microsoft.com/office/drawing/2014/main" id="{44C1B0C6-BB4E-4D5F-9A1F-04E1F8C0E36F}"/>
               </a:ext>
             </a:extLst>
           </p:cNvPr>
@@ -14186,60 +14009,63 @@
         </p:nvSpPr>
         <p:spPr/>
         <p:txBody>
-          <a:bodyPr/>
+          <a:bodyPr>
+            <a:normAutofit lnSpcReduction="10000"/>
+          </a:bodyPr>
           <a:lstStyle/>
           <a:p>
             <a:r>
               <a:rPr lang="en-US" dirty="0"/>
-              <a:t>Enough with non-</a:t>
-            </a:r>
-            <a:r>
-              <a:rPr lang="en-US" dirty="0" err="1"/>
-              <a:t>github</a:t>
-            </a:r>
-            <a:r>
-              <a:rPr lang="en-US" dirty="0"/>
-              <a:t> stuff, we git it! (Get it?)</a:t>
+              <a:t>Create a new branch, called lab_1, and change to that branch</a:t>
             </a:r>
           </a:p>
           <a:p>
             <a:pPr lvl="1"/>
             <a:r>
               <a:rPr lang="en-US" dirty="0"/>
-              <a:t>Actions and Workflows to build a CI/CD Pipeline</a:t>
+              <a:t>git branch lab_1</a:t>
             </a:r>
           </a:p>
           <a:p>
             <a:pPr lvl="1"/>
             <a:r>
               <a:rPr lang="en-US" dirty="0"/>
-              <a:t>Secrets and how to use them</a:t>
+              <a:t>git checkout lab_1</a:t>
+            </a:r>
+          </a:p>
+          <a:p>
+            <a:r>
+              <a:rPr lang="en-US" dirty="0"/>
+              <a:t>Make a minor change, for our example we’re creating a temp file and updating it, and then commit that change with the commit message “commit 1”</a:t>
             </a:r>
           </a:p>
           <a:p>
             <a:pPr lvl="1"/>
             <a:r>
               <a:rPr lang="en-US" dirty="0"/>
-              <a:t>Pull Request Management</a:t>
+              <a:t>echo “change 1” &gt;&gt; tmp.txt</a:t>
             </a:r>
           </a:p>
           <a:p>
             <a:pPr lvl="1"/>
             <a:r>
               <a:rPr lang="en-US" dirty="0"/>
-              <a:t>Issue Tracking and Projects</a:t>
+              <a:t>git add tmp.txt</a:t>
             </a:r>
           </a:p>
           <a:p>
             <a:pPr lvl="1"/>
-            <a:endParaRPr lang="en-US" dirty="0"/>
+            <a:r>
+              <a:rPr lang="en-US" dirty="0"/>
+              <a:t>git commit –m “commit 1”</a:t>
+            </a:r>
           </a:p>
         </p:txBody>
       </p:sp>
     </p:spTree>
     <p:extLst>
       <p:ext uri="{BB962C8B-B14F-4D97-AF65-F5344CB8AC3E}">
-        <p14:creationId xmlns:p14="http://schemas.microsoft.com/office/powerpoint/2010/main" val="2879512403"/>
+        <p14:creationId xmlns:p14="http://schemas.microsoft.com/office/powerpoint/2010/main" val="3831016955"/>
       </p:ext>
     </p:extLst>
   </p:cSld>
@@ -14271,7 +14097,7 @@
           <p:cNvPr id="2" name="Title 1">
             <a:extLst>
               <a:ext uri="{FF2B5EF4-FFF2-40B4-BE49-F238E27FC236}">
-                <a16:creationId xmlns:a16="http://schemas.microsoft.com/office/drawing/2014/main" id="{B2A7DB65-2734-4ADA-ADC9-73E420BCBF7B}"/>
+                <a16:creationId xmlns:a16="http://schemas.microsoft.com/office/drawing/2014/main" id="{B778339D-9DD8-4064-9E1B-B79A7D595DE2}"/>
               </a:ext>
             </a:extLst>
           </p:cNvPr>
@@ -14289,17 +14115,17 @@
           <a:p>
             <a:r>
               <a:rPr lang="en-US" dirty="0"/>
-              <a:t>Secrets and Workflows</a:t>
+              <a:t>Lab 1 – Interactively rebasing (Cont.)</a:t>
             </a:r>
           </a:p>
         </p:txBody>
       </p:sp>
       <p:sp>
         <p:nvSpPr>
-          <p:cNvPr id="3" name="Content Placeholder 2">
+          <p:cNvPr id="4" name="Content Placeholder 3">
             <a:extLst>
               <a:ext uri="{FF2B5EF4-FFF2-40B4-BE49-F238E27FC236}">
-                <a16:creationId xmlns:a16="http://schemas.microsoft.com/office/drawing/2014/main" id="{982C56AF-899F-4FD6-A398-653EC93AEA2A}"/>
+                <a16:creationId xmlns:a16="http://schemas.microsoft.com/office/drawing/2014/main" id="{44C1B0C6-BB4E-4D5F-9A1F-04E1F8C0E36F}"/>
               </a:ext>
             </a:extLst>
           </p:cNvPr>
@@ -14313,68 +14139,61 @@
         <p:spPr/>
         <p:txBody>
           <a:bodyPr>
-            <a:normAutofit fontScale="92500" lnSpcReduction="20000"/>
+            <a:normAutofit fontScale="85000" lnSpcReduction="20000"/>
           </a:bodyPr>
           <a:lstStyle/>
           <a:p>
             <a:r>
               <a:rPr lang="en-US" dirty="0"/>
-              <a:t>Secrets are important pieces of information that you want to remain hidden</a:t>
+              <a:t>Do the same steps we did before, twice more, but incrementing the commit message by one each time (“commit 2”, “commit 3”)</a:t>
             </a:r>
           </a:p>
           <a:p>
             <a:pPr lvl="1"/>
             <a:r>
               <a:rPr lang="en-US" dirty="0"/>
-              <a:t>This is likely to be username and passwords for services that your workflow may use</a:t>
+              <a:t>echo “change #” &gt;&gt; tmp.txt</a:t>
             </a:r>
           </a:p>
           <a:p>
             <a:pPr lvl="1"/>
             <a:r>
               <a:rPr lang="en-US" dirty="0"/>
-              <a:t>Secrets are essentially hidden environment variables</a:t>
-            </a:r>
-          </a:p>
-          <a:p>
-            <a:r>
-              <a:rPr lang="en-US" dirty="0"/>
-              <a:t>Workflows can be whatever you need them to be</a:t>
+              <a:t>git add tmp.txt</a:t>
             </a:r>
           </a:p>
           <a:p>
             <a:pPr lvl="1"/>
             <a:r>
               <a:rPr lang="en-US" dirty="0"/>
-              <a:t>This could be a CI/CD (Continuous Integration / Continuous Deployment) Pipeline</a:t>
+              <a:t>git commit –m “commit #”</a:t>
+            </a:r>
+          </a:p>
+          <a:p>
+            <a:r>
+              <a:rPr lang="en-US" dirty="0"/>
+              <a:t>Once finished, confirm that all commits and changes are in place and no files are pending commit (this prevents a rebase from occurring)</a:t>
             </a:r>
           </a:p>
           <a:p>
             <a:pPr lvl="1"/>
             <a:r>
               <a:rPr lang="en-US" dirty="0"/>
-              <a:t>Automatically tag specific branches as they come in</a:t>
+              <a:t>cat tmp.txt</a:t>
             </a:r>
           </a:p>
           <a:p>
             <a:pPr lvl="1"/>
             <a:r>
               <a:rPr lang="en-US" dirty="0"/>
-              <a:t>Immediately raise new issues when found</a:t>
+              <a:t>git status</a:t>
             </a:r>
           </a:p>
           <a:p>
             <a:pPr lvl="1"/>
             <a:r>
               <a:rPr lang="en-US" dirty="0"/>
-              <a:t>FTP files to a specific destination upon merge</a:t>
-            </a:r>
-          </a:p>
-          <a:p>
-            <a:pPr lvl="1"/>
-            <a:r>
-              <a:rPr lang="en-US" dirty="0"/>
-              <a:t>Countless other scenarios…</a:t>
+              <a:t>git log</a:t>
             </a:r>
           </a:p>
         </p:txBody>
@@ -14382,7 +14201,7 @@
     </p:spTree>
     <p:extLst>
       <p:ext uri="{BB962C8B-B14F-4D97-AF65-F5344CB8AC3E}">
-        <p14:creationId xmlns:p14="http://schemas.microsoft.com/office/powerpoint/2010/main" val="2339013658"/>
+        <p14:creationId xmlns:p14="http://schemas.microsoft.com/office/powerpoint/2010/main" val="3059681544"/>
       </p:ext>
     </p:extLst>
   </p:cSld>
@@ -14425,22 +14244,55 @@
             <p:ph type="title"/>
           </p:nvPr>
         </p:nvSpPr>
-        <p:spPr/>
+        <p:spPr>
+          <a:xfrm>
+            <a:off x="1146705" y="609601"/>
+            <a:ext cx="3856037" cy="1639884"/>
+          </a:xfrm>
+        </p:spPr>
         <p:txBody>
-          <a:bodyPr>
+          <a:bodyPr anchor="b">
             <a:normAutofit/>
           </a:bodyPr>
           <a:lstStyle/>
           <a:p>
             <a:r>
-              <a:rPr lang="en-US" sz="4400" dirty="0">
-                <a:latin typeface="Rockwell" panose="02060603020205020403" pitchFamily="18" charset="0"/>
-              </a:rPr>
+              <a:rPr lang="en-US"/>
               <a:t>Initial resources and Introductions</a:t>
             </a:r>
           </a:p>
         </p:txBody>
       </p:sp>
+      <p:pic>
+        <p:nvPicPr>
+          <p:cNvPr id="5" name="Picture 4">
+            <a:extLst>
+              <a:ext uri="{FF2B5EF4-FFF2-40B4-BE49-F238E27FC236}">
+                <a16:creationId xmlns:a16="http://schemas.microsoft.com/office/drawing/2014/main" id="{4DE7DAFC-00DA-4C23-BE73-0FBAB7B018A4}"/>
+              </a:ext>
+            </a:extLst>
+          </p:cNvPr>
+          <p:cNvPicPr>
+            <a:picLocks noChangeAspect="1"/>
+          </p:cNvPicPr>
+          <p:nvPr/>
+        </p:nvPicPr>
+        <p:blipFill rotWithShape="1">
+          <a:blip r:embed="rId2"/>
+          <a:srcRect r="-2" b="33817"/>
+          <a:stretch/>
+        </p:blipFill>
+        <p:spPr>
+          <a:xfrm>
+            <a:off x="6535737" y="1341414"/>
+            <a:ext cx="4509558" cy="3979334"/>
+          </a:xfrm>
+          <a:prstGeom prst="rect">
+            <a:avLst/>
+          </a:prstGeom>
+          <a:noFill/>
+        </p:spPr>
+      </p:pic>
       <p:sp>
         <p:nvSpPr>
           <p:cNvPr id="3" name="Content Placeholder 2">
@@ -14454,27 +14306,24 @@
             <a:spLocks noGrp="1"/>
           </p:cNvSpPr>
           <p:nvPr>
-            <p:ph idx="1"/>
+            <p:ph type="body" sz="half" idx="2"/>
           </p:nvPr>
         </p:nvSpPr>
         <p:spPr>
           <a:xfrm>
-            <a:off x="1141412" y="2249487"/>
-            <a:ext cx="9905999" cy="4126146"/>
+            <a:off x="1146705" y="2249485"/>
+            <a:ext cx="5077306" cy="3541714"/>
           </a:xfrm>
         </p:spPr>
         <p:txBody>
           <a:bodyPr>
-            <a:normAutofit fontScale="92500" lnSpcReduction="10000"/>
+            <a:normAutofit/>
           </a:bodyPr>
           <a:lstStyle/>
           <a:p>
             <a:r>
               <a:rPr lang="en-US" dirty="0">
-                <a:latin typeface="Tahoma" panose="020B0604030504040204" pitchFamily="34" charset="0"/>
-                <a:ea typeface="Tahoma" panose="020B0604030504040204" pitchFamily="34" charset="0"/>
-                <a:cs typeface="Tahoma" panose="020B0604030504040204" pitchFamily="34" charset="0"/>
-                <a:hlinkClick r:id="rId2">
+                <a:hlinkClick r:id="rId3">
                   <a:extLst>
                     <a:ext uri="{A12FA001-AC4F-418D-AE19-62706E023703}">
                       <ahyp:hlinkClr xmlns:ahyp="http://schemas.microsoft.com/office/drawing/2018/hyperlinkcolor" val="tx"/>
@@ -14482,24 +14331,40 @@
                   </a:extLst>
                 </a:hlinkClick>
               </a:rPr>
-              <a:t>https://github.zach-martin.com/advanced.html</a:t>
-            </a:r>
-            <a:endParaRPr lang="en-US" dirty="0">
-              <a:latin typeface="Tahoma" panose="020B0604030504040204" pitchFamily="34" charset="0"/>
-              <a:ea typeface="Tahoma" panose="020B0604030504040204" pitchFamily="34" charset="0"/>
-              <a:cs typeface="Tahoma" panose="020B0604030504040204" pitchFamily="34" charset="0"/>
-            </a:endParaRPr>
+              <a:t>https://</a:t>
+            </a:r>
+            <a:r>
+              <a:rPr lang="en-US" dirty="0" err="1">
+                <a:hlinkClick r:id="rId3">
+                  <a:extLst>
+                    <a:ext uri="{A12FA001-AC4F-418D-AE19-62706E023703}">
+                      <ahyp:hlinkClr xmlns:ahyp="http://schemas.microsoft.com/office/drawing/2018/hyperlinkcolor" val="tx"/>
+                    </a:ext>
+                  </a:extLst>
+                </a:hlinkClick>
+              </a:rPr>
+              <a:t>github.zach-martin.com</a:t>
+            </a:r>
+            <a:r>
+              <a:rPr lang="en-US" dirty="0">
+                <a:hlinkClick r:id="rId3">
+                  <a:extLst>
+                    <a:ext uri="{A12FA001-AC4F-418D-AE19-62706E023703}">
+                      <ahyp:hlinkClr xmlns:ahyp="http://schemas.microsoft.com/office/drawing/2018/hyperlinkcolor" val="tx"/>
+                    </a:ext>
+                  </a:extLst>
+                </a:hlinkClick>
+              </a:rPr>
+              <a:t>/advanced.html</a:t>
+            </a:r>
+            <a:endParaRPr lang="en-US" dirty="0"/>
           </a:p>
           <a:p>
             <a:pPr marL="0" indent="0">
               <a:buNone/>
             </a:pPr>
             <a:r>
-              <a:rPr lang="en-US" dirty="0">
-                <a:latin typeface="Tahoma" panose="020B0604030504040204" pitchFamily="34" charset="0"/>
-                <a:ea typeface="Tahoma" panose="020B0604030504040204" pitchFamily="34" charset="0"/>
-                <a:cs typeface="Tahoma" panose="020B0604030504040204" pitchFamily="34" charset="0"/>
-              </a:rPr>
+              <a:rPr lang="en-US" dirty="0"/>
               <a:t>A quick introduction –</a:t>
             </a:r>
           </a:p>
@@ -14508,91 +14373,38 @@
               <a:buNone/>
             </a:pPr>
             <a:r>
-              <a:rPr lang="en-US" dirty="0">
-                <a:latin typeface="Tahoma" panose="020B0604030504040204" pitchFamily="34" charset="0"/>
-                <a:ea typeface="Tahoma" panose="020B0604030504040204" pitchFamily="34" charset="0"/>
-                <a:cs typeface="Tahoma" panose="020B0604030504040204" pitchFamily="34" charset="0"/>
-              </a:rPr>
+              <a:rPr lang="en-US" dirty="0"/>
               <a:t>    Zach Martin</a:t>
             </a:r>
           </a:p>
           <a:p>
-            <a:pPr lvl="1"/>
-            <a:r>
-              <a:rPr lang="en-US" dirty="0">
-                <a:latin typeface="Tahoma" panose="020B0604030504040204" pitchFamily="34" charset="0"/>
-                <a:ea typeface="Tahoma" panose="020B0604030504040204" pitchFamily="34" charset="0"/>
-                <a:cs typeface="Tahoma" panose="020B0604030504040204" pitchFamily="34" charset="0"/>
-              </a:rPr>
-              <a:t>14 years IT experience</a:t>
-            </a:r>
-          </a:p>
-          <a:p>
-            <a:pPr lvl="1"/>
-            <a:r>
-              <a:rPr lang="en-US" dirty="0">
-                <a:latin typeface="Tahoma" panose="020B0604030504040204" pitchFamily="34" charset="0"/>
-                <a:ea typeface="Tahoma" panose="020B0604030504040204" pitchFamily="34" charset="0"/>
-                <a:cs typeface="Tahoma" panose="020B0604030504040204" pitchFamily="34" charset="0"/>
-              </a:rPr>
-              <a:t>4 years professional software development experience</a:t>
-            </a:r>
-          </a:p>
-          <a:p>
-            <a:pPr lvl="1"/>
-            <a:r>
-              <a:rPr lang="en-US" dirty="0">
-                <a:latin typeface="Tahoma" panose="020B0604030504040204" pitchFamily="34" charset="0"/>
-                <a:ea typeface="Tahoma" panose="020B0604030504040204" pitchFamily="34" charset="0"/>
-                <a:cs typeface="Tahoma" panose="020B0604030504040204" pitchFamily="34" charset="0"/>
-              </a:rPr>
-              <a:t>Father to a seven-month-old baby girl</a:t>
-            </a:r>
-          </a:p>
-          <a:p>
-            <a:pPr marL="457200" lvl="1" indent="0">
-              <a:buNone/>
+            <a:pPr marL="742950" lvl="1" indent="-285750">
+              <a:buFont typeface="Arial" panose="020B0604020202020204" pitchFamily="34" charset="0"/>
+              <a:buChar char="•"/>
             </a:pPr>
             <a:r>
-              <a:rPr lang="en-US" dirty="0">
-                <a:latin typeface="Tahoma" panose="020B0604030504040204" pitchFamily="34" charset="0"/>
-                <a:ea typeface="Tahoma" panose="020B0604030504040204" pitchFamily="34" charset="0"/>
-                <a:cs typeface="Tahoma" panose="020B0604030504040204" pitchFamily="34" charset="0"/>
-              </a:rPr>
-              <a:t>Chris Daniels</a:t>
-            </a:r>
-          </a:p>
-          <a:p>
-            <a:pPr lvl="1"/>
-            <a:r>
-              <a:rPr lang="en-US" dirty="0">
-                <a:latin typeface="Tahoma" panose="020B0604030504040204" pitchFamily="34" charset="0"/>
-                <a:ea typeface="Tahoma" panose="020B0604030504040204" pitchFamily="34" charset="0"/>
-                <a:cs typeface="Tahoma" panose="020B0604030504040204" pitchFamily="34" charset="0"/>
-              </a:rPr>
-              <a:t>Heads up the 1819 Initiative at UC</a:t>
-            </a:r>
-          </a:p>
-          <a:p>
-            <a:pPr lvl="1"/>
-            <a:r>
-              <a:rPr lang="en-US" dirty="0">
-                <a:latin typeface="Tahoma" panose="020B0604030504040204" pitchFamily="34" charset="0"/>
-                <a:ea typeface="Tahoma" panose="020B0604030504040204" pitchFamily="34" charset="0"/>
-                <a:cs typeface="Tahoma" panose="020B0604030504040204" pitchFamily="34" charset="0"/>
-              </a:rPr>
-              <a:t>7 years professional software development experience</a:t>
-            </a:r>
-          </a:p>
-          <a:p>
-            <a:pPr lvl="1"/>
-            <a:r>
-              <a:rPr lang="en-US" dirty="0">
-                <a:latin typeface="Tahoma" panose="020B0604030504040204" pitchFamily="34" charset="0"/>
-                <a:ea typeface="Tahoma" panose="020B0604030504040204" pitchFamily="34" charset="0"/>
-                <a:cs typeface="Tahoma" panose="020B0604030504040204" pitchFamily="34" charset="0"/>
-              </a:rPr>
-              <a:t>Father to a five-month-old baby boy</a:t>
+              <a:rPr lang="en-US" sz="1600" dirty="0"/>
+              <a:t>17 years IT experience</a:t>
+            </a:r>
+          </a:p>
+          <a:p>
+            <a:pPr marL="742950" lvl="1" indent="-285750">
+              <a:buFont typeface="Arial" panose="020B0604020202020204" pitchFamily="34" charset="0"/>
+              <a:buChar char="•"/>
+            </a:pPr>
+            <a:r>
+              <a:rPr lang="en-US" sz="1600" dirty="0"/>
+              <a:t>5 years professional software development experience</a:t>
+            </a:r>
+          </a:p>
+          <a:p>
+            <a:pPr marL="742950" lvl="1" indent="-285750">
+              <a:buFont typeface="Arial" panose="020B0604020202020204" pitchFamily="34" charset="0"/>
+              <a:buChar char="•"/>
+            </a:pPr>
+            <a:r>
+              <a:rPr lang="en-US" sz="1600" dirty="0"/>
+              <a:t>Father to a nineteen-month-old baby girl</a:t>
             </a:r>
           </a:p>
         </p:txBody>
@@ -14600,7 +14412,7 @@
     </p:spTree>
     <p:extLst>
       <p:ext uri="{BB962C8B-B14F-4D97-AF65-F5344CB8AC3E}">
-        <p14:creationId xmlns:p14="http://schemas.microsoft.com/office/powerpoint/2010/main" val="2172179498"/>
+        <p14:creationId xmlns:p14="http://schemas.microsoft.com/office/powerpoint/2010/main" val="322402964"/>
       </p:ext>
     </p:extLst>
   </p:cSld>
@@ -14632,7 +14444,7 @@
           <p:cNvPr id="2" name="Title 1">
             <a:extLst>
               <a:ext uri="{FF2B5EF4-FFF2-40B4-BE49-F238E27FC236}">
-                <a16:creationId xmlns:a16="http://schemas.microsoft.com/office/drawing/2014/main" id="{6B8CBCE7-19D5-47BD-BBA8-267CA594559F}"/>
+                <a16:creationId xmlns:a16="http://schemas.microsoft.com/office/drawing/2014/main" id="{B778339D-9DD8-4064-9E1B-B79A7D595DE2}"/>
               </a:ext>
             </a:extLst>
           </p:cNvPr>
@@ -14650,17 +14462,17 @@
           <a:p>
             <a:r>
               <a:rPr lang="en-US" dirty="0"/>
-              <a:t>Lab 2 – Let’s make a secret</a:t>
+              <a:t>Lab 1 – Interactively rebasing (Cont.)</a:t>
             </a:r>
           </a:p>
         </p:txBody>
       </p:sp>
       <p:sp>
         <p:nvSpPr>
-          <p:cNvPr id="3" name="Content Placeholder 2">
+          <p:cNvPr id="4" name="Content Placeholder 3">
             <a:extLst>
               <a:ext uri="{FF2B5EF4-FFF2-40B4-BE49-F238E27FC236}">
-                <a16:creationId xmlns:a16="http://schemas.microsoft.com/office/drawing/2014/main" id="{2461CDFF-AFCF-41F0-8E56-F9207F305A5B}"/>
+                <a16:creationId xmlns:a16="http://schemas.microsoft.com/office/drawing/2014/main" id="{44C1B0C6-BB4E-4D5F-9A1F-04E1F8C0E36F}"/>
               </a:ext>
             </a:extLst>
           </p:cNvPr>
@@ -14674,70 +14486,72 @@
         <p:spPr/>
         <p:txBody>
           <a:bodyPr>
-            <a:normAutofit lnSpcReduction="10000"/>
+            <a:normAutofit/>
           </a:bodyPr>
           <a:lstStyle/>
           <a:p>
             <a:r>
               <a:rPr lang="en-US" dirty="0"/>
-              <a:t>Setting up Secrets for your Repository if easy!</a:t>
+              <a:t>We’re now ready to interactively rebase and clean up our commit history</a:t>
             </a:r>
           </a:p>
           <a:p>
             <a:pPr lvl="1"/>
             <a:r>
               <a:rPr lang="en-US" dirty="0"/>
-              <a:t>Select Settings from the top ribbon on your repository homepage</a:t>
+              <a:t>git rebase –</a:t>
+            </a:r>
+            <a:r>
+              <a:rPr lang="en-US" dirty="0" err="1"/>
+              <a:t>i</a:t>
+            </a:r>
+            <a:r>
+              <a:rPr lang="en-US" dirty="0"/>
+              <a:t> HEAD~3</a:t>
             </a:r>
           </a:p>
           <a:p>
             <a:pPr lvl="1"/>
             <a:r>
               <a:rPr lang="en-US" dirty="0"/>
-              <a:t>Select Secrets from the left navigation panel</a:t>
+              <a:t>Squash commits 2 and 3 in the editor</a:t>
             </a:r>
           </a:p>
           <a:p>
             <a:pPr lvl="1"/>
             <a:r>
               <a:rPr lang="en-US" dirty="0"/>
-              <a:t>Click “Add a new secret” to start adding your secret</a:t>
-            </a:r>
-          </a:p>
-          <a:p>
-            <a:pPr lvl="2"/>
-            <a:r>
-              <a:rPr lang="en-US" dirty="0"/>
-              <a:t>Our secret Name is “LAB_SECRET” – This is the variable name used</a:t>
-            </a:r>
-          </a:p>
-          <a:p>
-            <a:pPr lvl="2"/>
-            <a:r>
-              <a:rPr lang="en-US" dirty="0"/>
-              <a:t>Our secret Value is “This will be our secret!” (Alternatively, you can input whatever you’d like here, up to 64KB in size)</a:t>
-            </a:r>
-          </a:p>
-          <a:p>
-            <a:pPr lvl="2"/>
-            <a:r>
-              <a:rPr lang="en-US" dirty="0"/>
-              <a:t>Click Add secret to finalize adding the secret</a:t>
-            </a:r>
-          </a:p>
-          <a:p>
-            <a:pPr lvl="2"/>
-            <a:r>
-              <a:rPr lang="en-US" dirty="0"/>
-              <a:t>Note: Any repo can have a maximum of 100 Secrets associated with it</a:t>
-            </a:r>
+              <a:t>Clean up the final commit message to now say “commit 1 with changes 1, 2, and 3”</a:t>
+            </a:r>
+          </a:p>
+          <a:p>
+            <a:pPr lvl="1"/>
+            <a:r>
+              <a:rPr lang="en-US" dirty="0"/>
+              <a:t>git log</a:t>
+            </a:r>
+          </a:p>
+          <a:p>
+            <a:r>
+              <a:rPr lang="en-US" dirty="0"/>
+              <a:t>We now have a cleaner </a:t>
+            </a:r>
+            <a:r>
+              <a:rPr lang="en-US"/>
+              <a:t>git history</a:t>
+            </a:r>
+            <a:endParaRPr lang="en-US" dirty="0"/>
+          </a:p>
+          <a:p>
+            <a:pPr lvl="1"/>
+            <a:endParaRPr lang="en-US" dirty="0"/>
           </a:p>
         </p:txBody>
       </p:sp>
     </p:spTree>
     <p:extLst>
       <p:ext uri="{BB962C8B-B14F-4D97-AF65-F5344CB8AC3E}">
-        <p14:creationId xmlns:p14="http://schemas.microsoft.com/office/powerpoint/2010/main" val="1269780835"/>
+        <p14:creationId xmlns:p14="http://schemas.microsoft.com/office/powerpoint/2010/main" val="3748549130"/>
       </p:ext>
     </p:extLst>
   </p:cSld>
@@ -14769,7 +14583,7 @@
           <p:cNvPr id="2" name="Title 1">
             <a:extLst>
               <a:ext uri="{FF2B5EF4-FFF2-40B4-BE49-F238E27FC236}">
-                <a16:creationId xmlns:a16="http://schemas.microsoft.com/office/drawing/2014/main" id="{9F8D29C7-8A51-44CB-B76F-70FFA3C275E3}"/>
+                <a16:creationId xmlns:a16="http://schemas.microsoft.com/office/drawing/2014/main" id="{AFEBA3CF-34A3-4670-84E6-3C2BD41D1880}"/>
               </a:ext>
             </a:extLst>
           </p:cNvPr>
@@ -14787,7 +14601,7 @@
           <a:p>
             <a:r>
               <a:rPr lang="en-US" dirty="0"/>
-              <a:t>LAB 2 – Our workflow and secret</a:t>
+              <a:t>Tags</a:t>
             </a:r>
           </a:p>
         </p:txBody>
@@ -14797,7 +14611,7 @@
           <p:cNvPr id="3" name="Content Placeholder 2">
             <a:extLst>
               <a:ext uri="{FF2B5EF4-FFF2-40B4-BE49-F238E27FC236}">
-                <a16:creationId xmlns:a16="http://schemas.microsoft.com/office/drawing/2014/main" id="{67BCB097-17C9-4894-9918-206E335879B6}"/>
+                <a16:creationId xmlns:a16="http://schemas.microsoft.com/office/drawing/2014/main" id="{7C091F4E-8775-4439-AF13-33C4DAD6ECF3}"/>
               </a:ext>
             </a:extLst>
           </p:cNvPr>
@@ -14815,33 +14629,64 @@
           <a:p>
             <a:r>
               <a:rPr lang="en-US" dirty="0"/>
-              <a:t>Now that we have a secret, let’s make a workflow to use it</a:t>
-            </a:r>
-          </a:p>
-          <a:p>
-            <a:r>
-              <a:rPr lang="en-US" dirty="0"/>
-              <a:t>Select Actions from the ribbon at the top of your repository homepage</a:t>
-            </a:r>
-          </a:p>
-          <a:p>
-            <a:r>
-              <a:rPr lang="en-US" dirty="0"/>
-              <a:t>Here you’ll see a number of workflows that are pre-built, but we’re going to make our own</a:t>
+              <a:t>Tags are used to indicate a significant milestone in the branch history</a:t>
             </a:r>
           </a:p>
           <a:p>
             <a:pPr lvl="1"/>
             <a:r>
               <a:rPr lang="en-US" dirty="0"/>
-              <a:t>Select “Skip this: Set up a workflow yourself” in the top right of the page</a:t>
+              <a:t>These are usually indicative of a version release</a:t>
             </a:r>
           </a:p>
           <a:p>
             <a:pPr lvl="1"/>
             <a:r>
               <a:rPr lang="en-US" dirty="0"/>
-              <a:t>Let’s pause to discuss YML files</a:t>
+              <a:t>Unlike branches, after a tag is created it has no further history</a:t>
+            </a:r>
+          </a:p>
+          <a:p>
+            <a:pPr lvl="1"/>
+            <a:r>
+              <a:rPr lang="en-US" dirty="0"/>
+              <a:t>Tags provide a static reference a specific point your git tree history</a:t>
+            </a:r>
+          </a:p>
+          <a:p>
+            <a:r>
+              <a:rPr lang="en-US" dirty="0"/>
+              <a:t>Usage</a:t>
+            </a:r>
+          </a:p>
+          <a:p>
+            <a:pPr lvl="1"/>
+            <a:r>
+              <a:rPr lang="en-US" dirty="0"/>
+              <a:t>git tag &lt;</a:t>
+            </a:r>
+            <a:r>
+              <a:rPr lang="en-US" dirty="0" err="1"/>
+              <a:t>tagname</a:t>
+            </a:r>
+            <a:r>
+              <a:rPr lang="en-US" dirty="0"/>
+              <a:t>&gt; - Creates a tag of &lt;</a:t>
+            </a:r>
+            <a:r>
+              <a:rPr lang="en-US" dirty="0" err="1"/>
+              <a:t>tagname</a:t>
+            </a:r>
+            <a:r>
+              <a:rPr lang="en-US" dirty="0"/>
+              <a:t>&gt;</a:t>
+            </a:r>
+          </a:p>
+          <a:p>
+            <a:pPr lvl="1"/>
+            <a:r>
+              <a:rPr lang="en-US" dirty="0"/>
+              <a:t>git tag – Lists all tags in the branch history</a:t>
             </a:r>
           </a:p>
         </p:txBody>
@@ -14849,7 +14694,7 @@
     </p:spTree>
     <p:extLst>
       <p:ext uri="{BB962C8B-B14F-4D97-AF65-F5344CB8AC3E}">
-        <p14:creationId xmlns:p14="http://schemas.microsoft.com/office/powerpoint/2010/main" val="3472812206"/>
+        <p14:creationId xmlns:p14="http://schemas.microsoft.com/office/powerpoint/2010/main" val="3241581009"/>
       </p:ext>
     </p:extLst>
   </p:cSld>
@@ -14881,7 +14726,7 @@
           <p:cNvPr id="2" name="Title 1">
             <a:extLst>
               <a:ext uri="{FF2B5EF4-FFF2-40B4-BE49-F238E27FC236}">
-                <a16:creationId xmlns:a16="http://schemas.microsoft.com/office/drawing/2014/main" id="{B5F0D990-AA06-490C-B918-101E69C4F751}"/>
+                <a16:creationId xmlns:a16="http://schemas.microsoft.com/office/drawing/2014/main" id="{9567AAA9-572C-40F8-B61C-976244117C46}"/>
               </a:ext>
             </a:extLst>
           </p:cNvPr>
@@ -14899,7 +14744,15 @@
           <a:p>
             <a:r>
               <a:rPr lang="en-US" dirty="0"/>
-              <a:t>Lab 2 – The intermission</a:t>
+              <a:t>Advanced </a:t>
+            </a:r>
+            <a:r>
+              <a:rPr lang="en-US" dirty="0" err="1"/>
+              <a:t>Github</a:t>
+            </a:r>
+            <a:r>
+              <a:rPr lang="en-US" dirty="0"/>
+              <a:t> Features</a:t>
             </a:r>
           </a:p>
         </p:txBody>
@@ -14909,7 +14762,7 @@
           <p:cNvPr id="3" name="Content Placeholder 2">
             <a:extLst>
               <a:ext uri="{FF2B5EF4-FFF2-40B4-BE49-F238E27FC236}">
-                <a16:creationId xmlns:a16="http://schemas.microsoft.com/office/drawing/2014/main" id="{51C8985B-9A11-4026-BBF4-FBC9EFBB044D}"/>
+                <a16:creationId xmlns:a16="http://schemas.microsoft.com/office/drawing/2014/main" id="{8FE9A726-545E-4DFA-B6C1-C177C8A98F34}"/>
               </a:ext>
             </a:extLst>
           </p:cNvPr>
@@ -14922,70 +14775,52 @@
         </p:nvSpPr>
         <p:spPr/>
         <p:txBody>
-          <a:bodyPr>
-            <a:normAutofit fontScale="92500" lnSpcReduction="20000"/>
-          </a:bodyPr>
+          <a:bodyPr/>
           <a:lstStyle/>
           <a:p>
             <a:r>
               <a:rPr lang="en-US" dirty="0"/>
-              <a:t>YML or YAML is a recursive acronym for “YAML </a:t>
+              <a:t>Enough with non-</a:t>
             </a:r>
             <a:r>
               <a:rPr lang="en-US" dirty="0" err="1"/>
-              <a:t>Ain’t</a:t>
-            </a:r>
-            <a:r>
-              <a:rPr lang="en-US" dirty="0"/>
-              <a:t> Markup Language”</a:t>
-            </a:r>
-          </a:p>
-          <a:p>
-            <a:r>
-              <a:rPr lang="en-US" dirty="0"/>
-              <a:t>Similar to JSON, but uses white space to denote structure</a:t>
-            </a:r>
-          </a:p>
-          <a:p>
-            <a:r>
-              <a:rPr lang="en-US" dirty="0"/>
-              <a:t>It’s minimal syntax footprint has helped it gain popularity</a:t>
-            </a:r>
-          </a:p>
-          <a:p>
-            <a:r>
-              <a:rPr lang="en-US" dirty="0"/>
-              <a:t>Key-Value pairs are denoted by colons ‘:’</a:t>
-            </a:r>
-          </a:p>
-          <a:p>
-            <a:r>
-              <a:rPr lang="en-US" dirty="0"/>
-              <a:t>Key advantages over other data-serialization languages</a:t>
+              <a:t>github</a:t>
+            </a:r>
+            <a:r>
+              <a:rPr lang="en-US" dirty="0"/>
+              <a:t> stuff, we git it! (Get it?)</a:t>
             </a:r>
           </a:p>
           <a:p>
             <a:pPr lvl="1"/>
             <a:r>
               <a:rPr lang="en-US" dirty="0"/>
-              <a:t>Multiple documents in a stream can be denoted through ---</a:t>
+              <a:t>Actions and Workflows to build a CI/CD Pipeline</a:t>
             </a:r>
           </a:p>
           <a:p>
             <a:pPr lvl="1"/>
             <a:r>
               <a:rPr lang="en-US" dirty="0"/>
-              <a:t>Data typing through implicit and explicit denotation</a:t>
+              <a:t>Secrets and how to use them</a:t>
             </a:r>
           </a:p>
           <a:p>
             <a:pPr lvl="1"/>
             <a:r>
               <a:rPr lang="en-US" dirty="0"/>
-              <a:t>References for repeated nodes allows for brevity</a:t>
-            </a:r>
-          </a:p>
-          <a:p>
+              <a:t>Pull Request Management</a:t>
+            </a:r>
+          </a:p>
+          <a:p>
+            <a:pPr lvl="1"/>
+            <a:r>
+              <a:rPr lang="en-US" dirty="0"/>
+              <a:t>Issue Tracking and Projects</a:t>
+            </a:r>
+          </a:p>
+          <a:p>
+            <a:pPr lvl="1"/>
             <a:endParaRPr lang="en-US" dirty="0"/>
           </a:p>
         </p:txBody>
@@ -14993,7 +14828,7 @@
     </p:spTree>
     <p:extLst>
       <p:ext uri="{BB962C8B-B14F-4D97-AF65-F5344CB8AC3E}">
-        <p14:creationId xmlns:p14="http://schemas.microsoft.com/office/powerpoint/2010/main" val="827438630"/>
+        <p14:creationId xmlns:p14="http://schemas.microsoft.com/office/powerpoint/2010/main" val="2879512403"/>
       </p:ext>
     </p:extLst>
   </p:cSld>
@@ -15025,7 +14860,7 @@
           <p:cNvPr id="2" name="Title 1">
             <a:extLst>
               <a:ext uri="{FF2B5EF4-FFF2-40B4-BE49-F238E27FC236}">
-                <a16:creationId xmlns:a16="http://schemas.microsoft.com/office/drawing/2014/main" id="{56EC12EE-0E66-4C46-B1FB-728D5711AF84}"/>
+                <a16:creationId xmlns:a16="http://schemas.microsoft.com/office/drawing/2014/main" id="{B2A7DB65-2734-4ADA-ADC9-73E420BCBF7B}"/>
               </a:ext>
             </a:extLst>
           </p:cNvPr>
@@ -15043,7 +14878,7 @@
           <a:p>
             <a:r>
               <a:rPr lang="en-US" dirty="0"/>
-              <a:t>Lab 2 – Workflow completion</a:t>
+              <a:t>Secrets and Workflows</a:t>
             </a:r>
           </a:p>
         </p:txBody>
@@ -15053,7 +14888,7 @@
           <p:cNvPr id="3" name="Content Placeholder 2">
             <a:extLst>
               <a:ext uri="{FF2B5EF4-FFF2-40B4-BE49-F238E27FC236}">
-                <a16:creationId xmlns:a16="http://schemas.microsoft.com/office/drawing/2014/main" id="{A7B9062D-6FED-4CA3-A9A4-9CA67ECF83D5}"/>
+                <a16:creationId xmlns:a16="http://schemas.microsoft.com/office/drawing/2014/main" id="{982C56AF-899F-4FD6-A398-653EC93AEA2A}"/>
               </a:ext>
             </a:extLst>
           </p:cNvPr>
@@ -15073,52 +14908,62 @@
           <a:p>
             <a:r>
               <a:rPr lang="en-US" dirty="0"/>
-              <a:t>Change the file name to lab2.yml</a:t>
-            </a:r>
-          </a:p>
-          <a:p>
-            <a:r>
-              <a:rPr lang="en-US" dirty="0"/>
-              <a:t>Change the name of the workflow to Lab 2 Workflow</a:t>
-            </a:r>
-          </a:p>
-          <a:p>
-            <a:r>
-              <a:rPr lang="en-US" dirty="0"/>
-              <a:t>Remove all lines after line 13</a:t>
-            </a:r>
-          </a:p>
-          <a:p>
-            <a:r>
-              <a:rPr lang="en-US" dirty="0"/>
-              <a:t>Update line 13 to reflect the following:</a:t>
+              <a:t>Secrets are important pieces of information that you want to remain hidden</a:t>
             </a:r>
           </a:p>
           <a:p>
             <a:pPr lvl="1"/>
             <a:r>
               <a:rPr lang="en-US" dirty="0"/>
-              <a:t>run: echo Our secret is ${{ </a:t>
-            </a:r>
-            <a:r>
-              <a:rPr lang="en-US" dirty="0" err="1"/>
-              <a:t>secrets.LAB_SECRET</a:t>
-            </a:r>
-            <a:r>
-              <a:rPr lang="en-US" dirty="0"/>
-              <a:t> }}</a:t>
-            </a:r>
-          </a:p>
-          <a:p>
-            <a:r>
-              <a:rPr lang="en-US" dirty="0"/>
-              <a:t>Alternatively, copy the contents of my example file from the link provided on the website for Lab 2</a:t>
-            </a:r>
-          </a:p>
-          <a:p>
-            <a:r>
-              <a:rPr lang="en-US" dirty="0"/>
-              <a:t>Commit the file to your repo using the commit button at the top right</a:t>
+              <a:t>This is likely to be username and passwords for services that your workflow may use</a:t>
+            </a:r>
+          </a:p>
+          <a:p>
+            <a:pPr lvl="1"/>
+            <a:r>
+              <a:rPr lang="en-US" dirty="0"/>
+              <a:t>Secrets are essentially hidden environment variables</a:t>
+            </a:r>
+          </a:p>
+          <a:p>
+            <a:r>
+              <a:rPr lang="en-US" dirty="0"/>
+              <a:t>Workflows can be whatever you need them to be</a:t>
+            </a:r>
+          </a:p>
+          <a:p>
+            <a:pPr lvl="1"/>
+            <a:r>
+              <a:rPr lang="en-US" dirty="0"/>
+              <a:t>This could be a CI/CD (Continuous Integration / Continuous Deployment) Pipeline</a:t>
+            </a:r>
+          </a:p>
+          <a:p>
+            <a:pPr lvl="1"/>
+            <a:r>
+              <a:rPr lang="en-US" dirty="0"/>
+              <a:t>Automatically tag specific branches as they come in</a:t>
+            </a:r>
+          </a:p>
+          <a:p>
+            <a:pPr lvl="1"/>
+            <a:r>
+              <a:rPr lang="en-US" dirty="0"/>
+              <a:t>Immediately raise new issues when found</a:t>
+            </a:r>
+          </a:p>
+          <a:p>
+            <a:pPr lvl="1"/>
+            <a:r>
+              <a:rPr lang="en-US" dirty="0"/>
+              <a:t>FTP files to a specific destination upon merge</a:t>
+            </a:r>
+          </a:p>
+          <a:p>
+            <a:pPr lvl="1"/>
+            <a:r>
+              <a:rPr lang="en-US" dirty="0"/>
+              <a:t>Countless other scenarios…</a:t>
             </a:r>
           </a:p>
         </p:txBody>
@@ -15126,7 +14971,7 @@
     </p:spTree>
     <p:extLst>
       <p:ext uri="{BB962C8B-B14F-4D97-AF65-F5344CB8AC3E}">
-        <p14:creationId xmlns:p14="http://schemas.microsoft.com/office/powerpoint/2010/main" val="4280234771"/>
+        <p14:creationId xmlns:p14="http://schemas.microsoft.com/office/powerpoint/2010/main" val="2339013658"/>
       </p:ext>
     </p:extLst>
   </p:cSld>
@@ -15158,7 +15003,7 @@
           <p:cNvPr id="2" name="Title 1">
             <a:extLst>
               <a:ext uri="{FF2B5EF4-FFF2-40B4-BE49-F238E27FC236}">
-                <a16:creationId xmlns:a16="http://schemas.microsoft.com/office/drawing/2014/main" id="{56EC12EE-0E66-4C46-B1FB-728D5711AF84}"/>
+                <a16:creationId xmlns:a16="http://schemas.microsoft.com/office/drawing/2014/main" id="{6B8CBCE7-19D5-47BD-BBA8-267CA594559F}"/>
               </a:ext>
             </a:extLst>
           </p:cNvPr>
@@ -15176,7 +15021,7 @@
           <a:p>
             <a:r>
               <a:rPr lang="en-US" dirty="0"/>
-              <a:t>Lab 2 – Workflow completion</a:t>
+              <a:t>Lab 2 – Let’s make a secret</a:t>
             </a:r>
           </a:p>
         </p:txBody>
@@ -15186,7 +15031,7 @@
           <p:cNvPr id="3" name="Content Placeholder 2">
             <a:extLst>
               <a:ext uri="{FF2B5EF4-FFF2-40B4-BE49-F238E27FC236}">
-                <a16:creationId xmlns:a16="http://schemas.microsoft.com/office/drawing/2014/main" id="{A7B9062D-6FED-4CA3-A9A4-9CA67ECF83D5}"/>
+                <a16:creationId xmlns:a16="http://schemas.microsoft.com/office/drawing/2014/main" id="{2461CDFF-AFCF-41F0-8E56-F9207F305A5B}"/>
               </a:ext>
             </a:extLst>
           </p:cNvPr>
@@ -15200,55 +15045,62 @@
         <p:spPr/>
         <p:txBody>
           <a:bodyPr>
-            <a:normAutofit/>
+            <a:normAutofit lnSpcReduction="10000"/>
           </a:bodyPr>
           <a:lstStyle/>
           <a:p>
             <a:r>
               <a:rPr lang="en-US" dirty="0"/>
-              <a:t>Watch your new workflow in action!</a:t>
+              <a:t>Setting up Secrets for your Repository if easy!</a:t>
             </a:r>
           </a:p>
           <a:p>
             <a:pPr lvl="1"/>
             <a:r>
               <a:rPr lang="en-US" dirty="0"/>
-              <a:t>Click on Actions on the top ribbon</a:t>
+              <a:t>Select Settings from the top ribbon on your repository homepage</a:t>
             </a:r>
           </a:p>
           <a:p>
             <a:pPr lvl="1"/>
             <a:r>
               <a:rPr lang="en-US" dirty="0"/>
-              <a:t>Select Lab 2 Workflow from the left nav panel</a:t>
+              <a:t>Select Secrets from the left navigation panel</a:t>
             </a:r>
           </a:p>
           <a:p>
             <a:pPr lvl="1"/>
             <a:r>
               <a:rPr lang="en-US" dirty="0"/>
-              <a:t>Click on the latest build of your Lab 2 Workflow</a:t>
-            </a:r>
-          </a:p>
-          <a:p>
-            <a:pPr lvl="1"/>
-            <a:r>
-              <a:rPr lang="en-US" dirty="0"/>
-              <a:t>Click on the “build” link to the left to review the logs of the build process</a:t>
-            </a:r>
-          </a:p>
-          <a:p>
-            <a:pPr lvl="1"/>
-            <a:r>
-              <a:rPr lang="en-US" dirty="0"/>
-              <a:t>Expand the collapsed item “Run a one-line script” so we can see our secret!</a:t>
+              <a:t>Click “Add a new secret” to start adding your secret</a:t>
             </a:r>
           </a:p>
           <a:p>
             <a:pPr lvl="2"/>
             <a:r>
               <a:rPr lang="en-US" dirty="0"/>
-              <a:t>What happened?</a:t>
+              <a:t>Our secret Name is “LAB_SECRET” – This is the variable name used</a:t>
+            </a:r>
+          </a:p>
+          <a:p>
+            <a:pPr lvl="2"/>
+            <a:r>
+              <a:rPr lang="en-US" dirty="0"/>
+              <a:t>Our secret Value is “This will be our secret!” (Alternatively, you can input whatever you’d like here, up to 64KB in size)</a:t>
+            </a:r>
+          </a:p>
+          <a:p>
+            <a:pPr lvl="2"/>
+            <a:r>
+              <a:rPr lang="en-US" dirty="0"/>
+              <a:t>Click Add secret to finalize adding the secret</a:t>
+            </a:r>
+          </a:p>
+          <a:p>
+            <a:pPr lvl="2"/>
+            <a:r>
+              <a:rPr lang="en-US" dirty="0"/>
+              <a:t>Note: Any repo can have a maximum of 100 Secrets associated with it</a:t>
             </a:r>
           </a:p>
         </p:txBody>
@@ -15256,7 +15108,7 @@
     </p:spTree>
     <p:extLst>
       <p:ext uri="{BB962C8B-B14F-4D97-AF65-F5344CB8AC3E}">
-        <p14:creationId xmlns:p14="http://schemas.microsoft.com/office/powerpoint/2010/main" val="1173621339"/>
+        <p14:creationId xmlns:p14="http://schemas.microsoft.com/office/powerpoint/2010/main" val="1269780835"/>
       </p:ext>
     </p:extLst>
   </p:cSld>
@@ -15288,7 +15140,7 @@
           <p:cNvPr id="2" name="Title 1">
             <a:extLst>
               <a:ext uri="{FF2B5EF4-FFF2-40B4-BE49-F238E27FC236}">
-                <a16:creationId xmlns:a16="http://schemas.microsoft.com/office/drawing/2014/main" id="{56B0ED3F-B8C2-4C79-B981-217056E83BA3}"/>
+                <a16:creationId xmlns:a16="http://schemas.microsoft.com/office/drawing/2014/main" id="{9F8D29C7-8A51-44CB-B76F-70FFA3C275E3}"/>
               </a:ext>
             </a:extLst>
           </p:cNvPr>
@@ -15306,7 +15158,7 @@
           <a:p>
             <a:r>
               <a:rPr lang="en-US" dirty="0"/>
-              <a:t>Forking workflow</a:t>
+              <a:t>LAB 2 – Our workflow and secret</a:t>
             </a:r>
           </a:p>
         </p:txBody>
@@ -15316,7 +15168,7 @@
           <p:cNvPr id="3" name="Content Placeholder 2">
             <a:extLst>
               <a:ext uri="{FF2B5EF4-FFF2-40B4-BE49-F238E27FC236}">
-                <a16:creationId xmlns:a16="http://schemas.microsoft.com/office/drawing/2014/main" id="{34190D32-8CFA-4160-B4EA-9C4BF3CC222B}"/>
+                <a16:creationId xmlns:a16="http://schemas.microsoft.com/office/drawing/2014/main" id="{67BCB097-17C9-4894-9918-206E335879B6}"/>
               </a:ext>
             </a:extLst>
           </p:cNvPr>
@@ -15334,54 +15186,41 @@
           <a:p>
             <a:r>
               <a:rPr lang="en-US" dirty="0"/>
-              <a:t>The Forking Workflow is most often seen in public open source projects.</a:t>
-            </a:r>
-          </a:p>
-          <a:p>
-            <a:r>
-              <a:rPr lang="en-US" dirty="0"/>
-              <a:t>The main advantage is that contributions can be integrated without the need for everybody to push to a single central repository</a:t>
-            </a:r>
-          </a:p>
-          <a:p>
-            <a:endParaRPr lang="en-US" dirty="0"/>
+              <a:t>Now that we have a secret, let’s make a workflow to use it</a:t>
+            </a:r>
+          </a:p>
+          <a:p>
+            <a:r>
+              <a:rPr lang="en-US" dirty="0"/>
+              <a:t>Select Actions from the ribbon at the top of your repository homepage</a:t>
+            </a:r>
+          </a:p>
+          <a:p>
+            <a:r>
+              <a:rPr lang="en-US" dirty="0"/>
+              <a:t>Here you’ll see a number of workflows that are pre-built, but we’re going to make our own</a:t>
+            </a:r>
+          </a:p>
+          <a:p>
+            <a:pPr lvl="1"/>
+            <a:r>
+              <a:rPr lang="en-US" dirty="0"/>
+              <a:t>Select “Skip this: Set up a workflow yourself” in the top right of the page</a:t>
+            </a:r>
+          </a:p>
+          <a:p>
+            <a:pPr lvl="1"/>
+            <a:r>
+              <a:rPr lang="en-US" dirty="0"/>
+              <a:t>Let’s pause to discuss YML files</a:t>
+            </a:r>
           </a:p>
         </p:txBody>
       </p:sp>
-      <p:pic>
-        <p:nvPicPr>
-          <p:cNvPr id="5" name="Picture 4">
-            <a:extLst>
-              <a:ext uri="{FF2B5EF4-FFF2-40B4-BE49-F238E27FC236}">
-                <a16:creationId xmlns:a16="http://schemas.microsoft.com/office/drawing/2014/main" id="{0292C6D5-4353-47B9-BA99-2A86B69B9841}"/>
-              </a:ext>
-            </a:extLst>
-          </p:cNvPr>
-          <p:cNvPicPr>
-            <a:picLocks noChangeAspect="1"/>
-          </p:cNvPicPr>
-          <p:nvPr/>
-        </p:nvPicPr>
-        <p:blipFill>
-          <a:blip r:embed="rId2"/>
-          <a:stretch>
-            <a:fillRect/>
-          </a:stretch>
-        </p:blipFill>
-        <p:spPr>
-          <a:xfrm>
-            <a:off x="3094037" y="4451034"/>
-            <a:ext cx="6000748" cy="1340167"/>
-          </a:xfrm>
-          <a:prstGeom prst="rect">
-            <a:avLst/>
-          </a:prstGeom>
-        </p:spPr>
-      </p:pic>
     </p:spTree>
     <p:extLst>
       <p:ext uri="{BB962C8B-B14F-4D97-AF65-F5344CB8AC3E}">
-        <p14:creationId xmlns:p14="http://schemas.microsoft.com/office/powerpoint/2010/main" val="1375465902"/>
+        <p14:creationId xmlns:p14="http://schemas.microsoft.com/office/powerpoint/2010/main" val="3472812206"/>
       </p:ext>
     </p:extLst>
   </p:cSld>
@@ -15413,7 +15252,7 @@
           <p:cNvPr id="2" name="Title 1">
             <a:extLst>
               <a:ext uri="{FF2B5EF4-FFF2-40B4-BE49-F238E27FC236}">
-                <a16:creationId xmlns:a16="http://schemas.microsoft.com/office/drawing/2014/main" id="{E7A3A6D1-66C8-44C6-98FB-76A530D9ECC2}"/>
+                <a16:creationId xmlns:a16="http://schemas.microsoft.com/office/drawing/2014/main" id="{B5F0D990-AA06-490C-B918-101E69C4F751}"/>
               </a:ext>
             </a:extLst>
           </p:cNvPr>
@@ -15431,7 +15270,7 @@
           <a:p>
             <a:r>
               <a:rPr lang="en-US" dirty="0"/>
-              <a:t>Branching differences</a:t>
+              <a:t>Lab 2 – The intermission</a:t>
             </a:r>
           </a:p>
         </p:txBody>
@@ -15441,7 +15280,7 @@
           <p:cNvPr id="3" name="Content Placeholder 2">
             <a:extLst>
               <a:ext uri="{FF2B5EF4-FFF2-40B4-BE49-F238E27FC236}">
-                <a16:creationId xmlns:a16="http://schemas.microsoft.com/office/drawing/2014/main" id="{3FFE1642-BC9F-4B01-A237-1732BC79D756}"/>
+                <a16:creationId xmlns:a16="http://schemas.microsoft.com/office/drawing/2014/main" id="{51C8985B-9A11-4026-BBF4-FBC9EFBB044D}"/>
               </a:ext>
             </a:extLst>
           </p:cNvPr>
@@ -15454,34 +15293,78 @@
         </p:nvSpPr>
         <p:spPr/>
         <p:txBody>
-          <a:bodyPr/>
+          <a:bodyPr>
+            <a:normAutofit fontScale="92500" lnSpcReduction="20000"/>
+          </a:bodyPr>
           <a:lstStyle/>
           <a:p>
             <a:r>
               <a:rPr lang="en-US" dirty="0"/>
-              <a:t>Everybody should still be using branches to isolate individual features, the only difference is how those branches get  shared.</a:t>
-            </a:r>
-          </a:p>
-          <a:p>
-            <a:r>
-              <a:rPr lang="en-US" dirty="0"/>
-              <a:t>In the Forking Workflow, they are pulled into another developer’s local repository, while in the Feature Branch and </a:t>
+              <a:t>YML or YAML is a recursive acronym for “YAML </a:t>
             </a:r>
             <a:r>
               <a:rPr lang="en-US" dirty="0" err="1"/>
-              <a:t>Gitflow</a:t>
-            </a:r>
-            <a:r>
-              <a:rPr lang="en-US" dirty="0"/>
-              <a:t> Workflows they are pushed to the official repository.</a:t>
-            </a:r>
+              <a:t>Ain’t</a:t>
+            </a:r>
+            <a:r>
+              <a:rPr lang="en-US" dirty="0"/>
+              <a:t> Markup Language”</a:t>
+            </a:r>
+          </a:p>
+          <a:p>
+            <a:r>
+              <a:rPr lang="en-US" dirty="0"/>
+              <a:t>Similar to JSON, but uses white space to denote structure</a:t>
+            </a:r>
+          </a:p>
+          <a:p>
+            <a:r>
+              <a:rPr lang="en-US" dirty="0"/>
+              <a:t>It’s minimal syntax footprint has helped it gain popularity</a:t>
+            </a:r>
+          </a:p>
+          <a:p>
+            <a:r>
+              <a:rPr lang="en-US" dirty="0"/>
+              <a:t>Key-Value pairs are denoted by colons ‘:’</a:t>
+            </a:r>
+          </a:p>
+          <a:p>
+            <a:r>
+              <a:rPr lang="en-US" dirty="0"/>
+              <a:t>Key advantages over other data-serialization languages</a:t>
+            </a:r>
+          </a:p>
+          <a:p>
+            <a:pPr lvl="1"/>
+            <a:r>
+              <a:rPr lang="en-US" dirty="0"/>
+              <a:t>Multiple documents in a stream can be denoted through ---</a:t>
+            </a:r>
+          </a:p>
+          <a:p>
+            <a:pPr lvl="1"/>
+            <a:r>
+              <a:rPr lang="en-US" dirty="0"/>
+              <a:t>Data typing through implicit and explicit denotation</a:t>
+            </a:r>
+          </a:p>
+          <a:p>
+            <a:pPr lvl="1"/>
+            <a:r>
+              <a:rPr lang="en-US" dirty="0"/>
+              <a:t>References for repeated nodes allows for brevity</a:t>
+            </a:r>
+          </a:p>
+          <a:p>
+            <a:endParaRPr lang="en-US" dirty="0"/>
           </a:p>
         </p:txBody>
       </p:sp>
     </p:spTree>
     <p:extLst>
       <p:ext uri="{BB962C8B-B14F-4D97-AF65-F5344CB8AC3E}">
-        <p14:creationId xmlns:p14="http://schemas.microsoft.com/office/powerpoint/2010/main" val="2391448022"/>
+        <p14:creationId xmlns:p14="http://schemas.microsoft.com/office/powerpoint/2010/main" val="827438630"/>
       </p:ext>
     </p:extLst>
   </p:cSld>
@@ -15513,7 +15396,7 @@
           <p:cNvPr id="2" name="Title 1">
             <a:extLst>
               <a:ext uri="{FF2B5EF4-FFF2-40B4-BE49-F238E27FC236}">
-                <a16:creationId xmlns:a16="http://schemas.microsoft.com/office/drawing/2014/main" id="{A8FA8C29-1A2A-4871-8FF6-E4331B6CEA52}"/>
+                <a16:creationId xmlns:a16="http://schemas.microsoft.com/office/drawing/2014/main" id="{56EC12EE-0E66-4C46-B1FB-728D5711AF84}"/>
               </a:ext>
             </a:extLst>
           </p:cNvPr>
@@ -15531,7 +15414,7 @@
           <a:p>
             <a:r>
               <a:rPr lang="en-US" dirty="0"/>
-              <a:t>Getting started</a:t>
+              <a:t>Lab 2 – Workflow completion</a:t>
             </a:r>
           </a:p>
         </p:txBody>
@@ -15541,7 +15424,7 @@
           <p:cNvPr id="3" name="Content Placeholder 2">
             <a:extLst>
               <a:ext uri="{FF2B5EF4-FFF2-40B4-BE49-F238E27FC236}">
-                <a16:creationId xmlns:a16="http://schemas.microsoft.com/office/drawing/2014/main" id="{55835F02-02AE-4439-8E8E-2F03C55CFE77}"/>
+                <a16:creationId xmlns:a16="http://schemas.microsoft.com/office/drawing/2014/main" id="{A7B9062D-6FED-4CA3-A9A4-9CA67ECF83D5}"/>
               </a:ext>
             </a:extLst>
           </p:cNvPr>
@@ -15554,38 +15437,59 @@
         </p:nvSpPr>
         <p:spPr/>
         <p:txBody>
-          <a:bodyPr/>
+          <a:bodyPr>
+            <a:normAutofit fontScale="92500" lnSpcReduction="20000"/>
+          </a:bodyPr>
           <a:lstStyle/>
           <a:p>
             <a:r>
               <a:rPr lang="en-US" dirty="0"/>
-              <a:t>All new developers to a Forking Workflow project need to fork the official repository</a:t>
-            </a:r>
-          </a:p>
-          <a:p>
-            <a:r>
-              <a:rPr lang="en-US" dirty="0"/>
-              <a:t>Forking is just a standard git clone operation</a:t>
-            </a:r>
-          </a:p>
-          <a:p>
-            <a:r>
-              <a:rPr lang="en-US" dirty="0"/>
-              <a:t>This will clone the original repository to our own server-side repository</a:t>
-            </a:r>
-          </a:p>
-          <a:p>
-            <a:r>
-              <a:rPr lang="en-US" dirty="0"/>
-              <a:t>Git hosting services automate this step without the need of </a:t>
+              <a:t>Change the file name to lab2.yml</a:t>
+            </a:r>
+          </a:p>
+          <a:p>
+            <a:r>
+              <a:rPr lang="en-US" dirty="0"/>
+              <a:t>Change the name of the workflow to Lab 2 Workflow</a:t>
+            </a:r>
+          </a:p>
+          <a:p>
+            <a:r>
+              <a:rPr lang="en-US" dirty="0"/>
+              <a:t>Remove all lines after line 13</a:t>
+            </a:r>
+          </a:p>
+          <a:p>
+            <a:r>
+              <a:rPr lang="en-US" dirty="0"/>
+              <a:t>Update line 13 to reflect the following:</a:t>
+            </a:r>
+          </a:p>
+          <a:p>
+            <a:pPr lvl="1"/>
+            <a:r>
+              <a:rPr lang="en-US" dirty="0"/>
+              <a:t>run: echo Our secret is ${{ </a:t>
             </a:r>
             <a:r>
               <a:rPr lang="en-US" dirty="0" err="1"/>
-              <a:t>SSH’ing</a:t>
-            </a:r>
-            <a:r>
-              <a:rPr lang="en-US" dirty="0"/>
-              <a:t> into a server to clone</a:t>
+              <a:t>secrets.LAB_SECRET</a:t>
+            </a:r>
+            <a:r>
+              <a:rPr lang="en-US" dirty="0"/>
+              <a:t> }}</a:t>
+            </a:r>
+          </a:p>
+          <a:p>
+            <a:r>
+              <a:rPr lang="en-US" dirty="0"/>
+              <a:t>Alternatively, copy the contents of my example file from the link provided on the website for Lab 2</a:t>
+            </a:r>
+          </a:p>
+          <a:p>
+            <a:r>
+              <a:rPr lang="en-US" dirty="0"/>
+              <a:t>Commit the file to your repo using the commit button at the top right</a:t>
             </a:r>
           </a:p>
         </p:txBody>
@@ -15593,7 +15497,7 @@
     </p:spTree>
     <p:extLst>
       <p:ext uri="{BB962C8B-B14F-4D97-AF65-F5344CB8AC3E}">
-        <p14:creationId xmlns:p14="http://schemas.microsoft.com/office/powerpoint/2010/main" val="2254951386"/>
+        <p14:creationId xmlns:p14="http://schemas.microsoft.com/office/powerpoint/2010/main" val="4280234771"/>
       </p:ext>
     </p:extLst>
   </p:cSld>
@@ -15625,7 +15529,7 @@
           <p:cNvPr id="2" name="Title 1">
             <a:extLst>
               <a:ext uri="{FF2B5EF4-FFF2-40B4-BE49-F238E27FC236}">
-                <a16:creationId xmlns:a16="http://schemas.microsoft.com/office/drawing/2014/main" id="{189ECE41-5CBE-4823-A2D4-75C0D66245FC}"/>
+                <a16:creationId xmlns:a16="http://schemas.microsoft.com/office/drawing/2014/main" id="{56EC12EE-0E66-4C46-B1FB-728D5711AF84}"/>
               </a:ext>
             </a:extLst>
           </p:cNvPr>
@@ -15643,7 +15547,7 @@
           <a:p>
             <a:r>
               <a:rPr lang="en-US" dirty="0"/>
-              <a:t>Clone your fork</a:t>
+              <a:t>Lab 2 – Workflow completion</a:t>
             </a:r>
           </a:p>
         </p:txBody>
@@ -15653,7 +15557,7 @@
           <p:cNvPr id="3" name="Content Placeholder 2">
             <a:extLst>
               <a:ext uri="{FF2B5EF4-FFF2-40B4-BE49-F238E27FC236}">
-                <a16:creationId xmlns:a16="http://schemas.microsoft.com/office/drawing/2014/main" id="{79A7F064-E54D-486C-8916-AD49218D22F8}"/>
+                <a16:creationId xmlns:a16="http://schemas.microsoft.com/office/drawing/2014/main" id="{A7B9062D-6FED-4CA3-A9A4-9CA67ECF83D5}"/>
               </a:ext>
             </a:extLst>
           </p:cNvPr>
@@ -15666,24 +15570,56 @@
         </p:nvSpPr>
         <p:spPr/>
         <p:txBody>
-          <a:bodyPr/>
+          <a:bodyPr>
+            <a:normAutofit/>
+          </a:bodyPr>
           <a:lstStyle/>
           <a:p>
             <a:r>
               <a:rPr lang="en-US" dirty="0"/>
-              <a:t>Clone your own public forked repo</a:t>
-            </a:r>
-          </a:p>
-          <a:p>
-            <a:r>
-              <a:rPr lang="en-US" dirty="0"/>
-              <a:t>This can be done with the familiar git clone command</a:t>
-            </a:r>
-          </a:p>
-          <a:p>
-            <a:r>
-              <a:rPr lang="en-US" dirty="0"/>
-              <a:t>Git clone https://github.com/user/repo.git</a:t>
+              <a:t>Watch your new workflow in action!</a:t>
+            </a:r>
+          </a:p>
+          <a:p>
+            <a:pPr lvl="1"/>
+            <a:r>
+              <a:rPr lang="en-US" dirty="0"/>
+              <a:t>Click on Actions on the top ribbon</a:t>
+            </a:r>
+          </a:p>
+          <a:p>
+            <a:pPr lvl="1"/>
+            <a:r>
+              <a:rPr lang="en-US" dirty="0"/>
+              <a:t>Select Lab 2 Workflow from the left nav panel</a:t>
+            </a:r>
+          </a:p>
+          <a:p>
+            <a:pPr lvl="1"/>
+            <a:r>
+              <a:rPr lang="en-US" dirty="0"/>
+              <a:t>Click on the latest build of your Lab 2 Workflow</a:t>
+            </a:r>
+          </a:p>
+          <a:p>
+            <a:pPr lvl="1"/>
+            <a:r>
+              <a:rPr lang="en-US" dirty="0"/>
+              <a:t>Click on the “build” link to the left to review the logs of the build process</a:t>
+            </a:r>
+          </a:p>
+          <a:p>
+            <a:pPr lvl="1"/>
+            <a:r>
+              <a:rPr lang="en-US" dirty="0"/>
+              <a:t>Expand the collapsed item “Run a one-line script” so we can see our secret!</a:t>
+            </a:r>
+          </a:p>
+          <a:p>
+            <a:pPr lvl="2"/>
+            <a:r>
+              <a:rPr lang="en-US" dirty="0"/>
+              <a:t>What happened?</a:t>
             </a:r>
           </a:p>
         </p:txBody>
@@ -15691,7 +15627,7 @@
     </p:spTree>
     <p:extLst>
       <p:ext uri="{BB962C8B-B14F-4D97-AF65-F5344CB8AC3E}">
-        <p14:creationId xmlns:p14="http://schemas.microsoft.com/office/powerpoint/2010/main" val="1256485116"/>
+        <p14:creationId xmlns:p14="http://schemas.microsoft.com/office/powerpoint/2010/main" val="1173621339"/>
       </p:ext>
     </p:extLst>
   </p:cSld>
@@ -15723,7 +15659,7 @@
           <p:cNvPr id="2" name="Title 1">
             <a:extLst>
               <a:ext uri="{FF2B5EF4-FFF2-40B4-BE49-F238E27FC236}">
-                <a16:creationId xmlns:a16="http://schemas.microsoft.com/office/drawing/2014/main" id="{6C5BC028-67C3-4959-BA86-7D4751ADBC8E}"/>
+                <a16:creationId xmlns:a16="http://schemas.microsoft.com/office/drawing/2014/main" id="{56B0ED3F-B8C2-4C79-B981-217056E83BA3}"/>
               </a:ext>
             </a:extLst>
           </p:cNvPr>
@@ -15734,24 +15670,90 @@
             <p:ph type="title"/>
           </p:nvPr>
         </p:nvSpPr>
-        <p:spPr/>
+        <p:spPr>
+          <a:xfrm>
+            <a:off x="1141413" y="618518"/>
+            <a:ext cx="9905998" cy="1478570"/>
+          </a:xfrm>
+        </p:spPr>
         <p:txBody>
-          <a:bodyPr/>
+          <a:bodyPr anchor="ctr">
+            <a:normAutofit/>
+          </a:bodyPr>
           <a:lstStyle/>
           <a:p>
             <a:r>
               <a:rPr lang="en-US" dirty="0"/>
-              <a:t>Adding a remote</a:t>
+              <a:t>Forking workflow</a:t>
             </a:r>
           </a:p>
         </p:txBody>
       </p:sp>
+      <p:pic>
+        <p:nvPicPr>
+          <p:cNvPr id="6" name="Picture 5" descr="A picture containing graphical user interface&#10;&#10;Description automatically generated">
+            <a:extLst>
+              <a:ext uri="{FF2B5EF4-FFF2-40B4-BE49-F238E27FC236}">
+                <a16:creationId xmlns:a16="http://schemas.microsoft.com/office/drawing/2014/main" id="{EFB0D2F4-36A4-4706-A37C-A410AB6F13E3}"/>
+              </a:ext>
+            </a:extLst>
+          </p:cNvPr>
+          <p:cNvPicPr>
+            <a:picLocks noChangeAspect="1"/>
+          </p:cNvPicPr>
+          <p:nvPr/>
+        </p:nvPicPr>
+        <p:blipFill>
+          <a:blip r:embed="rId2"/>
+          <a:stretch>
+            <a:fillRect/>
+          </a:stretch>
+        </p:blipFill>
+        <p:spPr>
+          <a:xfrm>
+            <a:off x="1494291" y="1726162"/>
+            <a:ext cx="3749511" cy="4673305"/>
+          </a:xfrm>
+          <a:prstGeom prst="rect">
+            <a:avLst/>
+          </a:prstGeom>
+          <a:solidFill>
+            <a:srgbClr val="FFFFFF">
+              <a:shade val="85000"/>
+            </a:srgbClr>
+          </a:solidFill>
+          <a:ln w="190500" cap="rnd">
+            <a:solidFill>
+              <a:srgbClr val="FFFFFF"/>
+            </a:solidFill>
+          </a:ln>
+          <a:effectLst>
+            <a:outerShdw blurRad="50000" algn="tl" rotWithShape="0">
+              <a:srgbClr val="000000">
+                <a:alpha val="41000"/>
+              </a:srgbClr>
+            </a:outerShdw>
+          </a:effectLst>
+          <a:scene3d>
+            <a:camera prst="orthographicFront"/>
+            <a:lightRig rig="twoPt" dir="t">
+              <a:rot lat="0" lon="0" rev="7800000"/>
+            </a:lightRig>
+          </a:scene3d>
+          <a:sp3d contourW="6350">
+            <a:bevelT w="50800" h="16510"/>
+            <a:contourClr>
+              <a:srgbClr val="C0C0C0"/>
+            </a:contourClr>
+          </a:sp3d>
+        </p:spPr>
+      </p:pic>
       <p:sp>
         <p:nvSpPr>
           <p:cNvPr id="3" name="Content Placeholder 2">
             <a:extLst>
               <a:ext uri="{FF2B5EF4-FFF2-40B4-BE49-F238E27FC236}">
-                <a16:creationId xmlns:a16="http://schemas.microsoft.com/office/drawing/2014/main" id="{B643AAAB-04D8-4324-81AB-4604FABB748C}"/>
+                <a16:creationId xmlns:a16="http://schemas.microsoft.com/office/drawing/2014/main" id="{34190D32-8CFA-4160-B4EA-9C4BF3CC222B}"/>
               </a:ext>
             </a:extLst>
           </p:cNvPr>
@@ -15759,74 +15761,41 @@
             <a:spLocks noGrp="1"/>
           </p:cNvSpPr>
           <p:nvPr>
-            <p:ph idx="1"/>
+            <p:ph sz="half" idx="2"/>
           </p:nvPr>
         </p:nvSpPr>
-        <p:spPr/>
+        <p:spPr>
+          <a:xfrm>
+            <a:off x="6172200" y="2249486"/>
+            <a:ext cx="4875211" cy="3541714"/>
+          </a:xfrm>
+        </p:spPr>
         <p:txBody>
           <a:bodyPr>
-            <a:normAutofit lnSpcReduction="10000"/>
+            <a:normAutofit/>
           </a:bodyPr>
           <a:lstStyle/>
           <a:p>
             <a:r>
               <a:rPr lang="en-US" dirty="0"/>
-              <a:t>The Forking Workflow requires two remotes</a:t>
-            </a:r>
-          </a:p>
-          <a:p>
-            <a:pPr lvl="1"/>
-            <a:r>
-              <a:rPr lang="en-US" dirty="0"/>
-              <a:t>one for the official repository</a:t>
-            </a:r>
-          </a:p>
-          <a:p>
-            <a:pPr lvl="1"/>
-            <a:r>
-              <a:rPr lang="en-US" dirty="0"/>
-              <a:t>one for the developer’s personal server-side repository</a:t>
-            </a:r>
-          </a:p>
-          <a:p>
-            <a:r>
-              <a:rPr lang="en-US" dirty="0"/>
-              <a:t>A common naming convention is to </a:t>
-            </a:r>
-          </a:p>
-          <a:p>
-            <a:pPr lvl="1"/>
-            <a:r>
-              <a:rPr lang="en-US" dirty="0"/>
-              <a:t>use origin as the remote for your forked repository </a:t>
-            </a:r>
-          </a:p>
-          <a:p>
-            <a:pPr lvl="2"/>
-            <a:r>
-              <a:rPr lang="en-US" dirty="0"/>
-              <a:t>This will be created automatically when you run git clone</a:t>
-            </a:r>
-          </a:p>
-          <a:p>
-            <a:pPr lvl="1"/>
-            <a:r>
-              <a:rPr lang="en-US" dirty="0"/>
-              <a:t>upstream for the official repository</a:t>
-            </a:r>
-          </a:p>
-          <a:p>
-            <a:r>
-              <a:rPr lang="en-US" dirty="0"/>
-              <a:t>git remote add upstream https://github.com/user/repo.git</a:t>
-            </a:r>
+              <a:t>The Forking Workflow is most often seen in public open source projects.</a:t>
+            </a:r>
+          </a:p>
+          <a:p>
+            <a:r>
+              <a:rPr lang="en-US" dirty="0"/>
+              <a:t>The main advantage is that contributions can be integrated without the need for everybody to push to a single central repository</a:t>
+            </a:r>
+          </a:p>
+          <a:p>
+            <a:endParaRPr lang="en-US" dirty="0"/>
           </a:p>
         </p:txBody>
       </p:sp>
     </p:spTree>
     <p:extLst>
       <p:ext uri="{BB962C8B-B14F-4D97-AF65-F5344CB8AC3E}">
-        <p14:creationId xmlns:p14="http://schemas.microsoft.com/office/powerpoint/2010/main" val="4047586881"/>
+        <p14:creationId xmlns:p14="http://schemas.microsoft.com/office/powerpoint/2010/main" val="1375465902"/>
       </p:ext>
     </p:extLst>
   </p:cSld>
@@ -15900,11 +15869,21 @@
         <p:spPr/>
         <p:txBody>
           <a:bodyPr>
-            <a:normAutofit fontScale="92500" lnSpcReduction="20000"/>
+            <a:normAutofit fontScale="70000" lnSpcReduction="20000"/>
           </a:bodyPr>
           <a:lstStyle/>
           <a:p>
             <a:r>
+              <a:rPr lang="en-US" dirty="0" err="1"/>
+              <a:t>Gitflow</a:t>
+            </a:r>
+            <a:r>
+              <a:rPr lang="en-US" dirty="0"/>
+              <a:t> Strategy Refresher</a:t>
+            </a:r>
+          </a:p>
+          <a:p>
+            <a:r>
               <a:rPr lang="en-US" dirty="0"/>
               <a:t>Advanced Git Tactics</a:t>
             </a:r>
@@ -15941,6 +15920,13 @@
             <a:r>
               <a:rPr lang="en-US" dirty="0"/>
               <a:t>Actions and Workflows to build a CI/CD Pipeline</a:t>
+            </a:r>
+          </a:p>
+          <a:p>
+            <a:pPr lvl="1"/>
+            <a:r>
+              <a:rPr lang="en-US" dirty="0"/>
+              <a:t>Templates</a:t>
             </a:r>
           </a:p>
           <a:p>
@@ -16005,7 +15991,7 @@
           <p:cNvPr id="2" name="Title 1">
             <a:extLst>
               <a:ext uri="{FF2B5EF4-FFF2-40B4-BE49-F238E27FC236}">
-                <a16:creationId xmlns:a16="http://schemas.microsoft.com/office/drawing/2014/main" id="{EA10D8D4-3DB2-4A9E-B755-952620E4FBCE}"/>
+                <a16:creationId xmlns:a16="http://schemas.microsoft.com/office/drawing/2014/main" id="{E7A3A6D1-66C8-44C6-98FB-76A530D9ECC2}"/>
               </a:ext>
             </a:extLst>
           </p:cNvPr>
@@ -16023,7 +16009,7 @@
           <a:p>
             <a:r>
               <a:rPr lang="en-US" dirty="0"/>
-              <a:t>Making changes</a:t>
+              <a:t>Branching differences</a:t>
             </a:r>
           </a:p>
         </p:txBody>
@@ -16033,7 +16019,7 @@
           <p:cNvPr id="3" name="Content Placeholder 2">
             <a:extLst>
               <a:ext uri="{FF2B5EF4-FFF2-40B4-BE49-F238E27FC236}">
-                <a16:creationId xmlns:a16="http://schemas.microsoft.com/office/drawing/2014/main" id="{E677DBBD-548C-40CB-9AB7-6CF4480001E9}"/>
+                <a16:creationId xmlns:a16="http://schemas.microsoft.com/office/drawing/2014/main" id="{3FFE1642-BC9F-4B01-A237-1732BC79D756}"/>
               </a:ext>
             </a:extLst>
           </p:cNvPr>
@@ -16051,24 +16037,29 @@
           <a:p>
             <a:r>
               <a:rPr lang="en-US" dirty="0"/>
-              <a:t>In your local copy of the forked repository, you can edit code, commit changes, and create branches just like in other Git workflows</a:t>
-            </a:r>
-          </a:p>
-          <a:p>
-            <a:r>
-              <a:rPr lang="en-US" dirty="0"/>
-              <a:t>If the official repo has moved forward, you can get the latest change with “git pull upstream master”</a:t>
-            </a:r>
-          </a:p>
-          <a:p>
-            <a:endParaRPr lang="en-US" dirty="0"/>
+              <a:t>Everybody should still be using branches to isolate individual features, the only difference is how those branches get  shared.</a:t>
+            </a:r>
+          </a:p>
+          <a:p>
+            <a:r>
+              <a:rPr lang="en-US" dirty="0"/>
+              <a:t>In the Forking Workflow, they are pulled into another developer’s local repository, while in the Feature Branch and </a:t>
+            </a:r>
+            <a:r>
+              <a:rPr lang="en-US" dirty="0" err="1"/>
+              <a:t>Gitflow</a:t>
+            </a:r>
+            <a:r>
+              <a:rPr lang="en-US" dirty="0"/>
+              <a:t> Workflows they are pushed to the official repository.</a:t>
+            </a:r>
           </a:p>
         </p:txBody>
       </p:sp>
     </p:spTree>
     <p:extLst>
       <p:ext uri="{BB962C8B-B14F-4D97-AF65-F5344CB8AC3E}">
-        <p14:creationId xmlns:p14="http://schemas.microsoft.com/office/powerpoint/2010/main" val="3070824342"/>
+        <p14:creationId xmlns:p14="http://schemas.microsoft.com/office/powerpoint/2010/main" val="2391448022"/>
       </p:ext>
     </p:extLst>
   </p:cSld>
@@ -16100,7 +16091,7 @@
           <p:cNvPr id="2" name="Title 1">
             <a:extLst>
               <a:ext uri="{FF2B5EF4-FFF2-40B4-BE49-F238E27FC236}">
-                <a16:creationId xmlns:a16="http://schemas.microsoft.com/office/drawing/2014/main" id="{2FF5F1A7-7492-4B3B-94F1-38DF60968C63}"/>
+                <a16:creationId xmlns:a16="http://schemas.microsoft.com/office/drawing/2014/main" id="{A8FA8C29-1A2A-4871-8FF6-E4331B6CEA52}"/>
               </a:ext>
             </a:extLst>
           </p:cNvPr>
@@ -16118,7 +16109,7 @@
           <a:p>
             <a:r>
               <a:rPr lang="en-US" dirty="0"/>
-              <a:t>Submitting code to the official repo</a:t>
+              <a:t>Getting started</a:t>
             </a:r>
           </a:p>
         </p:txBody>
@@ -16128,7 +16119,7 @@
           <p:cNvPr id="3" name="Content Placeholder 2">
             <a:extLst>
               <a:ext uri="{FF2B5EF4-FFF2-40B4-BE49-F238E27FC236}">
-                <a16:creationId xmlns:a16="http://schemas.microsoft.com/office/drawing/2014/main" id="{DE953982-2FE6-44C1-9909-79DAEF6E5045}"/>
+                <a16:creationId xmlns:a16="http://schemas.microsoft.com/office/drawing/2014/main" id="{55835F02-02AE-4439-8E8E-2F03C55CFE77}"/>
               </a:ext>
             </a:extLst>
           </p:cNvPr>
@@ -16141,49 +16132,38 @@
         </p:nvSpPr>
         <p:spPr/>
         <p:txBody>
-          <a:bodyPr>
-            <a:normAutofit fontScale="77500" lnSpcReduction="20000"/>
-          </a:bodyPr>
+          <a:bodyPr/>
           <a:lstStyle/>
           <a:p>
             <a:r>
               <a:rPr lang="en-US" dirty="0"/>
-              <a:t>Now you’re ready to make your new feature available!</a:t>
-            </a:r>
-          </a:p>
-          <a:p>
-            <a:r>
-              <a:rPr lang="en-US" dirty="0"/>
-              <a:t>First, you have to make your contribution accessible to other developers by pushing it to your public repository</a:t>
-            </a:r>
-          </a:p>
-          <a:p>
-            <a:pPr lvl="1"/>
-            <a:r>
-              <a:rPr lang="en-US" dirty="0"/>
-              <a:t>git push origin feature-branch</a:t>
-            </a:r>
-          </a:p>
-          <a:p>
-            <a:r>
-              <a:rPr lang="en-US" dirty="0"/>
-              <a:t>Second, you need to notify the project maintainer that they want to merge their feature into the official codebase</a:t>
-            </a:r>
-          </a:p>
-          <a:p>
+              <a:t>All new developers to a Forking Workflow project need to fork the official repository</a:t>
+            </a:r>
+          </a:p>
+          <a:p>
+            <a:r>
+              <a:rPr lang="en-US" dirty="0"/>
+              <a:t>Forking is just a standard git clone operation</a:t>
+            </a:r>
+          </a:p>
+          <a:p>
+            <a:r>
+              <a:rPr lang="en-US" dirty="0"/>
+              <a:t>This will clone the original repository to our own server-side repository</a:t>
+            </a:r>
+          </a:p>
+          <a:p>
+            <a:r>
+              <a:rPr lang="en-US" dirty="0"/>
+              <a:t>Git hosting services automate this step without the need of </a:t>
+            </a:r>
             <a:r>
               <a:rPr lang="en-US" dirty="0" err="1"/>
-              <a:t>Github</a:t>
-            </a:r>
-            <a:r>
-              <a:rPr lang="en-US" dirty="0"/>
-              <a:t> provides a “new pull request” button that leads to a form asking you to specify which branch you want to merge into the official repository.</a:t>
-            </a:r>
-          </a:p>
-          <a:p>
-            <a:r>
-              <a:rPr lang="en-US" dirty="0"/>
-              <a:t>Typically, you’ll want to integrate your feature branch into the upstream remote’s master branch.</a:t>
+              <a:t>SSH’ing</a:t>
+            </a:r>
+            <a:r>
+              <a:rPr lang="en-US" dirty="0"/>
+              <a:t> into a server to clone</a:t>
             </a:r>
           </a:p>
         </p:txBody>
@@ -16191,7 +16171,7 @@
     </p:spTree>
     <p:extLst>
       <p:ext uri="{BB962C8B-B14F-4D97-AF65-F5344CB8AC3E}">
-        <p14:creationId xmlns:p14="http://schemas.microsoft.com/office/powerpoint/2010/main" val="994643470"/>
+        <p14:creationId xmlns:p14="http://schemas.microsoft.com/office/powerpoint/2010/main" val="2254951386"/>
       </p:ext>
     </p:extLst>
   </p:cSld>
@@ -16223,7 +16203,7 @@
           <p:cNvPr id="2" name="Title 1">
             <a:extLst>
               <a:ext uri="{FF2B5EF4-FFF2-40B4-BE49-F238E27FC236}">
-                <a16:creationId xmlns:a16="http://schemas.microsoft.com/office/drawing/2014/main" id="{67E1F745-C343-4000-BA61-A4216D992177}"/>
+                <a16:creationId xmlns:a16="http://schemas.microsoft.com/office/drawing/2014/main" id="{189ECE41-5CBE-4823-A2D4-75C0D66245FC}"/>
               </a:ext>
             </a:extLst>
           </p:cNvPr>
@@ -16241,7 +16221,7 @@
           <a:p>
             <a:r>
               <a:rPr lang="en-US" dirty="0"/>
-              <a:t>Pull Requests</a:t>
+              <a:t>Clone your fork</a:t>
             </a:r>
           </a:p>
         </p:txBody>
@@ -16251,7 +16231,7 @@
           <p:cNvPr id="3" name="Content Placeholder 2">
             <a:extLst>
               <a:ext uri="{FF2B5EF4-FFF2-40B4-BE49-F238E27FC236}">
-                <a16:creationId xmlns:a16="http://schemas.microsoft.com/office/drawing/2014/main" id="{4A71ABC2-B0DA-4589-9CF9-EACAE9E9E93D}"/>
+                <a16:creationId xmlns:a16="http://schemas.microsoft.com/office/drawing/2014/main" id="{79A7F064-E54D-486C-8916-AD49218D22F8}"/>
               </a:ext>
             </a:extLst>
           </p:cNvPr>
@@ -16264,60 +16244,24 @@
         </p:nvSpPr>
         <p:spPr/>
         <p:txBody>
-          <a:bodyPr>
-            <a:normAutofit fontScale="85000" lnSpcReduction="10000"/>
-          </a:bodyPr>
+          <a:bodyPr/>
           <a:lstStyle/>
           <a:p>
             <a:r>
               <a:rPr lang="en-US" dirty="0"/>
-              <a:t>Pull requests (or PRs) represent a formal workflow to introduce code from one branch to another</a:t>
-            </a:r>
-          </a:p>
-          <a:p>
-            <a:r>
-              <a:rPr lang="en-US" dirty="0"/>
-              <a:t>There is typically a review process for pull requests</a:t>
-            </a:r>
-          </a:p>
-          <a:p>
-            <a:r>
-              <a:rPr lang="en-US" dirty="0"/>
-              <a:t>PRs provide a history for your repository beyond branches and commits</a:t>
-            </a:r>
-          </a:p>
-          <a:p>
-            <a:r>
-              <a:rPr lang="en-US" dirty="0"/>
-              <a:t>PRs can have rules to, including but not limited to, do the following:</a:t>
-            </a:r>
-          </a:p>
-          <a:p>
-            <a:pPr lvl="1"/>
-            <a:r>
-              <a:rPr lang="en-US" dirty="0"/>
-              <a:t>Make sure all code passes tests before it can be merged</a:t>
-            </a:r>
-          </a:p>
-          <a:p>
-            <a:pPr lvl="1"/>
-            <a:r>
-              <a:rPr lang="en-US" dirty="0"/>
-              <a:t>Meets the minimum number of approvers</a:t>
-            </a:r>
-          </a:p>
-          <a:p>
-            <a:pPr lvl="1"/>
-            <a:r>
-              <a:rPr lang="en-US" dirty="0"/>
-              <a:t>Expires if too much time has passed</a:t>
-            </a:r>
-          </a:p>
-          <a:p>
-            <a:pPr lvl="1"/>
-            <a:r>
-              <a:rPr lang="en-US" dirty="0"/>
-              <a:t>Clear previous approvals if the contributor pushes additional changes to the branch to be merged</a:t>
+              <a:t>Clone your own public forked repo</a:t>
+            </a:r>
+          </a:p>
+          <a:p>
+            <a:r>
+              <a:rPr lang="en-US" dirty="0"/>
+              <a:t>This can be done with the familiar git clone command</a:t>
+            </a:r>
+          </a:p>
+          <a:p>
+            <a:r>
+              <a:rPr lang="en-US" dirty="0"/>
+              <a:t>Git clone https://github.com/user/repo.git</a:t>
             </a:r>
           </a:p>
         </p:txBody>
@@ -16325,7 +16269,7 @@
     </p:spTree>
     <p:extLst>
       <p:ext uri="{BB962C8B-B14F-4D97-AF65-F5344CB8AC3E}">
-        <p14:creationId xmlns:p14="http://schemas.microsoft.com/office/powerpoint/2010/main" val="2477599779"/>
+        <p14:creationId xmlns:p14="http://schemas.microsoft.com/office/powerpoint/2010/main" val="1256485116"/>
       </p:ext>
     </p:extLst>
   </p:cSld>
@@ -16357,7 +16301,7 @@
           <p:cNvPr id="2" name="Title 1">
             <a:extLst>
               <a:ext uri="{FF2B5EF4-FFF2-40B4-BE49-F238E27FC236}">
-                <a16:creationId xmlns:a16="http://schemas.microsoft.com/office/drawing/2014/main" id="{7826371A-3D4E-49A3-A87C-545BDF3F92E5}"/>
+                <a16:creationId xmlns:a16="http://schemas.microsoft.com/office/drawing/2014/main" id="{6C5BC028-67C3-4959-BA86-7D4751ADBC8E}"/>
               </a:ext>
             </a:extLst>
           </p:cNvPr>
@@ -16375,7 +16319,7 @@
           <a:p>
             <a:r>
               <a:rPr lang="en-US" dirty="0"/>
-              <a:t>Issue tracking and projects</a:t>
+              <a:t>Adding a remote</a:t>
             </a:r>
           </a:p>
         </p:txBody>
@@ -16385,7 +16329,7 @@
           <p:cNvPr id="3" name="Content Placeholder 2">
             <a:extLst>
               <a:ext uri="{FF2B5EF4-FFF2-40B4-BE49-F238E27FC236}">
-                <a16:creationId xmlns:a16="http://schemas.microsoft.com/office/drawing/2014/main" id="{9BB3DF2A-9194-46FA-BE6A-7E2920736BBB}"/>
+                <a16:creationId xmlns:a16="http://schemas.microsoft.com/office/drawing/2014/main" id="{B643AAAB-04D8-4324-81AB-4604FABB748C}"/>
               </a:ext>
             </a:extLst>
           </p:cNvPr>
@@ -16399,54 +16343,68 @@
         <p:spPr/>
         <p:txBody>
           <a:bodyPr>
-            <a:normAutofit/>
+            <a:normAutofit lnSpcReduction="10000"/>
           </a:bodyPr>
           <a:lstStyle/>
           <a:p>
             <a:r>
               <a:rPr lang="en-US" dirty="0"/>
-              <a:t>Projects helps consolidate the work specific to a certain effort</a:t>
+              <a:t>The Forking Workflow requires two remotes</a:t>
             </a:r>
           </a:p>
           <a:p>
             <a:pPr lvl="1"/>
             <a:r>
               <a:rPr lang="en-US" dirty="0"/>
-              <a:t>A project need not be limited to a single repository</a:t>
+              <a:t>one for the official repository</a:t>
             </a:r>
           </a:p>
           <a:p>
             <a:pPr lvl="1"/>
             <a:r>
               <a:rPr lang="en-US" dirty="0"/>
-              <a:t>Most larger projects will have numerous repositories attached</a:t>
+              <a:t>one for the developer’s personal server-side repository</a:t>
+            </a:r>
+          </a:p>
+          <a:p>
+            <a:r>
+              <a:rPr lang="en-US" dirty="0"/>
+              <a:t>A common naming convention is to </a:t>
             </a:r>
           </a:p>
           <a:p>
             <a:pPr lvl="1"/>
             <a:r>
               <a:rPr lang="en-US" dirty="0"/>
-              <a:t>Kanban boards are a common work management tool to quickly visualize and progress items in need of completing</a:t>
+              <a:t>use origin as the remote for your forked repository </a:t>
+            </a:r>
+          </a:p>
+          <a:p>
+            <a:pPr lvl="2"/>
+            <a:r>
+              <a:rPr lang="en-US" dirty="0"/>
+              <a:t>This will be created automatically when you run git clone</a:t>
             </a:r>
           </a:p>
           <a:p>
             <a:pPr lvl="1"/>
             <a:r>
               <a:rPr lang="en-US" dirty="0"/>
-              <a:t>Issues can be triaged directly from your project screen to be sorted on the </a:t>
-            </a:r>
-            <a:r>
-              <a:rPr lang="en-US" dirty="0" err="1"/>
-              <a:t>kanban</a:t>
-            </a:r>
-            <a:endParaRPr lang="en-US" dirty="0"/>
+              <a:t>upstream for the official repository</a:t>
+            </a:r>
+          </a:p>
+          <a:p>
+            <a:r>
+              <a:rPr lang="en-US" dirty="0"/>
+              <a:t>git remote add upstream https://github.com/user/repo.git</a:t>
+            </a:r>
           </a:p>
         </p:txBody>
       </p:sp>
     </p:spTree>
     <p:extLst>
       <p:ext uri="{BB962C8B-B14F-4D97-AF65-F5344CB8AC3E}">
-        <p14:creationId xmlns:p14="http://schemas.microsoft.com/office/powerpoint/2010/main" val="1765616708"/>
+        <p14:creationId xmlns:p14="http://schemas.microsoft.com/office/powerpoint/2010/main" val="4047586881"/>
       </p:ext>
     </p:extLst>
   </p:cSld>
@@ -16478,7 +16436,7 @@
           <p:cNvPr id="2" name="Title 1">
             <a:extLst>
               <a:ext uri="{FF2B5EF4-FFF2-40B4-BE49-F238E27FC236}">
-                <a16:creationId xmlns:a16="http://schemas.microsoft.com/office/drawing/2014/main" id="{7826371A-3D4E-49A3-A87C-545BDF3F92E5}"/>
+                <a16:creationId xmlns:a16="http://schemas.microsoft.com/office/drawing/2014/main" id="{EA10D8D4-3DB2-4A9E-B755-952620E4FBCE}"/>
               </a:ext>
             </a:extLst>
           </p:cNvPr>
@@ -16496,7 +16454,7 @@
           <a:p>
             <a:r>
               <a:rPr lang="en-US" dirty="0"/>
-              <a:t>Issue tracking and projects (Cont.)</a:t>
+              <a:t>Making changes</a:t>
             </a:r>
           </a:p>
         </p:txBody>
@@ -16506,7 +16464,7 @@
           <p:cNvPr id="3" name="Content Placeholder 2">
             <a:extLst>
               <a:ext uri="{FF2B5EF4-FFF2-40B4-BE49-F238E27FC236}">
-                <a16:creationId xmlns:a16="http://schemas.microsoft.com/office/drawing/2014/main" id="{9BB3DF2A-9194-46FA-BE6A-7E2920736BBB}"/>
+                <a16:creationId xmlns:a16="http://schemas.microsoft.com/office/drawing/2014/main" id="{E677DBBD-548C-40CB-9AB7-6CF4480001E9}"/>
               </a:ext>
             </a:extLst>
           </p:cNvPr>
@@ -16519,63 +16477,29 @@
         </p:nvSpPr>
         <p:spPr/>
         <p:txBody>
-          <a:bodyPr>
-            <a:normAutofit fontScale="92500" lnSpcReduction="10000"/>
-          </a:bodyPr>
+          <a:bodyPr/>
           <a:lstStyle/>
           <a:p>
             <a:r>
               <a:rPr lang="en-US" dirty="0"/>
-              <a:t>Issue tracking acts as a funnel for all work coming into your project</a:t>
-            </a:r>
-          </a:p>
-          <a:p>
-            <a:pPr lvl="1"/>
-            <a:r>
-              <a:rPr lang="en-US" dirty="0"/>
-              <a:t>This doesn’t have to be explicitly issues in the sense of bugs or problems</a:t>
-            </a:r>
-          </a:p>
-          <a:p>
-            <a:pPr lvl="1"/>
-            <a:r>
-              <a:rPr lang="en-US" dirty="0"/>
-              <a:t>Enhancements or new features are classified as “issues”</a:t>
-            </a:r>
-          </a:p>
-          <a:p>
-            <a:pPr lvl="1"/>
-            <a:r>
-              <a:rPr lang="en-US" dirty="0"/>
-              <a:t>Requests for additional documentation are issues as well</a:t>
-            </a:r>
-          </a:p>
-          <a:p>
-            <a:r>
-              <a:rPr lang="en-US" dirty="0"/>
-              <a:t>As new issues are tracked, labels can help sort out the work</a:t>
-            </a:r>
-          </a:p>
-          <a:p>
-            <a:pPr lvl="1"/>
-            <a:r>
-              <a:rPr lang="en-US" dirty="0"/>
-              <a:t>Items tagged with “good first issue” are terrific for newcomers to your project (or a great target if you want to start helping on someone else’s project)</a:t>
-            </a:r>
-          </a:p>
-          <a:p>
-            <a:pPr lvl="1"/>
-            <a:r>
-              <a:rPr lang="en-US" dirty="0"/>
-              <a:t>“Help wanted” can indicate that the issue has exceeded the capacity of the current assignee, so they’re looking for more hands to solve the problem</a:t>
-            </a:r>
+              <a:t>In your local copy of the forked repository, you can edit code, commit changes, and create branches just like in other Git workflows</a:t>
+            </a:r>
+          </a:p>
+          <a:p>
+            <a:r>
+              <a:rPr lang="en-US" dirty="0"/>
+              <a:t>If the official repo has moved forward, you can get the latest change with “git pull upstream master”</a:t>
+            </a:r>
+          </a:p>
+          <a:p>
+            <a:endParaRPr lang="en-US" dirty="0"/>
           </a:p>
         </p:txBody>
       </p:sp>
     </p:spTree>
     <p:extLst>
       <p:ext uri="{BB962C8B-B14F-4D97-AF65-F5344CB8AC3E}">
-        <p14:creationId xmlns:p14="http://schemas.microsoft.com/office/powerpoint/2010/main" val="211437080"/>
+        <p14:creationId xmlns:p14="http://schemas.microsoft.com/office/powerpoint/2010/main" val="3070824342"/>
       </p:ext>
     </p:extLst>
   </p:cSld>
@@ -16607,7 +16531,7 @@
           <p:cNvPr id="2" name="Title 1">
             <a:extLst>
               <a:ext uri="{FF2B5EF4-FFF2-40B4-BE49-F238E27FC236}">
-                <a16:creationId xmlns:a16="http://schemas.microsoft.com/office/drawing/2014/main" id="{C7AB3235-CCE8-46E6-BDE8-EF71E09B00DA}"/>
+                <a16:creationId xmlns:a16="http://schemas.microsoft.com/office/drawing/2014/main" id="{2FF5F1A7-7492-4B3B-94F1-38DF60968C63}"/>
               </a:ext>
             </a:extLst>
           </p:cNvPr>
@@ -16625,7 +16549,7 @@
           <a:p>
             <a:r>
               <a:rPr lang="en-US" dirty="0"/>
-              <a:t>Presentation End – open lab and questions</a:t>
+              <a:t>Submitting code to the official repo</a:t>
             </a:r>
           </a:p>
         </p:txBody>
@@ -16635,7 +16559,7 @@
           <p:cNvPr id="3" name="Content Placeholder 2">
             <a:extLst>
               <a:ext uri="{FF2B5EF4-FFF2-40B4-BE49-F238E27FC236}">
-                <a16:creationId xmlns:a16="http://schemas.microsoft.com/office/drawing/2014/main" id="{3A9669AB-E7B2-4895-9E7F-B06438F6702B}"/>
+                <a16:creationId xmlns:a16="http://schemas.microsoft.com/office/drawing/2014/main" id="{DE953982-2FE6-44C1-9909-79DAEF6E5045}"/>
               </a:ext>
             </a:extLst>
           </p:cNvPr>
@@ -16648,51 +16572,605 @@
         </p:nvSpPr>
         <p:spPr/>
         <p:txBody>
-          <a:bodyPr/>
+          <a:bodyPr>
+            <a:normAutofit fontScale="77500" lnSpcReduction="20000"/>
+          </a:bodyPr>
           <a:lstStyle/>
           <a:p>
             <a:r>
               <a:rPr lang="en-US" dirty="0"/>
-              <a:t>Can’t think of a question or need to leave before I can answer?</a:t>
+              <a:t>Now you’re ready to make your new feature available!</a:t>
+            </a:r>
+          </a:p>
+          <a:p>
+            <a:r>
+              <a:rPr lang="en-US" dirty="0"/>
+              <a:t>First, you have to make your contribution accessible to other developers by pushing it to your public repository</a:t>
             </a:r>
           </a:p>
           <a:p>
             <a:pPr lvl="1"/>
             <a:r>
               <a:rPr lang="en-US" dirty="0"/>
-              <a:t>No worries! Send me an email – </a:t>
-            </a:r>
-            <a:r>
-              <a:rPr lang="en-US" dirty="0">
-                <a:solidFill>
-                  <a:schemeClr val="tx1">
-                    <a:lumMod val="95000"/>
-                  </a:schemeClr>
-                </a:solidFill>
-                <a:hlinkClick r:id="rId2">
-                  <a:extLst>
-                    <a:ext uri="{A12FA001-AC4F-418D-AE19-62706E023703}">
-                      <ahyp:hlinkClr xmlns:ahyp="http://schemas.microsoft.com/office/drawing/2018/hyperlinkcolor" val="tx"/>
-                    </a:ext>
-                  </a:extLst>
-                </a:hlinkClick>
-              </a:rPr>
-              <a:t>zach@zach-martin.com</a:t>
-            </a:r>
-            <a:endParaRPr lang="en-US" dirty="0">
-              <a:solidFill>
-                <a:schemeClr val="tx1">
-                  <a:lumMod val="95000"/>
-                </a:schemeClr>
-              </a:solidFill>
-            </a:endParaRPr>
+              <a:t>git push origin feature-branch</a:t>
+            </a:r>
+          </a:p>
+          <a:p>
+            <a:r>
+              <a:rPr lang="en-US" dirty="0"/>
+              <a:t>Second, you need to notify the project maintainer that they want to merge their feature into the official codebase</a:t>
+            </a:r>
+          </a:p>
+          <a:p>
+            <a:r>
+              <a:rPr lang="en-US" dirty="0" err="1"/>
+              <a:t>Github</a:t>
+            </a:r>
+            <a:r>
+              <a:rPr lang="en-US" dirty="0"/>
+              <a:t> provides a “new pull request” button that leads to a form asking you to specify which branch you want to merge into the official repository.</a:t>
+            </a:r>
+          </a:p>
+          <a:p>
+            <a:r>
+              <a:rPr lang="en-US" dirty="0"/>
+              <a:t>Typically, you’ll want to integrate your feature branch into the upstream remote’s master branch.</a:t>
+            </a:r>
           </a:p>
         </p:txBody>
       </p:sp>
     </p:spTree>
     <p:extLst>
       <p:ext uri="{BB962C8B-B14F-4D97-AF65-F5344CB8AC3E}">
-        <p14:creationId xmlns:p14="http://schemas.microsoft.com/office/powerpoint/2010/main" val="3460011935"/>
+        <p14:creationId xmlns:p14="http://schemas.microsoft.com/office/powerpoint/2010/main" val="994643470"/>
+      </p:ext>
+    </p:extLst>
+  </p:cSld>
+  <p:clrMapOvr>
+    <a:masterClrMapping/>
+  </p:clrMapOvr>
+</p:sld>
+</file>
+
+<file path=ppt/slides/slide36.xml><?xml version="1.0" encoding="utf-8"?>
+<p:sld xmlns:a="http://schemas.openxmlformats.org/drawingml/2006/main" xmlns:r="http://schemas.openxmlformats.org/officeDocument/2006/relationships" xmlns:p="http://schemas.openxmlformats.org/presentationml/2006/main">
+  <p:cSld>
+    <p:spTree>
+      <p:nvGrpSpPr>
+        <p:cNvPr id="1" name=""/>
+        <p:cNvGrpSpPr/>
+        <p:nvPr/>
+      </p:nvGrpSpPr>
+      <p:grpSpPr>
+        <a:xfrm>
+          <a:off x="0" y="0"/>
+          <a:ext cx="0" cy="0"/>
+          <a:chOff x="0" y="0"/>
+          <a:chExt cx="0" cy="0"/>
+        </a:xfrm>
+      </p:grpSpPr>
+      <p:sp>
+        <p:nvSpPr>
+          <p:cNvPr id="2" name="Title 1">
+            <a:extLst>
+              <a:ext uri="{FF2B5EF4-FFF2-40B4-BE49-F238E27FC236}">
+                <a16:creationId xmlns:a16="http://schemas.microsoft.com/office/drawing/2014/main" id="{67E1F745-C343-4000-BA61-A4216D992177}"/>
+              </a:ext>
+            </a:extLst>
+          </p:cNvPr>
+          <p:cNvSpPr>
+            <a:spLocks noGrp="1"/>
+          </p:cNvSpPr>
+          <p:nvPr>
+            <p:ph type="title"/>
+          </p:nvPr>
+        </p:nvSpPr>
+        <p:spPr/>
+        <p:txBody>
+          <a:bodyPr/>
+          <a:lstStyle/>
+          <a:p>
+            <a:r>
+              <a:rPr lang="en-US" dirty="0"/>
+              <a:t>Pull Requests</a:t>
+            </a:r>
+          </a:p>
+        </p:txBody>
+      </p:sp>
+      <p:sp>
+        <p:nvSpPr>
+          <p:cNvPr id="3" name="Content Placeholder 2">
+            <a:extLst>
+              <a:ext uri="{FF2B5EF4-FFF2-40B4-BE49-F238E27FC236}">
+                <a16:creationId xmlns:a16="http://schemas.microsoft.com/office/drawing/2014/main" id="{4A71ABC2-B0DA-4589-9CF9-EACAE9E9E93D}"/>
+              </a:ext>
+            </a:extLst>
+          </p:cNvPr>
+          <p:cNvSpPr>
+            <a:spLocks noGrp="1"/>
+          </p:cNvSpPr>
+          <p:nvPr>
+            <p:ph idx="1"/>
+          </p:nvPr>
+        </p:nvSpPr>
+        <p:spPr/>
+        <p:txBody>
+          <a:bodyPr>
+            <a:normAutofit fontScale="85000" lnSpcReduction="10000"/>
+          </a:bodyPr>
+          <a:lstStyle/>
+          <a:p>
+            <a:r>
+              <a:rPr lang="en-US" dirty="0"/>
+              <a:t>Pull requests (or PRs) represent a formal workflow to introduce code from one branch to another</a:t>
+            </a:r>
+          </a:p>
+          <a:p>
+            <a:r>
+              <a:rPr lang="en-US" dirty="0"/>
+              <a:t>There is typically a review process for pull requests</a:t>
+            </a:r>
+          </a:p>
+          <a:p>
+            <a:r>
+              <a:rPr lang="en-US" dirty="0"/>
+              <a:t>PRs provide a history for your repository beyond branches and commits</a:t>
+            </a:r>
+          </a:p>
+          <a:p>
+            <a:r>
+              <a:rPr lang="en-US" dirty="0"/>
+              <a:t>PRs can have rules to, including but not limited to, do the following:</a:t>
+            </a:r>
+          </a:p>
+          <a:p>
+            <a:pPr lvl="1"/>
+            <a:r>
+              <a:rPr lang="en-US" dirty="0"/>
+              <a:t>Make sure all code passes tests before it can be merged</a:t>
+            </a:r>
+          </a:p>
+          <a:p>
+            <a:pPr lvl="1"/>
+            <a:r>
+              <a:rPr lang="en-US" dirty="0"/>
+              <a:t>Meets the minimum number of approvers</a:t>
+            </a:r>
+          </a:p>
+          <a:p>
+            <a:pPr lvl="1"/>
+            <a:r>
+              <a:rPr lang="en-US" dirty="0"/>
+              <a:t>Expires if too much time has passed</a:t>
+            </a:r>
+          </a:p>
+          <a:p>
+            <a:pPr lvl="1"/>
+            <a:r>
+              <a:rPr lang="en-US" dirty="0"/>
+              <a:t>Clear previous approvals if the contributor pushes additional changes to the branch to be merged</a:t>
+            </a:r>
+          </a:p>
+        </p:txBody>
+      </p:sp>
+    </p:spTree>
+    <p:extLst>
+      <p:ext uri="{BB962C8B-B14F-4D97-AF65-F5344CB8AC3E}">
+        <p14:creationId xmlns:p14="http://schemas.microsoft.com/office/powerpoint/2010/main" val="2477599779"/>
+      </p:ext>
+    </p:extLst>
+  </p:cSld>
+  <p:clrMapOvr>
+    <a:masterClrMapping/>
+  </p:clrMapOvr>
+</p:sld>
+</file>
+
+<file path=ppt/slides/slide37.xml><?xml version="1.0" encoding="utf-8"?>
+<p:sld xmlns:a="http://schemas.openxmlformats.org/drawingml/2006/main" xmlns:r="http://schemas.openxmlformats.org/officeDocument/2006/relationships" xmlns:p="http://schemas.openxmlformats.org/presentationml/2006/main">
+  <p:cSld>
+    <p:spTree>
+      <p:nvGrpSpPr>
+        <p:cNvPr id="1" name=""/>
+        <p:cNvGrpSpPr/>
+        <p:nvPr/>
+      </p:nvGrpSpPr>
+      <p:grpSpPr>
+        <a:xfrm>
+          <a:off x="0" y="0"/>
+          <a:ext cx="0" cy="0"/>
+          <a:chOff x="0" y="0"/>
+          <a:chExt cx="0" cy="0"/>
+        </a:xfrm>
+      </p:grpSpPr>
+      <p:sp>
+        <p:nvSpPr>
+          <p:cNvPr id="2" name="Title 1">
+            <a:extLst>
+              <a:ext uri="{FF2B5EF4-FFF2-40B4-BE49-F238E27FC236}">
+                <a16:creationId xmlns:a16="http://schemas.microsoft.com/office/drawing/2014/main" id="{7826371A-3D4E-49A3-A87C-545BDF3F92E5}"/>
+              </a:ext>
+            </a:extLst>
+          </p:cNvPr>
+          <p:cNvSpPr>
+            <a:spLocks noGrp="1"/>
+          </p:cNvSpPr>
+          <p:nvPr>
+            <p:ph type="title"/>
+          </p:nvPr>
+        </p:nvSpPr>
+        <p:spPr/>
+        <p:txBody>
+          <a:bodyPr/>
+          <a:lstStyle/>
+          <a:p>
+            <a:r>
+              <a:rPr lang="en-US" dirty="0"/>
+              <a:t>Issue tracking and projects</a:t>
+            </a:r>
+          </a:p>
+        </p:txBody>
+      </p:sp>
+      <p:sp>
+        <p:nvSpPr>
+          <p:cNvPr id="3" name="Content Placeholder 2">
+            <a:extLst>
+              <a:ext uri="{FF2B5EF4-FFF2-40B4-BE49-F238E27FC236}">
+                <a16:creationId xmlns:a16="http://schemas.microsoft.com/office/drawing/2014/main" id="{9BB3DF2A-9194-46FA-BE6A-7E2920736BBB}"/>
+              </a:ext>
+            </a:extLst>
+          </p:cNvPr>
+          <p:cNvSpPr>
+            <a:spLocks noGrp="1"/>
+          </p:cNvSpPr>
+          <p:nvPr>
+            <p:ph idx="1"/>
+          </p:nvPr>
+        </p:nvSpPr>
+        <p:spPr/>
+        <p:txBody>
+          <a:bodyPr>
+            <a:normAutofit/>
+          </a:bodyPr>
+          <a:lstStyle/>
+          <a:p>
+            <a:r>
+              <a:rPr lang="en-US" dirty="0"/>
+              <a:t>Projects helps consolidate the work specific to a certain effort</a:t>
+            </a:r>
+          </a:p>
+          <a:p>
+            <a:pPr lvl="1"/>
+            <a:r>
+              <a:rPr lang="en-US" dirty="0"/>
+              <a:t>A project need not be limited to a single repository</a:t>
+            </a:r>
+          </a:p>
+          <a:p>
+            <a:pPr lvl="1"/>
+            <a:r>
+              <a:rPr lang="en-US" dirty="0"/>
+              <a:t>Most larger projects will have numerous repositories attached</a:t>
+            </a:r>
+          </a:p>
+          <a:p>
+            <a:pPr lvl="1"/>
+            <a:r>
+              <a:rPr lang="en-US" dirty="0"/>
+              <a:t>Kanban boards are a common work management tool to quickly visualize and progress items in need of completing</a:t>
+            </a:r>
+          </a:p>
+          <a:p>
+            <a:pPr lvl="1"/>
+            <a:r>
+              <a:rPr lang="en-US" dirty="0"/>
+              <a:t>Issues can be triaged directly from your project screen to be sorted on the </a:t>
+            </a:r>
+            <a:r>
+              <a:rPr lang="en-US" dirty="0" err="1"/>
+              <a:t>kanban</a:t>
+            </a:r>
+            <a:endParaRPr lang="en-US" dirty="0"/>
+          </a:p>
+        </p:txBody>
+      </p:sp>
+    </p:spTree>
+    <p:extLst>
+      <p:ext uri="{BB962C8B-B14F-4D97-AF65-F5344CB8AC3E}">
+        <p14:creationId xmlns:p14="http://schemas.microsoft.com/office/powerpoint/2010/main" val="1765616708"/>
+      </p:ext>
+    </p:extLst>
+  </p:cSld>
+  <p:clrMapOvr>
+    <a:masterClrMapping/>
+  </p:clrMapOvr>
+</p:sld>
+</file>
+
+<file path=ppt/slides/slide38.xml><?xml version="1.0" encoding="utf-8"?>
+<p:sld xmlns:a="http://schemas.openxmlformats.org/drawingml/2006/main" xmlns:r="http://schemas.openxmlformats.org/officeDocument/2006/relationships" xmlns:p="http://schemas.openxmlformats.org/presentationml/2006/main">
+  <p:cSld>
+    <p:spTree>
+      <p:nvGrpSpPr>
+        <p:cNvPr id="1" name=""/>
+        <p:cNvGrpSpPr/>
+        <p:nvPr/>
+      </p:nvGrpSpPr>
+      <p:grpSpPr>
+        <a:xfrm>
+          <a:off x="0" y="0"/>
+          <a:ext cx="0" cy="0"/>
+          <a:chOff x="0" y="0"/>
+          <a:chExt cx="0" cy="0"/>
+        </a:xfrm>
+      </p:grpSpPr>
+      <p:sp>
+        <p:nvSpPr>
+          <p:cNvPr id="2" name="Title 1">
+            <a:extLst>
+              <a:ext uri="{FF2B5EF4-FFF2-40B4-BE49-F238E27FC236}">
+                <a16:creationId xmlns:a16="http://schemas.microsoft.com/office/drawing/2014/main" id="{7826371A-3D4E-49A3-A87C-545BDF3F92E5}"/>
+              </a:ext>
+            </a:extLst>
+          </p:cNvPr>
+          <p:cNvSpPr>
+            <a:spLocks noGrp="1"/>
+          </p:cNvSpPr>
+          <p:nvPr>
+            <p:ph type="title"/>
+          </p:nvPr>
+        </p:nvSpPr>
+        <p:spPr/>
+        <p:txBody>
+          <a:bodyPr/>
+          <a:lstStyle/>
+          <a:p>
+            <a:r>
+              <a:rPr lang="en-US" dirty="0"/>
+              <a:t>Issue tracking and projects (Cont.)</a:t>
+            </a:r>
+          </a:p>
+        </p:txBody>
+      </p:sp>
+      <p:sp>
+        <p:nvSpPr>
+          <p:cNvPr id="3" name="Content Placeholder 2">
+            <a:extLst>
+              <a:ext uri="{FF2B5EF4-FFF2-40B4-BE49-F238E27FC236}">
+                <a16:creationId xmlns:a16="http://schemas.microsoft.com/office/drawing/2014/main" id="{9BB3DF2A-9194-46FA-BE6A-7E2920736BBB}"/>
+              </a:ext>
+            </a:extLst>
+          </p:cNvPr>
+          <p:cNvSpPr>
+            <a:spLocks noGrp="1"/>
+          </p:cNvSpPr>
+          <p:nvPr>
+            <p:ph idx="1"/>
+          </p:nvPr>
+        </p:nvSpPr>
+        <p:spPr/>
+        <p:txBody>
+          <a:bodyPr>
+            <a:normAutofit fontScale="92500" lnSpcReduction="10000"/>
+          </a:bodyPr>
+          <a:lstStyle/>
+          <a:p>
+            <a:r>
+              <a:rPr lang="en-US" dirty="0"/>
+              <a:t>Issue tracking acts as a funnel for all work coming into your project</a:t>
+            </a:r>
+          </a:p>
+          <a:p>
+            <a:pPr lvl="1"/>
+            <a:r>
+              <a:rPr lang="en-US" dirty="0"/>
+              <a:t>This doesn’t have to be explicitly issues in the sense of bugs or problems</a:t>
+            </a:r>
+          </a:p>
+          <a:p>
+            <a:pPr lvl="1"/>
+            <a:r>
+              <a:rPr lang="en-US" dirty="0"/>
+              <a:t>Enhancements or new features are classified as “issues”</a:t>
+            </a:r>
+          </a:p>
+          <a:p>
+            <a:pPr lvl="1"/>
+            <a:r>
+              <a:rPr lang="en-US" dirty="0"/>
+              <a:t>Requests for additional documentation are issues as well</a:t>
+            </a:r>
+          </a:p>
+          <a:p>
+            <a:r>
+              <a:rPr lang="en-US" dirty="0"/>
+              <a:t>As new issues are tracked, labels can help sort out the work</a:t>
+            </a:r>
+          </a:p>
+          <a:p>
+            <a:pPr lvl="1"/>
+            <a:r>
+              <a:rPr lang="en-US" dirty="0"/>
+              <a:t>Items tagged with “good first issue” are terrific for newcomers to your project (or a great target if you want to start helping on someone else’s project)</a:t>
+            </a:r>
+          </a:p>
+          <a:p>
+            <a:pPr lvl="1"/>
+            <a:r>
+              <a:rPr lang="en-US" dirty="0"/>
+              <a:t>“Help wanted” can indicate that the issue has exceeded the capacity of the current assignee, so they’re looking for more hands to solve the problem</a:t>
+            </a:r>
+          </a:p>
+        </p:txBody>
+      </p:sp>
+    </p:spTree>
+    <p:extLst>
+      <p:ext uri="{BB962C8B-B14F-4D97-AF65-F5344CB8AC3E}">
+        <p14:creationId xmlns:p14="http://schemas.microsoft.com/office/powerpoint/2010/main" val="211437080"/>
+      </p:ext>
+    </p:extLst>
+  </p:cSld>
+  <p:clrMapOvr>
+    <a:masterClrMapping/>
+  </p:clrMapOvr>
+</p:sld>
+</file>
+
+<file path=ppt/slides/slide39.xml><?xml version="1.0" encoding="utf-8"?>
+<p:sld xmlns:a="http://schemas.openxmlformats.org/drawingml/2006/main" xmlns:r="http://schemas.openxmlformats.org/officeDocument/2006/relationships" xmlns:p="http://schemas.openxmlformats.org/presentationml/2006/main">
+  <p:cSld>
+    <p:spTree>
+      <p:nvGrpSpPr>
+        <p:cNvPr id="1" name=""/>
+        <p:cNvGrpSpPr/>
+        <p:nvPr/>
+      </p:nvGrpSpPr>
+      <p:grpSpPr>
+        <a:xfrm>
+          <a:off x="0" y="0"/>
+          <a:ext cx="0" cy="0"/>
+          <a:chOff x="0" y="0"/>
+          <a:chExt cx="0" cy="0"/>
+        </a:xfrm>
+      </p:grpSpPr>
+      <p:sp>
+        <p:nvSpPr>
+          <p:cNvPr id="2" name="Title 1">
+            <a:extLst>
+              <a:ext uri="{FF2B5EF4-FFF2-40B4-BE49-F238E27FC236}">
+                <a16:creationId xmlns:a16="http://schemas.microsoft.com/office/drawing/2014/main" id="{9D1D1095-54EF-4488-87D3-7C294FE5DDD1}"/>
+              </a:ext>
+            </a:extLst>
+          </p:cNvPr>
+          <p:cNvSpPr>
+            <a:spLocks noGrp="1"/>
+          </p:cNvSpPr>
+          <p:nvPr>
+            <p:ph type="title"/>
+          </p:nvPr>
+        </p:nvSpPr>
+        <p:spPr/>
+        <p:txBody>
+          <a:bodyPr/>
+          <a:lstStyle/>
+          <a:p>
+            <a:r>
+              <a:rPr lang="en-US" dirty="0"/>
+              <a:t>Presentation Objectives Revisited</a:t>
+            </a:r>
+          </a:p>
+        </p:txBody>
+      </p:sp>
+      <p:sp>
+        <p:nvSpPr>
+          <p:cNvPr id="3" name="Content Placeholder 2">
+            <a:extLst>
+              <a:ext uri="{FF2B5EF4-FFF2-40B4-BE49-F238E27FC236}">
+                <a16:creationId xmlns:a16="http://schemas.microsoft.com/office/drawing/2014/main" id="{96FF33B1-49D5-4AF1-A01B-E5F09E5E9620}"/>
+              </a:ext>
+            </a:extLst>
+          </p:cNvPr>
+          <p:cNvSpPr>
+            <a:spLocks noGrp="1"/>
+          </p:cNvSpPr>
+          <p:nvPr>
+            <p:ph idx="1"/>
+          </p:nvPr>
+        </p:nvSpPr>
+        <p:spPr/>
+        <p:txBody>
+          <a:bodyPr>
+            <a:normAutofit fontScale="70000" lnSpcReduction="20000"/>
+          </a:bodyPr>
+          <a:lstStyle/>
+          <a:p>
+            <a:r>
+              <a:rPr lang="en-US" dirty="0" err="1"/>
+              <a:t>Gitflow</a:t>
+            </a:r>
+            <a:r>
+              <a:rPr lang="en-US" dirty="0"/>
+              <a:t> Strategy Refresher</a:t>
+            </a:r>
+          </a:p>
+          <a:p>
+            <a:r>
+              <a:rPr lang="en-US" dirty="0"/>
+              <a:t>Advanced Git Tactics</a:t>
+            </a:r>
+          </a:p>
+          <a:p>
+            <a:pPr lvl="1"/>
+            <a:r>
+              <a:rPr lang="en-US" dirty="0"/>
+              <a:t>Rebase – What it is and when to use it</a:t>
+            </a:r>
+          </a:p>
+          <a:p>
+            <a:pPr lvl="1"/>
+            <a:r>
+              <a:rPr lang="en-US" dirty="0"/>
+              <a:t>Forking vs. Cloning</a:t>
+            </a:r>
+          </a:p>
+          <a:p>
+            <a:pPr lvl="1"/>
+            <a:r>
+              <a:rPr lang="en-US" dirty="0"/>
+              <a:t>Tags </a:t>
+            </a:r>
+          </a:p>
+          <a:p>
+            <a:r>
+              <a:rPr lang="en-US" dirty="0"/>
+              <a:t>Advanced GitHub Features</a:t>
+            </a:r>
+          </a:p>
+          <a:p>
+            <a:pPr lvl="1"/>
+            <a:r>
+              <a:rPr lang="en-US" dirty="0"/>
+              <a:t>Actions and Workflows to build a CI/CD Pipeline</a:t>
+            </a:r>
+          </a:p>
+          <a:p>
+            <a:pPr lvl="1"/>
+            <a:r>
+              <a:rPr lang="en-US" dirty="0"/>
+              <a:t>Templates</a:t>
+            </a:r>
+          </a:p>
+          <a:p>
+            <a:pPr lvl="1"/>
+            <a:r>
+              <a:rPr lang="en-US" dirty="0"/>
+              <a:t>Secrets and how to use them</a:t>
+            </a:r>
+          </a:p>
+          <a:p>
+            <a:pPr lvl="1"/>
+            <a:r>
+              <a:rPr lang="en-US" dirty="0"/>
+              <a:t>Pull Request Management</a:t>
+            </a:r>
+          </a:p>
+          <a:p>
+            <a:pPr lvl="1"/>
+            <a:r>
+              <a:rPr lang="en-US" dirty="0"/>
+              <a:t>Issue Tracking and Projects</a:t>
+            </a:r>
+          </a:p>
+          <a:p>
+            <a:pPr lvl="1"/>
+            <a:endParaRPr lang="en-US" dirty="0"/>
+          </a:p>
+        </p:txBody>
+      </p:sp>
+    </p:spTree>
+    <p:extLst>
+      <p:ext uri="{BB962C8B-B14F-4D97-AF65-F5344CB8AC3E}">
+        <p14:creationId xmlns:p14="http://schemas.microsoft.com/office/powerpoint/2010/main" val="2029154267"/>
       </p:ext>
     </p:extLst>
   </p:cSld>
@@ -16724,7 +17202,7 @@
           <p:cNvPr id="2" name="Title 1">
             <a:extLst>
               <a:ext uri="{FF2B5EF4-FFF2-40B4-BE49-F238E27FC236}">
-                <a16:creationId xmlns:a16="http://schemas.microsoft.com/office/drawing/2014/main" id="{4D486711-6C98-4AF3-BEB5-160B9E93D8E1}"/>
+                <a16:creationId xmlns:a16="http://schemas.microsoft.com/office/drawing/2014/main" id="{30819BD5-DA31-4FB8-B85B-9FC5D4A46B14}"/>
               </a:ext>
             </a:extLst>
           </p:cNvPr>
@@ -16742,7 +17220,105 @@
           <a:p>
             <a:r>
               <a:rPr lang="en-US" dirty="0"/>
-              <a:t>Rebasing vs. Merging</a:t>
+              <a:t>Branching strategies - </a:t>
+            </a:r>
+            <a:r>
+              <a:rPr lang="en-US" dirty="0" err="1"/>
+              <a:t>Gitflow</a:t>
+            </a:r>
+            <a:endParaRPr lang="en-US" dirty="0"/>
+          </a:p>
+        </p:txBody>
+      </p:sp>
+      <p:pic>
+        <p:nvPicPr>
+          <p:cNvPr id="5" name="Content Placeholder 4">
+            <a:extLst>
+              <a:ext uri="{FF2B5EF4-FFF2-40B4-BE49-F238E27FC236}">
+                <a16:creationId xmlns:a16="http://schemas.microsoft.com/office/drawing/2014/main" id="{B928A5DC-54F3-4342-9FB1-578C95FDA742}"/>
+              </a:ext>
+            </a:extLst>
+          </p:cNvPr>
+          <p:cNvPicPr>
+            <a:picLocks noGrp="1" noChangeAspect="1"/>
+          </p:cNvPicPr>
+          <p:nvPr>
+            <p:ph idx="1"/>
+          </p:nvPr>
+        </p:nvPicPr>
+        <p:blipFill>
+          <a:blip r:embed="rId2">
+            <a:extLst>
+              <a:ext uri="{96DAC541-7B7A-43D3-8B79-37D633B846F1}">
+                <asvg:svgBlip xmlns:asvg="http://schemas.microsoft.com/office/drawing/2016/SVG/main" r:embed="rId3"/>
+              </a:ext>
+            </a:extLst>
+          </a:blip>
+          <a:stretch>
+            <a:fillRect/>
+          </a:stretch>
+        </p:blipFill>
+        <p:spPr>
+          <a:xfrm>
+            <a:off x="1403544" y="2097087"/>
+            <a:ext cx="9435031" cy="3868363"/>
+          </a:xfrm>
+        </p:spPr>
+      </p:pic>
+    </p:spTree>
+    <p:extLst>
+      <p:ext uri="{BB962C8B-B14F-4D97-AF65-F5344CB8AC3E}">
+        <p14:creationId xmlns:p14="http://schemas.microsoft.com/office/powerpoint/2010/main" val="2559640882"/>
+      </p:ext>
+    </p:extLst>
+  </p:cSld>
+  <p:clrMapOvr>
+    <a:masterClrMapping/>
+  </p:clrMapOvr>
+</p:sld>
+</file>
+
+<file path=ppt/slides/slide40.xml><?xml version="1.0" encoding="utf-8"?>
+<p:sld xmlns:a="http://schemas.openxmlformats.org/drawingml/2006/main" xmlns:r="http://schemas.openxmlformats.org/officeDocument/2006/relationships" xmlns:p="http://schemas.openxmlformats.org/presentationml/2006/main">
+  <p:cSld>
+    <p:spTree>
+      <p:nvGrpSpPr>
+        <p:cNvPr id="1" name=""/>
+        <p:cNvGrpSpPr/>
+        <p:nvPr/>
+      </p:nvGrpSpPr>
+      <p:grpSpPr>
+        <a:xfrm>
+          <a:off x="0" y="0"/>
+          <a:ext cx="0" cy="0"/>
+          <a:chOff x="0" y="0"/>
+          <a:chExt cx="0" cy="0"/>
+        </a:xfrm>
+      </p:grpSpPr>
+      <p:sp>
+        <p:nvSpPr>
+          <p:cNvPr id="2" name="Title 1">
+            <a:extLst>
+              <a:ext uri="{FF2B5EF4-FFF2-40B4-BE49-F238E27FC236}">
+                <a16:creationId xmlns:a16="http://schemas.microsoft.com/office/drawing/2014/main" id="{C7AB3235-CCE8-46E6-BDE8-EF71E09B00DA}"/>
+              </a:ext>
+            </a:extLst>
+          </p:cNvPr>
+          <p:cNvSpPr>
+            <a:spLocks noGrp="1"/>
+          </p:cNvSpPr>
+          <p:nvPr>
+            <p:ph type="title"/>
+          </p:nvPr>
+        </p:nvSpPr>
+        <p:spPr/>
+        <p:txBody>
+          <a:bodyPr/>
+          <a:lstStyle/>
+          <a:p>
+            <a:r>
+              <a:rPr lang="en-US" dirty="0"/>
+              <a:t>Presentation End – open lab and questions</a:t>
             </a:r>
           </a:p>
         </p:txBody>
@@ -16752,7 +17328,7 @@
           <p:cNvPr id="3" name="Content Placeholder 2">
             <a:extLst>
               <a:ext uri="{FF2B5EF4-FFF2-40B4-BE49-F238E27FC236}">
-                <a16:creationId xmlns:a16="http://schemas.microsoft.com/office/drawing/2014/main" id="{8E4CFEF3-0D67-4521-92E7-AEFC18406867}"/>
+                <a16:creationId xmlns:a16="http://schemas.microsoft.com/office/drawing/2014/main" id="{3A9669AB-E7B2-4895-9E7F-B06438F6702B}"/>
               </a:ext>
             </a:extLst>
           </p:cNvPr>
@@ -16770,49 +17346,46 @@
           <a:p>
             <a:r>
               <a:rPr lang="en-US" dirty="0"/>
-              <a:t>Merging</a:t>
+              <a:t>Can’t think of a question or need to leave before I can answer?</a:t>
             </a:r>
           </a:p>
           <a:p>
             <a:pPr lvl="1"/>
             <a:r>
               <a:rPr lang="en-US" dirty="0"/>
-              <a:t>Explicitly define what stays and what goes</a:t>
-            </a:r>
-          </a:p>
-          <a:p>
-            <a:pPr lvl="1"/>
-            <a:r>
-              <a:rPr lang="en-US" dirty="0"/>
-              <a:t>A new commit with these specifications is created</a:t>
-            </a:r>
-          </a:p>
-          <a:p>
-            <a:r>
-              <a:rPr lang="en-US" dirty="0"/>
-              <a:t>Rebasing</a:t>
-            </a:r>
-          </a:p>
-          <a:p>
-            <a:pPr lvl="1"/>
-            <a:r>
-              <a:rPr lang="en-US" dirty="0"/>
-              <a:t>“Replay” one branch at the end of another</a:t>
-            </a:r>
-          </a:p>
-          <a:p>
-            <a:pPr lvl="1"/>
-            <a:r>
-              <a:rPr lang="en-US" dirty="0"/>
-              <a:t>Cleaner tree with no additional commit</a:t>
-            </a:r>
+              <a:t>No worries! Send me an email – </a:t>
+            </a:r>
+            <a:r>
+              <a:rPr lang="en-US" dirty="0">
+                <a:solidFill>
+                  <a:schemeClr val="tx1">
+                    <a:lumMod val="95000"/>
+                  </a:schemeClr>
+                </a:solidFill>
+                <a:hlinkClick r:id="rId2">
+                  <a:extLst>
+                    <a:ext uri="{A12FA001-AC4F-418D-AE19-62706E023703}">
+                      <ahyp:hlinkClr xmlns:ahyp="http://schemas.microsoft.com/office/drawing/2018/hyperlinkcolor" val="tx"/>
+                    </a:ext>
+                  </a:extLst>
+                </a:hlinkClick>
+              </a:rPr>
+              <a:t>zach@zach-martin.com</a:t>
+            </a:r>
+            <a:endParaRPr lang="en-US" dirty="0">
+              <a:solidFill>
+                <a:schemeClr val="tx1">
+                  <a:lumMod val="95000"/>
+                </a:schemeClr>
+              </a:solidFill>
+            </a:endParaRPr>
           </a:p>
         </p:txBody>
       </p:sp>
     </p:spTree>
     <p:extLst>
       <p:ext uri="{BB962C8B-B14F-4D97-AF65-F5344CB8AC3E}">
-        <p14:creationId xmlns:p14="http://schemas.microsoft.com/office/powerpoint/2010/main" val="3826316260"/>
+        <p14:creationId xmlns:p14="http://schemas.microsoft.com/office/powerpoint/2010/main" val="3460011935"/>
       </p:ext>
     </p:extLst>
   </p:cSld>
@@ -16844,7 +17417,7 @@
           <p:cNvPr id="2" name="Title 1">
             <a:extLst>
               <a:ext uri="{FF2B5EF4-FFF2-40B4-BE49-F238E27FC236}">
-                <a16:creationId xmlns:a16="http://schemas.microsoft.com/office/drawing/2014/main" id="{460E5E25-300A-4A4D-B1C2-63CB6E978153}"/>
+                <a16:creationId xmlns:a16="http://schemas.microsoft.com/office/drawing/2014/main" id="{30819BD5-DA31-4FB8-B85B-9FC5D4A46B14}"/>
               </a:ext>
             </a:extLst>
           </p:cNvPr>
@@ -16862,17 +17435,25 @@
           <a:p>
             <a:r>
               <a:rPr lang="en-US" dirty="0"/>
-              <a:t>Rebase workflow</a:t>
+              <a:t>Branching strategies – </a:t>
+            </a:r>
+            <a:r>
+              <a:rPr lang="en-US" dirty="0" err="1"/>
+              <a:t>Gitflow</a:t>
+            </a:r>
+            <a:r>
+              <a:rPr lang="en-US" dirty="0"/>
+              <a:t> (Cont.)</a:t>
             </a:r>
           </a:p>
         </p:txBody>
       </p:sp>
       <p:pic>
         <p:nvPicPr>
-          <p:cNvPr id="9" name="Content Placeholder 8">
+          <p:cNvPr id="11" name="Content Placeholder 10">
             <a:extLst>
               <a:ext uri="{FF2B5EF4-FFF2-40B4-BE49-F238E27FC236}">
-                <a16:creationId xmlns:a16="http://schemas.microsoft.com/office/drawing/2014/main" id="{A0648F48-9120-4A8F-A261-F6CCE1ED9AC4}"/>
+                <a16:creationId xmlns:a16="http://schemas.microsoft.com/office/drawing/2014/main" id="{D704F0B6-6DFF-4631-B064-30A8D090672C}"/>
               </a:ext>
             </a:extLst>
           </p:cNvPr>
@@ -16897,15 +17478,15 @@
         </p:blipFill>
         <p:spPr>
           <a:xfrm>
-            <a:off x="3001215" y="2249488"/>
-            <a:ext cx="6186396" cy="3541712"/>
+            <a:off x="2174299" y="1780354"/>
+            <a:ext cx="7840225" cy="4459128"/>
           </a:xfrm>
         </p:spPr>
       </p:pic>
     </p:spTree>
     <p:extLst>
       <p:ext uri="{BB962C8B-B14F-4D97-AF65-F5344CB8AC3E}">
-        <p14:creationId xmlns:p14="http://schemas.microsoft.com/office/powerpoint/2010/main" val="1804423006"/>
+        <p14:creationId xmlns:p14="http://schemas.microsoft.com/office/powerpoint/2010/main" val="3925328895"/>
       </p:ext>
     </p:extLst>
   </p:cSld>
@@ -16937,7 +17518,7 @@
           <p:cNvPr id="2" name="Title 1">
             <a:extLst>
               <a:ext uri="{FF2B5EF4-FFF2-40B4-BE49-F238E27FC236}">
-                <a16:creationId xmlns:a16="http://schemas.microsoft.com/office/drawing/2014/main" id="{460E5E25-300A-4A4D-B1C2-63CB6E978153}"/>
+                <a16:creationId xmlns:a16="http://schemas.microsoft.com/office/drawing/2014/main" id="{30819BD5-DA31-4FB8-B85B-9FC5D4A46B14}"/>
               </a:ext>
             </a:extLst>
           </p:cNvPr>
@@ -16955,17 +17536,25 @@
           <a:p>
             <a:r>
               <a:rPr lang="en-US" dirty="0"/>
-              <a:t>Rebase workflow (Cont.)</a:t>
+              <a:t>Branching strategies – </a:t>
+            </a:r>
+            <a:r>
+              <a:rPr lang="en-US" dirty="0" err="1"/>
+              <a:t>Gitflow</a:t>
+            </a:r>
+            <a:r>
+              <a:rPr lang="en-US" dirty="0"/>
+              <a:t> (Cont.)</a:t>
             </a:r>
           </a:p>
         </p:txBody>
       </p:sp>
       <p:pic>
         <p:nvPicPr>
-          <p:cNvPr id="6" name="Content Placeholder 5">
+          <p:cNvPr id="9" name="Content Placeholder 8">
             <a:extLst>
               <a:ext uri="{FF2B5EF4-FFF2-40B4-BE49-F238E27FC236}">
-                <a16:creationId xmlns:a16="http://schemas.microsoft.com/office/drawing/2014/main" id="{7446AF04-D9E3-4AA5-BEEC-75A030DF9F74}"/>
+                <a16:creationId xmlns:a16="http://schemas.microsoft.com/office/drawing/2014/main" id="{D2595462-70B1-42AE-97F1-85438471583F}"/>
               </a:ext>
             </a:extLst>
           </p:cNvPr>
@@ -16990,15 +17579,15 @@
         </p:blipFill>
         <p:spPr>
           <a:xfrm>
-            <a:off x="3451344" y="2249488"/>
-            <a:ext cx="5286137" cy="3541712"/>
+            <a:off x="2314152" y="1753299"/>
+            <a:ext cx="7560520" cy="4857634"/>
           </a:xfrm>
         </p:spPr>
       </p:pic>
     </p:spTree>
     <p:extLst>
       <p:ext uri="{BB962C8B-B14F-4D97-AF65-F5344CB8AC3E}">
-        <p14:creationId xmlns:p14="http://schemas.microsoft.com/office/powerpoint/2010/main" val="2415559359"/>
+        <p14:creationId xmlns:p14="http://schemas.microsoft.com/office/powerpoint/2010/main" val="2638837885"/>
       </p:ext>
     </p:extLst>
   </p:cSld>
@@ -17030,7 +17619,7 @@
           <p:cNvPr id="2" name="Title 1">
             <a:extLst>
               <a:ext uri="{FF2B5EF4-FFF2-40B4-BE49-F238E27FC236}">
-                <a16:creationId xmlns:a16="http://schemas.microsoft.com/office/drawing/2014/main" id="{460E5E25-300A-4A4D-B1C2-63CB6E978153}"/>
+                <a16:creationId xmlns:a16="http://schemas.microsoft.com/office/drawing/2014/main" id="{30819BD5-DA31-4FB8-B85B-9FC5D4A46B14}"/>
               </a:ext>
             </a:extLst>
           </p:cNvPr>
@@ -17048,17 +17637,25 @@
           <a:p>
             <a:r>
               <a:rPr lang="en-US" dirty="0"/>
-              <a:t>Rebase workflow (Cont.)</a:t>
+              <a:t>Branching strategies – </a:t>
+            </a:r>
+            <a:r>
+              <a:rPr lang="en-US" dirty="0" err="1"/>
+              <a:t>Gitflow</a:t>
+            </a:r>
+            <a:r>
+              <a:rPr lang="en-US" dirty="0"/>
+              <a:t> (Cont.)</a:t>
             </a:r>
           </a:p>
         </p:txBody>
       </p:sp>
       <p:pic>
         <p:nvPicPr>
-          <p:cNvPr id="7" name="Content Placeholder 6">
+          <p:cNvPr id="9" name="Content Placeholder 8">
             <a:extLst>
               <a:ext uri="{FF2B5EF4-FFF2-40B4-BE49-F238E27FC236}">
-                <a16:creationId xmlns:a16="http://schemas.microsoft.com/office/drawing/2014/main" id="{B51158DF-473D-4D96-B075-D2D8845482C2}"/>
+                <a16:creationId xmlns:a16="http://schemas.microsoft.com/office/drawing/2014/main" id="{14AD2C50-D590-4F3F-9475-980F846DF02E}"/>
               </a:ext>
             </a:extLst>
           </p:cNvPr>
@@ -17083,15 +17680,15 @@
         </p:blipFill>
         <p:spPr>
           <a:xfrm>
-            <a:off x="3494991" y="2249488"/>
-            <a:ext cx="5198843" cy="3541712"/>
+            <a:off x="2774841" y="1802716"/>
+            <a:ext cx="6642318" cy="4765864"/>
           </a:xfrm>
         </p:spPr>
       </p:pic>
     </p:spTree>
     <p:extLst>
       <p:ext uri="{BB962C8B-B14F-4D97-AF65-F5344CB8AC3E}">
-        <p14:creationId xmlns:p14="http://schemas.microsoft.com/office/powerpoint/2010/main" val="404804294"/>
+        <p14:creationId xmlns:p14="http://schemas.microsoft.com/office/powerpoint/2010/main" val="3664828835"/>
       </p:ext>
     </p:extLst>
   </p:cSld>
@@ -17123,7 +17720,7 @@
           <p:cNvPr id="2" name="Title 1">
             <a:extLst>
               <a:ext uri="{FF2B5EF4-FFF2-40B4-BE49-F238E27FC236}">
-                <a16:creationId xmlns:a16="http://schemas.microsoft.com/office/drawing/2014/main" id="{460E5E25-300A-4A4D-B1C2-63CB6E978153}"/>
+                <a16:creationId xmlns:a16="http://schemas.microsoft.com/office/drawing/2014/main" id="{4D486711-6C98-4AF3-BEB5-160B9E93D8E1}"/>
               </a:ext>
             </a:extLst>
           </p:cNvPr>
@@ -17141,50 +17738,77 @@
           <a:p>
             <a:r>
               <a:rPr lang="en-US" dirty="0"/>
-              <a:t>Rebase workflow (Cont.)</a:t>
+              <a:t>Rebasing vs. Merging</a:t>
             </a:r>
           </a:p>
         </p:txBody>
       </p:sp>
-      <p:pic>
-        <p:nvPicPr>
-          <p:cNvPr id="6" name="Content Placeholder 5">
+      <p:sp>
+        <p:nvSpPr>
+          <p:cNvPr id="3" name="Content Placeholder 2">
             <a:extLst>
               <a:ext uri="{FF2B5EF4-FFF2-40B4-BE49-F238E27FC236}">
-                <a16:creationId xmlns:a16="http://schemas.microsoft.com/office/drawing/2014/main" id="{7A1A7D49-3A09-494D-9214-D9E300234EEA}"/>
+                <a16:creationId xmlns:a16="http://schemas.microsoft.com/office/drawing/2014/main" id="{8E4CFEF3-0D67-4521-92E7-AEFC18406867}"/>
               </a:ext>
             </a:extLst>
           </p:cNvPr>
-          <p:cNvPicPr>
-            <a:picLocks noGrp="1" noChangeAspect="1"/>
-          </p:cNvPicPr>
+          <p:cNvSpPr>
+            <a:spLocks noGrp="1"/>
+          </p:cNvSpPr>
           <p:nvPr>
             <p:ph idx="1"/>
           </p:nvPr>
-        </p:nvPicPr>
-        <p:blipFill>
-          <a:blip r:embed="rId2">
-            <a:extLst>
-              <a:ext uri="{96DAC541-7B7A-43D3-8B79-37D633B846F1}">
-                <asvg:svgBlip xmlns:asvg="http://schemas.microsoft.com/office/drawing/2016/SVG/main" r:embed="rId3"/>
-              </a:ext>
-            </a:extLst>
-          </a:blip>
-          <a:stretch>
-            <a:fillRect/>
-          </a:stretch>
-        </p:blipFill>
-        <p:spPr>
-          <a:xfrm>
-            <a:off x="3490213" y="2249488"/>
-            <a:ext cx="5208400" cy="3541712"/>
-          </a:xfrm>
-        </p:spPr>
-      </p:pic>
+        </p:nvSpPr>
+        <p:spPr/>
+        <p:txBody>
+          <a:bodyPr/>
+          <a:lstStyle/>
+          <a:p>
+            <a:r>
+              <a:rPr lang="en-US" dirty="0"/>
+              <a:t>Merging</a:t>
+            </a:r>
+          </a:p>
+          <a:p>
+            <a:pPr lvl="1"/>
+            <a:r>
+              <a:rPr lang="en-US" dirty="0"/>
+              <a:t>Explicitly define what stays and what goes</a:t>
+            </a:r>
+          </a:p>
+          <a:p>
+            <a:pPr lvl="1"/>
+            <a:r>
+              <a:rPr lang="en-US" dirty="0"/>
+              <a:t>A new commit with these specifications is created</a:t>
+            </a:r>
+          </a:p>
+          <a:p>
+            <a:r>
+              <a:rPr lang="en-US" dirty="0"/>
+              <a:t>Rebasing</a:t>
+            </a:r>
+          </a:p>
+          <a:p>
+            <a:pPr lvl="1"/>
+            <a:r>
+              <a:rPr lang="en-US" dirty="0"/>
+              <a:t>“Replay” one branch at the end of another</a:t>
+            </a:r>
+          </a:p>
+          <a:p>
+            <a:pPr lvl="1"/>
+            <a:r>
+              <a:rPr lang="en-US" dirty="0"/>
+              <a:t>Cleaner tree with no additional commit</a:t>
+            </a:r>
+          </a:p>
+        </p:txBody>
+      </p:sp>
     </p:spTree>
     <p:extLst>
       <p:ext uri="{BB962C8B-B14F-4D97-AF65-F5344CB8AC3E}">
-        <p14:creationId xmlns:p14="http://schemas.microsoft.com/office/powerpoint/2010/main" val="3970215657"/>
+        <p14:creationId xmlns:p14="http://schemas.microsoft.com/office/powerpoint/2010/main" val="3826316260"/>
       </p:ext>
     </p:extLst>
   </p:cSld>
@@ -17234,67 +17858,50 @@
           <a:p>
             <a:r>
               <a:rPr lang="en-US" dirty="0"/>
-              <a:t>Rebase golden Rule</a:t>
+              <a:t>Rebase workflow</a:t>
             </a:r>
           </a:p>
         </p:txBody>
       </p:sp>
-      <p:sp>
-        <p:nvSpPr>
+      <p:pic>
+        <p:nvPicPr>
           <p:cNvPr id="9" name="Content Placeholder 8">
             <a:extLst>
               <a:ext uri="{FF2B5EF4-FFF2-40B4-BE49-F238E27FC236}">
-                <a16:creationId xmlns:a16="http://schemas.microsoft.com/office/drawing/2014/main" id="{7B5AF4F8-6FA9-4858-A0E3-DE4C8ADBA48F}"/>
+                <a16:creationId xmlns:a16="http://schemas.microsoft.com/office/drawing/2014/main" id="{A0648F48-9120-4A8F-A261-F6CCE1ED9AC4}"/>
               </a:ext>
             </a:extLst>
           </p:cNvPr>
-          <p:cNvSpPr>
-            <a:spLocks noGrp="1"/>
-          </p:cNvSpPr>
+          <p:cNvPicPr>
+            <a:picLocks noGrp="1" noChangeAspect="1"/>
+          </p:cNvPicPr>
           <p:nvPr>
             <p:ph idx="1"/>
           </p:nvPr>
-        </p:nvSpPr>
-        <p:spPr/>
-        <p:txBody>
-          <a:bodyPr/>
-          <a:lstStyle/>
-          <a:p>
-            <a:r>
-              <a:rPr lang="en-US" dirty="0"/>
-              <a:t>When rebasing, keep the golden rule in mind:</a:t>
-            </a:r>
-          </a:p>
-          <a:p>
-            <a:pPr lvl="1"/>
-            <a:r>
-              <a:rPr lang="en-US" b="1" dirty="0"/>
-              <a:t>NEVER</a:t>
-            </a:r>
-            <a:r>
-              <a:rPr lang="en-US" dirty="0"/>
-              <a:t> rebase a public branch over your branch</a:t>
-            </a:r>
-          </a:p>
-          <a:p>
-            <a:r>
-              <a:rPr lang="en-US" dirty="0"/>
-              <a:t>Rebasing gives you an opportunity to realign your history with team changes</a:t>
-            </a:r>
-          </a:p>
-          <a:p>
-            <a:pPr lvl="1"/>
-            <a:r>
-              <a:rPr lang="en-US" dirty="0"/>
-              <a:t>Don’t make others have to realign around your own changes</a:t>
-            </a:r>
-          </a:p>
-        </p:txBody>
-      </p:sp>
+        </p:nvPicPr>
+        <p:blipFill>
+          <a:blip r:embed="rId2">
+            <a:extLst>
+              <a:ext uri="{96DAC541-7B7A-43D3-8B79-37D633B846F1}">
+                <asvg:svgBlip xmlns:asvg="http://schemas.microsoft.com/office/drawing/2016/SVG/main" r:embed="rId3"/>
+              </a:ext>
+            </a:extLst>
+          </a:blip>
+          <a:stretch>
+            <a:fillRect/>
+          </a:stretch>
+        </p:blipFill>
+        <p:spPr>
+          <a:xfrm>
+            <a:off x="3001215" y="2249488"/>
+            <a:ext cx="6186396" cy="3541712"/>
+          </a:xfrm>
+        </p:spPr>
+      </p:pic>
     </p:spTree>
     <p:extLst>
       <p:ext uri="{BB962C8B-B14F-4D97-AF65-F5344CB8AC3E}">
-        <p14:creationId xmlns:p14="http://schemas.microsoft.com/office/powerpoint/2010/main" val="467940543"/>
+        <p14:creationId xmlns:p14="http://schemas.microsoft.com/office/powerpoint/2010/main" val="1804423006"/>
       </p:ext>
     </p:extLst>
   </p:cSld>
@@ -18146,6 +18753,23 @@
 </file>
 
 <file path=customXml/item1.xml><?xml version="1.0" encoding="utf-8"?>
+<p:properties xmlns:p="http://schemas.microsoft.com/office/2006/metadata/properties" xmlns:xsi="http://www.w3.org/2001/XMLSchema-instance" xmlns:pc="http://schemas.microsoft.com/office/infopath/2007/PartnerControls">
+  <documentManagement>
+    <MediaServiceKeyPoints xmlns="71af3243-3dd4-4a8d-8c0d-dd76da1f02a5" xsi:nil="true"/>
+  </documentManagement>
+</p:properties>
+</file>
+
+<file path=customXml/item2.xml><?xml version="1.0" encoding="utf-8"?>
+<?mso-contentType ?>
+<FormTemplates xmlns="http://schemas.microsoft.com/sharepoint/v3/contenttype/forms">
+  <Display>DocumentLibraryForm</Display>
+  <Edit>DocumentLibraryForm</Edit>
+  <New>DocumentLibraryForm</New>
+</FormTemplates>
+</file>
+
+<file path=customXml/item3.xml><?xml version="1.0" encoding="utf-8"?>
 <ct:contentTypeSchema xmlns:ct="http://schemas.microsoft.com/office/2006/metadata/contentType" xmlns:ma="http://schemas.microsoft.com/office/2006/metadata/properties/metaAttributes" ct:_="" ma:_="" ma:contentTypeName="Document" ma:contentTypeID="0x01010079F111ED35F8CC479449609E8A0923A6" ma:contentTypeVersion="11" ma:contentTypeDescription="Create a new document." ma:contentTypeScope="" ma:versionID="96291512c1ee715ab617f4c07df79fc1">
   <xsd:schema xmlns:xsd="http://www.w3.org/2001/XMLSchema" xmlns:xs="http://www.w3.org/2001/XMLSchema" xmlns:p="http://schemas.microsoft.com/office/2006/metadata/properties" xmlns:ns2="71af3243-3dd4-4a8d-8c0d-dd76da1f02a5" xmlns:ns3="16c05727-aa75-4e4a-9b5f-8a80a1165891" targetNamespace="http://schemas.microsoft.com/office/2006/metadata/properties" ma:root="true" ma:fieldsID="8256c27c40ca5c40ce1cf6c44f0205df" ns2:_="" ns3:_="">
     <xsd:import namespace="71af3243-3dd4-4a8d-8c0d-dd76da1f02a5"/>
@@ -18356,38 +18980,14 @@
 </ct:contentTypeSchema>
 </file>
 
-<file path=customXml/item2.xml><?xml version="1.0" encoding="utf-8"?>
-<?mso-contentType ?>
-<FormTemplates xmlns="http://schemas.microsoft.com/sharepoint/v3/contenttype/forms">
-  <Display>DocumentLibraryForm</Display>
-  <Edit>DocumentLibraryForm</Edit>
-  <New>DocumentLibraryForm</New>
-</FormTemplates>
-</file>
-
-<file path=customXml/item3.xml><?xml version="1.0" encoding="utf-8"?>
-<p:properties xmlns:p="http://schemas.microsoft.com/office/2006/metadata/properties" xmlns:xsi="http://www.w3.org/2001/XMLSchema-instance" xmlns:pc="http://schemas.microsoft.com/office/infopath/2007/PartnerControls">
-  <documentManagement>
-    <MediaServiceKeyPoints xmlns="71af3243-3dd4-4a8d-8c0d-dd76da1f02a5" xsi:nil="true"/>
-  </documentManagement>
-</p:properties>
-</file>
-
 <file path=customXml/itemProps1.xml><?xml version="1.0" encoding="utf-8"?>
-<ds:datastoreItem xmlns:ds="http://schemas.openxmlformats.org/officeDocument/2006/customXml" ds:itemID="{A7C0B241-13E5-418D-8920-D23491E2D2C0}">
+<ds:datastoreItem xmlns:ds="http://schemas.openxmlformats.org/officeDocument/2006/customXml" ds:itemID="{E7866CFD-F94E-4AE5-ACEA-86FEC0F48A10}">
   <ds:schemaRefs>
-    <ds:schemaRef ds:uri="http://schemas.microsoft.com/office/2006/metadata/contentType"/>
-    <ds:schemaRef ds:uri="http://schemas.microsoft.com/office/2006/metadata/properties/metaAttributes"/>
-    <ds:schemaRef ds:uri="http://www.w3.org/2001/XMLSchema"/>
     <ds:schemaRef ds:uri="http://schemas.microsoft.com/office/2006/metadata/properties"/>
+    <ds:schemaRef ds:uri="http://www.w3.org/2000/xmlns/"/>
     <ds:schemaRef ds:uri="71af3243-3dd4-4a8d-8c0d-dd76da1f02a5"/>
-    <ds:schemaRef ds:uri="16c05727-aa75-4e4a-9b5f-8a80a1165891"/>
-    <ds:schemaRef ds:uri="http://schemas.microsoft.com/office/2006/documentManagement/types"/>
+    <ds:schemaRef ds:uri="http://www.w3.org/2001/XMLSchema-instance"/>
     <ds:schemaRef ds:uri="http://schemas.microsoft.com/office/infopath/2007/PartnerControls"/>
-    <ds:schemaRef ds:uri="http://schemas.openxmlformats.org/package/2006/metadata/core-properties"/>
-    <ds:schemaRef ds:uri="http://purl.org/dc/elements/1.1/"/>
-    <ds:schemaRef ds:uri="http://purl.org/dc/terms/"/>
-    <ds:schemaRef ds:uri="http://schemas.microsoft.com/internal/obd"/>
   </ds:schemaRefs>
 </ds:datastoreItem>
 </file>
@@ -18401,11 +19001,21 @@
 </file>
 
 <file path=customXml/itemProps3.xml><?xml version="1.0" encoding="utf-8"?>
-<ds:datastoreItem xmlns:ds="http://schemas.openxmlformats.org/officeDocument/2006/customXml" ds:itemID="{E7866CFD-F94E-4AE5-ACEA-86FEC0F48A10}">
+<ds:datastoreItem xmlns:ds="http://schemas.openxmlformats.org/officeDocument/2006/customXml" ds:itemID="{A7C0B241-13E5-418D-8920-D23491E2D2C0}">
   <ds:schemaRefs>
+    <ds:schemaRef ds:uri="http://schemas.microsoft.com/office/2006/metadata/contentType"/>
+    <ds:schemaRef ds:uri="http://schemas.microsoft.com/office/2006/metadata/properties/metaAttributes"/>
+    <ds:schemaRef ds:uri="http://www.w3.org/2000/xmlns/"/>
+    <ds:schemaRef ds:uri="http://www.w3.org/2001/XMLSchema"/>
+    <ds:schemaRef ds:uri="71af3243-3dd4-4a8d-8c0d-dd76da1f02a5"/>
+    <ds:schemaRef ds:uri="16c05727-aa75-4e4a-9b5f-8a80a1165891"/>
     <ds:schemaRef ds:uri="http://schemas.microsoft.com/office/2006/metadata/properties"/>
+    <ds:schemaRef ds:uri="http://schemas.microsoft.com/office/2006/documentManagement/types"/>
     <ds:schemaRef ds:uri="http://schemas.microsoft.com/office/infopath/2007/PartnerControls"/>
-    <ds:schemaRef ds:uri="71af3243-3dd4-4a8d-8c0d-dd76da1f02a5"/>
+    <ds:schemaRef ds:uri="http://schemas.openxmlformats.org/package/2006/metadata/core-properties"/>
+    <ds:schemaRef ds:uri="http://purl.org/dc/elements/1.1/"/>
+    <ds:schemaRef ds:uri="http://purl.org/dc/terms/"/>
+    <ds:schemaRef ds:uri="http://schemas.microsoft.com/internal/obd"/>
   </ds:schemaRefs>
 </ds:datastoreItem>
 </file>
</xml_diff>

<commit_message>
Updated Advanced github topics.pptx
</commit_message>
<xml_diff>
--- a/resources/Advanced github topics.pptx
+++ b/resources/Advanced github topics.pptx
@@ -247,7 +247,7 @@
           <a:p>
             <a:fld id="{2B85766F-5EC0-4797-B4D1-777FCB005B11}" type="datetimeFigureOut">
               <a:rPr lang="en-US" smtClean="0"/>
-              <a:t>5/19/2021</a:t>
+              <a:t>12/11/2021</a:t>
             </a:fld>
             <a:endParaRPr lang="en-US" dirty="0"/>
           </a:p>
@@ -424,7 +424,7 @@
           <a:p>
             <a:fld id="{B2B4B5EC-152C-4627-80C0-63B10D5574EF}" type="datetimeFigureOut">
               <a:rPr lang="en-US" smtClean="0"/>
-              <a:t>5/19/2021</a:t>
+              <a:t>12/11/2021</a:t>
             </a:fld>
             <a:endParaRPr lang="en-US" dirty="0"/>
           </a:p>
@@ -748,7 +748,7 @@
           <a:noFill/>
           <a:extLst>
             <a:ext uri="{909E8E84-426E-40dd-AFC4-6F175D3DCCD1}">
-              <a14:hiddenFill xmlns:a14="http://schemas.microsoft.com/office/drawing/2010/main" xmlns="">
+              <a14:hiddenFill xmlns="" xmlns:a14="http://schemas.microsoft.com/office/drawing/2010/main">
                 <a:solidFill>
                   <a:srgbClr val="FFFFFF"/>
                 </a:solidFill>
@@ -807,7 +807,7 @@
             </a:ln>
             <a:extLst>
               <a:ext uri="{91240B29-F687-4f45-9708-019B960494DF}">
-                <a14:hiddenLine xmlns:a14="http://schemas.microsoft.com/office/drawing/2010/main" xmlns="" w="9525">
+                <a14:hiddenLine xmlns="" xmlns:a14="http://schemas.microsoft.com/office/drawing/2010/main" w="9525">
                   <a:solidFill>
                     <a:srgbClr val="000000"/>
                   </a:solidFill>
@@ -897,7 +897,7 @@
             </a:ln>
             <a:extLst>
               <a:ext uri="{91240B29-F687-4f45-9708-019B960494DF}">
-                <a14:hiddenLine xmlns:a14="http://schemas.microsoft.com/office/drawing/2010/main" xmlns="" w="9525">
+                <a14:hiddenLine xmlns="" xmlns:a14="http://schemas.microsoft.com/office/drawing/2010/main" w="9525">
                   <a:solidFill>
                     <a:srgbClr val="000000"/>
                   </a:solidFill>
@@ -987,7 +987,7 @@
             </a:ln>
             <a:extLst>
               <a:ext uri="{91240B29-F687-4f45-9708-019B960494DF}">
-                <a14:hiddenLine xmlns:a14="http://schemas.microsoft.com/office/drawing/2010/main" xmlns="" w="9525">
+                <a14:hiddenLine xmlns="" xmlns:a14="http://schemas.microsoft.com/office/drawing/2010/main" w="9525">
                   <a:solidFill>
                     <a:srgbClr val="000000"/>
                   </a:solidFill>
@@ -1021,7 +1021,7 @@
             </a:ln>
             <a:extLst>
               <a:ext uri="{91240B29-F687-4f45-9708-019B960494DF}">
-                <a14:hiddenLine xmlns:a14="http://schemas.microsoft.com/office/drawing/2010/main" xmlns="" w="9525">
+                <a14:hiddenLine xmlns="" xmlns:a14="http://schemas.microsoft.com/office/drawing/2010/main" w="9525">
                   <a:solidFill>
                     <a:srgbClr val="000000"/>
                   </a:solidFill>
@@ -1111,7 +1111,7 @@
             </a:ln>
             <a:extLst>
               <a:ext uri="{91240B29-F687-4f45-9708-019B960494DF}">
-                <a14:hiddenLine xmlns:a14="http://schemas.microsoft.com/office/drawing/2010/main" xmlns="" w="9525">
+                <a14:hiddenLine xmlns="" xmlns:a14="http://schemas.microsoft.com/office/drawing/2010/main" w="9525">
                   <a:solidFill>
                     <a:srgbClr val="000000"/>
                   </a:solidFill>
@@ -1173,7 +1173,7 @@
             </a:ln>
             <a:extLst>
               <a:ext uri="{91240B29-F687-4f45-9708-019B960494DF}">
-                <a14:hiddenLine xmlns:a14="http://schemas.microsoft.com/office/drawing/2010/main" xmlns="" w="9525">
+                <a14:hiddenLine xmlns="" xmlns:a14="http://schemas.microsoft.com/office/drawing/2010/main" w="9525">
                   <a:solidFill>
                     <a:srgbClr val="000000"/>
                   </a:solidFill>
@@ -1235,7 +1235,7 @@
             </a:ln>
             <a:extLst>
               <a:ext uri="{91240B29-F687-4f45-9708-019B960494DF}">
-                <a14:hiddenLine xmlns:a14="http://schemas.microsoft.com/office/drawing/2010/main" xmlns="" w="9525">
+                <a14:hiddenLine xmlns="" xmlns:a14="http://schemas.microsoft.com/office/drawing/2010/main" w="9525">
                   <a:solidFill>
                     <a:srgbClr val="000000"/>
                   </a:solidFill>
@@ -1325,7 +1325,7 @@
             </a:ln>
             <a:extLst>
               <a:ext uri="{91240B29-F687-4f45-9708-019B960494DF}">
-                <a14:hiddenLine xmlns:a14="http://schemas.microsoft.com/office/drawing/2010/main" xmlns="" w="9525">
+                <a14:hiddenLine xmlns="" xmlns:a14="http://schemas.microsoft.com/office/drawing/2010/main" w="9525">
                   <a:solidFill>
                     <a:srgbClr val="000000"/>
                   </a:solidFill>
@@ -1387,7 +1387,7 @@
             </a:ln>
             <a:extLst>
               <a:ext uri="{91240B29-F687-4f45-9708-019B960494DF}">
-                <a14:hiddenLine xmlns:a14="http://schemas.microsoft.com/office/drawing/2010/main" xmlns="" w="9525">
+                <a14:hiddenLine xmlns="" xmlns:a14="http://schemas.microsoft.com/office/drawing/2010/main" w="9525">
                   <a:solidFill>
                     <a:srgbClr val="000000"/>
                   </a:solidFill>
@@ -1449,7 +1449,7 @@
             </a:ln>
             <a:extLst>
               <a:ext uri="{91240B29-F687-4f45-9708-019B960494DF}">
-                <a14:hiddenLine xmlns:a14="http://schemas.microsoft.com/office/drawing/2010/main" xmlns="" w="9525">
+                <a14:hiddenLine xmlns="" xmlns:a14="http://schemas.microsoft.com/office/drawing/2010/main" w="9525">
                   <a:solidFill>
                     <a:srgbClr val="000000"/>
                   </a:solidFill>
@@ -1539,7 +1539,7 @@
             </a:ln>
             <a:extLst>
               <a:ext uri="{91240B29-F687-4f45-9708-019B960494DF}">
-                <a14:hiddenLine xmlns:a14="http://schemas.microsoft.com/office/drawing/2010/main" xmlns="" w="9525">
+                <a14:hiddenLine xmlns="" xmlns:a14="http://schemas.microsoft.com/office/drawing/2010/main" w="9525">
                   <a:solidFill>
                     <a:srgbClr val="000000"/>
                   </a:solidFill>
@@ -1629,7 +1629,7 @@
             </a:ln>
             <a:extLst>
               <a:ext uri="{91240B29-F687-4f45-9708-019B960494DF}">
-                <a14:hiddenLine xmlns:a14="http://schemas.microsoft.com/office/drawing/2010/main" xmlns="" w="9525">
+                <a14:hiddenLine xmlns="" xmlns:a14="http://schemas.microsoft.com/office/drawing/2010/main" w="9525">
                   <a:solidFill>
                     <a:srgbClr val="000000"/>
                   </a:solidFill>
@@ -1691,7 +1691,7 @@
             </a:ln>
             <a:extLst>
               <a:ext uri="{91240B29-F687-4f45-9708-019B960494DF}">
-                <a14:hiddenLine xmlns:a14="http://schemas.microsoft.com/office/drawing/2010/main" xmlns="" w="9525">
+                <a14:hiddenLine xmlns="" xmlns:a14="http://schemas.microsoft.com/office/drawing/2010/main" w="9525">
                   <a:solidFill>
                     <a:srgbClr val="000000"/>
                   </a:solidFill>
@@ -1801,7 +1801,7 @@
             </a:ln>
             <a:extLst>
               <a:ext uri="{91240B29-F687-4f45-9708-019B960494DF}">
-                <a14:hiddenLine xmlns:a14="http://schemas.microsoft.com/office/drawing/2010/main" xmlns="" w="9525">
+                <a14:hiddenLine xmlns="" xmlns:a14="http://schemas.microsoft.com/office/drawing/2010/main" w="9525">
                   <a:solidFill>
                     <a:srgbClr val="000000"/>
                   </a:solidFill>
@@ -1863,7 +1863,7 @@
             </a:ln>
             <a:extLst>
               <a:ext uri="{91240B29-F687-4f45-9708-019B960494DF}">
-                <a14:hiddenLine xmlns:a14="http://schemas.microsoft.com/office/drawing/2010/main" xmlns="" w="9525">
+                <a14:hiddenLine xmlns="" xmlns:a14="http://schemas.microsoft.com/office/drawing/2010/main" w="9525">
                   <a:solidFill>
                     <a:srgbClr val="000000"/>
                   </a:solidFill>
@@ -1953,7 +1953,7 @@
             </a:ln>
             <a:extLst>
               <a:ext uri="{91240B29-F687-4f45-9708-019B960494DF}">
-                <a14:hiddenLine xmlns:a14="http://schemas.microsoft.com/office/drawing/2010/main" xmlns="" w="9525">
+                <a14:hiddenLine xmlns="" xmlns:a14="http://schemas.microsoft.com/office/drawing/2010/main" w="9525">
                   <a:solidFill>
                     <a:srgbClr val="000000"/>
                   </a:solidFill>
@@ -2043,7 +2043,7 @@
             </a:ln>
             <a:extLst>
               <a:ext uri="{91240B29-F687-4f45-9708-019B960494DF}">
-                <a14:hiddenLine xmlns:a14="http://schemas.microsoft.com/office/drawing/2010/main" xmlns="" w="9525">
+                <a14:hiddenLine xmlns="" xmlns:a14="http://schemas.microsoft.com/office/drawing/2010/main" w="9525">
                   <a:solidFill>
                     <a:srgbClr val="000000"/>
                   </a:solidFill>
@@ -2105,7 +2105,7 @@
             </a:ln>
             <a:extLst>
               <a:ext uri="{91240B29-F687-4f45-9708-019B960494DF}">
-                <a14:hiddenLine xmlns:a14="http://schemas.microsoft.com/office/drawing/2010/main" xmlns="" w="9525">
+                <a14:hiddenLine xmlns="" xmlns:a14="http://schemas.microsoft.com/office/drawing/2010/main" w="9525">
                   <a:solidFill>
                     <a:srgbClr val="000000"/>
                   </a:solidFill>
@@ -2195,7 +2195,7 @@
             </a:ln>
             <a:extLst>
               <a:ext uri="{91240B29-F687-4f45-9708-019B960494DF}">
-                <a14:hiddenLine xmlns:a14="http://schemas.microsoft.com/office/drawing/2010/main" xmlns="" w="9525">
+                <a14:hiddenLine xmlns="" xmlns:a14="http://schemas.microsoft.com/office/drawing/2010/main" w="9525">
                   <a:solidFill>
                     <a:srgbClr val="000000"/>
                   </a:solidFill>
@@ -2285,7 +2285,7 @@
             </a:ln>
             <a:extLst>
               <a:ext uri="{91240B29-F687-4f45-9708-019B960494DF}">
-                <a14:hiddenLine xmlns:a14="http://schemas.microsoft.com/office/drawing/2010/main" xmlns="" w="9525">
+                <a14:hiddenLine xmlns="" xmlns:a14="http://schemas.microsoft.com/office/drawing/2010/main" w="9525">
                   <a:solidFill>
                     <a:srgbClr val="000000"/>
                   </a:solidFill>
@@ -2341,7 +2341,7 @@
             </a:ln>
             <a:extLst>
               <a:ext uri="{91240B29-F687-4f45-9708-019B960494DF}">
-                <a14:hiddenLine xmlns:a14="http://schemas.microsoft.com/office/drawing/2010/main" xmlns="" w="9525">
+                <a14:hiddenLine xmlns="" xmlns:a14="http://schemas.microsoft.com/office/drawing/2010/main" w="9525">
                   <a:solidFill>
                     <a:srgbClr val="000000"/>
                   </a:solidFill>
@@ -2431,7 +2431,7 @@
             </a:ln>
             <a:extLst>
               <a:ext uri="{91240B29-F687-4f45-9708-019B960494DF}">
-                <a14:hiddenLine xmlns:a14="http://schemas.microsoft.com/office/drawing/2010/main" xmlns="" w="9525">
+                <a14:hiddenLine xmlns="" xmlns:a14="http://schemas.microsoft.com/office/drawing/2010/main" w="9525">
                   <a:solidFill>
                     <a:srgbClr val="000000"/>
                   </a:solidFill>
@@ -2487,7 +2487,7 @@
             </a:ln>
             <a:extLst>
               <a:ext uri="{91240B29-F687-4f45-9708-019B960494DF}">
-                <a14:hiddenLine xmlns:a14="http://schemas.microsoft.com/office/drawing/2010/main" xmlns="" w="9525">
+                <a14:hiddenLine xmlns="" xmlns:a14="http://schemas.microsoft.com/office/drawing/2010/main" w="9525">
                   <a:solidFill>
                     <a:srgbClr val="000000"/>
                   </a:solidFill>
@@ -2577,7 +2577,7 @@
             </a:ln>
             <a:extLst>
               <a:ext uri="{91240B29-F687-4f45-9708-019B960494DF}">
-                <a14:hiddenLine xmlns:a14="http://schemas.microsoft.com/office/drawing/2010/main" xmlns="" w="9525">
+                <a14:hiddenLine xmlns="" xmlns:a14="http://schemas.microsoft.com/office/drawing/2010/main" w="9525">
                   <a:solidFill>
                     <a:srgbClr val="000000"/>
                   </a:solidFill>
@@ -2645,7 +2645,7 @@
             </a:ln>
             <a:extLst>
               <a:ext uri="{91240B29-F687-4f45-9708-019B960494DF}">
-                <a14:hiddenLine xmlns:a14="http://schemas.microsoft.com/office/drawing/2010/main" xmlns="" w="9525">
+                <a14:hiddenLine xmlns="" xmlns:a14="http://schemas.microsoft.com/office/drawing/2010/main" w="9525">
                   <a:solidFill>
                     <a:srgbClr val="000000"/>
                   </a:solidFill>
@@ -2735,7 +2735,7 @@
             </a:ln>
             <a:extLst>
               <a:ext uri="{91240B29-F687-4f45-9708-019B960494DF}">
-                <a14:hiddenLine xmlns:a14="http://schemas.microsoft.com/office/drawing/2010/main" xmlns="" w="9525">
+                <a14:hiddenLine xmlns="" xmlns:a14="http://schemas.microsoft.com/office/drawing/2010/main" w="9525">
                   <a:solidFill>
                     <a:srgbClr val="000000"/>
                   </a:solidFill>
@@ -2803,7 +2803,7 @@
             </a:ln>
             <a:extLst>
               <a:ext uri="{91240B29-F687-4f45-9708-019B960494DF}">
-                <a14:hiddenLine xmlns:a14="http://schemas.microsoft.com/office/drawing/2010/main" xmlns="" w="9525">
+                <a14:hiddenLine xmlns="" xmlns:a14="http://schemas.microsoft.com/office/drawing/2010/main" w="9525">
                   <a:solidFill>
                     <a:srgbClr val="000000"/>
                   </a:solidFill>
@@ -2893,7 +2893,7 @@
             </a:ln>
             <a:extLst>
               <a:ext uri="{91240B29-F687-4f45-9708-019B960494DF}">
-                <a14:hiddenLine xmlns:a14="http://schemas.microsoft.com/office/drawing/2010/main" xmlns="" w="9525">
+                <a14:hiddenLine xmlns="" xmlns:a14="http://schemas.microsoft.com/office/drawing/2010/main" w="9525">
                   <a:solidFill>
                     <a:srgbClr val="000000"/>
                   </a:solidFill>
@@ -2927,7 +2927,7 @@
             </a:ln>
             <a:extLst>
               <a:ext uri="{91240B29-F687-4f45-9708-019B960494DF}">
-                <a14:hiddenLine xmlns:a14="http://schemas.microsoft.com/office/drawing/2010/main" xmlns="" w="9525">
+                <a14:hiddenLine xmlns="" xmlns:a14="http://schemas.microsoft.com/office/drawing/2010/main" w="9525">
                   <a:solidFill>
                     <a:srgbClr val="000000"/>
                   </a:solidFill>
@@ -3017,7 +3017,7 @@
             </a:ln>
             <a:extLst>
               <a:ext uri="{91240B29-F687-4f45-9708-019B960494DF}">
-                <a14:hiddenLine xmlns:a14="http://schemas.microsoft.com/office/drawing/2010/main" xmlns="" w="9525">
+                <a14:hiddenLine xmlns="" xmlns:a14="http://schemas.microsoft.com/office/drawing/2010/main" w="9525">
                   <a:solidFill>
                     <a:srgbClr val="000000"/>
                   </a:solidFill>
@@ -3079,7 +3079,7 @@
             </a:ln>
             <a:extLst>
               <a:ext uri="{91240B29-F687-4f45-9708-019B960494DF}">
-                <a14:hiddenLine xmlns:a14="http://schemas.microsoft.com/office/drawing/2010/main" xmlns="" w="9525">
+                <a14:hiddenLine xmlns="" xmlns:a14="http://schemas.microsoft.com/office/drawing/2010/main" w="9525">
                   <a:solidFill>
                     <a:srgbClr val="000000"/>
                   </a:solidFill>
@@ -3141,7 +3141,7 @@
             </a:ln>
             <a:extLst>
               <a:ext uri="{91240B29-F687-4f45-9708-019B960494DF}">
-                <a14:hiddenLine xmlns:a14="http://schemas.microsoft.com/office/drawing/2010/main" xmlns="" w="9525">
+                <a14:hiddenLine xmlns="" xmlns:a14="http://schemas.microsoft.com/office/drawing/2010/main" w="9525">
                   <a:solidFill>
                     <a:srgbClr val="000000"/>
                   </a:solidFill>
@@ -3231,7 +3231,7 @@
             </a:ln>
             <a:extLst>
               <a:ext uri="{91240B29-F687-4f45-9708-019B960494DF}">
-                <a14:hiddenLine xmlns:a14="http://schemas.microsoft.com/office/drawing/2010/main" xmlns="" w="9525">
+                <a14:hiddenLine xmlns="" xmlns:a14="http://schemas.microsoft.com/office/drawing/2010/main" w="9525">
                   <a:solidFill>
                     <a:srgbClr val="000000"/>
                   </a:solidFill>
@@ -3299,7 +3299,7 @@
             </a:ln>
             <a:extLst>
               <a:ext uri="{91240B29-F687-4f45-9708-019B960494DF}">
-                <a14:hiddenLine xmlns:a14="http://schemas.microsoft.com/office/drawing/2010/main" xmlns="" w="9525">
+                <a14:hiddenLine xmlns="" xmlns:a14="http://schemas.microsoft.com/office/drawing/2010/main" w="9525">
                   <a:solidFill>
                     <a:srgbClr val="000000"/>
                   </a:solidFill>
@@ -3361,7 +3361,7 @@
             </a:ln>
             <a:extLst>
               <a:ext uri="{91240B29-F687-4f45-9708-019B960494DF}">
-                <a14:hiddenLine xmlns:a14="http://schemas.microsoft.com/office/drawing/2010/main" xmlns="" w="9525">
+                <a14:hiddenLine xmlns="" xmlns:a14="http://schemas.microsoft.com/office/drawing/2010/main" w="9525">
                   <a:solidFill>
                     <a:srgbClr val="000000"/>
                   </a:solidFill>
@@ -3451,7 +3451,7 @@
             </a:ln>
             <a:extLst>
               <a:ext uri="{91240B29-F687-4f45-9708-019B960494DF}">
-                <a14:hiddenLine xmlns:a14="http://schemas.microsoft.com/office/drawing/2010/main" xmlns="" w="9525">
+                <a14:hiddenLine xmlns="" xmlns:a14="http://schemas.microsoft.com/office/drawing/2010/main" w="9525">
                   <a:solidFill>
                     <a:srgbClr val="000000"/>
                   </a:solidFill>
@@ -3513,7 +3513,7 @@
             </a:ln>
             <a:extLst>
               <a:ext uri="{91240B29-F687-4f45-9708-019B960494DF}">
-                <a14:hiddenLine xmlns:a14="http://schemas.microsoft.com/office/drawing/2010/main" xmlns="" w="9525">
+                <a14:hiddenLine xmlns="" xmlns:a14="http://schemas.microsoft.com/office/drawing/2010/main" w="9525">
                   <a:solidFill>
                     <a:srgbClr val="000000"/>
                   </a:solidFill>
@@ -3603,7 +3603,7 @@
             </a:ln>
             <a:extLst>
               <a:ext uri="{91240B29-F687-4f45-9708-019B960494DF}">
-                <a14:hiddenLine xmlns:a14="http://schemas.microsoft.com/office/drawing/2010/main" xmlns="" w="9525">
+                <a14:hiddenLine xmlns="" xmlns:a14="http://schemas.microsoft.com/office/drawing/2010/main" w="9525">
                   <a:solidFill>
                     <a:srgbClr val="000000"/>
                   </a:solidFill>
@@ -3665,7 +3665,7 @@
             </a:ln>
             <a:extLst>
               <a:ext uri="{91240B29-F687-4f45-9708-019B960494DF}">
-                <a14:hiddenLine xmlns:a14="http://schemas.microsoft.com/office/drawing/2010/main" xmlns="" w="9525">
+                <a14:hiddenLine xmlns="" xmlns:a14="http://schemas.microsoft.com/office/drawing/2010/main" w="9525">
                   <a:solidFill>
                     <a:srgbClr val="000000"/>
                   </a:solidFill>
@@ -3755,7 +3755,7 @@
             </a:ln>
             <a:extLst>
               <a:ext uri="{91240B29-F687-4f45-9708-019B960494DF}">
-                <a14:hiddenLine xmlns:a14="http://schemas.microsoft.com/office/drawing/2010/main" xmlns="" w="9525">
+                <a14:hiddenLine xmlns="" xmlns:a14="http://schemas.microsoft.com/office/drawing/2010/main" w="9525">
                   <a:solidFill>
                     <a:srgbClr val="000000"/>
                   </a:solidFill>
@@ -3789,7 +3789,7 @@
             </a:ln>
             <a:extLst>
               <a:ext uri="{91240B29-F687-4f45-9708-019B960494DF}">
-                <a14:hiddenLine xmlns:a14="http://schemas.microsoft.com/office/drawing/2010/main" xmlns="" w="9525">
+                <a14:hiddenLine xmlns="" xmlns:a14="http://schemas.microsoft.com/office/drawing/2010/main" w="9525">
                   <a:solidFill>
                     <a:srgbClr val="000000"/>
                   </a:solidFill>
@@ -3854,7 +3854,7 @@
             </a:ln>
             <a:extLst>
               <a:ext uri="{91240B29-F687-4f45-9708-019B960494DF}">
-                <a14:hiddenLine xmlns:a14="http://schemas.microsoft.com/office/drawing/2010/main" xmlns="" w="9525">
+                <a14:hiddenLine xmlns="" xmlns:a14="http://schemas.microsoft.com/office/drawing/2010/main" w="9525">
                   <a:solidFill>
                     <a:srgbClr val="000000"/>
                   </a:solidFill>
@@ -3944,7 +3944,7 @@
             </a:ln>
             <a:extLst>
               <a:ext uri="{91240B29-F687-4f45-9708-019B960494DF}">
-                <a14:hiddenLine xmlns:a14="http://schemas.microsoft.com/office/drawing/2010/main" xmlns="" w="9525">
+                <a14:hiddenLine xmlns="" xmlns:a14="http://schemas.microsoft.com/office/drawing/2010/main" w="9525">
                   <a:solidFill>
                     <a:srgbClr val="000000"/>
                   </a:solidFill>
@@ -4006,7 +4006,7 @@
             </a:ln>
             <a:extLst>
               <a:ext uri="{91240B29-F687-4f45-9708-019B960494DF}">
-                <a14:hiddenLine xmlns:a14="http://schemas.microsoft.com/office/drawing/2010/main" xmlns="" w="9525">
+                <a14:hiddenLine xmlns="" xmlns:a14="http://schemas.microsoft.com/office/drawing/2010/main" w="9525">
                   <a:solidFill>
                     <a:srgbClr val="000000"/>
                   </a:solidFill>
@@ -4096,7 +4096,7 @@
             </a:ln>
             <a:extLst>
               <a:ext uri="{91240B29-F687-4f45-9708-019B960494DF}">
-                <a14:hiddenLine xmlns:a14="http://schemas.microsoft.com/office/drawing/2010/main" xmlns="" w="9525">
+                <a14:hiddenLine xmlns="" xmlns:a14="http://schemas.microsoft.com/office/drawing/2010/main" w="9525">
                   <a:solidFill>
                     <a:srgbClr val="000000"/>
                   </a:solidFill>
@@ -4186,7 +4186,7 @@
             </a:ln>
             <a:extLst>
               <a:ext uri="{91240B29-F687-4f45-9708-019B960494DF}">
-                <a14:hiddenLine xmlns:a14="http://schemas.microsoft.com/office/drawing/2010/main" xmlns="" w="9525">
+                <a14:hiddenLine xmlns="" xmlns:a14="http://schemas.microsoft.com/office/drawing/2010/main" w="9525">
                   <a:solidFill>
                     <a:srgbClr val="000000"/>
                   </a:solidFill>
@@ -4251,7 +4251,7 @@
             </a:ln>
             <a:extLst>
               <a:ext uri="{91240B29-F687-4f45-9708-019B960494DF}">
-                <a14:hiddenLine xmlns:a14="http://schemas.microsoft.com/office/drawing/2010/main" xmlns="" w="9525">
+                <a14:hiddenLine xmlns="" xmlns:a14="http://schemas.microsoft.com/office/drawing/2010/main" w="9525">
                   <a:solidFill>
                     <a:srgbClr val="000000"/>
                   </a:solidFill>
@@ -4313,7 +4313,7 @@
             </a:ln>
             <a:extLst>
               <a:ext uri="{91240B29-F687-4f45-9708-019B960494DF}">
-                <a14:hiddenLine xmlns:a14="http://schemas.microsoft.com/office/drawing/2010/main" xmlns="" w="9525">
+                <a14:hiddenLine xmlns="" xmlns:a14="http://schemas.microsoft.com/office/drawing/2010/main" w="9525">
                   <a:solidFill>
                     <a:srgbClr val="000000"/>
                   </a:solidFill>
@@ -4403,7 +4403,7 @@
             </a:ln>
             <a:extLst>
               <a:ext uri="{91240B29-F687-4f45-9708-019B960494DF}">
-                <a14:hiddenLine xmlns:a14="http://schemas.microsoft.com/office/drawing/2010/main" xmlns="" w="9525">
+                <a14:hiddenLine xmlns="" xmlns:a14="http://schemas.microsoft.com/office/drawing/2010/main" w="9525">
                   <a:solidFill>
                     <a:srgbClr val="000000"/>
                   </a:solidFill>
@@ -4493,7 +4493,7 @@
             </a:ln>
             <a:extLst>
               <a:ext uri="{91240B29-F687-4f45-9708-019B960494DF}">
-                <a14:hiddenLine xmlns:a14="http://schemas.microsoft.com/office/drawing/2010/main" xmlns="" w="9525">
+                <a14:hiddenLine xmlns="" xmlns:a14="http://schemas.microsoft.com/office/drawing/2010/main" w="9525">
                   <a:solidFill>
                     <a:srgbClr val="000000"/>
                   </a:solidFill>
@@ -4555,7 +4555,7 @@
             </a:ln>
             <a:extLst>
               <a:ext uri="{91240B29-F687-4f45-9708-019B960494DF}">
-                <a14:hiddenLine xmlns:a14="http://schemas.microsoft.com/office/drawing/2010/main" xmlns="" w="9525">
+                <a14:hiddenLine xmlns="" xmlns:a14="http://schemas.microsoft.com/office/drawing/2010/main" w="9525">
                   <a:solidFill>
                     <a:srgbClr val="000000"/>
                   </a:solidFill>
@@ -4675,7 +4675,7 @@
             </a:ln>
             <a:extLst>
               <a:ext uri="{91240B29-F687-4f45-9708-019B960494DF}">
-                <a14:hiddenLine xmlns:a14="http://schemas.microsoft.com/office/drawing/2010/main" xmlns="" w="9525">
+                <a14:hiddenLine xmlns="" xmlns:a14="http://schemas.microsoft.com/office/drawing/2010/main" w="9525">
                   <a:solidFill>
                     <a:srgbClr val="000000"/>
                   </a:solidFill>
@@ -4743,7 +4743,7 @@
             </a:ln>
             <a:extLst>
               <a:ext uri="{91240B29-F687-4f45-9708-019B960494DF}">
-                <a14:hiddenLine xmlns:a14="http://schemas.microsoft.com/office/drawing/2010/main" xmlns="" w="9525">
+                <a14:hiddenLine xmlns="" xmlns:a14="http://schemas.microsoft.com/office/drawing/2010/main" w="9525">
                   <a:solidFill>
                     <a:srgbClr val="000000"/>
                   </a:solidFill>
@@ -4833,7 +4833,7 @@
             </a:ln>
             <a:extLst>
               <a:ext uri="{91240B29-F687-4f45-9708-019B960494DF}">
-                <a14:hiddenLine xmlns:a14="http://schemas.microsoft.com/office/drawing/2010/main" xmlns="" w="9525">
+                <a14:hiddenLine xmlns="" xmlns:a14="http://schemas.microsoft.com/office/drawing/2010/main" w="9525">
                   <a:solidFill>
                     <a:srgbClr val="000000"/>
                   </a:solidFill>
@@ -4973,7 +4973,7 @@
           <a:p>
             <a:fld id="{48A87A34-81AB-432B-8DAE-1953F412C126}" type="datetimeFigureOut">
               <a:rPr lang="en-US" smtClean="0"/>
-              <a:t>5/19/2021</a:t>
+              <a:t>12/11/2021</a:t>
             </a:fld>
             <a:endParaRPr lang="en-US" dirty="0"/>
           </a:p>
@@ -5240,7 +5240,7 @@
           <a:p>
             <a:fld id="{48A87A34-81AB-432B-8DAE-1953F412C126}" type="datetimeFigureOut">
               <a:rPr lang="en-US" smtClean="0"/>
-              <a:t>5/19/2021</a:t>
+              <a:t>12/11/2021</a:t>
             </a:fld>
             <a:endParaRPr lang="en-US" dirty="0"/>
           </a:p>
@@ -5436,7 +5436,7 @@
           <a:p>
             <a:fld id="{48A87A34-81AB-432B-8DAE-1953F412C126}" type="datetimeFigureOut">
               <a:rPr lang="en-US" smtClean="0"/>
-              <a:t>5/19/2021</a:t>
+              <a:t>12/11/2021</a:t>
             </a:fld>
             <a:endParaRPr lang="en-US" dirty="0"/>
           </a:p>
@@ -5699,7 +5699,7 @@
           <a:p>
             <a:fld id="{48A87A34-81AB-432B-8DAE-1953F412C126}" type="datetimeFigureOut">
               <a:rPr lang="en-US" smtClean="0"/>
-              <a:t>5/19/2021</a:t>
+              <a:t>12/11/2021</a:t>
             </a:fld>
             <a:endParaRPr lang="en-US" dirty="0"/>
           </a:p>
@@ -6133,7 +6133,7 @@
           <a:p>
             <a:fld id="{48A87A34-81AB-432B-8DAE-1953F412C126}" type="datetimeFigureOut">
               <a:rPr lang="en-US" smtClean="0"/>
-              <a:t>5/19/2021</a:t>
+              <a:t>12/11/2021</a:t>
             </a:fld>
             <a:endParaRPr lang="en-US" dirty="0"/>
           </a:p>
@@ -6679,7 +6679,7 @@
           <a:p>
             <a:fld id="{48A87A34-81AB-432B-8DAE-1953F412C126}" type="datetimeFigureOut">
               <a:rPr lang="en-US" smtClean="0"/>
-              <a:t>5/19/2021</a:t>
+              <a:t>12/11/2021</a:t>
             </a:fld>
             <a:endParaRPr lang="en-US" dirty="0"/>
           </a:p>
@@ -7399,7 +7399,7 @@
           <a:p>
             <a:fld id="{48A87A34-81AB-432B-8DAE-1953F412C126}" type="datetimeFigureOut">
               <a:rPr lang="en-US" smtClean="0"/>
-              <a:t>5/19/2021</a:t>
+              <a:t>12/11/2021</a:t>
             </a:fld>
             <a:endParaRPr lang="en-US" dirty="0"/>
           </a:p>
@@ -7569,7 +7569,7 @@
           <a:p>
             <a:fld id="{48A87A34-81AB-432B-8DAE-1953F412C126}" type="datetimeFigureOut">
               <a:rPr lang="en-US" smtClean="0"/>
-              <a:t>5/19/2021</a:t>
+              <a:t>12/11/2021</a:t>
             </a:fld>
             <a:endParaRPr lang="en-US" dirty="0"/>
           </a:p>
@@ -7749,7 +7749,7 @@
           <a:p>
             <a:fld id="{48A87A34-81AB-432B-8DAE-1953F412C126}" type="datetimeFigureOut">
               <a:rPr lang="en-US" smtClean="0"/>
-              <a:t>5/19/2021</a:t>
+              <a:t>12/11/2021</a:t>
             </a:fld>
             <a:endParaRPr lang="en-US" dirty="0"/>
           </a:p>
@@ -7919,7 +7919,7 @@
           <a:p>
             <a:fld id="{48A87A34-81AB-432B-8DAE-1953F412C126}" type="datetimeFigureOut">
               <a:rPr lang="en-US" smtClean="0"/>
-              <a:t>5/19/2021</a:t>
+              <a:t>12/11/2021</a:t>
             </a:fld>
             <a:endParaRPr lang="en-US" dirty="0"/>
           </a:p>
@@ -8169,7 +8169,7 @@
           <a:p>
             <a:fld id="{48A87A34-81AB-432B-8DAE-1953F412C126}" type="datetimeFigureOut">
               <a:rPr lang="en-US" smtClean="0"/>
-              <a:t>5/19/2021</a:t>
+              <a:t>12/11/2021</a:t>
             </a:fld>
             <a:endParaRPr lang="en-US" dirty="0"/>
           </a:p>
@@ -8401,7 +8401,7 @@
           <a:p>
             <a:fld id="{48A87A34-81AB-432B-8DAE-1953F412C126}" type="datetimeFigureOut">
               <a:rPr lang="en-US" smtClean="0"/>
-              <a:t>5/19/2021</a:t>
+              <a:t>12/11/2021</a:t>
             </a:fld>
             <a:endParaRPr lang="en-US" dirty="0"/>
           </a:p>
@@ -8782,7 +8782,7 @@
           <a:p>
             <a:fld id="{48A87A34-81AB-432B-8DAE-1953F412C126}" type="datetimeFigureOut">
               <a:rPr lang="en-US" smtClean="0"/>
-              <a:t>5/19/2021</a:t>
+              <a:t>12/11/2021</a:t>
             </a:fld>
             <a:endParaRPr lang="en-US" dirty="0"/>
           </a:p>
@@ -8900,7 +8900,7 @@
           <a:p>
             <a:fld id="{48A87A34-81AB-432B-8DAE-1953F412C126}" type="datetimeFigureOut">
               <a:rPr lang="en-US" smtClean="0"/>
-              <a:t>5/19/2021</a:t>
+              <a:t>12/11/2021</a:t>
             </a:fld>
             <a:endParaRPr lang="en-US" dirty="0"/>
           </a:p>
@@ -8995,7 +8995,7 @@
           <a:p>
             <a:fld id="{48A87A34-81AB-432B-8DAE-1953F412C126}" type="datetimeFigureOut">
               <a:rPr lang="en-US" smtClean="0"/>
-              <a:t>5/19/2021</a:t>
+              <a:t>12/11/2021</a:t>
             </a:fld>
             <a:endParaRPr lang="en-US" dirty="0"/>
           </a:p>
@@ -9244,7 +9244,7 @@
           <a:p>
             <a:fld id="{48A87A34-81AB-432B-8DAE-1953F412C126}" type="datetimeFigureOut">
               <a:rPr lang="en-US" smtClean="0"/>
-              <a:t>5/19/2021</a:t>
+              <a:t>12/11/2021</a:t>
             </a:fld>
             <a:endParaRPr lang="en-US" dirty="0"/>
           </a:p>
@@ -9524,7 +9524,7 @@
           <a:p>
             <a:fld id="{48A87A34-81AB-432B-8DAE-1953F412C126}" type="datetimeFigureOut">
               <a:rPr lang="en-US" smtClean="0"/>
-              <a:t>5/19/2021</a:t>
+              <a:t>12/11/2021</a:t>
             </a:fld>
             <a:endParaRPr lang="en-US" dirty="0"/>
           </a:p>
@@ -9647,7 +9647,7 @@
           <a:noFill/>
           <a:extLst>
             <a:ext uri="{909E8E84-426E-40dd-AFC4-6F175D3DCCD1}">
-              <a14:hiddenFill xmlns:a14="http://schemas.microsoft.com/office/drawing/2010/main" xmlns="">
+              <a14:hiddenFill xmlns="" xmlns:a14="http://schemas.microsoft.com/office/drawing/2010/main">
                 <a:solidFill>
                   <a:srgbClr val="FFFFFF"/>
                 </a:solidFill>
@@ -9721,7 +9721,7 @@
               </a:ln>
               <a:extLst>
                 <a:ext uri="{91240B29-F687-4f45-9708-019B960494DF}">
-                  <a14:hiddenLine xmlns:a14="http://schemas.microsoft.com/office/drawing/2010/main" xmlns="" w="9525">
+                  <a14:hiddenLine xmlns="" xmlns:a14="http://schemas.microsoft.com/office/drawing/2010/main" w="9525">
                     <a:solidFill>
                       <a:srgbClr val="000000"/>
                     </a:solidFill>
@@ -9811,7 +9811,7 @@
               </a:ln>
               <a:extLst>
                 <a:ext uri="{91240B29-F687-4f45-9708-019B960494DF}">
-                  <a14:hiddenLine xmlns:a14="http://schemas.microsoft.com/office/drawing/2010/main" xmlns="" w="9525">
+                  <a14:hiddenLine xmlns="" xmlns:a14="http://schemas.microsoft.com/office/drawing/2010/main" w="9525">
                     <a:solidFill>
                       <a:srgbClr val="000000"/>
                     </a:solidFill>
@@ -9901,7 +9901,7 @@
               </a:ln>
               <a:extLst>
                 <a:ext uri="{91240B29-F687-4f45-9708-019B960494DF}">
-                  <a14:hiddenLine xmlns:a14="http://schemas.microsoft.com/office/drawing/2010/main" xmlns="" w="9525">
+                  <a14:hiddenLine xmlns="" xmlns:a14="http://schemas.microsoft.com/office/drawing/2010/main" w="9525">
                     <a:solidFill>
                       <a:srgbClr val="000000"/>
                     </a:solidFill>
@@ -9963,7 +9963,7 @@
               </a:ln>
               <a:extLst>
                 <a:ext uri="{91240B29-F687-4f45-9708-019B960494DF}">
-                  <a14:hiddenLine xmlns:a14="http://schemas.microsoft.com/office/drawing/2010/main" xmlns="" w="9525">
+                  <a14:hiddenLine xmlns="" xmlns:a14="http://schemas.microsoft.com/office/drawing/2010/main" w="9525">
                     <a:solidFill>
                       <a:srgbClr val="000000"/>
                     </a:solidFill>
@@ -10053,7 +10053,7 @@
               </a:ln>
               <a:extLst>
                 <a:ext uri="{91240B29-F687-4f45-9708-019B960494DF}">
-                  <a14:hiddenLine xmlns:a14="http://schemas.microsoft.com/office/drawing/2010/main" xmlns="" w="9525">
+                  <a14:hiddenLine xmlns="" xmlns:a14="http://schemas.microsoft.com/office/drawing/2010/main" w="9525">
                     <a:solidFill>
                       <a:srgbClr val="000000"/>
                     </a:solidFill>
@@ -10115,7 +10115,7 @@
               </a:ln>
               <a:extLst>
                 <a:ext uri="{91240B29-F687-4f45-9708-019B960494DF}">
-                  <a14:hiddenLine xmlns:a14="http://schemas.microsoft.com/office/drawing/2010/main" xmlns="" w="9525">
+                  <a14:hiddenLine xmlns="" xmlns:a14="http://schemas.microsoft.com/office/drawing/2010/main" w="9525">
                     <a:solidFill>
                       <a:srgbClr val="000000"/>
                     </a:solidFill>
@@ -10177,7 +10177,7 @@
               </a:ln>
               <a:extLst>
                 <a:ext uri="{91240B29-F687-4f45-9708-019B960494DF}">
-                  <a14:hiddenLine xmlns:a14="http://schemas.microsoft.com/office/drawing/2010/main" xmlns="" w="9525">
+                  <a14:hiddenLine xmlns="" xmlns:a14="http://schemas.microsoft.com/office/drawing/2010/main" w="9525">
                     <a:solidFill>
                       <a:srgbClr val="000000"/>
                     </a:solidFill>
@@ -10267,7 +10267,7 @@
               </a:ln>
               <a:extLst>
                 <a:ext uri="{91240B29-F687-4f45-9708-019B960494DF}">
-                  <a14:hiddenLine xmlns:a14="http://schemas.microsoft.com/office/drawing/2010/main" xmlns="" w="9525">
+                  <a14:hiddenLine xmlns="" xmlns:a14="http://schemas.microsoft.com/office/drawing/2010/main" w="9525">
                     <a:solidFill>
                       <a:srgbClr val="000000"/>
                     </a:solidFill>
@@ -10357,7 +10357,7 @@
               </a:ln>
               <a:extLst>
                 <a:ext uri="{91240B29-F687-4f45-9708-019B960494DF}">
-                  <a14:hiddenLine xmlns:a14="http://schemas.microsoft.com/office/drawing/2010/main" xmlns="" w="9525">
+                  <a14:hiddenLine xmlns="" xmlns:a14="http://schemas.microsoft.com/office/drawing/2010/main" w="9525">
                     <a:solidFill>
                       <a:srgbClr val="000000"/>
                     </a:solidFill>
@@ -10419,7 +10419,7 @@
               </a:ln>
               <a:extLst>
                 <a:ext uri="{91240B29-F687-4f45-9708-019B960494DF}">
-                  <a14:hiddenLine xmlns:a14="http://schemas.microsoft.com/office/drawing/2010/main" xmlns="" w="9525">
+                  <a14:hiddenLine xmlns="" xmlns:a14="http://schemas.microsoft.com/office/drawing/2010/main" w="9525">
                     <a:solidFill>
                       <a:srgbClr val="000000"/>
                     </a:solidFill>
@@ -10529,7 +10529,7 @@
               </a:ln>
               <a:extLst>
                 <a:ext uri="{91240B29-F687-4f45-9708-019B960494DF}">
-                  <a14:hiddenLine xmlns:a14="http://schemas.microsoft.com/office/drawing/2010/main" xmlns="" w="9525">
+                  <a14:hiddenLine xmlns="" xmlns:a14="http://schemas.microsoft.com/office/drawing/2010/main" w="9525">
                     <a:solidFill>
                       <a:srgbClr val="000000"/>
                     </a:solidFill>
@@ -10613,7 +10613,7 @@
               </a:ln>
               <a:extLst>
                 <a:ext uri="{91240B29-F687-4f45-9708-019B960494DF}">
-                  <a14:hiddenLine xmlns:a14="http://schemas.microsoft.com/office/drawing/2010/main" xmlns="" w="9525">
+                  <a14:hiddenLine xmlns="" xmlns:a14="http://schemas.microsoft.com/office/drawing/2010/main" w="9525">
                     <a:solidFill>
                       <a:srgbClr val="000000"/>
                     </a:solidFill>
@@ -10675,7 +10675,7 @@
               </a:ln>
               <a:extLst>
                 <a:ext uri="{91240B29-F687-4f45-9708-019B960494DF}">
-                  <a14:hiddenLine xmlns:a14="http://schemas.microsoft.com/office/drawing/2010/main" xmlns="" w="9525">
+                  <a14:hiddenLine xmlns="" xmlns:a14="http://schemas.microsoft.com/office/drawing/2010/main" w="9525">
                     <a:solidFill>
                       <a:srgbClr val="000000"/>
                     </a:solidFill>
@@ -10737,7 +10737,7 @@
               </a:ln>
               <a:extLst>
                 <a:ext uri="{91240B29-F687-4f45-9708-019B960494DF}">
-                  <a14:hiddenLine xmlns:a14="http://schemas.microsoft.com/office/drawing/2010/main" xmlns="" w="9525">
+                  <a14:hiddenLine xmlns="" xmlns:a14="http://schemas.microsoft.com/office/drawing/2010/main" w="9525">
                     <a:solidFill>
                       <a:srgbClr val="000000"/>
                     </a:solidFill>
@@ -10827,7 +10827,7 @@
               </a:ln>
               <a:extLst>
                 <a:ext uri="{91240B29-F687-4f45-9708-019B960494DF}">
-                  <a14:hiddenLine xmlns:a14="http://schemas.microsoft.com/office/drawing/2010/main" xmlns="" w="9525">
+                  <a14:hiddenLine xmlns="" xmlns:a14="http://schemas.microsoft.com/office/drawing/2010/main" w="9525">
                     <a:solidFill>
                       <a:srgbClr val="000000"/>
                     </a:solidFill>
@@ -10861,7 +10861,7 @@
               </a:ln>
               <a:extLst>
                 <a:ext uri="{91240B29-F687-4f45-9708-019B960494DF}">
-                  <a14:hiddenLine xmlns:a14="http://schemas.microsoft.com/office/drawing/2010/main" xmlns="" w="9525">
+                  <a14:hiddenLine xmlns="" xmlns:a14="http://schemas.microsoft.com/office/drawing/2010/main" w="9525">
                     <a:solidFill>
                       <a:srgbClr val="000000"/>
                     </a:solidFill>
@@ -10926,7 +10926,7 @@
               </a:ln>
               <a:extLst>
                 <a:ext uri="{91240B29-F687-4f45-9708-019B960494DF}">
-                  <a14:hiddenLine xmlns:a14="http://schemas.microsoft.com/office/drawing/2010/main" xmlns="" w="9525">
+                  <a14:hiddenLine xmlns="" xmlns:a14="http://schemas.microsoft.com/office/drawing/2010/main" w="9525">
                     <a:solidFill>
                       <a:srgbClr val="000000"/>
                     </a:solidFill>
@@ -11016,7 +11016,7 @@
               </a:ln>
               <a:extLst>
                 <a:ext uri="{91240B29-F687-4f45-9708-019B960494DF}">
-                  <a14:hiddenLine xmlns:a14="http://schemas.microsoft.com/office/drawing/2010/main" xmlns="" w="9525">
+                  <a14:hiddenLine xmlns="" xmlns:a14="http://schemas.microsoft.com/office/drawing/2010/main" w="9525">
                     <a:solidFill>
                       <a:srgbClr val="000000"/>
                     </a:solidFill>
@@ -11078,7 +11078,7 @@
               </a:ln>
               <a:extLst>
                 <a:ext uri="{91240B29-F687-4f45-9708-019B960494DF}">
-                  <a14:hiddenLine xmlns:a14="http://schemas.microsoft.com/office/drawing/2010/main" xmlns="" w="9525">
+                  <a14:hiddenLine xmlns="" xmlns:a14="http://schemas.microsoft.com/office/drawing/2010/main" w="9525">
                     <a:solidFill>
                       <a:srgbClr val="000000"/>
                     </a:solidFill>
@@ -11168,7 +11168,7 @@
               </a:ln>
               <a:extLst>
                 <a:ext uri="{91240B29-F687-4f45-9708-019B960494DF}">
-                  <a14:hiddenLine xmlns:a14="http://schemas.microsoft.com/office/drawing/2010/main" xmlns="" w="9525">
+                  <a14:hiddenLine xmlns="" xmlns:a14="http://schemas.microsoft.com/office/drawing/2010/main" w="9525">
                     <a:solidFill>
                       <a:srgbClr val="000000"/>
                     </a:solidFill>
@@ -11233,7 +11233,7 @@
               </a:ln>
               <a:extLst>
                 <a:ext uri="{91240B29-F687-4f45-9708-019B960494DF}">
-                  <a14:hiddenLine xmlns:a14="http://schemas.microsoft.com/office/drawing/2010/main" xmlns="" w="9525">
+                  <a14:hiddenLine xmlns="" xmlns:a14="http://schemas.microsoft.com/office/drawing/2010/main" w="9525">
                     <a:solidFill>
                       <a:srgbClr val="000000"/>
                     </a:solidFill>
@@ -11295,7 +11295,7 @@
               </a:ln>
               <a:extLst>
                 <a:ext uri="{91240B29-F687-4f45-9708-019B960494DF}">
-                  <a14:hiddenLine xmlns:a14="http://schemas.microsoft.com/office/drawing/2010/main" xmlns="" w="9525">
+                  <a14:hiddenLine xmlns="" xmlns:a14="http://schemas.microsoft.com/office/drawing/2010/main" w="9525">
                     <a:solidFill>
                       <a:srgbClr val="000000"/>
                     </a:solidFill>
@@ -11385,7 +11385,7 @@
               </a:ln>
               <a:extLst>
                 <a:ext uri="{91240B29-F687-4f45-9708-019B960494DF}">
-                  <a14:hiddenLine xmlns:a14="http://schemas.microsoft.com/office/drawing/2010/main" xmlns="" w="9525">
+                  <a14:hiddenLine xmlns="" xmlns:a14="http://schemas.microsoft.com/office/drawing/2010/main" w="9525">
                     <a:solidFill>
                       <a:srgbClr val="000000"/>
                     </a:solidFill>
@@ -11475,7 +11475,7 @@
               </a:ln>
               <a:extLst>
                 <a:ext uri="{91240B29-F687-4f45-9708-019B960494DF}">
-                  <a14:hiddenLine xmlns:a14="http://schemas.microsoft.com/office/drawing/2010/main" xmlns="" w="9525">
+                  <a14:hiddenLine xmlns="" xmlns:a14="http://schemas.microsoft.com/office/drawing/2010/main" w="9525">
                     <a:solidFill>
                       <a:srgbClr val="000000"/>
                     </a:solidFill>
@@ -11540,7 +11540,7 @@
               </a:ln>
               <a:extLst>
                 <a:ext uri="{91240B29-F687-4f45-9708-019B960494DF}">
-                  <a14:hiddenLine xmlns:a14="http://schemas.microsoft.com/office/drawing/2010/main" xmlns="" w="9525">
+                  <a14:hiddenLine xmlns="" xmlns:a14="http://schemas.microsoft.com/office/drawing/2010/main" w="9525">
                     <a:solidFill>
                       <a:srgbClr val="000000"/>
                     </a:solidFill>
@@ -11660,7 +11660,7 @@
               </a:ln>
               <a:extLst>
                 <a:ext uri="{91240B29-F687-4f45-9708-019B960494DF}">
-                  <a14:hiddenLine xmlns:a14="http://schemas.microsoft.com/office/drawing/2010/main" xmlns="" w="9525">
+                  <a14:hiddenLine xmlns="" xmlns:a14="http://schemas.microsoft.com/office/drawing/2010/main" w="9525">
                     <a:solidFill>
                       <a:srgbClr val="000000"/>
                     </a:solidFill>
@@ -11741,7 +11741,7 @@
               </a:ln>
               <a:extLst>
                 <a:ext uri="{91240B29-F687-4f45-9708-019B960494DF}">
-                  <a14:hiddenLine xmlns:a14="http://schemas.microsoft.com/office/drawing/2010/main" xmlns="" w="9525">
+                  <a14:hiddenLine xmlns="" xmlns:a14="http://schemas.microsoft.com/office/drawing/2010/main" w="9525">
                     <a:solidFill>
                       <a:srgbClr val="000000"/>
                     </a:solidFill>
@@ -11856,7 +11856,7 @@
               </a:ln>
               <a:extLst>
                 <a:ext uri="{91240B29-F687-4f45-9708-019B960494DF}">
-                  <a14:hiddenLine xmlns:a14="http://schemas.microsoft.com/office/drawing/2010/main" xmlns="" w="9525">
+                  <a14:hiddenLine xmlns="" xmlns:a14="http://schemas.microsoft.com/office/drawing/2010/main" w="9525">
                     <a:solidFill>
                       <a:srgbClr val="000000"/>
                     </a:solidFill>
@@ -11946,7 +11946,7 @@
               </a:ln>
               <a:extLst>
                 <a:ext uri="{91240B29-F687-4f45-9708-019B960494DF}">
-                  <a14:hiddenLine xmlns:a14="http://schemas.microsoft.com/office/drawing/2010/main" xmlns="" w="9525">
+                  <a14:hiddenLine xmlns="" xmlns:a14="http://schemas.microsoft.com/office/drawing/2010/main" w="9525">
                     <a:solidFill>
                       <a:srgbClr val="000000"/>
                     </a:solidFill>
@@ -12011,7 +12011,7 @@
               </a:ln>
               <a:extLst>
                 <a:ext uri="{91240B29-F687-4f45-9708-019B960494DF}">
-                  <a14:hiddenLine xmlns:a14="http://schemas.microsoft.com/office/drawing/2010/main" xmlns="" w="9525">
+                  <a14:hiddenLine xmlns="" xmlns:a14="http://schemas.microsoft.com/office/drawing/2010/main" w="9525">
                     <a:solidFill>
                       <a:srgbClr val="000000"/>
                     </a:solidFill>
@@ -12101,7 +12101,7 @@
               </a:ln>
               <a:extLst>
                 <a:ext uri="{91240B29-F687-4f45-9708-019B960494DF}">
-                  <a14:hiddenLine xmlns:a14="http://schemas.microsoft.com/office/drawing/2010/main" xmlns="" w="9525">
+                  <a14:hiddenLine xmlns="" xmlns:a14="http://schemas.microsoft.com/office/drawing/2010/main" w="9525">
                     <a:solidFill>
                       <a:srgbClr val="000000"/>
                     </a:solidFill>
@@ -12169,7 +12169,7 @@
               </a:ln>
               <a:extLst>
                 <a:ext uri="{91240B29-F687-4f45-9708-019B960494DF}">
-                  <a14:hiddenLine xmlns:a14="http://schemas.microsoft.com/office/drawing/2010/main" xmlns="" w="9525">
+                  <a14:hiddenLine xmlns="" xmlns:a14="http://schemas.microsoft.com/office/drawing/2010/main" w="9525">
                     <a:solidFill>
                       <a:srgbClr val="000000"/>
                     </a:solidFill>
@@ -12259,7 +12259,7 @@
               </a:ln>
               <a:extLst>
                 <a:ext uri="{91240B29-F687-4f45-9708-019B960494DF}">
-                  <a14:hiddenLine xmlns:a14="http://schemas.microsoft.com/office/drawing/2010/main" xmlns="" w="9525">
+                  <a14:hiddenLine xmlns="" xmlns:a14="http://schemas.microsoft.com/office/drawing/2010/main" w="9525">
                     <a:solidFill>
                       <a:srgbClr val="000000"/>
                     </a:solidFill>
@@ -12327,7 +12327,7 @@
               </a:ln>
               <a:extLst>
                 <a:ext uri="{91240B29-F687-4f45-9708-019B960494DF}">
-                  <a14:hiddenLine xmlns:a14="http://schemas.microsoft.com/office/drawing/2010/main" xmlns="" w="9525">
+                  <a14:hiddenLine xmlns="" xmlns:a14="http://schemas.microsoft.com/office/drawing/2010/main" w="9525">
                     <a:solidFill>
                       <a:srgbClr val="000000"/>
                     </a:solidFill>
@@ -12417,7 +12417,7 @@
               </a:ln>
               <a:extLst>
                 <a:ext uri="{91240B29-F687-4f45-9708-019B960494DF}">
-                  <a14:hiddenLine xmlns:a14="http://schemas.microsoft.com/office/drawing/2010/main" xmlns="" w="9525">
+                  <a14:hiddenLine xmlns="" xmlns:a14="http://schemas.microsoft.com/office/drawing/2010/main" w="9525">
                     <a:solidFill>
                       <a:srgbClr val="000000"/>
                     </a:solidFill>
@@ -12451,7 +12451,7 @@
               </a:ln>
               <a:extLst>
                 <a:ext uri="{91240B29-F687-4f45-9708-019B960494DF}">
-                  <a14:hiddenLine xmlns:a14="http://schemas.microsoft.com/office/drawing/2010/main" xmlns="" w="9525">
+                  <a14:hiddenLine xmlns="" xmlns:a14="http://schemas.microsoft.com/office/drawing/2010/main" w="9525">
                     <a:solidFill>
                       <a:srgbClr val="000000"/>
                     </a:solidFill>
@@ -12592,7 +12592,7 @@
             <a:fld id="{48A87A34-81AB-432B-8DAE-1953F412C126}" type="datetimeFigureOut">
               <a:rPr lang="en-US" smtClean="0"/>
               <a:pPr/>
-              <a:t>5/19/2021</a:t>
+              <a:t>12/11/2021</a:t>
             </a:fld>
             <a:endParaRPr lang="en-US" dirty="0"/>
           </a:p>
@@ -13164,10 +13164,10 @@
       </p:sp>
       <p:pic>
         <p:nvPicPr>
-          <p:cNvPr id="6" name="Content Placeholder 5">
+          <p:cNvPr id="11" name="Content Placeholder 10">
             <a:extLst>
               <a:ext uri="{FF2B5EF4-FFF2-40B4-BE49-F238E27FC236}">
-                <a16:creationId xmlns:a16="http://schemas.microsoft.com/office/drawing/2014/main" id="{7446AF04-D9E3-4AA5-BEEC-75A030DF9F74}"/>
+                <a16:creationId xmlns:a16="http://schemas.microsoft.com/office/drawing/2014/main" id="{DFEF437D-4FE8-49DB-AE87-690223DB2B7B}"/>
               </a:ext>
             </a:extLst>
           </p:cNvPr>
@@ -13257,10 +13257,10 @@
       </p:sp>
       <p:pic>
         <p:nvPicPr>
-          <p:cNvPr id="7" name="Content Placeholder 6">
+          <p:cNvPr id="11" name="Content Placeholder 10">
             <a:extLst>
               <a:ext uri="{FF2B5EF4-FFF2-40B4-BE49-F238E27FC236}">
-                <a16:creationId xmlns:a16="http://schemas.microsoft.com/office/drawing/2014/main" id="{B51158DF-473D-4D96-B075-D2D8845482C2}"/>
+                <a16:creationId xmlns:a16="http://schemas.microsoft.com/office/drawing/2014/main" id="{A78D3DAB-23F8-45F5-8EDD-EE27F22124F3}"/>
               </a:ext>
             </a:extLst>
           </p:cNvPr>
@@ -13350,10 +13350,10 @@
       </p:sp>
       <p:pic>
         <p:nvPicPr>
-          <p:cNvPr id="6" name="Content Placeholder 5">
+          <p:cNvPr id="11" name="Content Placeholder 10">
             <a:extLst>
               <a:ext uri="{FF2B5EF4-FFF2-40B4-BE49-F238E27FC236}">
-                <a16:creationId xmlns:a16="http://schemas.microsoft.com/office/drawing/2014/main" id="{7A1A7D49-3A09-494D-9214-D9E300234EEA}"/>
+                <a16:creationId xmlns:a16="http://schemas.microsoft.com/office/drawing/2014/main" id="{748187CA-2912-4A84-BF25-028B80E149C5}"/>
               </a:ext>
             </a:extLst>
           </p:cNvPr>
@@ -14458,14 +14458,14 @@
             </a:pPr>
             <a:r>
               <a:rPr lang="en-US" sz="1600" dirty="0"/>
-              <a:t>Father to a nearly two-year-old girl</a:t>
+              <a:t>Father to a two-year-old girl</a:t>
             </a:r>
           </a:p>
         </p:txBody>
       </p:sp>
       <p:pic>
         <p:nvPicPr>
-          <p:cNvPr id="6" name="Picture 5" descr="A person holding a baby&#10;&#10;Description automatically generated with medium confidence">
+          <p:cNvPr id="6" name="Picture 5">
             <a:extLst>
               <a:ext uri="{FF2B5EF4-FFF2-40B4-BE49-F238E27FC236}">
                 <a16:creationId xmlns:a16="http://schemas.microsoft.com/office/drawing/2014/main" id="{071438C7-8E02-4026-B844-B3481E6FDCD5}"/>
@@ -14479,14 +14479,13 @@
         </p:nvPicPr>
         <p:blipFill>
           <a:blip r:embed="rId3"/>
-          <a:stretch>
-            <a:fillRect/>
-          </a:stretch>
+          <a:srcRect/>
+          <a:stretch/>
         </p:blipFill>
         <p:spPr>
-          <a:xfrm>
-            <a:off x="6817069" y="894523"/>
-            <a:ext cx="3545785" cy="4727714"/>
+          <a:xfrm rot="5400000">
+            <a:off x="6226105" y="1485487"/>
+            <a:ext cx="4727713" cy="3545785"/>
           </a:xfrm>
           <a:prstGeom prst="rect">
             <a:avLst/>
@@ -16630,10 +16629,10 @@
       </p:sp>
       <p:pic>
         <p:nvPicPr>
-          <p:cNvPr id="5" name="Content Placeholder 4">
+          <p:cNvPr id="7" name="Content Placeholder 6">
             <a:extLst>
               <a:ext uri="{FF2B5EF4-FFF2-40B4-BE49-F238E27FC236}">
-                <a16:creationId xmlns:a16="http://schemas.microsoft.com/office/drawing/2014/main" id="{B928A5DC-54F3-4342-9FB1-578C95FDA742}"/>
+                <a16:creationId xmlns:a16="http://schemas.microsoft.com/office/drawing/2014/main" id="{4F0BBCC2-E0B8-4524-AE2B-784EE0FEB414}"/>
               </a:ext>
             </a:extLst>
           </p:cNvPr>
@@ -16658,8 +16657,8 @@
         </p:blipFill>
         <p:spPr>
           <a:xfrm>
-            <a:off x="1403544" y="2097087"/>
-            <a:ext cx="9435031" cy="3868363"/>
+            <a:off x="1557129" y="2160057"/>
+            <a:ext cx="9454407" cy="3876307"/>
           </a:xfrm>
         </p:spPr>
       </p:pic>
@@ -16731,10 +16730,10 @@
       </p:sp>
       <p:pic>
         <p:nvPicPr>
-          <p:cNvPr id="11" name="Content Placeholder 10">
+          <p:cNvPr id="6" name="Content Placeholder 5">
             <a:extLst>
               <a:ext uri="{FF2B5EF4-FFF2-40B4-BE49-F238E27FC236}">
-                <a16:creationId xmlns:a16="http://schemas.microsoft.com/office/drawing/2014/main" id="{D704F0B6-6DFF-4631-B064-30A8D090672C}"/>
+                <a16:creationId xmlns:a16="http://schemas.microsoft.com/office/drawing/2014/main" id="{82D4F457-447F-462B-8B37-55E860B8A119}"/>
               </a:ext>
             </a:extLst>
           </p:cNvPr>
@@ -16759,8 +16758,8 @@
         </p:blipFill>
         <p:spPr>
           <a:xfrm>
-            <a:off x="2174299" y="1780354"/>
-            <a:ext cx="7840225" cy="4459128"/>
+            <a:off x="1879990" y="1623391"/>
+            <a:ext cx="9005653" cy="5121966"/>
           </a:xfrm>
         </p:spPr>
       </p:pic>
@@ -16832,10 +16831,10 @@
       </p:sp>
       <p:pic>
         <p:nvPicPr>
-          <p:cNvPr id="9" name="Content Placeholder 8">
+          <p:cNvPr id="6" name="Content Placeholder 5">
             <a:extLst>
               <a:ext uri="{FF2B5EF4-FFF2-40B4-BE49-F238E27FC236}">
-                <a16:creationId xmlns:a16="http://schemas.microsoft.com/office/drawing/2014/main" id="{D2595462-70B1-42AE-97F1-85438471583F}"/>
+                <a16:creationId xmlns:a16="http://schemas.microsoft.com/office/drawing/2014/main" id="{78F95F04-F841-4DD1-AA05-D22141B32F4C}"/>
               </a:ext>
             </a:extLst>
           </p:cNvPr>
@@ -16860,8 +16859,8 @@
         </p:blipFill>
         <p:spPr>
           <a:xfrm>
-            <a:off x="2314152" y="1753299"/>
-            <a:ext cx="7560520" cy="4857634"/>
+            <a:off x="2445026" y="1729409"/>
+            <a:ext cx="7907332" cy="5080461"/>
           </a:xfrm>
         </p:spPr>
       </p:pic>
@@ -16933,10 +16932,10 @@
       </p:sp>
       <p:pic>
         <p:nvPicPr>
-          <p:cNvPr id="9" name="Content Placeholder 8">
+          <p:cNvPr id="6" name="Content Placeholder 5">
             <a:extLst>
               <a:ext uri="{FF2B5EF4-FFF2-40B4-BE49-F238E27FC236}">
-                <a16:creationId xmlns:a16="http://schemas.microsoft.com/office/drawing/2014/main" id="{14AD2C50-D590-4F3F-9475-980F846DF02E}"/>
+                <a16:creationId xmlns:a16="http://schemas.microsoft.com/office/drawing/2014/main" id="{A7E8AFF6-9ED2-4CEA-B879-2B5F0E06184C}"/>
               </a:ext>
             </a:extLst>
           </p:cNvPr>
@@ -16961,8 +16960,8 @@
         </p:blipFill>
         <p:spPr>
           <a:xfrm>
-            <a:off x="2774841" y="1802716"/>
-            <a:ext cx="6642318" cy="4765864"/>
+            <a:off x="2726010" y="1643270"/>
+            <a:ext cx="7098075" cy="5092870"/>
           </a:xfrm>
         </p:spPr>
       </p:pic>
@@ -17146,10 +17145,10 @@
       </p:sp>
       <p:pic>
         <p:nvPicPr>
-          <p:cNvPr id="9" name="Content Placeholder 8">
+          <p:cNvPr id="11" name="Content Placeholder 10">
             <a:extLst>
               <a:ext uri="{FF2B5EF4-FFF2-40B4-BE49-F238E27FC236}">
-                <a16:creationId xmlns:a16="http://schemas.microsoft.com/office/drawing/2014/main" id="{A0648F48-9120-4A8F-A261-F6CCE1ED9AC4}"/>
+                <a16:creationId xmlns:a16="http://schemas.microsoft.com/office/drawing/2014/main" id="{4ADF8F83-9A80-48FD-BA09-A73AEF28E1B5}"/>
               </a:ext>
             </a:extLst>
           </p:cNvPr>
@@ -18034,20 +18033,20 @@
 </file>
 
 <file path=customXml/item1.xml><?xml version="1.0" encoding="utf-8"?>
+<p:properties xmlns:p="http://schemas.microsoft.com/office/2006/metadata/properties" xmlns:xsi="http://www.w3.org/2001/XMLSchema-instance" xmlns:pc="http://schemas.microsoft.com/office/infopath/2007/PartnerControls">
+  <documentManagement>
+    <MediaServiceKeyPoints xmlns="71af3243-3dd4-4a8d-8c0d-dd76da1f02a5" xsi:nil="true"/>
+  </documentManagement>
+</p:properties>
+</file>
+
+<file path=customXml/item2.xml><?xml version="1.0" encoding="utf-8"?>
 <?mso-contentType ?>
 <FormTemplates xmlns="http://schemas.microsoft.com/sharepoint/v3/contenttype/forms">
   <Display>DocumentLibraryForm</Display>
   <Edit>DocumentLibraryForm</Edit>
   <New>DocumentLibraryForm</New>
 </FormTemplates>
-</file>
-
-<file path=customXml/item2.xml><?xml version="1.0" encoding="utf-8"?>
-<p:properties xmlns:p="http://schemas.microsoft.com/office/2006/metadata/properties" xmlns:xsi="http://www.w3.org/2001/XMLSchema-instance" xmlns:pc="http://schemas.microsoft.com/office/infopath/2007/PartnerControls">
-  <documentManagement>
-    <MediaServiceKeyPoints xmlns="71af3243-3dd4-4a8d-8c0d-dd76da1f02a5" xsi:nil="true"/>
-  </documentManagement>
-</p:properties>
 </file>
 
 <file path=customXml/item3.xml><?xml version="1.0" encoding="utf-8"?>
@@ -18262,14 +18261,6 @@
 </file>
 
 <file path=customXml/itemProps1.xml><?xml version="1.0" encoding="utf-8"?>
-<ds:datastoreItem xmlns:ds="http://schemas.openxmlformats.org/officeDocument/2006/customXml" ds:itemID="{B579702B-25C7-40D7-9E29-7686B11A9660}">
-  <ds:schemaRefs>
-    <ds:schemaRef ds:uri="http://schemas.microsoft.com/sharepoint/v3/contenttype/forms"/>
-  </ds:schemaRefs>
-</ds:datastoreItem>
-</file>
-
-<file path=customXml/itemProps2.xml><?xml version="1.0" encoding="utf-8"?>
 <ds:datastoreItem xmlns:ds="http://schemas.openxmlformats.org/officeDocument/2006/customXml" ds:itemID="{E7866CFD-F94E-4AE5-ACEA-86FEC0F48A10}">
   <ds:schemaRefs>
     <ds:schemaRef ds:uri="http://schemas.microsoft.com/office/2006/metadata/properties"/>
@@ -18277,6 +18268,14 @@
     <ds:schemaRef ds:uri="71af3243-3dd4-4a8d-8c0d-dd76da1f02a5"/>
     <ds:schemaRef ds:uri="http://www.w3.org/2001/XMLSchema-instance"/>
     <ds:schemaRef ds:uri="http://schemas.microsoft.com/office/infopath/2007/PartnerControls"/>
+  </ds:schemaRefs>
+</ds:datastoreItem>
+</file>
+
+<file path=customXml/itemProps2.xml><?xml version="1.0" encoding="utf-8"?>
+<ds:datastoreItem xmlns:ds="http://schemas.openxmlformats.org/officeDocument/2006/customXml" ds:itemID="{B579702B-25C7-40D7-9E29-7686B11A9660}">
+  <ds:schemaRefs>
+    <ds:schemaRef ds:uri="http://schemas.microsoft.com/sharepoint/v3/contenttype/forms"/>
   </ds:schemaRefs>
 </ds:datastoreItem>
 </file>

</xml_diff>